<commit_message>
added search & navigation bar and re-usable css
</commit_message>
<xml_diff>
--- a/wireframe.pptx
+++ b/wireframe.pptx
@@ -267,7 +267,7 @@
           <a:p>
             <a:fld id="{5B3D8EE2-B186-4E74-82A5-3FDCBC0BCA47}" type="datetimeFigureOut">
               <a:rPr lang="en-SG" smtClean="0"/>
-              <a:t>7/9/2021</a:t>
+              <a:t>11/9/2021</a:t>
             </a:fld>
             <a:endParaRPr lang="en-SG"/>
           </a:p>
@@ -467,7 +467,7 @@
           <a:p>
             <a:fld id="{5B3D8EE2-B186-4E74-82A5-3FDCBC0BCA47}" type="datetimeFigureOut">
               <a:rPr lang="en-SG" smtClean="0"/>
-              <a:t>7/9/2021</a:t>
+              <a:t>11/9/2021</a:t>
             </a:fld>
             <a:endParaRPr lang="en-SG"/>
           </a:p>
@@ -677,7 +677,7 @@
           <a:p>
             <a:fld id="{5B3D8EE2-B186-4E74-82A5-3FDCBC0BCA47}" type="datetimeFigureOut">
               <a:rPr lang="en-SG" smtClean="0"/>
-              <a:t>7/9/2021</a:t>
+              <a:t>11/9/2021</a:t>
             </a:fld>
             <a:endParaRPr lang="en-SG"/>
           </a:p>
@@ -877,7 +877,7 @@
           <a:p>
             <a:fld id="{5B3D8EE2-B186-4E74-82A5-3FDCBC0BCA47}" type="datetimeFigureOut">
               <a:rPr lang="en-SG" smtClean="0"/>
-              <a:t>7/9/2021</a:t>
+              <a:t>11/9/2021</a:t>
             </a:fld>
             <a:endParaRPr lang="en-SG"/>
           </a:p>
@@ -1153,7 +1153,7 @@
           <a:p>
             <a:fld id="{5B3D8EE2-B186-4E74-82A5-3FDCBC0BCA47}" type="datetimeFigureOut">
               <a:rPr lang="en-SG" smtClean="0"/>
-              <a:t>7/9/2021</a:t>
+              <a:t>11/9/2021</a:t>
             </a:fld>
             <a:endParaRPr lang="en-SG"/>
           </a:p>
@@ -1421,7 +1421,7 @@
           <a:p>
             <a:fld id="{5B3D8EE2-B186-4E74-82A5-3FDCBC0BCA47}" type="datetimeFigureOut">
               <a:rPr lang="en-SG" smtClean="0"/>
-              <a:t>7/9/2021</a:t>
+              <a:t>11/9/2021</a:t>
             </a:fld>
             <a:endParaRPr lang="en-SG"/>
           </a:p>
@@ -1836,7 +1836,7 @@
           <a:p>
             <a:fld id="{5B3D8EE2-B186-4E74-82A5-3FDCBC0BCA47}" type="datetimeFigureOut">
               <a:rPr lang="en-SG" smtClean="0"/>
-              <a:t>7/9/2021</a:t>
+              <a:t>11/9/2021</a:t>
             </a:fld>
             <a:endParaRPr lang="en-SG"/>
           </a:p>
@@ -1978,7 +1978,7 @@
           <a:p>
             <a:fld id="{5B3D8EE2-B186-4E74-82A5-3FDCBC0BCA47}" type="datetimeFigureOut">
               <a:rPr lang="en-SG" smtClean="0"/>
-              <a:t>7/9/2021</a:t>
+              <a:t>11/9/2021</a:t>
             </a:fld>
             <a:endParaRPr lang="en-SG"/>
           </a:p>
@@ -2091,7 +2091,7 @@
           <a:p>
             <a:fld id="{5B3D8EE2-B186-4E74-82A5-3FDCBC0BCA47}" type="datetimeFigureOut">
               <a:rPr lang="en-SG" smtClean="0"/>
-              <a:t>7/9/2021</a:t>
+              <a:t>11/9/2021</a:t>
             </a:fld>
             <a:endParaRPr lang="en-SG"/>
           </a:p>
@@ -2404,7 +2404,7 @@
           <a:p>
             <a:fld id="{5B3D8EE2-B186-4E74-82A5-3FDCBC0BCA47}" type="datetimeFigureOut">
               <a:rPr lang="en-SG" smtClean="0"/>
-              <a:t>7/9/2021</a:t>
+              <a:t>11/9/2021</a:t>
             </a:fld>
             <a:endParaRPr lang="en-SG"/>
           </a:p>
@@ -2693,7 +2693,7 @@
           <a:p>
             <a:fld id="{5B3D8EE2-B186-4E74-82A5-3FDCBC0BCA47}" type="datetimeFigureOut">
               <a:rPr lang="en-SG" smtClean="0"/>
-              <a:t>7/9/2021</a:t>
+              <a:t>11/9/2021</a:t>
             </a:fld>
             <a:endParaRPr lang="en-SG"/>
           </a:p>
@@ -2936,7 +2936,7 @@
           <a:p>
             <a:fld id="{5B3D8EE2-B186-4E74-82A5-3FDCBC0BCA47}" type="datetimeFigureOut">
               <a:rPr lang="en-SG" smtClean="0"/>
-              <a:t>7/9/2021</a:t>
+              <a:t>11/9/2021</a:t>
             </a:fld>
             <a:endParaRPr lang="en-SG"/>
           </a:p>
@@ -3710,8 +3710,8 @@
         </p:nvSpPr>
         <p:spPr>
           <a:xfrm>
-            <a:off x="4418043" y="960801"/>
-            <a:ext cx="3806891" cy="369332"/>
+            <a:off x="4900087" y="960801"/>
+            <a:ext cx="3121092" cy="369332"/>
           </a:xfrm>
           <a:prstGeom prst="rect">
             <a:avLst/>
@@ -3726,7 +3726,7 @@
           <a:p>
             <a:r>
               <a:rPr lang="en-US" dirty="0"/>
-              <a:t>Outdoor Pre-Wedding Shoot Locations</a:t>
+              <a:t>Pre-Wedding Shoot Locations</a:t>
             </a:r>
             <a:endParaRPr lang="en-SG" dirty="0"/>
           </a:p>
@@ -4969,6 +4969,87 @@
                 <a:schemeClr val="accent2"/>
               </a:solidFill>
             </a:endParaRPr>
+          </a:p>
+        </p:txBody>
+      </p:sp>
+      <p:sp>
+        <p:nvSpPr>
+          <p:cNvPr id="3" name="TextBox 2">
+            <a:extLst>
+              <a:ext uri="{FF2B5EF4-FFF2-40B4-BE49-F238E27FC236}">
+                <a16:creationId xmlns:a16="http://schemas.microsoft.com/office/drawing/2014/main" id="{8D57FB78-D92F-4FC7-BA32-F040DEA406D1}"/>
+              </a:ext>
+            </a:extLst>
+          </p:cNvPr>
+          <p:cNvSpPr txBox="1"/>
+          <p:nvPr/>
+        </p:nvSpPr>
+        <p:spPr>
+          <a:xfrm>
+            <a:off x="8153400" y="2124075"/>
+            <a:ext cx="3295650" cy="1200329"/>
+          </a:xfrm>
+          <a:prstGeom prst="rect">
+            <a:avLst/>
+          </a:prstGeom>
+          <a:noFill/>
+        </p:spPr>
+        <p:txBody>
+          <a:bodyPr wrap="square" rtlCol="0">
+            <a:spAutoFit/>
+          </a:bodyPr>
+          <a:lstStyle/>
+          <a:p>
+            <a:r>
+              <a:rPr lang="en-US" dirty="0">
+                <a:solidFill>
+                  <a:schemeClr val="accent2"/>
+                </a:solidFill>
+              </a:rPr>
+              <a:t>carpark, show </a:t>
+            </a:r>
+            <a:r>
+              <a:rPr lang="en-US" dirty="0" err="1">
+                <a:solidFill>
+                  <a:schemeClr val="accent2"/>
+                </a:solidFill>
+              </a:rPr>
+              <a:t>avai</a:t>
+            </a:r>
+            <a:r>
+              <a:rPr lang="en-US" dirty="0">
+                <a:solidFill>
+                  <a:schemeClr val="accent2"/>
+                </a:solidFill>
+              </a:rPr>
+              <a:t> and how many slot left </a:t>
+            </a:r>
+          </a:p>
+          <a:p>
+            <a:r>
+              <a:rPr lang="en-US" dirty="0">
+                <a:solidFill>
+                  <a:schemeClr val="accent2"/>
+                </a:solidFill>
+              </a:rPr>
+              <a:t>show parameter of nearby </a:t>
+            </a:r>
+            <a:r>
+              <a:rPr lang="en-US" dirty="0" err="1">
+                <a:solidFill>
+                  <a:schemeClr val="accent2"/>
+                </a:solidFill>
+              </a:rPr>
+              <a:t>wihin</a:t>
+            </a:r>
+            <a:r>
+              <a:rPr lang="en-US" dirty="0">
+                <a:solidFill>
+                  <a:schemeClr val="accent2"/>
+                </a:solidFill>
+              </a:rPr>
+              <a:t> 500 meters </a:t>
+            </a:r>
           </a:p>
         </p:txBody>
       </p:sp>
@@ -5789,6 +5870,59 @@
           </a:graphicData>
         </a:graphic>
       </p:graphicFrame>
+      <p:sp>
+        <p:nvSpPr>
+          <p:cNvPr id="2" name="TextBox 1">
+            <a:extLst>
+              <a:ext uri="{FF2B5EF4-FFF2-40B4-BE49-F238E27FC236}">
+                <a16:creationId xmlns:a16="http://schemas.microsoft.com/office/drawing/2014/main" id="{C05525D6-B00C-4E6C-8434-109FFFE1EA1E}"/>
+              </a:ext>
+            </a:extLst>
+          </p:cNvPr>
+          <p:cNvSpPr txBox="1"/>
+          <p:nvPr/>
+        </p:nvSpPr>
+        <p:spPr>
+          <a:xfrm>
+            <a:off x="8374354" y="981075"/>
+            <a:ext cx="2569871" cy="646331"/>
+          </a:xfrm>
+          <a:prstGeom prst="rect">
+            <a:avLst/>
+          </a:prstGeom>
+          <a:noFill/>
+        </p:spPr>
+        <p:txBody>
+          <a:bodyPr wrap="square" rtlCol="0">
+            <a:spAutoFit/>
+          </a:bodyPr>
+          <a:lstStyle/>
+          <a:p>
+            <a:r>
+              <a:rPr lang="en-SG" dirty="0"/>
+              <a:t>To do if have extra time:</a:t>
+            </a:r>
+          </a:p>
+          <a:p>
+            <a:r>
+              <a:rPr lang="en-SG" dirty="0" err="1"/>
+              <a:t>Fourquare</a:t>
+            </a:r>
+            <a:r>
+              <a:rPr lang="en-SG" dirty="0"/>
+              <a:t> &gt; photo </a:t>
+            </a:r>
+            <a:r>
+              <a:rPr lang="en-SG" dirty="0" err="1"/>
+              <a:t>api</a:t>
+            </a:r>
+            <a:r>
+              <a:rPr lang="en-SG" dirty="0"/>
+              <a:t> </a:t>
+            </a:r>
+          </a:p>
+        </p:txBody>
+      </p:sp>
     </p:spTree>
     <p:extLst>
       <p:ext uri="{BB962C8B-B14F-4D97-AF65-F5344CB8AC3E}">

</xml_diff>

<commit_message>
add geo data for national parks
</commit_message>
<xml_diff>
--- a/wireframe.pptx
+++ b/wireframe.pptx
@@ -10,8 +10,9 @@
     <p:sldId id="259" r:id="rId4"/>
     <p:sldId id="264" r:id="rId5"/>
     <p:sldId id="261" r:id="rId6"/>
-    <p:sldId id="262" r:id="rId7"/>
-    <p:sldId id="263" r:id="rId8"/>
+    <p:sldId id="265" r:id="rId7"/>
+    <p:sldId id="262" r:id="rId8"/>
+    <p:sldId id="263" r:id="rId9"/>
   </p:sldIdLst>
   <p:sldSz cx="12192000" cy="6858000"/>
   <p:notesSz cx="6858000" cy="9144000"/>
@@ -5977,7 +5978,7 @@
         </p:spPr>
         <p:txBody>
           <a:bodyPr>
-            <a:normAutofit fontScale="70000" lnSpcReduction="20000"/>
+            <a:normAutofit fontScale="85000" lnSpcReduction="20000"/>
           </a:bodyPr>
           <a:lstStyle/>
           <a:p>
@@ -5994,25 +5995,6 @@
               <a:buNone/>
             </a:pPr>
             <a:endParaRPr lang="en-US" sz="2600" dirty="0"/>
-          </a:p>
-          <a:p>
-            <a:r>
-              <a:rPr lang="en-US" dirty="0"/>
-              <a:t>Map</a:t>
-            </a:r>
-          </a:p>
-          <a:p>
-            <a:pPr marL="0" indent="0">
-              <a:buNone/>
-            </a:pPr>
-            <a:r>
-              <a:rPr lang="en-US" dirty="0" err="1"/>
-              <a:t>Leftlet</a:t>
-            </a:r>
-            <a:r>
-              <a:rPr lang="en-US" dirty="0"/>
-              <a:t> </a:t>
-            </a:r>
           </a:p>
           <a:p>
             <a:pPr marL="0" indent="0">
@@ -6143,6 +6125,104 @@
 </file>
 
 <file path=ppt/slides/slide6.xml><?xml version="1.0" encoding="utf-8"?>
+<p:sld xmlns:a="http://schemas.openxmlformats.org/drawingml/2006/main" xmlns:r="http://schemas.openxmlformats.org/officeDocument/2006/relationships" xmlns:p="http://schemas.openxmlformats.org/presentationml/2006/main">
+  <p:cSld>
+    <p:spTree>
+      <p:nvGrpSpPr>
+        <p:cNvPr id="1" name=""/>
+        <p:cNvGrpSpPr/>
+        <p:nvPr/>
+      </p:nvGrpSpPr>
+      <p:grpSpPr>
+        <a:xfrm>
+          <a:off x="0" y="0"/>
+          <a:ext cx="0" cy="0"/>
+          <a:chOff x="0" y="0"/>
+          <a:chExt cx="0" cy="0"/>
+        </a:xfrm>
+      </p:grpSpPr>
+      <p:sp>
+        <p:nvSpPr>
+          <p:cNvPr id="3" name="Content Placeholder 2">
+            <a:extLst>
+              <a:ext uri="{FF2B5EF4-FFF2-40B4-BE49-F238E27FC236}">
+                <a16:creationId xmlns:a16="http://schemas.microsoft.com/office/drawing/2014/main" id="{9F709A1E-B8F0-411D-B370-3DAEEA62892A}"/>
+              </a:ext>
+            </a:extLst>
+          </p:cNvPr>
+          <p:cNvSpPr>
+            <a:spLocks noGrp="1"/>
+          </p:cNvSpPr>
+          <p:nvPr>
+            <p:ph idx="1"/>
+          </p:nvPr>
+        </p:nvSpPr>
+        <p:spPr>
+          <a:xfrm>
+            <a:off x="838200" y="422413"/>
+            <a:ext cx="10515600" cy="6038022"/>
+          </a:xfrm>
+        </p:spPr>
+        <p:txBody>
+          <a:bodyPr>
+            <a:normAutofit/>
+          </a:bodyPr>
+          <a:lstStyle/>
+          <a:p>
+            <a:pPr marL="0" indent="0">
+              <a:buNone/>
+            </a:pPr>
+            <a:r>
+              <a:rPr lang="en-US" sz="1600" b="1" dirty="0"/>
+              <a:t>Updated data use: </a:t>
+            </a:r>
+          </a:p>
+          <a:p>
+            <a:r>
+              <a:rPr lang="en-US" sz="1600" dirty="0"/>
+              <a:t>Main map  &gt;&gt; </a:t>
+            </a:r>
+            <a:r>
+              <a:rPr lang="en-US" sz="1600" dirty="0" err="1"/>
+              <a:t>Leftlet</a:t>
+            </a:r>
+            <a:r>
+              <a:rPr lang="en-US" sz="1600" dirty="0"/>
+              <a:t> </a:t>
+            </a:r>
+            <a:endParaRPr lang="en-SG" sz="1600" dirty="0"/>
+          </a:p>
+          <a:p>
+            <a:r>
+              <a:rPr lang="en-SG" sz="1600" dirty="0"/>
+              <a:t>Parks</a:t>
+            </a:r>
+          </a:p>
+          <a:p>
+            <a:pPr marL="0" indent="0">
+              <a:buNone/>
+            </a:pPr>
+            <a:r>
+              <a:rPr lang="en-SG" sz="1600" dirty="0"/>
+              <a:t>https://data.gov.sg/dataset/parks?resource_id=579a406c-f1bb-44da-afb7-45d8c1e4465f</a:t>
+            </a:r>
+          </a:p>
+        </p:txBody>
+      </p:sp>
+    </p:spTree>
+    <p:extLst>
+      <p:ext uri="{BB962C8B-B14F-4D97-AF65-F5344CB8AC3E}">
+        <p14:creationId xmlns:p14="http://schemas.microsoft.com/office/powerpoint/2010/main" val="3841191396"/>
+      </p:ext>
+    </p:extLst>
+  </p:cSld>
+  <p:clrMapOvr>
+    <a:masterClrMapping/>
+  </p:clrMapOvr>
+</p:sld>
+</file>
+
+<file path=ppt/slides/slide7.xml><?xml version="1.0" encoding="utf-8"?>
 <p:sld xmlns:a="http://schemas.openxmlformats.org/drawingml/2006/main" xmlns:r="http://schemas.openxmlformats.org/officeDocument/2006/relationships" xmlns:p="http://schemas.openxmlformats.org/presentationml/2006/main">
   <p:cSld>
     <p:spTree>
@@ -6796,7 +6876,7 @@
 </p:sld>
 </file>
 
-<file path=ppt/slides/slide7.xml><?xml version="1.0" encoding="utf-8"?>
+<file path=ppt/slides/slide8.xml><?xml version="1.0" encoding="utf-8"?>
 <p:sld xmlns:a="http://schemas.openxmlformats.org/drawingml/2006/main" xmlns:r="http://schemas.openxmlformats.org/officeDocument/2006/relationships" xmlns:p="http://schemas.openxmlformats.org/presentationml/2006/main">
   <p:cSld>
     <p:spTree>

</xml_diff>

<commit_message>
refectored leaftlet map to function
</commit_message>
<xml_diff>
--- a/wireframe.pptx
+++ b/wireframe.pptx
@@ -268,7 +268,7 @@
           <a:p>
             <a:fld id="{5B3D8EE2-B186-4E74-82A5-3FDCBC0BCA47}" type="datetimeFigureOut">
               <a:rPr lang="en-SG" smtClean="0"/>
-              <a:t>11/9/2021</a:t>
+              <a:t>12/9/2021</a:t>
             </a:fld>
             <a:endParaRPr lang="en-SG"/>
           </a:p>
@@ -468,7 +468,7 @@
           <a:p>
             <a:fld id="{5B3D8EE2-B186-4E74-82A5-3FDCBC0BCA47}" type="datetimeFigureOut">
               <a:rPr lang="en-SG" smtClean="0"/>
-              <a:t>11/9/2021</a:t>
+              <a:t>12/9/2021</a:t>
             </a:fld>
             <a:endParaRPr lang="en-SG"/>
           </a:p>
@@ -678,7 +678,7 @@
           <a:p>
             <a:fld id="{5B3D8EE2-B186-4E74-82A5-3FDCBC0BCA47}" type="datetimeFigureOut">
               <a:rPr lang="en-SG" smtClean="0"/>
-              <a:t>11/9/2021</a:t>
+              <a:t>12/9/2021</a:t>
             </a:fld>
             <a:endParaRPr lang="en-SG"/>
           </a:p>
@@ -878,7 +878,7 @@
           <a:p>
             <a:fld id="{5B3D8EE2-B186-4E74-82A5-3FDCBC0BCA47}" type="datetimeFigureOut">
               <a:rPr lang="en-SG" smtClean="0"/>
-              <a:t>11/9/2021</a:t>
+              <a:t>12/9/2021</a:t>
             </a:fld>
             <a:endParaRPr lang="en-SG"/>
           </a:p>
@@ -1154,7 +1154,7 @@
           <a:p>
             <a:fld id="{5B3D8EE2-B186-4E74-82A5-3FDCBC0BCA47}" type="datetimeFigureOut">
               <a:rPr lang="en-SG" smtClean="0"/>
-              <a:t>11/9/2021</a:t>
+              <a:t>12/9/2021</a:t>
             </a:fld>
             <a:endParaRPr lang="en-SG"/>
           </a:p>
@@ -1422,7 +1422,7 @@
           <a:p>
             <a:fld id="{5B3D8EE2-B186-4E74-82A5-3FDCBC0BCA47}" type="datetimeFigureOut">
               <a:rPr lang="en-SG" smtClean="0"/>
-              <a:t>11/9/2021</a:t>
+              <a:t>12/9/2021</a:t>
             </a:fld>
             <a:endParaRPr lang="en-SG"/>
           </a:p>
@@ -1837,7 +1837,7 @@
           <a:p>
             <a:fld id="{5B3D8EE2-B186-4E74-82A5-3FDCBC0BCA47}" type="datetimeFigureOut">
               <a:rPr lang="en-SG" smtClean="0"/>
-              <a:t>11/9/2021</a:t>
+              <a:t>12/9/2021</a:t>
             </a:fld>
             <a:endParaRPr lang="en-SG"/>
           </a:p>
@@ -1979,7 +1979,7 @@
           <a:p>
             <a:fld id="{5B3D8EE2-B186-4E74-82A5-3FDCBC0BCA47}" type="datetimeFigureOut">
               <a:rPr lang="en-SG" smtClean="0"/>
-              <a:t>11/9/2021</a:t>
+              <a:t>12/9/2021</a:t>
             </a:fld>
             <a:endParaRPr lang="en-SG"/>
           </a:p>
@@ -2092,7 +2092,7 @@
           <a:p>
             <a:fld id="{5B3D8EE2-B186-4E74-82A5-3FDCBC0BCA47}" type="datetimeFigureOut">
               <a:rPr lang="en-SG" smtClean="0"/>
-              <a:t>11/9/2021</a:t>
+              <a:t>12/9/2021</a:t>
             </a:fld>
             <a:endParaRPr lang="en-SG"/>
           </a:p>
@@ -2405,7 +2405,7 @@
           <a:p>
             <a:fld id="{5B3D8EE2-B186-4E74-82A5-3FDCBC0BCA47}" type="datetimeFigureOut">
               <a:rPr lang="en-SG" smtClean="0"/>
-              <a:t>11/9/2021</a:t>
+              <a:t>12/9/2021</a:t>
             </a:fld>
             <a:endParaRPr lang="en-SG"/>
           </a:p>
@@ -2694,7 +2694,7 @@
           <a:p>
             <a:fld id="{5B3D8EE2-B186-4E74-82A5-3FDCBC0BCA47}" type="datetimeFigureOut">
               <a:rPr lang="en-SG" smtClean="0"/>
-              <a:t>11/9/2021</a:t>
+              <a:t>12/9/2021</a:t>
             </a:fld>
             <a:endParaRPr lang="en-SG"/>
           </a:p>
@@ -2937,7 +2937,7 @@
           <a:p>
             <a:fld id="{5B3D8EE2-B186-4E74-82A5-3FDCBC0BCA47}" type="datetimeFigureOut">
               <a:rPr lang="en-SG" smtClean="0"/>
-              <a:t>11/9/2021</a:t>
+              <a:t>12/9/2021</a:t>
             </a:fld>
             <a:endParaRPr lang="en-SG"/>
           </a:p>
@@ -6141,74 +6141,330 @@
           <a:chExt cx="0" cy="0"/>
         </a:xfrm>
       </p:grpSpPr>
-      <p:sp>
-        <p:nvSpPr>
-          <p:cNvPr id="3" name="Content Placeholder 2">
-            <a:extLst>
-              <a:ext uri="{FF2B5EF4-FFF2-40B4-BE49-F238E27FC236}">
-                <a16:creationId xmlns:a16="http://schemas.microsoft.com/office/drawing/2014/main" id="{9F709A1E-B8F0-411D-B370-3DAEEA62892A}"/>
-              </a:ext>
-            </a:extLst>
-          </p:cNvPr>
-          <p:cNvSpPr>
-            <a:spLocks noGrp="1"/>
-          </p:cNvSpPr>
+      <p:graphicFrame>
+        <p:nvGraphicFramePr>
+          <p:cNvPr id="2" name="Table 3">
+            <a:extLst>
+              <a:ext uri="{FF2B5EF4-FFF2-40B4-BE49-F238E27FC236}">
+                <a16:creationId xmlns:a16="http://schemas.microsoft.com/office/drawing/2014/main" id="{B81D1094-1E12-4E9F-9397-57470ED44070}"/>
+              </a:ext>
+            </a:extLst>
+          </p:cNvPr>
+          <p:cNvGraphicFramePr>
+            <a:graphicFrameLocks noGrp="1"/>
+          </p:cNvGraphicFramePr>
           <p:nvPr>
-            <p:ph idx="1"/>
+            <p:extLst>
+              <p:ext uri="{D42A27DB-BD31-4B8C-83A1-F6EECF244321}">
+                <p14:modId xmlns:p14="http://schemas.microsoft.com/office/powerpoint/2010/main" val="1807826774"/>
+              </p:ext>
+            </p:extLst>
           </p:nvPr>
-        </p:nvSpPr>
-        <p:spPr>
-          <a:xfrm>
-            <a:off x="838200" y="422413"/>
-            <a:ext cx="10515600" cy="6038022"/>
-          </a:xfrm>
-        </p:spPr>
-        <p:txBody>
-          <a:bodyPr>
-            <a:normAutofit/>
-          </a:bodyPr>
-          <a:lstStyle/>
-          <a:p>
-            <a:pPr marL="0" indent="0">
-              <a:buNone/>
-            </a:pPr>
-            <a:r>
-              <a:rPr lang="en-US" sz="1600" b="1" dirty="0"/>
-              <a:t>Updated data use: </a:t>
-            </a:r>
-          </a:p>
-          <a:p>
-            <a:r>
-              <a:rPr lang="en-US" sz="1600" dirty="0"/>
-              <a:t>Main map  &gt;&gt; </a:t>
-            </a:r>
-            <a:r>
-              <a:rPr lang="en-US" sz="1600" dirty="0" err="1"/>
-              <a:t>Leftlet</a:t>
-            </a:r>
-            <a:r>
-              <a:rPr lang="en-US" sz="1600" dirty="0"/>
-              <a:t> </a:t>
-            </a:r>
-            <a:endParaRPr lang="en-SG" sz="1600" dirty="0"/>
-          </a:p>
-          <a:p>
-            <a:r>
-              <a:rPr lang="en-SG" sz="1600" dirty="0"/>
-              <a:t>Parks</a:t>
-            </a:r>
-          </a:p>
-          <a:p>
-            <a:pPr marL="0" indent="0">
-              <a:buNone/>
-            </a:pPr>
-            <a:r>
-              <a:rPr lang="en-SG" sz="1600" dirty="0"/>
-              <a:t>https://data.gov.sg/dataset/parks?resource_id=579a406c-f1bb-44da-afb7-45d8c1e4465f</a:t>
-            </a:r>
-          </a:p>
-        </p:txBody>
-      </p:sp>
+        </p:nvGraphicFramePr>
+        <p:xfrm>
+          <a:off x="246821" y="356888"/>
+          <a:ext cx="11698358" cy="2494280"/>
+        </p:xfrm>
+        <a:graphic>
+          <a:graphicData uri="http://schemas.openxmlformats.org/drawingml/2006/table">
+            <a:tbl>
+              <a:tblPr firstRow="1" bandRow="1">
+                <a:tableStyleId>{5C22544A-7EE6-4342-B048-85BDC9FD1C3A}</a:tableStyleId>
+              </a:tblPr>
+              <a:tblGrid>
+                <a:gridCol w="5849179">
+                  <a:extLst>
+                    <a:ext uri="{9D8B030D-6E8A-4147-A177-3AD203B41FA5}">
+                      <a16:colId xmlns:a16="http://schemas.microsoft.com/office/drawing/2014/main" val="2073254338"/>
+                    </a:ext>
+                  </a:extLst>
+                </a:gridCol>
+                <a:gridCol w="5849179">
+                  <a:extLst>
+                    <a:ext uri="{9D8B030D-6E8A-4147-A177-3AD203B41FA5}">
+                      <a16:colId xmlns:a16="http://schemas.microsoft.com/office/drawing/2014/main" val="3487445649"/>
+                    </a:ext>
+                  </a:extLst>
+                </a:gridCol>
+              </a:tblGrid>
+              <a:tr h="370840">
+                <a:tc>
+                  <a:txBody>
+                    <a:bodyPr/>
+                    <a:lstStyle/>
+                    <a:p>
+                      <a:pPr marL="0" marR="0" lvl="0" indent="0" algn="l" defTabSz="914400" rtl="0" eaLnBrk="1" fontAlgn="auto" latinLnBrk="0" hangingPunct="1">
+                        <a:lnSpc>
+                          <a:spcPct val="100000"/>
+                        </a:lnSpc>
+                        <a:spcBef>
+                          <a:spcPts val="0"/>
+                        </a:spcBef>
+                        <a:spcAft>
+                          <a:spcPts val="0"/>
+                        </a:spcAft>
+                        <a:buClrTx/>
+                        <a:buSzTx/>
+                        <a:buFontTx/>
+                        <a:buNone/>
+                        <a:tabLst/>
+                        <a:defRPr/>
+                      </a:pPr>
+                      <a:r>
+                        <a:rPr lang="en-US" sz="1800" b="1" dirty="0"/>
+                        <a:t>Updated data use: </a:t>
+                      </a:r>
+                    </a:p>
+                  </a:txBody>
+                  <a:tcPr/>
+                </a:tc>
+                <a:tc>
+                  <a:txBody>
+                    <a:bodyPr/>
+                    <a:lstStyle/>
+                    <a:p>
+                      <a:r>
+                        <a:rPr lang="en-US" dirty="0"/>
+                        <a:t>Ref: </a:t>
+                      </a:r>
+                      <a:endParaRPr lang="en-SG" dirty="0"/>
+                    </a:p>
+                  </a:txBody>
+                  <a:tcPr/>
+                </a:tc>
+                <a:extLst>
+                  <a:ext uri="{0D108BD9-81ED-4DB2-BD59-A6C34878D82A}">
+                    <a16:rowId xmlns:a16="http://schemas.microsoft.com/office/drawing/2014/main" val="1548987095"/>
+                  </a:ext>
+                </a:extLst>
+              </a:tr>
+              <a:tr h="370840">
+                <a:tc>
+                  <a:txBody>
+                    <a:bodyPr/>
+                    <a:lstStyle/>
+                    <a:p>
+                      <a:pPr marL="0" marR="0" lvl="0" indent="0" algn="l" defTabSz="914400" rtl="0" eaLnBrk="1" fontAlgn="auto" latinLnBrk="0" hangingPunct="1">
+                        <a:lnSpc>
+                          <a:spcPct val="100000"/>
+                        </a:lnSpc>
+                        <a:spcBef>
+                          <a:spcPts val="0"/>
+                        </a:spcBef>
+                        <a:spcAft>
+                          <a:spcPts val="0"/>
+                        </a:spcAft>
+                        <a:buClrTx/>
+                        <a:buSzTx/>
+                        <a:buFontTx/>
+                        <a:buNone/>
+                        <a:tabLst/>
+                        <a:defRPr/>
+                      </a:pPr>
+                      <a:r>
+                        <a:rPr lang="en-US" sz="1800" dirty="0"/>
+                        <a:t>Main map  &gt;&gt; </a:t>
+                      </a:r>
+                      <a:r>
+                        <a:rPr lang="en-US" sz="1800" dirty="0" err="1"/>
+                        <a:t>Leftlet</a:t>
+                      </a:r>
+                      <a:r>
+                        <a:rPr lang="en-US" sz="1800" dirty="0"/>
+                        <a:t> </a:t>
+                      </a:r>
+                    </a:p>
+                  </a:txBody>
+                  <a:tcPr/>
+                </a:tc>
+                <a:tc>
+                  <a:txBody>
+                    <a:bodyPr/>
+                    <a:lstStyle/>
+                    <a:p>
+                      <a:pPr marL="0" marR="0" lvl="0" indent="0" algn="l" defTabSz="914400" rtl="0" eaLnBrk="1" fontAlgn="auto" latinLnBrk="0" hangingPunct="1">
+                        <a:lnSpc>
+                          <a:spcPct val="100000"/>
+                        </a:lnSpc>
+                        <a:spcBef>
+                          <a:spcPts val="0"/>
+                        </a:spcBef>
+                        <a:spcAft>
+                          <a:spcPts val="0"/>
+                        </a:spcAft>
+                        <a:buClrTx/>
+                        <a:buSzTx/>
+                        <a:buFontTx/>
+                        <a:buNone/>
+                        <a:tabLst/>
+                        <a:defRPr/>
+                      </a:pPr>
+                      <a:r>
+                        <a:rPr lang="en-SG" sz="1800" dirty="0"/>
+                        <a:t>https://leafletjs.com/reference-1.7.1.html</a:t>
+                      </a:r>
+                    </a:p>
+                  </a:txBody>
+                  <a:tcPr/>
+                </a:tc>
+                <a:extLst>
+                  <a:ext uri="{0D108BD9-81ED-4DB2-BD59-A6C34878D82A}">
+                    <a16:rowId xmlns:a16="http://schemas.microsoft.com/office/drawing/2014/main" val="930923466"/>
+                  </a:ext>
+                </a:extLst>
+              </a:tr>
+              <a:tr h="370840">
+                <a:tc>
+                  <a:txBody>
+                    <a:bodyPr/>
+                    <a:lstStyle/>
+                    <a:p>
+                      <a:pPr marL="0" marR="0" lvl="0" indent="0" algn="l" defTabSz="914400" rtl="0" eaLnBrk="1" fontAlgn="auto" latinLnBrk="0" hangingPunct="1">
+                        <a:lnSpc>
+                          <a:spcPct val="100000"/>
+                        </a:lnSpc>
+                        <a:spcBef>
+                          <a:spcPts val="0"/>
+                        </a:spcBef>
+                        <a:spcAft>
+                          <a:spcPts val="0"/>
+                        </a:spcAft>
+                        <a:buClrTx/>
+                        <a:buSzTx/>
+                        <a:buFontTx/>
+                        <a:buNone/>
+                        <a:tabLst/>
+                        <a:defRPr/>
+                      </a:pPr>
+                      <a:r>
+                        <a:rPr lang="en-SG" sz="1800" dirty="0"/>
+                        <a:t>Parks</a:t>
+                      </a:r>
+                    </a:p>
+                  </a:txBody>
+                  <a:tcPr/>
+                </a:tc>
+                <a:tc>
+                  <a:txBody>
+                    <a:bodyPr/>
+                    <a:lstStyle/>
+                    <a:p>
+                      <a:pPr marL="0" marR="0" lvl="0" indent="0" algn="l" defTabSz="914400" rtl="0" eaLnBrk="1" fontAlgn="auto" latinLnBrk="0" hangingPunct="1">
+                        <a:lnSpc>
+                          <a:spcPct val="100000"/>
+                        </a:lnSpc>
+                        <a:spcBef>
+                          <a:spcPts val="0"/>
+                        </a:spcBef>
+                        <a:spcAft>
+                          <a:spcPts val="0"/>
+                        </a:spcAft>
+                        <a:buClrTx/>
+                        <a:buSzTx/>
+                        <a:buFontTx/>
+                        <a:buNone/>
+                        <a:tabLst/>
+                        <a:defRPr/>
+                      </a:pPr>
+                      <a:r>
+                        <a:rPr lang="en-SG" sz="1800" dirty="0"/>
+                        <a:t>https://data.gov.sg/dataset/parks?resource_id=579a406c-f1bb-44da-afb7-45d8c1e4465f</a:t>
+                      </a:r>
+                    </a:p>
+                  </a:txBody>
+                  <a:tcPr/>
+                </a:tc>
+                <a:extLst>
+                  <a:ext uri="{0D108BD9-81ED-4DB2-BD59-A6C34878D82A}">
+                    <a16:rowId xmlns:a16="http://schemas.microsoft.com/office/drawing/2014/main" val="3313079467"/>
+                  </a:ext>
+                </a:extLst>
+              </a:tr>
+              <a:tr h="370840">
+                <a:tc>
+                  <a:txBody>
+                    <a:bodyPr/>
+                    <a:lstStyle/>
+                    <a:p>
+                      <a:endParaRPr lang="en-SG" dirty="0"/>
+                    </a:p>
+                  </a:txBody>
+                  <a:tcPr/>
+                </a:tc>
+                <a:tc>
+                  <a:txBody>
+                    <a:bodyPr/>
+                    <a:lstStyle/>
+                    <a:p>
+                      <a:endParaRPr lang="en-SG"/>
+                    </a:p>
+                  </a:txBody>
+                  <a:tcPr/>
+                </a:tc>
+                <a:extLst>
+                  <a:ext uri="{0D108BD9-81ED-4DB2-BD59-A6C34878D82A}">
+                    <a16:rowId xmlns:a16="http://schemas.microsoft.com/office/drawing/2014/main" val="3190661558"/>
+                  </a:ext>
+                </a:extLst>
+              </a:tr>
+              <a:tr h="370840">
+                <a:tc>
+                  <a:txBody>
+                    <a:bodyPr/>
+                    <a:lstStyle/>
+                    <a:p>
+                      <a:endParaRPr lang="en-SG" dirty="0"/>
+                    </a:p>
+                  </a:txBody>
+                  <a:tcPr/>
+                </a:tc>
+                <a:tc>
+                  <a:txBody>
+                    <a:bodyPr/>
+                    <a:lstStyle/>
+                    <a:p>
+                      <a:endParaRPr lang="en-SG"/>
+                    </a:p>
+                  </a:txBody>
+                  <a:tcPr/>
+                </a:tc>
+                <a:extLst>
+                  <a:ext uri="{0D108BD9-81ED-4DB2-BD59-A6C34878D82A}">
+                    <a16:rowId xmlns:a16="http://schemas.microsoft.com/office/drawing/2014/main" val="860356388"/>
+                  </a:ext>
+                </a:extLst>
+              </a:tr>
+              <a:tr h="370840">
+                <a:tc>
+                  <a:txBody>
+                    <a:bodyPr/>
+                    <a:lstStyle/>
+                    <a:p>
+                      <a:endParaRPr lang="en-SG" dirty="0"/>
+                    </a:p>
+                  </a:txBody>
+                  <a:tcPr/>
+                </a:tc>
+                <a:tc>
+                  <a:txBody>
+                    <a:bodyPr/>
+                    <a:lstStyle/>
+                    <a:p>
+                      <a:endParaRPr lang="en-SG" dirty="0"/>
+                    </a:p>
+                  </a:txBody>
+                  <a:tcPr/>
+                </a:tc>
+                <a:extLst>
+                  <a:ext uri="{0D108BD9-81ED-4DB2-BD59-A6C34878D82A}">
+                    <a16:rowId xmlns:a16="http://schemas.microsoft.com/office/drawing/2014/main" val="999446564"/>
+                  </a:ext>
+                </a:extLst>
+              </a:tr>
+            </a:tbl>
+          </a:graphicData>
+        </a:graphic>
+      </p:graphicFrame>
     </p:spTree>
     <p:extLst>
       <p:ext uri="{BB962C8B-B14F-4D97-AF65-F5344CB8AC3E}">

</xml_diff>

<commit_message>
implement search logic for parks
</commit_message>
<xml_diff>
--- a/wireframe.pptx
+++ b/wireframe.pptx
@@ -7863,14 +7863,14 @@
           <p:nvPr>
             <p:extLst>
               <p:ext uri="{D42A27DB-BD31-4B8C-83A1-F6EECF244321}">
-                <p14:modId xmlns:p14="http://schemas.microsoft.com/office/powerpoint/2010/main" val="1070533869"/>
+                <p14:modId xmlns:p14="http://schemas.microsoft.com/office/powerpoint/2010/main" val="709467731"/>
               </p:ext>
             </p:extLst>
           </p:nvPr>
         </p:nvGraphicFramePr>
         <p:xfrm>
           <a:off x="238539" y="149163"/>
-          <a:ext cx="11728175" cy="5339080"/>
+          <a:ext cx="11728175" cy="5582920"/>
         </p:xfrm>
         <a:graphic>
           <a:graphicData uri="http://schemas.openxmlformats.org/drawingml/2006/table">
@@ -8157,6 +8157,12 @@
                       <a:r>
                         <a:rPr lang="en-US" sz="1600" dirty="0"/>
                         <a:t>Map to search bar </a:t>
+                      </a:r>
+                    </a:p>
+                    <a:p>
+                      <a:r>
+                        <a:rPr lang="en-US" sz="1600" dirty="0"/>
+                        <a:t>Fly to the first result location</a:t>
                       </a:r>
                     </a:p>
                     <a:p>

</xml_diff>

<commit_message>
display search result list and implement hide card box body
</commit_message>
<xml_diff>
--- a/wireframe.pptx
+++ b/wireframe.pptx
@@ -4,6 +4,9 @@
   <p:sldMasterIdLst>
     <p:sldMasterId id="2147483648" r:id="rId1"/>
   </p:sldMasterIdLst>
+  <p:notesMasterIdLst>
+    <p:notesMasterId r:id="rId14"/>
+  </p:notesMasterIdLst>
   <p:sldIdLst>
     <p:sldId id="256" r:id="rId2"/>
     <p:sldId id="257" r:id="rId3"/>
@@ -147,6 +150,440 @@
 </p:presentation>
 </file>
 
+<file path=ppt/notesMasters/notesMaster1.xml><?xml version="1.0" encoding="utf-8"?>
+<p:notesMaster xmlns:a="http://schemas.openxmlformats.org/drawingml/2006/main" xmlns:r="http://schemas.openxmlformats.org/officeDocument/2006/relationships" xmlns:p="http://schemas.openxmlformats.org/presentationml/2006/main">
+  <p:cSld>
+    <p:bg>
+      <p:bgRef idx="1001">
+        <a:schemeClr val="bg1"/>
+      </p:bgRef>
+    </p:bg>
+    <p:spTree>
+      <p:nvGrpSpPr>
+        <p:cNvPr id="1" name=""/>
+        <p:cNvGrpSpPr/>
+        <p:nvPr/>
+      </p:nvGrpSpPr>
+      <p:grpSpPr>
+        <a:xfrm>
+          <a:off x="0" y="0"/>
+          <a:ext cx="0" cy="0"/>
+          <a:chOff x="0" y="0"/>
+          <a:chExt cx="0" cy="0"/>
+        </a:xfrm>
+      </p:grpSpPr>
+      <p:sp>
+        <p:nvSpPr>
+          <p:cNvPr id="2" name="Header Placeholder 1"/>
+          <p:cNvSpPr>
+            <a:spLocks noGrp="1"/>
+          </p:cNvSpPr>
+          <p:nvPr>
+            <p:ph type="hdr" sz="quarter"/>
+          </p:nvPr>
+        </p:nvSpPr>
+        <p:spPr>
+          <a:xfrm>
+            <a:off x="0" y="0"/>
+            <a:ext cx="2971800" cy="458788"/>
+          </a:xfrm>
+          <a:prstGeom prst="rect">
+            <a:avLst/>
+          </a:prstGeom>
+        </p:spPr>
+        <p:txBody>
+          <a:bodyPr vert="horz" lIns="91440" tIns="45720" rIns="91440" bIns="45720" rtlCol="0"/>
+          <a:lstStyle>
+            <a:lvl1pPr algn="l">
+              <a:defRPr sz="1200"/>
+            </a:lvl1pPr>
+          </a:lstStyle>
+          <a:p>
+            <a:endParaRPr lang="en-SG"/>
+          </a:p>
+        </p:txBody>
+      </p:sp>
+      <p:sp>
+        <p:nvSpPr>
+          <p:cNvPr id="3" name="Date Placeholder 2"/>
+          <p:cNvSpPr>
+            <a:spLocks noGrp="1"/>
+          </p:cNvSpPr>
+          <p:nvPr>
+            <p:ph type="dt" idx="1"/>
+          </p:nvPr>
+        </p:nvSpPr>
+        <p:spPr>
+          <a:xfrm>
+            <a:off x="3884613" y="0"/>
+            <a:ext cx="2971800" cy="458788"/>
+          </a:xfrm>
+          <a:prstGeom prst="rect">
+            <a:avLst/>
+          </a:prstGeom>
+        </p:spPr>
+        <p:txBody>
+          <a:bodyPr vert="horz" lIns="91440" tIns="45720" rIns="91440" bIns="45720" rtlCol="0"/>
+          <a:lstStyle>
+            <a:lvl1pPr algn="r">
+              <a:defRPr sz="1200"/>
+            </a:lvl1pPr>
+          </a:lstStyle>
+          <a:p>
+            <a:fld id="{32064421-C73C-417F-B8BA-758EB1A55C3F}" type="datetimeFigureOut">
+              <a:rPr lang="en-SG" smtClean="0"/>
+              <a:t>13/9/2021</a:t>
+            </a:fld>
+            <a:endParaRPr lang="en-SG"/>
+          </a:p>
+        </p:txBody>
+      </p:sp>
+      <p:sp>
+        <p:nvSpPr>
+          <p:cNvPr id="4" name="Slide Image Placeholder 3"/>
+          <p:cNvSpPr>
+            <a:spLocks noGrp="1" noRot="1" noChangeAspect="1"/>
+          </p:cNvSpPr>
+          <p:nvPr>
+            <p:ph type="sldImg" idx="2"/>
+          </p:nvPr>
+        </p:nvSpPr>
+        <p:spPr>
+          <a:xfrm>
+            <a:off x="685800" y="1143000"/>
+            <a:ext cx="5486400" cy="3086100"/>
+          </a:xfrm>
+          <a:prstGeom prst="rect">
+            <a:avLst/>
+          </a:prstGeom>
+          <a:noFill/>
+          <a:ln w="12700">
+            <a:solidFill>
+              <a:prstClr val="black"/>
+            </a:solidFill>
+          </a:ln>
+        </p:spPr>
+        <p:txBody>
+          <a:bodyPr vert="horz" lIns="91440" tIns="45720" rIns="91440" bIns="45720" rtlCol="0" anchor="ctr"/>
+          <a:lstStyle/>
+          <a:p>
+            <a:endParaRPr lang="en-SG"/>
+          </a:p>
+        </p:txBody>
+      </p:sp>
+      <p:sp>
+        <p:nvSpPr>
+          <p:cNvPr id="5" name="Notes Placeholder 4"/>
+          <p:cNvSpPr>
+            <a:spLocks noGrp="1"/>
+          </p:cNvSpPr>
+          <p:nvPr>
+            <p:ph type="body" sz="quarter" idx="3"/>
+          </p:nvPr>
+        </p:nvSpPr>
+        <p:spPr>
+          <a:xfrm>
+            <a:off x="685800" y="4400550"/>
+            <a:ext cx="5486400" cy="3600450"/>
+          </a:xfrm>
+          <a:prstGeom prst="rect">
+            <a:avLst/>
+          </a:prstGeom>
+        </p:spPr>
+        <p:txBody>
+          <a:bodyPr vert="horz" lIns="91440" tIns="45720" rIns="91440" bIns="45720" rtlCol="0"/>
+          <a:lstStyle/>
+          <a:p>
+            <a:pPr lvl="0"/>
+            <a:r>
+              <a:rPr lang="en-US"/>
+              <a:t>Click to edit Master text styles</a:t>
+            </a:r>
+          </a:p>
+          <a:p>
+            <a:pPr lvl="1"/>
+            <a:r>
+              <a:rPr lang="en-US"/>
+              <a:t>Second level</a:t>
+            </a:r>
+          </a:p>
+          <a:p>
+            <a:pPr lvl="2"/>
+            <a:r>
+              <a:rPr lang="en-US"/>
+              <a:t>Third level</a:t>
+            </a:r>
+          </a:p>
+          <a:p>
+            <a:pPr lvl="3"/>
+            <a:r>
+              <a:rPr lang="en-US"/>
+              <a:t>Fourth level</a:t>
+            </a:r>
+          </a:p>
+          <a:p>
+            <a:pPr lvl="4"/>
+            <a:r>
+              <a:rPr lang="en-US"/>
+              <a:t>Fifth level</a:t>
+            </a:r>
+            <a:endParaRPr lang="en-SG"/>
+          </a:p>
+        </p:txBody>
+      </p:sp>
+      <p:sp>
+        <p:nvSpPr>
+          <p:cNvPr id="6" name="Footer Placeholder 5"/>
+          <p:cNvSpPr>
+            <a:spLocks noGrp="1"/>
+          </p:cNvSpPr>
+          <p:nvPr>
+            <p:ph type="ftr" sz="quarter" idx="4"/>
+          </p:nvPr>
+        </p:nvSpPr>
+        <p:spPr>
+          <a:xfrm>
+            <a:off x="0" y="8685213"/>
+            <a:ext cx="2971800" cy="458787"/>
+          </a:xfrm>
+          <a:prstGeom prst="rect">
+            <a:avLst/>
+          </a:prstGeom>
+        </p:spPr>
+        <p:txBody>
+          <a:bodyPr vert="horz" lIns="91440" tIns="45720" rIns="91440" bIns="45720" rtlCol="0" anchor="b"/>
+          <a:lstStyle>
+            <a:lvl1pPr algn="l">
+              <a:defRPr sz="1200"/>
+            </a:lvl1pPr>
+          </a:lstStyle>
+          <a:p>
+            <a:endParaRPr lang="en-SG"/>
+          </a:p>
+        </p:txBody>
+      </p:sp>
+      <p:sp>
+        <p:nvSpPr>
+          <p:cNvPr id="7" name="Slide Number Placeholder 6"/>
+          <p:cNvSpPr>
+            <a:spLocks noGrp="1"/>
+          </p:cNvSpPr>
+          <p:nvPr>
+            <p:ph type="sldNum" sz="quarter" idx="5"/>
+          </p:nvPr>
+        </p:nvSpPr>
+        <p:spPr>
+          <a:xfrm>
+            <a:off x="3884613" y="8685213"/>
+            <a:ext cx="2971800" cy="458787"/>
+          </a:xfrm>
+          <a:prstGeom prst="rect">
+            <a:avLst/>
+          </a:prstGeom>
+        </p:spPr>
+        <p:txBody>
+          <a:bodyPr vert="horz" lIns="91440" tIns="45720" rIns="91440" bIns="45720" rtlCol="0" anchor="b"/>
+          <a:lstStyle>
+            <a:lvl1pPr algn="r">
+              <a:defRPr sz="1200"/>
+            </a:lvl1pPr>
+          </a:lstStyle>
+          <a:p>
+            <a:fld id="{EDB02C1C-226F-41E0-8C26-25B756F23392}" type="slidenum">
+              <a:rPr lang="en-SG" smtClean="0"/>
+              <a:t>‹#›</a:t>
+            </a:fld>
+            <a:endParaRPr lang="en-SG"/>
+          </a:p>
+        </p:txBody>
+      </p:sp>
+    </p:spTree>
+    <p:extLst>
+      <p:ext uri="{BB962C8B-B14F-4D97-AF65-F5344CB8AC3E}">
+        <p14:creationId xmlns:p14="http://schemas.microsoft.com/office/powerpoint/2010/main" val="3595459961"/>
+      </p:ext>
+    </p:extLst>
+  </p:cSld>
+  <p:clrMap bg1="lt1" tx1="dk1" bg2="lt2" tx2="dk2" accent1="accent1" accent2="accent2" accent3="accent3" accent4="accent4" accent5="accent5" accent6="accent6" hlink="hlink" folHlink="folHlink"/>
+  <p:notesStyle>
+    <a:lvl1pPr marL="0" algn="l" defTabSz="914400" rtl="0" eaLnBrk="1" latinLnBrk="0" hangingPunct="1">
+      <a:defRPr sz="1200" kern="1200">
+        <a:solidFill>
+          <a:schemeClr val="tx1"/>
+        </a:solidFill>
+        <a:latin typeface="+mn-lt"/>
+        <a:ea typeface="+mn-ea"/>
+        <a:cs typeface="+mn-cs"/>
+      </a:defRPr>
+    </a:lvl1pPr>
+    <a:lvl2pPr marL="457200" algn="l" defTabSz="914400" rtl="0" eaLnBrk="1" latinLnBrk="0" hangingPunct="1">
+      <a:defRPr sz="1200" kern="1200">
+        <a:solidFill>
+          <a:schemeClr val="tx1"/>
+        </a:solidFill>
+        <a:latin typeface="+mn-lt"/>
+        <a:ea typeface="+mn-ea"/>
+        <a:cs typeface="+mn-cs"/>
+      </a:defRPr>
+    </a:lvl2pPr>
+    <a:lvl3pPr marL="914400" algn="l" defTabSz="914400" rtl="0" eaLnBrk="1" latinLnBrk="0" hangingPunct="1">
+      <a:defRPr sz="1200" kern="1200">
+        <a:solidFill>
+          <a:schemeClr val="tx1"/>
+        </a:solidFill>
+        <a:latin typeface="+mn-lt"/>
+        <a:ea typeface="+mn-ea"/>
+        <a:cs typeface="+mn-cs"/>
+      </a:defRPr>
+    </a:lvl3pPr>
+    <a:lvl4pPr marL="1371600" algn="l" defTabSz="914400" rtl="0" eaLnBrk="1" latinLnBrk="0" hangingPunct="1">
+      <a:defRPr sz="1200" kern="1200">
+        <a:solidFill>
+          <a:schemeClr val="tx1"/>
+        </a:solidFill>
+        <a:latin typeface="+mn-lt"/>
+        <a:ea typeface="+mn-ea"/>
+        <a:cs typeface="+mn-cs"/>
+      </a:defRPr>
+    </a:lvl4pPr>
+    <a:lvl5pPr marL="1828800" algn="l" defTabSz="914400" rtl="0" eaLnBrk="1" latinLnBrk="0" hangingPunct="1">
+      <a:defRPr sz="1200" kern="1200">
+        <a:solidFill>
+          <a:schemeClr val="tx1"/>
+        </a:solidFill>
+        <a:latin typeface="+mn-lt"/>
+        <a:ea typeface="+mn-ea"/>
+        <a:cs typeface="+mn-cs"/>
+      </a:defRPr>
+    </a:lvl5pPr>
+    <a:lvl6pPr marL="2286000" algn="l" defTabSz="914400" rtl="0" eaLnBrk="1" latinLnBrk="0" hangingPunct="1">
+      <a:defRPr sz="1200" kern="1200">
+        <a:solidFill>
+          <a:schemeClr val="tx1"/>
+        </a:solidFill>
+        <a:latin typeface="+mn-lt"/>
+        <a:ea typeface="+mn-ea"/>
+        <a:cs typeface="+mn-cs"/>
+      </a:defRPr>
+    </a:lvl6pPr>
+    <a:lvl7pPr marL="2743200" algn="l" defTabSz="914400" rtl="0" eaLnBrk="1" latinLnBrk="0" hangingPunct="1">
+      <a:defRPr sz="1200" kern="1200">
+        <a:solidFill>
+          <a:schemeClr val="tx1"/>
+        </a:solidFill>
+        <a:latin typeface="+mn-lt"/>
+        <a:ea typeface="+mn-ea"/>
+        <a:cs typeface="+mn-cs"/>
+      </a:defRPr>
+    </a:lvl7pPr>
+    <a:lvl8pPr marL="3200400" algn="l" defTabSz="914400" rtl="0" eaLnBrk="1" latinLnBrk="0" hangingPunct="1">
+      <a:defRPr sz="1200" kern="1200">
+        <a:solidFill>
+          <a:schemeClr val="tx1"/>
+        </a:solidFill>
+        <a:latin typeface="+mn-lt"/>
+        <a:ea typeface="+mn-ea"/>
+        <a:cs typeface="+mn-cs"/>
+      </a:defRPr>
+    </a:lvl8pPr>
+    <a:lvl9pPr marL="3657600" algn="l" defTabSz="914400" rtl="0" eaLnBrk="1" latinLnBrk="0" hangingPunct="1">
+      <a:defRPr sz="1200" kern="1200">
+        <a:solidFill>
+          <a:schemeClr val="tx1"/>
+        </a:solidFill>
+        <a:latin typeface="+mn-lt"/>
+        <a:ea typeface="+mn-ea"/>
+        <a:cs typeface="+mn-cs"/>
+      </a:defRPr>
+    </a:lvl9pPr>
+  </p:notesStyle>
+</p:notesMaster>
+</file>
+
+<file path=ppt/notesSlides/notesSlide1.xml><?xml version="1.0" encoding="utf-8"?>
+<p:notes xmlns:a="http://schemas.openxmlformats.org/drawingml/2006/main" xmlns:r="http://schemas.openxmlformats.org/officeDocument/2006/relationships" xmlns:p="http://schemas.openxmlformats.org/presentationml/2006/main">
+  <p:cSld>
+    <p:spTree>
+      <p:nvGrpSpPr>
+        <p:cNvPr id="1" name=""/>
+        <p:cNvGrpSpPr/>
+        <p:nvPr/>
+      </p:nvGrpSpPr>
+      <p:grpSpPr>
+        <a:xfrm>
+          <a:off x="0" y="0"/>
+          <a:ext cx="0" cy="0"/>
+          <a:chOff x="0" y="0"/>
+          <a:chExt cx="0" cy="0"/>
+        </a:xfrm>
+      </p:grpSpPr>
+      <p:sp>
+        <p:nvSpPr>
+          <p:cNvPr id="2" name="Slide Image Placeholder 1"/>
+          <p:cNvSpPr>
+            <a:spLocks noGrp="1" noRot="1" noChangeAspect="1"/>
+          </p:cNvSpPr>
+          <p:nvPr>
+            <p:ph type="sldImg"/>
+          </p:nvPr>
+        </p:nvSpPr>
+        <p:spPr/>
+      </p:sp>
+      <p:sp>
+        <p:nvSpPr>
+          <p:cNvPr id="3" name="Notes Placeholder 2"/>
+          <p:cNvSpPr>
+            <a:spLocks noGrp="1"/>
+          </p:cNvSpPr>
+          <p:nvPr>
+            <p:ph type="body" idx="1"/>
+          </p:nvPr>
+        </p:nvSpPr>
+        <p:spPr/>
+        <p:txBody>
+          <a:bodyPr/>
+          <a:lstStyle/>
+          <a:p>
+            <a:endParaRPr lang="en-SG" dirty="0"/>
+          </a:p>
+        </p:txBody>
+      </p:sp>
+      <p:sp>
+        <p:nvSpPr>
+          <p:cNvPr id="4" name="Slide Number Placeholder 3"/>
+          <p:cNvSpPr>
+            <a:spLocks noGrp="1"/>
+          </p:cNvSpPr>
+          <p:nvPr>
+            <p:ph type="sldNum" sz="quarter" idx="5"/>
+          </p:nvPr>
+        </p:nvSpPr>
+        <p:spPr/>
+        <p:txBody>
+          <a:bodyPr/>
+          <a:lstStyle/>
+          <a:p>
+            <a:fld id="{EDB02C1C-226F-41E0-8C26-25B756F23392}" type="slidenum">
+              <a:rPr lang="en-SG" smtClean="0"/>
+              <a:t>7</a:t>
+            </a:fld>
+            <a:endParaRPr lang="en-SG"/>
+          </a:p>
+        </p:txBody>
+      </p:sp>
+    </p:spTree>
+    <p:extLst>
+      <p:ext uri="{BB962C8B-B14F-4D97-AF65-F5344CB8AC3E}">
+        <p14:creationId xmlns:p14="http://schemas.microsoft.com/office/powerpoint/2010/main" val="1559201942"/>
+      </p:ext>
+    </p:extLst>
+  </p:cSld>
+  <p:clrMapOvr>
+    <a:masterClrMapping/>
+  </p:clrMapOvr>
+</p:notes>
+</file>
+
 <file path=ppt/slideLayouts/slideLayout1.xml><?xml version="1.0" encoding="utf-8"?>
 <p:sldLayout xmlns:a="http://schemas.openxmlformats.org/drawingml/2006/main" xmlns:r="http://schemas.openxmlformats.org/officeDocument/2006/relationships" xmlns:p="http://schemas.openxmlformats.org/presentationml/2006/main" type="title" preserve="1">
   <p:cSld name="Title Slide">
@@ -296,7 +733,7 @@
           <a:p>
             <a:fld id="{5B3D8EE2-B186-4E74-82A5-3FDCBC0BCA47}" type="datetimeFigureOut">
               <a:rPr lang="en-SG" smtClean="0"/>
-              <a:t>12/9/2021</a:t>
+              <a:t>13/9/2021</a:t>
             </a:fld>
             <a:endParaRPr lang="en-SG"/>
           </a:p>
@@ -496,7 +933,7 @@
           <a:p>
             <a:fld id="{5B3D8EE2-B186-4E74-82A5-3FDCBC0BCA47}" type="datetimeFigureOut">
               <a:rPr lang="en-SG" smtClean="0"/>
-              <a:t>12/9/2021</a:t>
+              <a:t>13/9/2021</a:t>
             </a:fld>
             <a:endParaRPr lang="en-SG"/>
           </a:p>
@@ -706,7 +1143,7 @@
           <a:p>
             <a:fld id="{5B3D8EE2-B186-4E74-82A5-3FDCBC0BCA47}" type="datetimeFigureOut">
               <a:rPr lang="en-SG" smtClean="0"/>
-              <a:t>12/9/2021</a:t>
+              <a:t>13/9/2021</a:t>
             </a:fld>
             <a:endParaRPr lang="en-SG"/>
           </a:p>
@@ -906,7 +1343,7 @@
           <a:p>
             <a:fld id="{5B3D8EE2-B186-4E74-82A5-3FDCBC0BCA47}" type="datetimeFigureOut">
               <a:rPr lang="en-SG" smtClean="0"/>
-              <a:t>12/9/2021</a:t>
+              <a:t>13/9/2021</a:t>
             </a:fld>
             <a:endParaRPr lang="en-SG"/>
           </a:p>
@@ -1182,7 +1619,7 @@
           <a:p>
             <a:fld id="{5B3D8EE2-B186-4E74-82A5-3FDCBC0BCA47}" type="datetimeFigureOut">
               <a:rPr lang="en-SG" smtClean="0"/>
-              <a:t>12/9/2021</a:t>
+              <a:t>13/9/2021</a:t>
             </a:fld>
             <a:endParaRPr lang="en-SG"/>
           </a:p>
@@ -1450,7 +1887,7 @@
           <a:p>
             <a:fld id="{5B3D8EE2-B186-4E74-82A5-3FDCBC0BCA47}" type="datetimeFigureOut">
               <a:rPr lang="en-SG" smtClean="0"/>
-              <a:t>12/9/2021</a:t>
+              <a:t>13/9/2021</a:t>
             </a:fld>
             <a:endParaRPr lang="en-SG"/>
           </a:p>
@@ -1865,7 +2302,7 @@
           <a:p>
             <a:fld id="{5B3D8EE2-B186-4E74-82A5-3FDCBC0BCA47}" type="datetimeFigureOut">
               <a:rPr lang="en-SG" smtClean="0"/>
-              <a:t>12/9/2021</a:t>
+              <a:t>13/9/2021</a:t>
             </a:fld>
             <a:endParaRPr lang="en-SG"/>
           </a:p>
@@ -2007,7 +2444,7 @@
           <a:p>
             <a:fld id="{5B3D8EE2-B186-4E74-82A5-3FDCBC0BCA47}" type="datetimeFigureOut">
               <a:rPr lang="en-SG" smtClean="0"/>
-              <a:t>12/9/2021</a:t>
+              <a:t>13/9/2021</a:t>
             </a:fld>
             <a:endParaRPr lang="en-SG"/>
           </a:p>
@@ -2120,7 +2557,7 @@
           <a:p>
             <a:fld id="{5B3D8EE2-B186-4E74-82A5-3FDCBC0BCA47}" type="datetimeFigureOut">
               <a:rPr lang="en-SG" smtClean="0"/>
-              <a:t>12/9/2021</a:t>
+              <a:t>13/9/2021</a:t>
             </a:fld>
             <a:endParaRPr lang="en-SG"/>
           </a:p>
@@ -2433,7 +2870,7 @@
           <a:p>
             <a:fld id="{5B3D8EE2-B186-4E74-82A5-3FDCBC0BCA47}" type="datetimeFigureOut">
               <a:rPr lang="en-SG" smtClean="0"/>
-              <a:t>12/9/2021</a:t>
+              <a:t>13/9/2021</a:t>
             </a:fld>
             <a:endParaRPr lang="en-SG"/>
           </a:p>
@@ -2722,7 +3159,7 @@
           <a:p>
             <a:fld id="{5B3D8EE2-B186-4E74-82A5-3FDCBC0BCA47}" type="datetimeFigureOut">
               <a:rPr lang="en-SG" smtClean="0"/>
-              <a:t>12/9/2021</a:t>
+              <a:t>13/9/2021</a:t>
             </a:fld>
             <a:endParaRPr lang="en-SG"/>
           </a:p>
@@ -2965,7 +3402,7 @@
           <a:p>
             <a:fld id="{5B3D8EE2-B186-4E74-82A5-3FDCBC0BCA47}" type="datetimeFigureOut">
               <a:rPr lang="en-SG" smtClean="0"/>
-              <a:t>12/9/2021</a:t>
+              <a:t>13/9/2021</a:t>
             </a:fld>
             <a:endParaRPr lang="en-SG"/>
           </a:p>
@@ -7863,14 +8300,14 @@
           <p:nvPr>
             <p:extLst>
               <p:ext uri="{D42A27DB-BD31-4B8C-83A1-F6EECF244321}">
-                <p14:modId xmlns:p14="http://schemas.microsoft.com/office/powerpoint/2010/main" val="709467731"/>
+                <p14:modId xmlns:p14="http://schemas.microsoft.com/office/powerpoint/2010/main" val="828023777"/>
               </p:ext>
             </p:extLst>
           </p:nvPr>
         </p:nvGraphicFramePr>
         <p:xfrm>
           <a:off x="238539" y="149163"/>
-          <a:ext cx="11728175" cy="5582920"/>
+          <a:ext cx="11728175" cy="6070600"/>
         </p:xfrm>
         <a:graphic>
           <a:graphicData uri="http://schemas.openxmlformats.org/drawingml/2006/table">
@@ -8150,25 +8587,56 @@
                     <a:p>
                       <a:r>
                         <a:rPr lang="en-US" sz="1600" dirty="0"/>
-                        <a:t>Clear list </a:t>
+                        <a:t>Clear list x</a:t>
                       </a:r>
                     </a:p>
                     <a:p>
                       <a:r>
                         <a:rPr lang="en-US" sz="1600" dirty="0"/>
-                        <a:t>Map to search bar </a:t>
+                        <a:t>Map to search bar x</a:t>
                       </a:r>
                     </a:p>
                     <a:p>
+                      <a:r>
+                        <a:rPr lang="en-US" sz="1600" dirty="0"/>
+                        <a:t>Hide card body x </a:t>
+                      </a:r>
+                    </a:p>
+                    <a:p>
+                      <a:r>
+                        <a:rPr lang="en-US" sz="1600" dirty="0"/>
+                        <a:t>Show filtered search result x </a:t>
+                      </a:r>
+                      <a:r>
+                        <a:rPr lang="en-US" sz="1600" dirty="0">
+                          <a:solidFill>
+                            <a:srgbClr val="FF0000"/>
+                          </a:solidFill>
+                        </a:rPr>
+                        <a:t>– to move this block to script** </a:t>
+                      </a:r>
+                    </a:p>
+                    <a:p>
+                      <a:pPr marL="0" marR="0" lvl="0" indent="0" algn="l" defTabSz="914400" rtl="0" eaLnBrk="1" fontAlgn="auto" latinLnBrk="0" hangingPunct="1">
+                        <a:lnSpc>
+                          <a:spcPct val="100000"/>
+                        </a:lnSpc>
+                        <a:spcBef>
+                          <a:spcPts val="0"/>
+                        </a:spcBef>
+                        <a:spcAft>
+                          <a:spcPts val="0"/>
+                        </a:spcAft>
+                        <a:buClrTx/>
+                        <a:buSzTx/>
+                        <a:buFontTx/>
+                        <a:buNone/>
+                        <a:tabLst/>
+                        <a:defRPr/>
+                      </a:pPr>
                       <a:r>
                         <a:rPr lang="en-US" sz="1600" dirty="0"/>
                         <a:t>Fly to the first result location</a:t>
-                      </a:r>
-                    </a:p>
-                    <a:p>
-                      <a:r>
-                        <a:rPr lang="en-US" sz="1600" dirty="0"/>
-                        <a:t>Show filtered search result </a:t>
                       </a:r>
                     </a:p>
                     <a:p>
@@ -9765,4 +10233,299 @@
     </a:ext>
   </a:extLst>
 </a:theme>
+</file>
+
+<file path=ppt/theme/theme2.xml><?xml version="1.0" encoding="utf-8"?>
+<a:theme xmlns:a="http://schemas.openxmlformats.org/drawingml/2006/main" name="Office Theme">
+  <a:themeElements>
+    <a:clrScheme name="Office">
+      <a:dk1>
+        <a:sysClr val="windowText" lastClr="000000"/>
+      </a:dk1>
+      <a:lt1>
+        <a:sysClr val="window" lastClr="FFFFFF"/>
+      </a:lt1>
+      <a:dk2>
+        <a:srgbClr val="44546A"/>
+      </a:dk2>
+      <a:lt2>
+        <a:srgbClr val="E7E6E6"/>
+      </a:lt2>
+      <a:accent1>
+        <a:srgbClr val="4472C4"/>
+      </a:accent1>
+      <a:accent2>
+        <a:srgbClr val="ED7D31"/>
+      </a:accent2>
+      <a:accent3>
+        <a:srgbClr val="A5A5A5"/>
+      </a:accent3>
+      <a:accent4>
+        <a:srgbClr val="FFC000"/>
+      </a:accent4>
+      <a:accent5>
+        <a:srgbClr val="5B9BD5"/>
+      </a:accent5>
+      <a:accent6>
+        <a:srgbClr val="70AD47"/>
+      </a:accent6>
+      <a:hlink>
+        <a:srgbClr val="0563C1"/>
+      </a:hlink>
+      <a:folHlink>
+        <a:srgbClr val="954F72"/>
+      </a:folHlink>
+    </a:clrScheme>
+    <a:fontScheme name="Office">
+      <a:majorFont>
+        <a:latin typeface="Calibri Light" panose="020F0302020204030204"/>
+        <a:ea typeface=""/>
+        <a:cs typeface=""/>
+        <a:font script="Jpan" typeface="游ゴシック Light"/>
+        <a:font script="Hang" typeface="맑은 고딕"/>
+        <a:font script="Hans" typeface="等线 Light"/>
+        <a:font script="Hant" typeface="新細明體"/>
+        <a:font script="Arab" typeface="Times New Roman"/>
+        <a:font script="Hebr" typeface="Times New Roman"/>
+        <a:font script="Thai" typeface="Angsana New"/>
+        <a:font script="Ethi" typeface="Nyala"/>
+        <a:font script="Beng" typeface="Vrinda"/>
+        <a:font script="Gujr" typeface="Shruti"/>
+        <a:font script="Khmr" typeface="MoolBoran"/>
+        <a:font script="Knda" typeface="Tunga"/>
+        <a:font script="Guru" typeface="Raavi"/>
+        <a:font script="Cans" typeface="Euphemia"/>
+        <a:font script="Cher" typeface="Plantagenet Cherokee"/>
+        <a:font script="Yiii" typeface="Microsoft Yi Baiti"/>
+        <a:font script="Tibt" typeface="Microsoft Himalaya"/>
+        <a:font script="Thaa" typeface="MV Boli"/>
+        <a:font script="Deva" typeface="Mangal"/>
+        <a:font script="Telu" typeface="Gautami"/>
+        <a:font script="Taml" typeface="Latha"/>
+        <a:font script="Syrc" typeface="Estrangelo Edessa"/>
+        <a:font script="Orya" typeface="Kalinga"/>
+        <a:font script="Mlym" typeface="Kartika"/>
+        <a:font script="Laoo" typeface="DokChampa"/>
+        <a:font script="Sinh" typeface="Iskoola Pota"/>
+        <a:font script="Mong" typeface="Mongolian Baiti"/>
+        <a:font script="Viet" typeface="Times New Roman"/>
+        <a:font script="Uigh" typeface="Microsoft Uighur"/>
+        <a:font script="Geor" typeface="Sylfaen"/>
+        <a:font script="Armn" typeface="Arial"/>
+        <a:font script="Bugi" typeface="Leelawadee UI"/>
+        <a:font script="Bopo" typeface="Microsoft JhengHei"/>
+        <a:font script="Java" typeface="Javanese Text"/>
+        <a:font script="Lisu" typeface="Segoe UI"/>
+        <a:font script="Mymr" typeface="Myanmar Text"/>
+        <a:font script="Nkoo" typeface="Ebrima"/>
+        <a:font script="Olck" typeface="Nirmala UI"/>
+        <a:font script="Osma" typeface="Ebrima"/>
+        <a:font script="Phag" typeface="Phagspa"/>
+        <a:font script="Syrn" typeface="Estrangelo Edessa"/>
+        <a:font script="Syrj" typeface="Estrangelo Edessa"/>
+        <a:font script="Syre" typeface="Estrangelo Edessa"/>
+        <a:font script="Sora" typeface="Nirmala UI"/>
+        <a:font script="Tale" typeface="Microsoft Tai Le"/>
+        <a:font script="Talu" typeface="Microsoft New Tai Lue"/>
+        <a:font script="Tfng" typeface="Ebrima"/>
+      </a:majorFont>
+      <a:minorFont>
+        <a:latin typeface="Calibri" panose="020F0502020204030204"/>
+        <a:ea typeface=""/>
+        <a:cs typeface=""/>
+        <a:font script="Jpan" typeface="游ゴシック"/>
+        <a:font script="Hang" typeface="맑은 고딕"/>
+        <a:font script="Hans" typeface="等线"/>
+        <a:font script="Hant" typeface="新細明體"/>
+        <a:font script="Arab" typeface="Arial"/>
+        <a:font script="Hebr" typeface="Arial"/>
+        <a:font script="Thai" typeface="Cordia New"/>
+        <a:font script="Ethi" typeface="Nyala"/>
+        <a:font script="Beng" typeface="Vrinda"/>
+        <a:font script="Gujr" typeface="Shruti"/>
+        <a:font script="Khmr" typeface="DaunPenh"/>
+        <a:font script="Knda" typeface="Tunga"/>
+        <a:font script="Guru" typeface="Raavi"/>
+        <a:font script="Cans" typeface="Euphemia"/>
+        <a:font script="Cher" typeface="Plantagenet Cherokee"/>
+        <a:font script="Yiii" typeface="Microsoft Yi Baiti"/>
+        <a:font script="Tibt" typeface="Microsoft Himalaya"/>
+        <a:font script="Thaa" typeface="MV Boli"/>
+        <a:font script="Deva" typeface="Mangal"/>
+        <a:font script="Telu" typeface="Gautami"/>
+        <a:font script="Taml" typeface="Latha"/>
+        <a:font script="Syrc" typeface="Estrangelo Edessa"/>
+        <a:font script="Orya" typeface="Kalinga"/>
+        <a:font script="Mlym" typeface="Kartika"/>
+        <a:font script="Laoo" typeface="DokChampa"/>
+        <a:font script="Sinh" typeface="Iskoola Pota"/>
+        <a:font script="Mong" typeface="Mongolian Baiti"/>
+        <a:font script="Viet" typeface="Arial"/>
+        <a:font script="Uigh" typeface="Microsoft Uighur"/>
+        <a:font script="Geor" typeface="Sylfaen"/>
+        <a:font script="Armn" typeface="Arial"/>
+        <a:font script="Bugi" typeface="Leelawadee UI"/>
+        <a:font script="Bopo" typeface="Microsoft JhengHei"/>
+        <a:font script="Java" typeface="Javanese Text"/>
+        <a:font script="Lisu" typeface="Segoe UI"/>
+        <a:font script="Mymr" typeface="Myanmar Text"/>
+        <a:font script="Nkoo" typeface="Ebrima"/>
+        <a:font script="Olck" typeface="Nirmala UI"/>
+        <a:font script="Osma" typeface="Ebrima"/>
+        <a:font script="Phag" typeface="Phagspa"/>
+        <a:font script="Syrn" typeface="Estrangelo Edessa"/>
+        <a:font script="Syrj" typeface="Estrangelo Edessa"/>
+        <a:font script="Syre" typeface="Estrangelo Edessa"/>
+        <a:font script="Sora" typeface="Nirmala UI"/>
+        <a:font script="Tale" typeface="Microsoft Tai Le"/>
+        <a:font script="Talu" typeface="Microsoft New Tai Lue"/>
+        <a:font script="Tfng" typeface="Ebrima"/>
+      </a:minorFont>
+    </a:fontScheme>
+    <a:fmtScheme name="Office">
+      <a:fillStyleLst>
+        <a:solidFill>
+          <a:schemeClr val="phClr"/>
+        </a:solidFill>
+        <a:gradFill rotWithShape="1">
+          <a:gsLst>
+            <a:gs pos="0">
+              <a:schemeClr val="phClr">
+                <a:lumMod val="110000"/>
+                <a:satMod val="105000"/>
+                <a:tint val="67000"/>
+              </a:schemeClr>
+            </a:gs>
+            <a:gs pos="50000">
+              <a:schemeClr val="phClr">
+                <a:lumMod val="105000"/>
+                <a:satMod val="103000"/>
+                <a:tint val="73000"/>
+              </a:schemeClr>
+            </a:gs>
+            <a:gs pos="100000">
+              <a:schemeClr val="phClr">
+                <a:lumMod val="105000"/>
+                <a:satMod val="109000"/>
+                <a:tint val="81000"/>
+              </a:schemeClr>
+            </a:gs>
+          </a:gsLst>
+          <a:lin ang="5400000" scaled="0"/>
+        </a:gradFill>
+        <a:gradFill rotWithShape="1">
+          <a:gsLst>
+            <a:gs pos="0">
+              <a:schemeClr val="phClr">
+                <a:satMod val="103000"/>
+                <a:lumMod val="102000"/>
+                <a:tint val="94000"/>
+              </a:schemeClr>
+            </a:gs>
+            <a:gs pos="50000">
+              <a:schemeClr val="phClr">
+                <a:satMod val="110000"/>
+                <a:lumMod val="100000"/>
+                <a:shade val="100000"/>
+              </a:schemeClr>
+            </a:gs>
+            <a:gs pos="100000">
+              <a:schemeClr val="phClr">
+                <a:lumMod val="99000"/>
+                <a:satMod val="120000"/>
+                <a:shade val="78000"/>
+              </a:schemeClr>
+            </a:gs>
+          </a:gsLst>
+          <a:lin ang="5400000" scaled="0"/>
+        </a:gradFill>
+      </a:fillStyleLst>
+      <a:lnStyleLst>
+        <a:ln w="6350" cap="flat" cmpd="sng" algn="ctr">
+          <a:solidFill>
+            <a:schemeClr val="phClr"/>
+          </a:solidFill>
+          <a:prstDash val="solid"/>
+          <a:miter lim="800000"/>
+        </a:ln>
+        <a:ln w="12700" cap="flat" cmpd="sng" algn="ctr">
+          <a:solidFill>
+            <a:schemeClr val="phClr"/>
+          </a:solidFill>
+          <a:prstDash val="solid"/>
+          <a:miter lim="800000"/>
+        </a:ln>
+        <a:ln w="19050" cap="flat" cmpd="sng" algn="ctr">
+          <a:solidFill>
+            <a:schemeClr val="phClr"/>
+          </a:solidFill>
+          <a:prstDash val="solid"/>
+          <a:miter lim="800000"/>
+        </a:ln>
+      </a:lnStyleLst>
+      <a:effectStyleLst>
+        <a:effectStyle>
+          <a:effectLst/>
+        </a:effectStyle>
+        <a:effectStyle>
+          <a:effectLst/>
+        </a:effectStyle>
+        <a:effectStyle>
+          <a:effectLst>
+            <a:outerShdw blurRad="57150" dist="19050" dir="5400000" algn="ctr" rotWithShape="0">
+              <a:srgbClr val="000000">
+                <a:alpha val="63000"/>
+              </a:srgbClr>
+            </a:outerShdw>
+          </a:effectLst>
+        </a:effectStyle>
+      </a:effectStyleLst>
+      <a:bgFillStyleLst>
+        <a:solidFill>
+          <a:schemeClr val="phClr"/>
+        </a:solidFill>
+        <a:solidFill>
+          <a:schemeClr val="phClr">
+            <a:tint val="95000"/>
+            <a:satMod val="170000"/>
+          </a:schemeClr>
+        </a:solidFill>
+        <a:gradFill rotWithShape="1">
+          <a:gsLst>
+            <a:gs pos="0">
+              <a:schemeClr val="phClr">
+                <a:tint val="93000"/>
+                <a:satMod val="150000"/>
+                <a:shade val="98000"/>
+                <a:lumMod val="102000"/>
+              </a:schemeClr>
+            </a:gs>
+            <a:gs pos="50000">
+              <a:schemeClr val="phClr">
+                <a:tint val="98000"/>
+                <a:satMod val="130000"/>
+                <a:shade val="90000"/>
+                <a:lumMod val="103000"/>
+              </a:schemeClr>
+            </a:gs>
+            <a:gs pos="100000">
+              <a:schemeClr val="phClr">
+                <a:shade val="63000"/>
+                <a:satMod val="120000"/>
+              </a:schemeClr>
+            </a:gs>
+          </a:gsLst>
+          <a:lin ang="5400000" scaled="0"/>
+        </a:gradFill>
+      </a:bgFillStyleLst>
+    </a:fmtScheme>
+  </a:themeElements>
+  <a:objectDefaults/>
+  <a:extraClrSchemeLst/>
+  <a:extLst>
+    <a:ext uri="{05A4C25C-085E-4340-85A3-A5531E510DB2}">
+      <thm15:themeFamily xmlns:thm15="http://schemas.microsoft.com/office/thememl/2012/main" name="Office Theme" id="{62F939B6-93AF-4DB8-9C6B-D6C7DFDC589F}" vid="{4A3C46E8-61CC-4603-A589-7422A47A8E4A}"/>
+    </a:ext>
+  </a:extLst>
+</a:theme>
 </file>
</xml_diff>

<commit_message>
added flyTo selected location upon click
</commit_message>
<xml_diff>
--- a/wireframe.pptx
+++ b/wireframe.pptx
@@ -8300,14 +8300,14 @@
           <p:nvPr>
             <p:extLst>
               <p:ext uri="{D42A27DB-BD31-4B8C-83A1-F6EECF244321}">
-                <p14:modId xmlns:p14="http://schemas.microsoft.com/office/powerpoint/2010/main" val="828023777"/>
+                <p14:modId xmlns:p14="http://schemas.microsoft.com/office/powerpoint/2010/main" val="429074811"/>
               </p:ext>
             </p:extLst>
           </p:nvPr>
         </p:nvGraphicFramePr>
         <p:xfrm>
           <a:off x="238539" y="149163"/>
-          <a:ext cx="11728175" cy="6070600"/>
+          <a:ext cx="11728175" cy="6278880"/>
         </p:xfrm>
         <a:graphic>
           <a:graphicData uri="http://schemas.openxmlformats.org/drawingml/2006/table">
@@ -8323,14 +8323,14 @@
                     </a:ext>
                   </a:extLst>
                 </a:gridCol>
-                <a:gridCol w="2027187">
+                <a:gridCol w="1370674">
                   <a:extLst>
                     <a:ext uri="{9D8B030D-6E8A-4147-A177-3AD203B41FA5}">
                       <a16:colId xmlns:a16="http://schemas.microsoft.com/office/drawing/2014/main" val="764260135"/>
                     </a:ext>
                   </a:extLst>
                 </a:gridCol>
-                <a:gridCol w="3071191">
+                <a:gridCol w="3727704">
                   <a:extLst>
                     <a:ext uri="{9D8B030D-6E8A-4147-A177-3AD203B41FA5}">
                       <a16:colId xmlns:a16="http://schemas.microsoft.com/office/drawing/2014/main" val="3641419838"/>
@@ -8636,7 +8636,7 @@
                       </a:pPr>
                       <a:r>
                         <a:rPr lang="en-US" sz="1600" dirty="0"/>
-                        <a:t>Fly to the first result location</a:t>
+                        <a:t>Fly to the first result location xx</a:t>
                       </a:r>
                     </a:p>
                     <a:p>
@@ -8654,7 +8654,253 @@
                     <a:bodyPr/>
                     <a:lstStyle/>
                     <a:p>
-                      <a:endParaRPr lang="en-SG" sz="1600" dirty="0"/>
+                      <a:r>
+                        <a:rPr lang="en-US" sz="1200" b="0" kern="1200" dirty="0">
+                          <a:solidFill>
+                            <a:schemeClr val="dk1"/>
+                          </a:solidFill>
+                          <a:effectLst/>
+                          <a:latin typeface="+mn-lt"/>
+                          <a:ea typeface="+mn-ea"/>
+                          <a:cs typeface="+mn-cs"/>
+                        </a:rPr>
+                        <a:t>/*</a:t>
+                      </a:r>
+                    </a:p>
+                    <a:p>
+                      <a:r>
+                        <a:rPr lang="en-US" sz="1200" b="0" kern="1200" dirty="0">
+                          <a:solidFill>
+                            <a:schemeClr val="dk1"/>
+                          </a:solidFill>
+                          <a:effectLst/>
+                          <a:latin typeface="+mn-lt"/>
+                          <a:ea typeface="+mn-ea"/>
+                          <a:cs typeface="+mn-cs"/>
+                        </a:rPr>
+                        <a:t>        Leaflet Method (for </a:t>
+                      </a:r>
+                      <a:r>
+                        <a:rPr lang="en-US" sz="1200" b="0" kern="1200" dirty="0" err="1">
+                          <a:solidFill>
+                            <a:schemeClr val="dk1"/>
+                          </a:solidFill>
+                          <a:effectLst/>
+                          <a:latin typeface="+mn-lt"/>
+                          <a:ea typeface="+mn-ea"/>
+                          <a:cs typeface="+mn-cs"/>
+                        </a:rPr>
+                        <a:t>LatLngBounds</a:t>
+                      </a:r>
+                      <a:r>
+                        <a:rPr lang="en-US" sz="1200" b="0" kern="1200" dirty="0">
+                          <a:solidFill>
+                            <a:schemeClr val="dk1"/>
+                          </a:solidFill>
+                          <a:effectLst/>
+                          <a:latin typeface="+mn-lt"/>
+                          <a:ea typeface="+mn-ea"/>
+                          <a:cs typeface="+mn-cs"/>
+                        </a:rPr>
+                        <a:t> objects):</a:t>
+                      </a:r>
+                    </a:p>
+                    <a:p>
+                      <a:r>
+                        <a:rPr lang="en-US" sz="1200" b="0" kern="1200" dirty="0">
+                          <a:solidFill>
+                            <a:schemeClr val="dk1"/>
+                          </a:solidFill>
+                          <a:effectLst/>
+                          <a:latin typeface="+mn-lt"/>
+                          <a:ea typeface="+mn-ea"/>
+                          <a:cs typeface="+mn-cs"/>
+                        </a:rPr>
+                        <a:t>        </a:t>
+                      </a:r>
+                      <a:r>
+                        <a:rPr lang="en-US" sz="1200" b="0" kern="1200" dirty="0" err="1">
+                          <a:solidFill>
+                            <a:schemeClr val="dk1"/>
+                          </a:solidFill>
+                          <a:effectLst/>
+                          <a:latin typeface="+mn-lt"/>
+                          <a:ea typeface="+mn-ea"/>
+                          <a:cs typeface="+mn-cs"/>
+                        </a:rPr>
+                        <a:t>getBounds</a:t>
+                      </a:r>
+                      <a:r>
+                        <a:rPr lang="en-US" sz="1200" b="0" kern="1200" dirty="0">
+                          <a:solidFill>
+                            <a:schemeClr val="dk1"/>
+                          </a:solidFill>
+                          <a:effectLst/>
+                          <a:latin typeface="+mn-lt"/>
+                          <a:ea typeface="+mn-ea"/>
+                          <a:cs typeface="+mn-cs"/>
+                        </a:rPr>
+                        <a:t>() returns </a:t>
+                      </a:r>
+                      <a:r>
+                        <a:rPr lang="en-US" sz="1200" b="0" kern="1200" dirty="0" err="1">
+                          <a:solidFill>
+                            <a:schemeClr val="dk1"/>
+                          </a:solidFill>
+                          <a:effectLst/>
+                          <a:latin typeface="+mn-lt"/>
+                          <a:ea typeface="+mn-ea"/>
+                          <a:cs typeface="+mn-cs"/>
+                        </a:rPr>
+                        <a:t>LatLngBounds</a:t>
+                      </a:r>
+                      <a:r>
+                        <a:rPr lang="en-US" sz="1200" b="0" kern="1200" dirty="0">
+                          <a:solidFill>
+                            <a:schemeClr val="dk1"/>
+                          </a:solidFill>
+                          <a:effectLst/>
+                          <a:latin typeface="+mn-lt"/>
+                          <a:ea typeface="+mn-ea"/>
+                          <a:cs typeface="+mn-cs"/>
+                        </a:rPr>
+                        <a:t>  // </a:t>
+                      </a:r>
+                      <a:r>
+                        <a:rPr lang="en-US" sz="1200" b="0" kern="1200" dirty="0" err="1">
+                          <a:solidFill>
+                            <a:schemeClr val="dk1"/>
+                          </a:solidFill>
+                          <a:effectLst/>
+                          <a:latin typeface="+mn-lt"/>
+                          <a:ea typeface="+mn-ea"/>
+                          <a:cs typeface="+mn-cs"/>
+                        </a:rPr>
+                        <a:t>getCenter</a:t>
+                      </a:r>
+                      <a:r>
+                        <a:rPr lang="en-US" sz="1200" b="0" kern="1200" dirty="0">
+                          <a:solidFill>
+                            <a:schemeClr val="dk1"/>
+                          </a:solidFill>
+                          <a:effectLst/>
+                          <a:latin typeface="+mn-lt"/>
+                          <a:ea typeface="+mn-ea"/>
+                          <a:cs typeface="+mn-cs"/>
+                        </a:rPr>
+                        <a:t>() returns </a:t>
+                      </a:r>
+                      <a:r>
+                        <a:rPr lang="en-US" sz="1200" b="0" kern="1200" dirty="0" err="1">
+                          <a:solidFill>
+                            <a:schemeClr val="dk1"/>
+                          </a:solidFill>
+                          <a:effectLst/>
+                          <a:latin typeface="+mn-lt"/>
+                          <a:ea typeface="+mn-ea"/>
+                          <a:cs typeface="+mn-cs"/>
+                        </a:rPr>
+                        <a:t>LatLng</a:t>
+                      </a:r>
+                      <a:endParaRPr lang="en-US" sz="1200" b="0" kern="1200" dirty="0">
+                        <a:solidFill>
+                          <a:schemeClr val="dk1"/>
+                        </a:solidFill>
+                        <a:effectLst/>
+                        <a:latin typeface="+mn-lt"/>
+                        <a:ea typeface="+mn-ea"/>
+                        <a:cs typeface="+mn-cs"/>
+                      </a:endParaRPr>
+                    </a:p>
+                    <a:p>
+                      <a:r>
+                        <a:rPr lang="en-US" sz="1200" b="0" kern="1200" dirty="0">
+                          <a:solidFill>
+                            <a:schemeClr val="dk1"/>
+                          </a:solidFill>
+                          <a:effectLst/>
+                          <a:latin typeface="+mn-lt"/>
+                          <a:ea typeface="+mn-ea"/>
+                          <a:cs typeface="+mn-cs"/>
+                        </a:rPr>
+                        <a:t>        */</a:t>
+                      </a:r>
+                    </a:p>
+                    <a:p>
+                      <a:r>
+                        <a:rPr lang="en-US" sz="1200" b="0" kern="1200" dirty="0">
+                          <a:solidFill>
+                            <a:schemeClr val="dk1"/>
+                          </a:solidFill>
+                          <a:effectLst/>
+                          <a:latin typeface="+mn-lt"/>
+                          <a:ea typeface="+mn-ea"/>
+                          <a:cs typeface="+mn-cs"/>
+                        </a:rPr>
+                        <a:t>        // ****TO DO - when click on search result &gt; bring to marker </a:t>
+                      </a:r>
+                    </a:p>
+                    <a:p>
+                      <a:r>
+                        <a:rPr lang="en-US" sz="1200" b="0" kern="1200" dirty="0">
+                          <a:solidFill>
+                            <a:schemeClr val="dk1"/>
+                          </a:solidFill>
+                          <a:effectLst/>
+                          <a:latin typeface="+mn-lt"/>
+                          <a:ea typeface="+mn-ea"/>
+                          <a:cs typeface="+mn-cs"/>
+                        </a:rPr>
+                        <a:t>        let center = </a:t>
+                      </a:r>
+                      <a:r>
+                        <a:rPr lang="en-US" sz="1200" b="0" kern="1200" dirty="0" err="1">
+                          <a:solidFill>
+                            <a:schemeClr val="dk1"/>
+                          </a:solidFill>
+                          <a:effectLst/>
+                          <a:latin typeface="+mn-lt"/>
+                          <a:ea typeface="+mn-ea"/>
+                          <a:cs typeface="+mn-cs"/>
+                        </a:rPr>
+                        <a:t>map.getBounds</a:t>
+                      </a:r>
+                      <a:r>
+                        <a:rPr lang="en-US" sz="1200" b="0" kern="1200" dirty="0">
+                          <a:solidFill>
+                            <a:schemeClr val="dk1"/>
+                          </a:solidFill>
+                          <a:effectLst/>
+                          <a:latin typeface="+mn-lt"/>
+                          <a:ea typeface="+mn-ea"/>
+                          <a:cs typeface="+mn-cs"/>
+                        </a:rPr>
+                        <a:t>().</a:t>
+                      </a:r>
+                      <a:r>
+                        <a:rPr lang="en-US" sz="1200" b="0" kern="1200" dirty="0" err="1">
+                          <a:solidFill>
+                            <a:schemeClr val="dk1"/>
+                          </a:solidFill>
+                          <a:effectLst/>
+                          <a:latin typeface="+mn-lt"/>
+                          <a:ea typeface="+mn-ea"/>
+                          <a:cs typeface="+mn-cs"/>
+                        </a:rPr>
+                        <a:t>getCenter</a:t>
+                      </a:r>
+                      <a:r>
+                        <a:rPr lang="en-US" sz="1200" b="0" kern="1200" dirty="0">
+                          <a:solidFill>
+                            <a:schemeClr val="dk1"/>
+                          </a:solidFill>
+                          <a:effectLst/>
+                          <a:latin typeface="+mn-lt"/>
+                          <a:ea typeface="+mn-ea"/>
+                          <a:cs typeface="+mn-cs"/>
+                        </a:rPr>
+                        <a:t>();</a:t>
+                      </a:r>
                     </a:p>
                   </a:txBody>
                   <a:tcPr/>
@@ -8662,61 +8908,6 @@
                 <a:extLst>
                   <a:ext uri="{0D108BD9-81ED-4DB2-BD59-A6C34878D82A}">
                     <a16:rowId xmlns:a16="http://schemas.microsoft.com/office/drawing/2014/main" val="892559996"/>
-                  </a:ext>
-                </a:extLst>
-              </a:tr>
-              <a:tr h="370840">
-                <a:tc>
-                  <a:txBody>
-                    <a:bodyPr/>
-                    <a:lstStyle/>
-                    <a:p>
-                      <a:endParaRPr lang="en-SG" sz="1600"/>
-                    </a:p>
-                  </a:txBody>
-                  <a:tcPr/>
-                </a:tc>
-                <a:tc>
-                  <a:txBody>
-                    <a:bodyPr/>
-                    <a:lstStyle/>
-                    <a:p>
-                      <a:r>
-                        <a:rPr lang="en-US" sz="1600" dirty="0"/>
-                        <a:t>Next: </a:t>
-                      </a:r>
-                      <a:endParaRPr lang="en-SG" sz="1600" dirty="0"/>
-                    </a:p>
-                  </a:txBody>
-                  <a:tcPr/>
-                </a:tc>
-                <a:tc>
-                  <a:txBody>
-                    <a:bodyPr/>
-                    <a:lstStyle/>
-                    <a:p>
-                      <a:r>
-                        <a:rPr lang="en-US" sz="1600" dirty="0"/>
-                        <a:t>show parameter of nearby within 500 meters </a:t>
-                      </a:r>
-                      <a:endParaRPr lang="en-SG" sz="1600" dirty="0"/>
-                    </a:p>
-                  </a:txBody>
-                  <a:tcPr/>
-                </a:tc>
-                <a:tc>
-                  <a:txBody>
-                    <a:bodyPr/>
-                    <a:lstStyle/>
-                    <a:p>
-                      <a:endParaRPr lang="en-SG" sz="1600" dirty="0"/>
-                    </a:p>
-                  </a:txBody>
-                  <a:tcPr/>
-                </a:tc>
-                <a:extLst>
-                  <a:ext uri="{0D108BD9-81ED-4DB2-BD59-A6C34878D82A}">
-                    <a16:rowId xmlns:a16="http://schemas.microsoft.com/office/drawing/2014/main" val="4053821403"/>
                   </a:ext>
                 </a:extLst>
               </a:tr>
@@ -8757,78 +8948,7 @@
                         <a:rPr lang="en-US" sz="1600" dirty="0"/>
                         <a:t>Next: </a:t>
                       </a:r>
-                      <a:endParaRPr lang="en-SG" sz="1600" dirty="0"/>
-                    </a:p>
-                    <a:p>
-                      <a:endParaRPr lang="en-SG" sz="1600" dirty="0"/>
-                    </a:p>
-                  </a:txBody>
-                  <a:tcPr/>
-                </a:tc>
-                <a:tc>
-                  <a:txBody>
-                    <a:bodyPr/>
-                    <a:lstStyle/>
-                    <a:p>
-                      <a:r>
-                        <a:rPr lang="en-US" sz="1600" dirty="0"/>
-                        <a:t>Navbar: </a:t>
-                      </a:r>
-                      <a:r>
-                        <a:rPr lang="en-US" sz="1600" dirty="0" err="1"/>
-                        <a:t>redio</a:t>
-                      </a:r>
-                      <a:r>
-                        <a:rPr lang="en-US" sz="1600" dirty="0"/>
-                        <a:t> button to </a:t>
-                      </a:r>
-                    </a:p>
-                    <a:p>
-                      <a:r>
-                        <a:rPr lang="en-US" sz="1600" dirty="0"/>
-                        <a:t>choose by region </a:t>
-                      </a:r>
-                    </a:p>
-                    <a:p>
-                      <a:r>
-                        <a:rPr lang="en-US" sz="1600" dirty="0"/>
-                        <a:t>Check the radius by 500 meters </a:t>
-                      </a:r>
-                    </a:p>
-                  </a:txBody>
-                  <a:tcPr/>
-                </a:tc>
-                <a:tc>
-                  <a:txBody>
-                    <a:bodyPr/>
-                    <a:lstStyle/>
-                    <a:p>
-                      <a:endParaRPr lang="en-SG" sz="1600" dirty="0"/>
-                    </a:p>
-                  </a:txBody>
-                  <a:tcPr/>
-                </a:tc>
-                <a:extLst>
-                  <a:ext uri="{0D108BD9-81ED-4DB2-BD59-A6C34878D82A}">
-                    <a16:rowId xmlns:a16="http://schemas.microsoft.com/office/drawing/2014/main" val="390328045"/>
-                  </a:ext>
-                </a:extLst>
-              </a:tr>
-              <a:tr h="370840">
-                <a:tc>
-                  <a:txBody>
-                    <a:bodyPr/>
-                    <a:lstStyle/>
-                    <a:p>
-                      <a:endParaRPr lang="en-SG" sz="1600"/>
-                    </a:p>
-                  </a:txBody>
-                  <a:tcPr/>
-                </a:tc>
-                <a:tc>
-                  <a:txBody>
-                    <a:bodyPr/>
-                    <a:lstStyle/>
+                    </a:p>
                     <a:p>
                       <a:pPr marL="0" marR="0" lvl="0" indent="0" algn="l" defTabSz="914400" rtl="0" eaLnBrk="1" fontAlgn="auto" latinLnBrk="0" hangingPunct="1">
                         <a:lnSpc>
@@ -8849,7 +8969,7 @@
                       </a:pPr>
                       <a:r>
                         <a:rPr lang="en-US" sz="1600" dirty="0"/>
-                        <a:t>Next: </a:t>
+                        <a:t>under explore tap: </a:t>
                       </a:r>
                       <a:endParaRPr lang="en-SG" sz="1600" dirty="0"/>
                     </a:p>
@@ -8866,16 +8986,93 @@
                     <a:p>
                       <a:r>
                         <a:rPr lang="en-US" sz="1600" dirty="0"/>
-                        <a:t>Mapped the selected secret spots (insert photo) display on the map </a:t>
+                        <a:t>Navbar: insert as drop down list … </a:t>
                       </a:r>
                     </a:p>
                     <a:p>
-                      <a:endParaRPr lang="en-US" sz="1600" dirty="0"/>
-                    </a:p>
-                    <a:p>
+                      <a:pPr marL="0" marR="0" lvl="0" indent="0" algn="l" defTabSz="914400" rtl="0" eaLnBrk="1" fontAlgn="auto" latinLnBrk="0" hangingPunct="1">
+                        <a:lnSpc>
+                          <a:spcPct val="100000"/>
+                        </a:lnSpc>
+                        <a:spcBef>
+                          <a:spcPts val="0"/>
+                        </a:spcBef>
+                        <a:spcAft>
+                          <a:spcPts val="0"/>
+                        </a:spcAft>
+                        <a:buClrTx/>
+                        <a:buSzTx/>
+                        <a:buFontTx/>
+                        <a:buNone/>
+                        <a:tabLst/>
+                        <a:defRPr/>
+                      </a:pPr>
                       <a:r>
                         <a:rPr lang="en-US" sz="1600" dirty="0"/>
-                        <a:t>Include on the radio buttons for selection</a:t>
+                        <a:t>- </a:t>
+                      </a:r>
+                      <a:r>
+                        <a:rPr lang="en-US" sz="1600" dirty="0" err="1"/>
+                        <a:t>redio</a:t>
+                      </a:r>
+                      <a:r>
+                        <a:rPr lang="en-US" sz="1600" dirty="0"/>
+                        <a:t> button to </a:t>
+                      </a:r>
+                      <a:r>
+                        <a:rPr lang="en-SG" sz="1800" b="0" i="0" kern="1200" dirty="0">
+                          <a:solidFill>
+                            <a:schemeClr val="dk1"/>
+                          </a:solidFill>
+                          <a:effectLst/>
+                          <a:latin typeface="+mn-lt"/>
+                          <a:ea typeface="+mn-ea"/>
+                          <a:cs typeface="+mn-cs"/>
+                        </a:rPr>
+                        <a:t>Toggle Search Results:</a:t>
+                      </a:r>
+                      <a:endParaRPr lang="en-US" sz="1600" dirty="0"/>
+                    </a:p>
+                    <a:p>
+                      <a:r>
+                        <a:rPr lang="en-US" sz="1600" dirty="0"/>
+                        <a:t>choose by region  // </a:t>
+                      </a:r>
+                    </a:p>
+                    <a:p>
+                      <a:r>
+                        <a:rPr lang="en-US" sz="1600" dirty="0"/>
+                        <a:t>Check the radius by 500 meters (show parameter of nearby)</a:t>
+                      </a:r>
+                    </a:p>
+                    <a:p>
+                      <a:endParaRPr lang="en-US" sz="1600" dirty="0"/>
+                    </a:p>
+                    <a:p>
+                      <a:r>
+                        <a:rPr lang="en-US" sz="1600" dirty="0"/>
+                        <a:t>- Mapped the selected secret spots (insert photo) display on the map – put in separate file for this and future edition</a:t>
+                      </a:r>
+                    </a:p>
+                    <a:p>
+                      <a:endParaRPr lang="en-US" sz="1600" dirty="0"/>
+                    </a:p>
+                    <a:p>
+                      <a:r>
+                        <a:rPr lang="en-US" sz="1600" dirty="0"/>
+                        <a:t>Include on the checkbox for selection</a:t>
+                      </a:r>
+                    </a:p>
+                    <a:p>
+                      <a:r>
+                        <a:rPr lang="en-US" sz="1600" dirty="0"/>
+                        <a:t>(indoor famous spots</a:t>
+                      </a:r>
+                    </a:p>
+                    <a:p>
+                      <a:r>
+                        <a:rPr lang="en-US" sz="1600" dirty="0"/>
+                        <a:t>Outdoor famous spots)</a:t>
                       </a:r>
                       <a:endParaRPr lang="en-SG" sz="1600" dirty="0"/>
                     </a:p>
@@ -8887,6 +9084,28 @@
                     <a:bodyPr/>
                     <a:lstStyle/>
                     <a:p>
+                      <a:r>
+                        <a:rPr lang="en-US" sz="1600" dirty="0"/>
+                        <a:t>Select: </a:t>
+                      </a:r>
+                    </a:p>
+                    <a:p>
+                      <a:r>
+                        <a:rPr lang="en-US" sz="1600" dirty="0"/>
+                        <a:t>Indoor </a:t>
+                      </a:r>
+                    </a:p>
+                    <a:p>
+                      <a:r>
+                        <a:rPr lang="en-US" sz="1600" dirty="0"/>
+                        <a:t>Outdoor nature </a:t>
+                      </a:r>
+                    </a:p>
+                    <a:p>
+                      <a:r>
+                        <a:rPr lang="en-US" sz="1600" dirty="0"/>
+                        <a:t>Both </a:t>
+                      </a:r>
                       <a:endParaRPr lang="en-SG" sz="1600" dirty="0"/>
                     </a:p>
                   </a:txBody>
@@ -8894,54 +9113,7 @@
                 </a:tc>
                 <a:extLst>
                   <a:ext uri="{0D108BD9-81ED-4DB2-BD59-A6C34878D82A}">
-                    <a16:rowId xmlns:a16="http://schemas.microsoft.com/office/drawing/2014/main" val="1708857485"/>
-                  </a:ext>
-                </a:extLst>
-              </a:tr>
-              <a:tr h="370840">
-                <a:tc>
-                  <a:txBody>
-                    <a:bodyPr/>
-                    <a:lstStyle/>
-                    <a:p>
-                      <a:endParaRPr lang="en-SG" sz="1600"/>
-                    </a:p>
-                  </a:txBody>
-                  <a:tcPr/>
-                </a:tc>
-                <a:tc>
-                  <a:txBody>
-                    <a:bodyPr/>
-                    <a:lstStyle/>
-                    <a:p>
-                      <a:endParaRPr lang="en-SG" sz="1600"/>
-                    </a:p>
-                  </a:txBody>
-                  <a:tcPr/>
-                </a:tc>
-                <a:tc>
-                  <a:txBody>
-                    <a:bodyPr/>
-                    <a:lstStyle/>
-                    <a:p>
-                      <a:endParaRPr lang="en-SG" sz="1600" dirty="0"/>
-                    </a:p>
-                  </a:txBody>
-                  <a:tcPr/>
-                </a:tc>
-                <a:tc>
-                  <a:txBody>
-                    <a:bodyPr/>
-                    <a:lstStyle/>
-                    <a:p>
-                      <a:endParaRPr lang="en-SG" sz="1600" dirty="0"/>
-                    </a:p>
-                  </a:txBody>
-                  <a:tcPr/>
-                </a:tc>
-                <a:extLst>
-                  <a:ext uri="{0D108BD9-81ED-4DB2-BD59-A6C34878D82A}">
-                    <a16:rowId xmlns:a16="http://schemas.microsoft.com/office/drawing/2014/main" val="1480457366"/>
+                    <a16:rowId xmlns:a16="http://schemas.microsoft.com/office/drawing/2014/main" val="390328045"/>
                   </a:ext>
                 </a:extLst>
               </a:tr>

</xml_diff>

<commit_message>
remove modules for js scripts
</commit_message>
<xml_diff>
--- a/wireframe.pptx
+++ b/wireframe.pptx
@@ -8300,14 +8300,14 @@
           <p:nvPr>
             <p:extLst>
               <p:ext uri="{D42A27DB-BD31-4B8C-83A1-F6EECF244321}">
-                <p14:modId xmlns:p14="http://schemas.microsoft.com/office/powerpoint/2010/main" val="429074811"/>
+                <p14:modId xmlns:p14="http://schemas.microsoft.com/office/powerpoint/2010/main" val="2211943474"/>
               </p:ext>
             </p:extLst>
           </p:nvPr>
         </p:nvGraphicFramePr>
         <p:xfrm>
           <a:off x="238539" y="149163"/>
-          <a:ext cx="11728175" cy="6278880"/>
+          <a:ext cx="11728175" cy="6522720"/>
         </p:xfrm>
         <a:graphic>
           <a:graphicData uri="http://schemas.openxmlformats.org/drawingml/2006/table">
@@ -8587,19 +8587,19 @@
                     <a:p>
                       <a:r>
                         <a:rPr lang="en-US" sz="1600" dirty="0"/>
-                        <a:t>Clear list x</a:t>
+                        <a:t>Clear list </a:t>
                       </a:r>
                     </a:p>
                     <a:p>
                       <a:r>
                         <a:rPr lang="en-US" sz="1600" dirty="0"/>
-                        <a:t>Map to search bar x</a:t>
+                        <a:t>Map to search bar </a:t>
                       </a:r>
                     </a:p>
                     <a:p>
                       <a:r>
                         <a:rPr lang="en-US" sz="1600" dirty="0"/>
-                        <a:t>Hide card body x </a:t>
+                        <a:t>Hide card body </a:t>
                       </a:r>
                     </a:p>
                     <a:p>
@@ -8614,6 +8614,37 @@
                           </a:solidFill>
                         </a:rPr>
                         <a:t>– to move this block to script** </a:t>
+                      </a:r>
+                    </a:p>
+                    <a:p>
+                      <a:pPr marL="0" marR="0" lvl="0" indent="0" algn="l" defTabSz="914400" rtl="0" eaLnBrk="1" fontAlgn="auto" latinLnBrk="0" hangingPunct="1">
+                        <a:lnSpc>
+                          <a:spcPct val="100000"/>
+                        </a:lnSpc>
+                        <a:spcBef>
+                          <a:spcPts val="0"/>
+                        </a:spcBef>
+                        <a:spcAft>
+                          <a:spcPts val="0"/>
+                        </a:spcAft>
+                        <a:buClrTx/>
+                        <a:buSzTx/>
+                        <a:buFontTx/>
+                        <a:buNone/>
+                        <a:tabLst/>
+                        <a:defRPr/>
+                      </a:pPr>
+                      <a:r>
+                        <a:rPr lang="en-US" sz="1600" dirty="0"/>
+                        <a:t>Fly to </a:t>
+                      </a:r>
+                      <a:r>
+                        <a:rPr lang="en-US" sz="1600" dirty="0" err="1"/>
+                        <a:t>latlong</a:t>
+                      </a:r>
+                      <a:r>
+                        <a:rPr lang="en-US" sz="1600" dirty="0"/>
+                        <a:t> upon click</a:t>
                       </a:r>
                     </a:p>
                     <a:p>
@@ -8900,6 +8931,31 @@
                           <a:cs typeface="+mn-cs"/>
                         </a:rPr>
                         <a:t>();</a:t>
+                      </a:r>
+                    </a:p>
+                    <a:p>
+                      <a:endParaRPr lang="en-US" sz="1200" b="0" kern="1200" dirty="0">
+                        <a:solidFill>
+                          <a:schemeClr val="dk1"/>
+                        </a:solidFill>
+                        <a:effectLst/>
+                        <a:latin typeface="+mn-lt"/>
+                        <a:ea typeface="+mn-ea"/>
+                        <a:cs typeface="+mn-cs"/>
+                      </a:endParaRPr>
+                    </a:p>
+                    <a:p>
+                      <a:r>
+                        <a:rPr lang="en-US" sz="1200" b="0" kern="1200" dirty="0">
+                          <a:solidFill>
+                            <a:srgbClr val="FF0000"/>
+                          </a:solidFill>
+                          <a:effectLst/>
+                          <a:latin typeface="+mn-lt"/>
+                          <a:ea typeface="+mn-ea"/>
+                          <a:cs typeface="+mn-cs"/>
+                        </a:rPr>
+                        <a:t>**put all variable into constances.js file </a:t>
                       </a:r>
                     </a:p>
                   </a:txBody>

</xml_diff>

<commit_message>
define constants for api address
</commit_message>
<xml_diff>
--- a/wireframe.pptx
+++ b/wireframe.pptx
@@ -232,7 +232,7 @@
           <a:p>
             <a:fld id="{32064421-C73C-417F-B8BA-758EB1A55C3F}" type="datetimeFigureOut">
               <a:rPr lang="en-SG" smtClean="0"/>
-              <a:t>13/9/2021</a:t>
+              <a:t>14/9/2021</a:t>
             </a:fld>
             <a:endParaRPr lang="en-SG"/>
           </a:p>
@@ -733,7 +733,7 @@
           <a:p>
             <a:fld id="{5B3D8EE2-B186-4E74-82A5-3FDCBC0BCA47}" type="datetimeFigureOut">
               <a:rPr lang="en-SG" smtClean="0"/>
-              <a:t>13/9/2021</a:t>
+              <a:t>14/9/2021</a:t>
             </a:fld>
             <a:endParaRPr lang="en-SG"/>
           </a:p>
@@ -933,7 +933,7 @@
           <a:p>
             <a:fld id="{5B3D8EE2-B186-4E74-82A5-3FDCBC0BCA47}" type="datetimeFigureOut">
               <a:rPr lang="en-SG" smtClean="0"/>
-              <a:t>13/9/2021</a:t>
+              <a:t>14/9/2021</a:t>
             </a:fld>
             <a:endParaRPr lang="en-SG"/>
           </a:p>
@@ -1143,7 +1143,7 @@
           <a:p>
             <a:fld id="{5B3D8EE2-B186-4E74-82A5-3FDCBC0BCA47}" type="datetimeFigureOut">
               <a:rPr lang="en-SG" smtClean="0"/>
-              <a:t>13/9/2021</a:t>
+              <a:t>14/9/2021</a:t>
             </a:fld>
             <a:endParaRPr lang="en-SG"/>
           </a:p>
@@ -1343,7 +1343,7 @@
           <a:p>
             <a:fld id="{5B3D8EE2-B186-4E74-82A5-3FDCBC0BCA47}" type="datetimeFigureOut">
               <a:rPr lang="en-SG" smtClean="0"/>
-              <a:t>13/9/2021</a:t>
+              <a:t>14/9/2021</a:t>
             </a:fld>
             <a:endParaRPr lang="en-SG"/>
           </a:p>
@@ -1619,7 +1619,7 @@
           <a:p>
             <a:fld id="{5B3D8EE2-B186-4E74-82A5-3FDCBC0BCA47}" type="datetimeFigureOut">
               <a:rPr lang="en-SG" smtClean="0"/>
-              <a:t>13/9/2021</a:t>
+              <a:t>14/9/2021</a:t>
             </a:fld>
             <a:endParaRPr lang="en-SG"/>
           </a:p>
@@ -1887,7 +1887,7 @@
           <a:p>
             <a:fld id="{5B3D8EE2-B186-4E74-82A5-3FDCBC0BCA47}" type="datetimeFigureOut">
               <a:rPr lang="en-SG" smtClean="0"/>
-              <a:t>13/9/2021</a:t>
+              <a:t>14/9/2021</a:t>
             </a:fld>
             <a:endParaRPr lang="en-SG"/>
           </a:p>
@@ -2302,7 +2302,7 @@
           <a:p>
             <a:fld id="{5B3D8EE2-B186-4E74-82A5-3FDCBC0BCA47}" type="datetimeFigureOut">
               <a:rPr lang="en-SG" smtClean="0"/>
-              <a:t>13/9/2021</a:t>
+              <a:t>14/9/2021</a:t>
             </a:fld>
             <a:endParaRPr lang="en-SG"/>
           </a:p>
@@ -2444,7 +2444,7 @@
           <a:p>
             <a:fld id="{5B3D8EE2-B186-4E74-82A5-3FDCBC0BCA47}" type="datetimeFigureOut">
               <a:rPr lang="en-SG" smtClean="0"/>
-              <a:t>13/9/2021</a:t>
+              <a:t>14/9/2021</a:t>
             </a:fld>
             <a:endParaRPr lang="en-SG"/>
           </a:p>
@@ -2557,7 +2557,7 @@
           <a:p>
             <a:fld id="{5B3D8EE2-B186-4E74-82A5-3FDCBC0BCA47}" type="datetimeFigureOut">
               <a:rPr lang="en-SG" smtClean="0"/>
-              <a:t>13/9/2021</a:t>
+              <a:t>14/9/2021</a:t>
             </a:fld>
             <a:endParaRPr lang="en-SG"/>
           </a:p>
@@ -2870,7 +2870,7 @@
           <a:p>
             <a:fld id="{5B3D8EE2-B186-4E74-82A5-3FDCBC0BCA47}" type="datetimeFigureOut">
               <a:rPr lang="en-SG" smtClean="0"/>
-              <a:t>13/9/2021</a:t>
+              <a:t>14/9/2021</a:t>
             </a:fld>
             <a:endParaRPr lang="en-SG"/>
           </a:p>
@@ -3159,7 +3159,7 @@
           <a:p>
             <a:fld id="{5B3D8EE2-B186-4E74-82A5-3FDCBC0BCA47}" type="datetimeFigureOut">
               <a:rPr lang="en-SG" smtClean="0"/>
-              <a:t>13/9/2021</a:t>
+              <a:t>14/9/2021</a:t>
             </a:fld>
             <a:endParaRPr lang="en-SG"/>
           </a:p>
@@ -3402,7 +3402,7 @@
           <a:p>
             <a:fld id="{5B3D8EE2-B186-4E74-82A5-3FDCBC0BCA47}" type="datetimeFigureOut">
               <a:rPr lang="en-SG" smtClean="0"/>
-              <a:t>13/9/2021</a:t>
+              <a:t>14/9/2021</a:t>
             </a:fld>
             <a:endParaRPr lang="en-SG"/>
           </a:p>
@@ -8300,14 +8300,14 @@
           <p:nvPr>
             <p:extLst>
               <p:ext uri="{D42A27DB-BD31-4B8C-83A1-F6EECF244321}">
-                <p14:modId xmlns:p14="http://schemas.microsoft.com/office/powerpoint/2010/main" val="2211943474"/>
+                <p14:modId xmlns:p14="http://schemas.microsoft.com/office/powerpoint/2010/main" val="2959631894"/>
               </p:ext>
             </p:extLst>
           </p:nvPr>
         </p:nvGraphicFramePr>
         <p:xfrm>
           <a:off x="238539" y="149163"/>
-          <a:ext cx="11728175" cy="6522720"/>
+          <a:ext cx="11728175" cy="6278880"/>
         </p:xfrm>
         <a:graphic>
           <a:graphicData uri="http://schemas.openxmlformats.org/drawingml/2006/table">
@@ -8605,16 +8605,13 @@
                     <a:p>
                       <a:r>
                         <a:rPr lang="en-US" sz="1600" dirty="0"/>
-                        <a:t>Show filtered search result x </a:t>
+                        <a:t>Show filtered search result </a:t>
                       </a:r>
-                      <a:r>
-                        <a:rPr lang="en-US" sz="1600" dirty="0">
-                          <a:solidFill>
-                            <a:srgbClr val="FF0000"/>
-                          </a:solidFill>
-                        </a:rPr>
-                        <a:t>– to move this block to script** </a:t>
-                      </a:r>
+                      <a:endParaRPr lang="en-US" sz="1600" dirty="0">
+                        <a:solidFill>
+                          <a:srgbClr val="FF0000"/>
+                        </a:solidFill>
+                      </a:endParaRPr>
                     </a:p>
                     <a:p>
                       <a:pPr marL="0" marR="0" lvl="0" indent="0" algn="l" defTabSz="914400" rtl="0" eaLnBrk="1" fontAlgn="auto" latinLnBrk="0" hangingPunct="1">
@@ -8667,7 +8664,7 @@
                       </a:pPr>
                       <a:r>
                         <a:rPr lang="en-US" sz="1600" dirty="0"/>
-                        <a:t>Fly to the first result location xx</a:t>
+                        <a:t>Fly to the first result location </a:t>
                       </a:r>
                     </a:p>
                     <a:p>
@@ -8946,6 +8943,18 @@
                     </a:p>
                     <a:p>
                       <a:r>
+                        <a:rPr lang="en-US" sz="1200" b="0" kern="1200">
+                          <a:solidFill>
+                            <a:srgbClr val="FF0000"/>
+                          </a:solidFill>
+                          <a:effectLst/>
+                          <a:latin typeface="+mn-lt"/>
+                          <a:ea typeface="+mn-ea"/>
+                          <a:cs typeface="+mn-cs"/>
+                        </a:rPr>
+                        <a:t>put </a:t>
+                      </a:r>
+                      <a:r>
                         <a:rPr lang="en-US" sz="1200" b="0" kern="1200" dirty="0">
                           <a:solidFill>
                             <a:srgbClr val="FF0000"/>
@@ -8955,7 +8964,7 @@
                           <a:ea typeface="+mn-ea"/>
                           <a:cs typeface="+mn-cs"/>
                         </a:rPr>
-                        <a:t>**put all variable into constances.js file </a:t>
+                        <a:t>all variable into constances.js file </a:t>
                       </a:r>
                     </a:p>
                   </a:txBody>

</xml_diff>

<commit_message>
four square places API search impletation, with markers and display name
</commit_message>
<xml_diff>
--- a/wireframe.pptx
+++ b/wireframe.pptx
@@ -5,21 +5,22 @@
     <p:sldMasterId id="2147483648" r:id="rId1"/>
   </p:sldMasterIdLst>
   <p:notesMasterIdLst>
-    <p:notesMasterId r:id="rId14"/>
+    <p:notesMasterId r:id="rId15"/>
   </p:notesMasterIdLst>
   <p:sldIdLst>
     <p:sldId id="256" r:id="rId2"/>
     <p:sldId id="257" r:id="rId3"/>
     <p:sldId id="259" r:id="rId4"/>
-    <p:sldId id="264" r:id="rId5"/>
-    <p:sldId id="261" r:id="rId6"/>
-    <p:sldId id="265" r:id="rId7"/>
-    <p:sldId id="266" r:id="rId8"/>
-    <p:sldId id="267" r:id="rId9"/>
-    <p:sldId id="268" r:id="rId10"/>
-    <p:sldId id="269" r:id="rId11"/>
-    <p:sldId id="262" r:id="rId12"/>
-    <p:sldId id="263" r:id="rId13"/>
+    <p:sldId id="270" r:id="rId5"/>
+    <p:sldId id="264" r:id="rId6"/>
+    <p:sldId id="261" r:id="rId7"/>
+    <p:sldId id="265" r:id="rId8"/>
+    <p:sldId id="266" r:id="rId9"/>
+    <p:sldId id="267" r:id="rId10"/>
+    <p:sldId id="268" r:id="rId11"/>
+    <p:sldId id="269" r:id="rId12"/>
+    <p:sldId id="262" r:id="rId13"/>
+    <p:sldId id="263" r:id="rId14"/>
   </p:sldIdLst>
   <p:sldSz cx="12192000" cy="6858000"/>
   <p:notesSz cx="6858000" cy="9144000"/>
@@ -126,6 +127,7 @@
             <p14:sldId id="256"/>
             <p14:sldId id="257"/>
             <p14:sldId id="259"/>
+            <p14:sldId id="270"/>
             <p14:sldId id="264"/>
             <p14:sldId id="261"/>
             <p14:sldId id="265"/>
@@ -232,7 +234,7 @@
           <a:p>
             <a:fld id="{32064421-C73C-417F-B8BA-758EB1A55C3F}" type="datetimeFigureOut">
               <a:rPr lang="en-SG" smtClean="0"/>
-              <a:t>14/9/2021</a:t>
+              <a:t>15/9/2021</a:t>
             </a:fld>
             <a:endParaRPr lang="en-SG"/>
           </a:p>
@@ -565,7 +567,7 @@
           <a:p>
             <a:fld id="{EDB02C1C-226F-41E0-8C26-25B756F23392}" type="slidenum">
               <a:rPr lang="en-SG" smtClean="0"/>
-              <a:t>7</a:t>
+              <a:t>8</a:t>
             </a:fld>
             <a:endParaRPr lang="en-SG"/>
           </a:p>
@@ -733,7 +735,7 @@
           <a:p>
             <a:fld id="{5B3D8EE2-B186-4E74-82A5-3FDCBC0BCA47}" type="datetimeFigureOut">
               <a:rPr lang="en-SG" smtClean="0"/>
-              <a:t>14/9/2021</a:t>
+              <a:t>15/9/2021</a:t>
             </a:fld>
             <a:endParaRPr lang="en-SG"/>
           </a:p>
@@ -933,7 +935,7 @@
           <a:p>
             <a:fld id="{5B3D8EE2-B186-4E74-82A5-3FDCBC0BCA47}" type="datetimeFigureOut">
               <a:rPr lang="en-SG" smtClean="0"/>
-              <a:t>14/9/2021</a:t>
+              <a:t>15/9/2021</a:t>
             </a:fld>
             <a:endParaRPr lang="en-SG"/>
           </a:p>
@@ -1143,7 +1145,7 @@
           <a:p>
             <a:fld id="{5B3D8EE2-B186-4E74-82A5-3FDCBC0BCA47}" type="datetimeFigureOut">
               <a:rPr lang="en-SG" smtClean="0"/>
-              <a:t>14/9/2021</a:t>
+              <a:t>15/9/2021</a:t>
             </a:fld>
             <a:endParaRPr lang="en-SG"/>
           </a:p>
@@ -1343,7 +1345,7 @@
           <a:p>
             <a:fld id="{5B3D8EE2-B186-4E74-82A5-3FDCBC0BCA47}" type="datetimeFigureOut">
               <a:rPr lang="en-SG" smtClean="0"/>
-              <a:t>14/9/2021</a:t>
+              <a:t>15/9/2021</a:t>
             </a:fld>
             <a:endParaRPr lang="en-SG"/>
           </a:p>
@@ -1619,7 +1621,7 @@
           <a:p>
             <a:fld id="{5B3D8EE2-B186-4E74-82A5-3FDCBC0BCA47}" type="datetimeFigureOut">
               <a:rPr lang="en-SG" smtClean="0"/>
-              <a:t>14/9/2021</a:t>
+              <a:t>15/9/2021</a:t>
             </a:fld>
             <a:endParaRPr lang="en-SG"/>
           </a:p>
@@ -1887,7 +1889,7 @@
           <a:p>
             <a:fld id="{5B3D8EE2-B186-4E74-82A5-3FDCBC0BCA47}" type="datetimeFigureOut">
               <a:rPr lang="en-SG" smtClean="0"/>
-              <a:t>14/9/2021</a:t>
+              <a:t>15/9/2021</a:t>
             </a:fld>
             <a:endParaRPr lang="en-SG"/>
           </a:p>
@@ -2302,7 +2304,7 @@
           <a:p>
             <a:fld id="{5B3D8EE2-B186-4E74-82A5-3FDCBC0BCA47}" type="datetimeFigureOut">
               <a:rPr lang="en-SG" smtClean="0"/>
-              <a:t>14/9/2021</a:t>
+              <a:t>15/9/2021</a:t>
             </a:fld>
             <a:endParaRPr lang="en-SG"/>
           </a:p>
@@ -2444,7 +2446,7 @@
           <a:p>
             <a:fld id="{5B3D8EE2-B186-4E74-82A5-3FDCBC0BCA47}" type="datetimeFigureOut">
               <a:rPr lang="en-SG" smtClean="0"/>
-              <a:t>14/9/2021</a:t>
+              <a:t>15/9/2021</a:t>
             </a:fld>
             <a:endParaRPr lang="en-SG"/>
           </a:p>
@@ -2557,7 +2559,7 @@
           <a:p>
             <a:fld id="{5B3D8EE2-B186-4E74-82A5-3FDCBC0BCA47}" type="datetimeFigureOut">
               <a:rPr lang="en-SG" smtClean="0"/>
-              <a:t>14/9/2021</a:t>
+              <a:t>15/9/2021</a:t>
             </a:fld>
             <a:endParaRPr lang="en-SG"/>
           </a:p>
@@ -2870,7 +2872,7 @@
           <a:p>
             <a:fld id="{5B3D8EE2-B186-4E74-82A5-3FDCBC0BCA47}" type="datetimeFigureOut">
               <a:rPr lang="en-SG" smtClean="0"/>
-              <a:t>14/9/2021</a:t>
+              <a:t>15/9/2021</a:t>
             </a:fld>
             <a:endParaRPr lang="en-SG"/>
           </a:p>
@@ -3159,7 +3161,7 @@
           <a:p>
             <a:fld id="{5B3D8EE2-B186-4E74-82A5-3FDCBC0BCA47}" type="datetimeFigureOut">
               <a:rPr lang="en-SG" smtClean="0"/>
-              <a:t>14/9/2021</a:t>
+              <a:t>15/9/2021</a:t>
             </a:fld>
             <a:endParaRPr lang="en-SG"/>
           </a:p>
@@ -3402,7 +3404,7 @@
           <a:p>
             <a:fld id="{5B3D8EE2-B186-4E74-82A5-3FDCBC0BCA47}" type="datetimeFigureOut">
               <a:rPr lang="en-SG" smtClean="0"/>
-              <a:t>14/9/2021</a:t>
+              <a:t>15/9/2021</a:t>
             </a:fld>
             <a:endParaRPr lang="en-SG"/>
           </a:p>
@@ -3948,6 +3950,495 @@
           <p:nvPr>
             <p:extLst>
               <p:ext uri="{D42A27DB-BD31-4B8C-83A1-F6EECF244321}">
+                <p14:modId xmlns:p14="http://schemas.microsoft.com/office/powerpoint/2010/main" val="1362983282"/>
+              </p:ext>
+            </p:extLst>
+          </p:nvPr>
+        </p:nvGraphicFramePr>
+        <p:xfrm>
+          <a:off x="238539" y="149163"/>
+          <a:ext cx="11728175" cy="2590800"/>
+        </p:xfrm>
+        <a:graphic>
+          <a:graphicData uri="http://schemas.openxmlformats.org/drawingml/2006/table">
+            <a:tbl>
+              <a:tblPr firstRow="1" bandRow="1">
+                <a:tableStyleId>{5C22544A-7EE6-4342-B048-85BDC9FD1C3A}</a:tableStyleId>
+              </a:tblPr>
+              <a:tblGrid>
+                <a:gridCol w="1595626">
+                  <a:extLst>
+                    <a:ext uri="{9D8B030D-6E8A-4147-A177-3AD203B41FA5}">
+                      <a16:colId xmlns:a16="http://schemas.microsoft.com/office/drawing/2014/main" val="1417640537"/>
+                    </a:ext>
+                  </a:extLst>
+                </a:gridCol>
+                <a:gridCol w="2027187">
+                  <a:extLst>
+                    <a:ext uri="{9D8B030D-6E8A-4147-A177-3AD203B41FA5}">
+                      <a16:colId xmlns:a16="http://schemas.microsoft.com/office/drawing/2014/main" val="764260135"/>
+                    </a:ext>
+                  </a:extLst>
+                </a:gridCol>
+                <a:gridCol w="3071191">
+                  <a:extLst>
+                    <a:ext uri="{9D8B030D-6E8A-4147-A177-3AD203B41FA5}">
+                      <a16:colId xmlns:a16="http://schemas.microsoft.com/office/drawing/2014/main" val="3641419838"/>
+                    </a:ext>
+                  </a:extLst>
+                </a:gridCol>
+                <a:gridCol w="5034171">
+                  <a:extLst>
+                    <a:ext uri="{9D8B030D-6E8A-4147-A177-3AD203B41FA5}">
+                      <a16:colId xmlns:a16="http://schemas.microsoft.com/office/drawing/2014/main" val="4284585333"/>
+                    </a:ext>
+                  </a:extLst>
+                </a:gridCol>
+              </a:tblGrid>
+              <a:tr h="0">
+                <a:tc>
+                  <a:txBody>
+                    <a:bodyPr/>
+                    <a:lstStyle/>
+                    <a:p>
+                      <a:pPr algn="ctr"/>
+                      <a:r>
+                        <a:rPr lang="en-US" sz="1800" b="1" dirty="0"/>
+                        <a:t>Prioritization 3</a:t>
+                      </a:r>
+                      <a:endParaRPr lang="en-SG" dirty="0"/>
+                    </a:p>
+                  </a:txBody>
+                  <a:tcPr/>
+                </a:tc>
+                <a:tc>
+                  <a:txBody>
+                    <a:bodyPr/>
+                    <a:lstStyle/>
+                    <a:p>
+                      <a:pPr algn="ctr"/>
+                      <a:r>
+                        <a:rPr lang="en-US" dirty="0"/>
+                        <a:t>Features </a:t>
+                      </a:r>
+                      <a:endParaRPr lang="en-SG" dirty="0"/>
+                    </a:p>
+                  </a:txBody>
+                  <a:tcPr/>
+                </a:tc>
+                <a:tc>
+                  <a:txBody>
+                    <a:bodyPr/>
+                    <a:lstStyle/>
+                    <a:p>
+                      <a:pPr algn="ctr"/>
+                      <a:r>
+                        <a:rPr lang="en-US" dirty="0"/>
+                        <a:t>Tasks list</a:t>
+                      </a:r>
+                      <a:endParaRPr lang="en-SG" dirty="0"/>
+                    </a:p>
+                  </a:txBody>
+                  <a:tcPr/>
+                </a:tc>
+                <a:tc>
+                  <a:txBody>
+                    <a:bodyPr/>
+                    <a:lstStyle/>
+                    <a:p>
+                      <a:pPr algn="ctr"/>
+                      <a:r>
+                        <a:rPr lang="en-US" dirty="0"/>
+                        <a:t>Acceptance criteria</a:t>
+                      </a:r>
+                      <a:endParaRPr lang="en-SG" dirty="0"/>
+                    </a:p>
+                  </a:txBody>
+                  <a:tcPr/>
+                </a:tc>
+                <a:extLst>
+                  <a:ext uri="{0D108BD9-81ED-4DB2-BD59-A6C34878D82A}">
+                    <a16:rowId xmlns:a16="http://schemas.microsoft.com/office/drawing/2014/main" val="3206974568"/>
+                  </a:ext>
+                </a:extLst>
+              </a:tr>
+              <a:tr h="370840">
+                <a:tc>
+                  <a:txBody>
+                    <a:bodyPr/>
+                    <a:lstStyle/>
+                    <a:p>
+                      <a:r>
+                        <a:rPr lang="en-US" sz="1600" dirty="0"/>
+                        <a:t>Carpark </a:t>
+                      </a:r>
+                      <a:r>
+                        <a:rPr lang="en-US" sz="1600" dirty="0" err="1"/>
+                        <a:t>api</a:t>
+                      </a:r>
+                      <a:r>
+                        <a:rPr lang="en-US" sz="1600" dirty="0"/>
+                        <a:t> </a:t>
+                      </a:r>
+                      <a:endParaRPr lang="en-SG" sz="1600" dirty="0"/>
+                    </a:p>
+                  </a:txBody>
+                  <a:tcPr/>
+                </a:tc>
+                <a:tc>
+                  <a:txBody>
+                    <a:bodyPr/>
+                    <a:lstStyle/>
+                    <a:p>
+                      <a:endParaRPr lang="en-SG" sz="1600" dirty="0"/>
+                    </a:p>
+                  </a:txBody>
+                  <a:tcPr/>
+                </a:tc>
+                <a:tc>
+                  <a:txBody>
+                    <a:bodyPr/>
+                    <a:lstStyle/>
+                    <a:p>
+                      <a:pPr marL="0" marR="0" lvl="0" indent="0" algn="l" defTabSz="914400" rtl="0" eaLnBrk="1" fontAlgn="auto" latinLnBrk="0" hangingPunct="1">
+                        <a:lnSpc>
+                          <a:spcPct val="100000"/>
+                        </a:lnSpc>
+                        <a:spcBef>
+                          <a:spcPts val="0"/>
+                        </a:spcBef>
+                        <a:spcAft>
+                          <a:spcPts val="0"/>
+                        </a:spcAft>
+                        <a:buClrTx/>
+                        <a:buSzTx/>
+                        <a:buFontTx/>
+                        <a:buNone/>
+                        <a:tabLst/>
+                        <a:defRPr/>
+                      </a:pPr>
+                      <a:endParaRPr lang="en-SG" sz="1600" dirty="0"/>
+                    </a:p>
+                  </a:txBody>
+                  <a:tcPr/>
+                </a:tc>
+                <a:tc>
+                  <a:txBody>
+                    <a:bodyPr/>
+                    <a:lstStyle/>
+                    <a:p>
+                      <a:pPr marL="0" marR="0" lvl="0" indent="0" algn="l" defTabSz="914400" rtl="0" eaLnBrk="1" fontAlgn="auto" latinLnBrk="0" hangingPunct="1">
+                        <a:lnSpc>
+                          <a:spcPct val="100000"/>
+                        </a:lnSpc>
+                        <a:spcBef>
+                          <a:spcPts val="0"/>
+                        </a:spcBef>
+                        <a:spcAft>
+                          <a:spcPts val="0"/>
+                        </a:spcAft>
+                        <a:buClrTx/>
+                        <a:buSzTx/>
+                        <a:buFontTx/>
+                        <a:buNone/>
+                        <a:tabLst/>
+                        <a:defRPr/>
+                      </a:pPr>
+                      <a:endParaRPr lang="en-SG" sz="1600" dirty="0"/>
+                    </a:p>
+                  </a:txBody>
+                  <a:tcPr/>
+                </a:tc>
+                <a:extLst>
+                  <a:ext uri="{0D108BD9-81ED-4DB2-BD59-A6C34878D82A}">
+                    <a16:rowId xmlns:a16="http://schemas.microsoft.com/office/drawing/2014/main" val="2021552113"/>
+                  </a:ext>
+                </a:extLst>
+              </a:tr>
+              <a:tr h="370840">
+                <a:tc>
+                  <a:txBody>
+                    <a:bodyPr/>
+                    <a:lstStyle/>
+                    <a:p>
+                      <a:endParaRPr lang="en-SG" sz="1600"/>
+                    </a:p>
+                  </a:txBody>
+                  <a:tcPr/>
+                </a:tc>
+                <a:tc>
+                  <a:txBody>
+                    <a:bodyPr/>
+                    <a:lstStyle/>
+                    <a:p>
+                      <a:endParaRPr lang="en-SG" sz="1600" dirty="0"/>
+                    </a:p>
+                  </a:txBody>
+                  <a:tcPr/>
+                </a:tc>
+                <a:tc>
+                  <a:txBody>
+                    <a:bodyPr/>
+                    <a:lstStyle/>
+                    <a:p>
+                      <a:endParaRPr lang="en-SG" sz="1600" dirty="0"/>
+                    </a:p>
+                  </a:txBody>
+                  <a:tcPr/>
+                </a:tc>
+                <a:tc>
+                  <a:txBody>
+                    <a:bodyPr/>
+                    <a:lstStyle/>
+                    <a:p>
+                      <a:endParaRPr lang="en-SG" sz="1600" dirty="0"/>
+                    </a:p>
+                  </a:txBody>
+                  <a:tcPr/>
+                </a:tc>
+                <a:extLst>
+                  <a:ext uri="{0D108BD9-81ED-4DB2-BD59-A6C34878D82A}">
+                    <a16:rowId xmlns:a16="http://schemas.microsoft.com/office/drawing/2014/main" val="892559996"/>
+                  </a:ext>
+                </a:extLst>
+              </a:tr>
+              <a:tr h="370840">
+                <a:tc>
+                  <a:txBody>
+                    <a:bodyPr/>
+                    <a:lstStyle/>
+                    <a:p>
+                      <a:endParaRPr lang="en-SG" sz="1600"/>
+                    </a:p>
+                  </a:txBody>
+                  <a:tcPr/>
+                </a:tc>
+                <a:tc>
+                  <a:txBody>
+                    <a:bodyPr/>
+                    <a:lstStyle/>
+                    <a:p>
+                      <a:endParaRPr lang="en-SG" sz="1600" dirty="0"/>
+                    </a:p>
+                  </a:txBody>
+                  <a:tcPr/>
+                </a:tc>
+                <a:tc>
+                  <a:txBody>
+                    <a:bodyPr/>
+                    <a:lstStyle/>
+                    <a:p>
+                      <a:endParaRPr lang="en-SG" sz="1600" dirty="0"/>
+                    </a:p>
+                  </a:txBody>
+                  <a:tcPr/>
+                </a:tc>
+                <a:tc>
+                  <a:txBody>
+                    <a:bodyPr/>
+                    <a:lstStyle/>
+                    <a:p>
+                      <a:endParaRPr lang="en-SG" sz="1600" dirty="0"/>
+                    </a:p>
+                  </a:txBody>
+                  <a:tcPr/>
+                </a:tc>
+                <a:extLst>
+                  <a:ext uri="{0D108BD9-81ED-4DB2-BD59-A6C34878D82A}">
+                    <a16:rowId xmlns:a16="http://schemas.microsoft.com/office/drawing/2014/main" val="4053821403"/>
+                  </a:ext>
+                </a:extLst>
+              </a:tr>
+              <a:tr h="370840">
+                <a:tc>
+                  <a:txBody>
+                    <a:bodyPr/>
+                    <a:lstStyle/>
+                    <a:p>
+                      <a:endParaRPr lang="en-SG" sz="1600"/>
+                    </a:p>
+                  </a:txBody>
+                  <a:tcPr/>
+                </a:tc>
+                <a:tc>
+                  <a:txBody>
+                    <a:bodyPr/>
+                    <a:lstStyle/>
+                    <a:p>
+                      <a:endParaRPr lang="en-SG" sz="1600" dirty="0"/>
+                    </a:p>
+                  </a:txBody>
+                  <a:tcPr/>
+                </a:tc>
+                <a:tc>
+                  <a:txBody>
+                    <a:bodyPr/>
+                    <a:lstStyle/>
+                    <a:p>
+                      <a:endParaRPr lang="en-US" sz="1600" dirty="0"/>
+                    </a:p>
+                  </a:txBody>
+                  <a:tcPr/>
+                </a:tc>
+                <a:tc>
+                  <a:txBody>
+                    <a:bodyPr/>
+                    <a:lstStyle/>
+                    <a:p>
+                      <a:endParaRPr lang="en-SG" sz="1600" dirty="0"/>
+                    </a:p>
+                  </a:txBody>
+                  <a:tcPr/>
+                </a:tc>
+                <a:extLst>
+                  <a:ext uri="{0D108BD9-81ED-4DB2-BD59-A6C34878D82A}">
+                    <a16:rowId xmlns:a16="http://schemas.microsoft.com/office/drawing/2014/main" val="390328045"/>
+                  </a:ext>
+                </a:extLst>
+              </a:tr>
+              <a:tr h="370840">
+                <a:tc>
+                  <a:txBody>
+                    <a:bodyPr/>
+                    <a:lstStyle/>
+                    <a:p>
+                      <a:endParaRPr lang="en-SG" sz="1600"/>
+                    </a:p>
+                  </a:txBody>
+                  <a:tcPr/>
+                </a:tc>
+                <a:tc>
+                  <a:txBody>
+                    <a:bodyPr/>
+                    <a:lstStyle/>
+                    <a:p>
+                      <a:endParaRPr lang="en-SG" sz="1600"/>
+                    </a:p>
+                  </a:txBody>
+                  <a:tcPr/>
+                </a:tc>
+                <a:tc>
+                  <a:txBody>
+                    <a:bodyPr/>
+                    <a:lstStyle/>
+                    <a:p>
+                      <a:endParaRPr lang="en-SG" sz="1600" dirty="0"/>
+                    </a:p>
+                  </a:txBody>
+                  <a:tcPr/>
+                </a:tc>
+                <a:tc>
+                  <a:txBody>
+                    <a:bodyPr/>
+                    <a:lstStyle/>
+                    <a:p>
+                      <a:endParaRPr lang="en-SG" sz="1600" dirty="0"/>
+                    </a:p>
+                  </a:txBody>
+                  <a:tcPr/>
+                </a:tc>
+                <a:extLst>
+                  <a:ext uri="{0D108BD9-81ED-4DB2-BD59-A6C34878D82A}">
+                    <a16:rowId xmlns:a16="http://schemas.microsoft.com/office/drawing/2014/main" val="1708857485"/>
+                  </a:ext>
+                </a:extLst>
+              </a:tr>
+              <a:tr h="370840">
+                <a:tc>
+                  <a:txBody>
+                    <a:bodyPr/>
+                    <a:lstStyle/>
+                    <a:p>
+                      <a:endParaRPr lang="en-SG" sz="1600"/>
+                    </a:p>
+                  </a:txBody>
+                  <a:tcPr/>
+                </a:tc>
+                <a:tc>
+                  <a:txBody>
+                    <a:bodyPr/>
+                    <a:lstStyle/>
+                    <a:p>
+                      <a:endParaRPr lang="en-SG" sz="1600"/>
+                    </a:p>
+                  </a:txBody>
+                  <a:tcPr/>
+                </a:tc>
+                <a:tc>
+                  <a:txBody>
+                    <a:bodyPr/>
+                    <a:lstStyle/>
+                    <a:p>
+                      <a:endParaRPr lang="en-SG" sz="1600" dirty="0"/>
+                    </a:p>
+                  </a:txBody>
+                  <a:tcPr/>
+                </a:tc>
+                <a:tc>
+                  <a:txBody>
+                    <a:bodyPr/>
+                    <a:lstStyle/>
+                    <a:p>
+                      <a:endParaRPr lang="en-SG" sz="1600" dirty="0"/>
+                    </a:p>
+                  </a:txBody>
+                  <a:tcPr/>
+                </a:tc>
+                <a:extLst>
+                  <a:ext uri="{0D108BD9-81ED-4DB2-BD59-A6C34878D82A}">
+                    <a16:rowId xmlns:a16="http://schemas.microsoft.com/office/drawing/2014/main" val="1480457366"/>
+                  </a:ext>
+                </a:extLst>
+              </a:tr>
+            </a:tbl>
+          </a:graphicData>
+        </a:graphic>
+      </p:graphicFrame>
+    </p:spTree>
+    <p:extLst>
+      <p:ext uri="{BB962C8B-B14F-4D97-AF65-F5344CB8AC3E}">
+        <p14:creationId xmlns:p14="http://schemas.microsoft.com/office/powerpoint/2010/main" val="2691880006"/>
+      </p:ext>
+    </p:extLst>
+  </p:cSld>
+  <p:clrMapOvr>
+    <a:masterClrMapping/>
+  </p:clrMapOvr>
+</p:sld>
+</file>
+
+<file path=ppt/slides/slide11.xml><?xml version="1.0" encoding="utf-8"?>
+<p:sld xmlns:a="http://schemas.openxmlformats.org/drawingml/2006/main" xmlns:r="http://schemas.openxmlformats.org/officeDocument/2006/relationships" xmlns:p="http://schemas.openxmlformats.org/presentationml/2006/main">
+  <p:cSld>
+    <p:spTree>
+      <p:nvGrpSpPr>
+        <p:cNvPr id="1" name=""/>
+        <p:cNvGrpSpPr/>
+        <p:nvPr/>
+      </p:nvGrpSpPr>
+      <p:grpSpPr>
+        <a:xfrm>
+          <a:off x="0" y="0"/>
+          <a:ext cx="0" cy="0"/>
+          <a:chOff x="0" y="0"/>
+          <a:chExt cx="0" cy="0"/>
+        </a:xfrm>
+      </p:grpSpPr>
+      <p:graphicFrame>
+        <p:nvGraphicFramePr>
+          <p:cNvPr id="3" name="Table 3">
+            <a:extLst>
+              <a:ext uri="{FF2B5EF4-FFF2-40B4-BE49-F238E27FC236}">
+                <a16:creationId xmlns:a16="http://schemas.microsoft.com/office/drawing/2014/main" id="{34E5978E-10A6-43F2-BF10-97A84F4B18DD}"/>
+              </a:ext>
+            </a:extLst>
+          </p:cNvPr>
+          <p:cNvGraphicFramePr>
+            <a:graphicFrameLocks noGrp="1"/>
+          </p:cNvGraphicFramePr>
+          <p:nvPr>
+            <p:extLst>
+              <p:ext uri="{D42A27DB-BD31-4B8C-83A1-F6EECF244321}">
                 <p14:modId xmlns:p14="http://schemas.microsoft.com/office/powerpoint/2010/main" val="2049529597"/>
               </p:ext>
             </p:extLst>
@@ -4415,7 +4906,7 @@
 </p:sld>
 </file>
 
-<file path=ppt/slides/slide11.xml><?xml version="1.0" encoding="utf-8"?>
+<file path=ppt/slides/slide12.xml><?xml version="1.0" encoding="utf-8"?>
 <p:sld xmlns:a="http://schemas.openxmlformats.org/drawingml/2006/main" xmlns:r="http://schemas.openxmlformats.org/officeDocument/2006/relationships" xmlns:p="http://schemas.openxmlformats.org/presentationml/2006/main">
   <p:cSld>
     <p:spTree>
@@ -5069,7 +5560,7 @@
 </p:sld>
 </file>
 
-<file path=ppt/slides/slide12.xml><?xml version="1.0" encoding="utf-8"?>
+<file path=ppt/slides/slide13.xml><?xml version="1.0" encoding="utf-8"?>
 <p:sld xmlns:a="http://schemas.openxmlformats.org/drawingml/2006/main" xmlns:r="http://schemas.openxmlformats.org/officeDocument/2006/relationships" xmlns:p="http://schemas.openxmlformats.org/presentationml/2006/main">
   <p:cSld>
     <p:spTree>
@@ -6023,10 +6514,10 @@
       </p:sp>
       <p:sp>
         <p:nvSpPr>
-          <p:cNvPr id="5" name="Rectangle: Rounded Corners 4">
-            <a:extLst>
-              <a:ext uri="{FF2B5EF4-FFF2-40B4-BE49-F238E27FC236}">
-                <a16:creationId xmlns:a16="http://schemas.microsoft.com/office/drawing/2014/main" id="{096B9309-8632-4F95-940B-B8BBBDD22729}"/>
+          <p:cNvPr id="23" name="Rectangle 22">
+            <a:extLst>
+              <a:ext uri="{FF2B5EF4-FFF2-40B4-BE49-F238E27FC236}">
+                <a16:creationId xmlns:a16="http://schemas.microsoft.com/office/drawing/2014/main" id="{FF173BAE-1655-42AC-9196-3914BED0354E}"/>
               </a:ext>
             </a:extLst>
           </p:cNvPr>
@@ -6035,200 +6526,7 @@
         </p:nvSpPr>
         <p:spPr>
           <a:xfrm>
-            <a:off x="933061" y="830426"/>
-            <a:ext cx="1726163" cy="335902"/>
-          </a:xfrm>
-          <a:prstGeom prst="roundRect">
-            <a:avLst/>
-          </a:prstGeom>
-        </p:spPr>
-        <p:style>
-          <a:lnRef idx="2">
-            <a:schemeClr val="accent3">
-              <a:shade val="50000"/>
-            </a:schemeClr>
-          </a:lnRef>
-          <a:fillRef idx="1">
-            <a:schemeClr val="accent3"/>
-          </a:fillRef>
-          <a:effectRef idx="0">
-            <a:schemeClr val="accent3"/>
-          </a:effectRef>
-          <a:fontRef idx="minor">
-            <a:schemeClr val="lt1"/>
-          </a:fontRef>
-        </p:style>
-        <p:txBody>
-          <a:bodyPr rtlCol="0" anchor="ctr"/>
-          <a:lstStyle/>
-          <a:p>
-            <a:pPr algn="ctr"/>
-            <a:endParaRPr lang="en-SG"/>
-          </a:p>
-        </p:txBody>
-      </p:sp>
-      <p:sp>
-        <p:nvSpPr>
-          <p:cNvPr id="6" name="Rectangle: Rounded Corners 5">
-            <a:extLst>
-              <a:ext uri="{FF2B5EF4-FFF2-40B4-BE49-F238E27FC236}">
-                <a16:creationId xmlns:a16="http://schemas.microsoft.com/office/drawing/2014/main" id="{E91A345C-642E-4D66-A7DD-C2A8CB19CF5A}"/>
-              </a:ext>
-            </a:extLst>
-          </p:cNvPr>
-          <p:cNvSpPr/>
-          <p:nvPr/>
-        </p:nvSpPr>
-        <p:spPr>
-          <a:xfrm>
-            <a:off x="2369975" y="830426"/>
-            <a:ext cx="289249" cy="335902"/>
-          </a:xfrm>
-          <a:prstGeom prst="roundRect">
-            <a:avLst/>
-          </a:prstGeom>
-          <a:solidFill>
-            <a:schemeClr val="bg1"/>
-          </a:solidFill>
-        </p:spPr>
-        <p:style>
-          <a:lnRef idx="2">
-            <a:schemeClr val="accent3">
-              <a:shade val="50000"/>
-            </a:schemeClr>
-          </a:lnRef>
-          <a:fillRef idx="1">
-            <a:schemeClr val="accent3"/>
-          </a:fillRef>
-          <a:effectRef idx="0">
-            <a:schemeClr val="accent3"/>
-          </a:effectRef>
-          <a:fontRef idx="minor">
-            <a:schemeClr val="lt1"/>
-          </a:fontRef>
-        </p:style>
-        <p:txBody>
-          <a:bodyPr rtlCol="0" anchor="ctr"/>
-          <a:lstStyle/>
-          <a:p>
-            <a:pPr algn="ctr"/>
-            <a:endParaRPr lang="en-SG" dirty="0"/>
-          </a:p>
-        </p:txBody>
-      </p:sp>
-      <p:sp>
-        <p:nvSpPr>
-          <p:cNvPr id="11" name="TextBox 10">
-            <a:extLst>
-              <a:ext uri="{FF2B5EF4-FFF2-40B4-BE49-F238E27FC236}">
-                <a16:creationId xmlns:a16="http://schemas.microsoft.com/office/drawing/2014/main" id="{8538EA02-6C5F-4029-9D42-C2246A569DB4}"/>
-              </a:ext>
-            </a:extLst>
-          </p:cNvPr>
-          <p:cNvSpPr txBox="1"/>
-          <p:nvPr/>
-        </p:nvSpPr>
-        <p:spPr>
-          <a:xfrm>
-            <a:off x="933061" y="1436781"/>
-            <a:ext cx="1097903" cy="923330"/>
-          </a:xfrm>
-          <a:prstGeom prst="rect">
-            <a:avLst/>
-          </a:prstGeom>
-          <a:noFill/>
-        </p:spPr>
-        <p:txBody>
-          <a:bodyPr wrap="square" rtlCol="0">
-            <a:spAutoFit/>
-          </a:bodyPr>
-          <a:lstStyle/>
-          <a:p>
-            <a:r>
-              <a:rPr lang="en-US" dirty="0"/>
-              <a:t>Result 1</a:t>
-            </a:r>
-          </a:p>
-          <a:p>
-            <a:r>
-              <a:rPr lang="en-US" dirty="0"/>
-              <a:t>Result 2</a:t>
-            </a:r>
-          </a:p>
-          <a:p>
-            <a:r>
-              <a:rPr lang="en-US" dirty="0"/>
-              <a:t>Result 3</a:t>
-            </a:r>
-          </a:p>
-        </p:txBody>
-      </p:sp>
-      <p:sp>
-        <p:nvSpPr>
-          <p:cNvPr id="12" name="TextBox 11">
-            <a:extLst>
-              <a:ext uri="{FF2B5EF4-FFF2-40B4-BE49-F238E27FC236}">
-                <a16:creationId xmlns:a16="http://schemas.microsoft.com/office/drawing/2014/main" id="{95DA45DA-2D1A-4BCA-A278-3124BCC6EEC1}"/>
-              </a:ext>
-            </a:extLst>
-          </p:cNvPr>
-          <p:cNvSpPr txBox="1"/>
-          <p:nvPr/>
-        </p:nvSpPr>
-        <p:spPr>
-          <a:xfrm>
-            <a:off x="727785" y="462069"/>
-            <a:ext cx="1489789" cy="307777"/>
-          </a:xfrm>
-          <a:prstGeom prst="rect">
-            <a:avLst/>
-          </a:prstGeom>
-          <a:noFill/>
-        </p:spPr>
-        <p:txBody>
-          <a:bodyPr wrap="square" rtlCol="0">
-            <a:spAutoFit/>
-          </a:bodyPr>
-          <a:lstStyle/>
-          <a:p>
-            <a:r>
-              <a:rPr lang="en-US" sz="1400" dirty="0">
-                <a:solidFill>
-                  <a:srgbClr val="FFFFFF"/>
-                </a:solidFill>
-                <a:latin typeface="Roboto" panose="02000000000000000000" pitchFamily="2" charset="0"/>
-              </a:rPr>
-              <a:t>Search | </a:t>
-            </a:r>
-            <a:r>
-              <a:rPr lang="en-US" sz="1400" b="0" i="0" dirty="0">
-                <a:solidFill>
-                  <a:srgbClr val="FFFFFF"/>
-                </a:solidFill>
-                <a:effectLst/>
-                <a:latin typeface="Roboto" panose="02000000000000000000" pitchFamily="2" charset="0"/>
-              </a:rPr>
-              <a:t>Explore</a:t>
-            </a:r>
-            <a:endParaRPr lang="en-SG" sz="1400" dirty="0"/>
-          </a:p>
-        </p:txBody>
-      </p:sp>
-      <p:sp>
-        <p:nvSpPr>
-          <p:cNvPr id="23" name="Rectangle 22">
-            <a:extLst>
-              <a:ext uri="{FF2B5EF4-FFF2-40B4-BE49-F238E27FC236}">
-                <a16:creationId xmlns:a16="http://schemas.microsoft.com/office/drawing/2014/main" id="{FF173BAE-1655-42AC-9196-3914BED0354E}"/>
-              </a:ext>
-            </a:extLst>
-          </p:cNvPr>
-          <p:cNvSpPr/>
-          <p:nvPr/>
-        </p:nvSpPr>
-        <p:spPr>
-          <a:xfrm>
-            <a:off x="646919" y="407670"/>
+            <a:off x="648081" y="360801"/>
             <a:ext cx="2310883" cy="2208244"/>
           </a:xfrm>
           <a:prstGeom prst="rect">
@@ -6637,132 +6935,256 @@
           </a:p>
         </p:txBody>
       </p:sp>
-      <p:sp>
-        <p:nvSpPr>
-          <p:cNvPr id="33" name="TextBox 32">
-            <a:extLst>
-              <a:ext uri="{FF2B5EF4-FFF2-40B4-BE49-F238E27FC236}">
-                <a16:creationId xmlns:a16="http://schemas.microsoft.com/office/drawing/2014/main" id="{2E67FA11-F145-4906-8F0F-8F0BFB9813E6}"/>
-              </a:ext>
-            </a:extLst>
-          </p:cNvPr>
-          <p:cNvSpPr txBox="1"/>
+      <p:grpSp>
+        <p:nvGrpSpPr>
+          <p:cNvPr id="7" name="Group 6">
+            <a:extLst>
+              <a:ext uri="{FF2B5EF4-FFF2-40B4-BE49-F238E27FC236}">
+                <a16:creationId xmlns:a16="http://schemas.microsoft.com/office/drawing/2014/main" id="{7EE1BCDC-452A-4D01-A3FA-59923DD3D519}"/>
+              </a:ext>
+            </a:extLst>
+          </p:cNvPr>
+          <p:cNvGrpSpPr/>
           <p:nvPr/>
-        </p:nvSpPr>
-        <p:spPr>
+        </p:nvGrpSpPr>
+        <p:grpSpPr>
           <a:xfrm>
-            <a:off x="2418565" y="446681"/>
-            <a:ext cx="540399" cy="323165"/>
+            <a:off x="727785" y="446681"/>
+            <a:ext cx="2231179" cy="1913430"/>
+            <a:chOff x="727785" y="446681"/>
+            <a:chExt cx="2231179" cy="1913430"/>
           </a:xfrm>
-          <a:prstGeom prst="rect">
-            <a:avLst/>
-          </a:prstGeom>
-          <a:noFill/>
-        </p:spPr>
-        <p:txBody>
-          <a:bodyPr wrap="square" rtlCol="0">
-            <a:spAutoFit/>
-          </a:bodyPr>
-          <a:lstStyle/>
-          <a:p>
-            <a:r>
-              <a:rPr lang="en-US" sz="1500" dirty="0"/>
-              <a:t>hide</a:t>
-            </a:r>
-            <a:endParaRPr lang="en-SG" sz="1500" dirty="0"/>
-          </a:p>
-        </p:txBody>
-      </p:sp>
-      <p:sp>
-        <p:nvSpPr>
-          <p:cNvPr id="2" name="TextBox 1">
-            <a:extLst>
-              <a:ext uri="{FF2B5EF4-FFF2-40B4-BE49-F238E27FC236}">
-                <a16:creationId xmlns:a16="http://schemas.microsoft.com/office/drawing/2014/main" id="{DC8EE8EE-B5E6-4156-9A14-20E1A17EFB74}"/>
-              </a:ext>
-            </a:extLst>
-          </p:cNvPr>
-          <p:cNvSpPr txBox="1"/>
-          <p:nvPr/>
-        </p:nvSpPr>
-        <p:spPr>
-          <a:xfrm>
-            <a:off x="7712765" y="556591"/>
-            <a:ext cx="3483665" cy="954107"/>
-          </a:xfrm>
-          <a:prstGeom prst="rect">
-            <a:avLst/>
-          </a:prstGeom>
-          <a:noFill/>
-        </p:spPr>
-        <p:txBody>
-          <a:bodyPr wrap="square" rtlCol="0">
-            <a:spAutoFit/>
-          </a:bodyPr>
-          <a:lstStyle/>
-          <a:p>
-            <a:r>
-              <a:rPr lang="en-US" sz="1400" dirty="0">
-                <a:solidFill>
-                  <a:schemeClr val="accent2"/>
-                </a:solidFill>
-              </a:rPr>
-              <a:t>To add on: </a:t>
-            </a:r>
-          </a:p>
-          <a:p>
-            <a:r>
-              <a:rPr lang="en-US" sz="1400" dirty="0">
-                <a:solidFill>
-                  <a:schemeClr val="accent2"/>
-                </a:solidFill>
-              </a:rPr>
-              <a:t>Navbar - </a:t>
-            </a:r>
-          </a:p>
-          <a:p>
-            <a:pPr marL="285750" indent="-285750">
-              <a:buFont typeface="Arial" panose="020B0604020202020204" pitchFamily="34" charset="0"/>
-              <a:buChar char="•"/>
-            </a:pPr>
-            <a:r>
-              <a:rPr lang="en-US" sz="1400" dirty="0" err="1">
-                <a:solidFill>
-                  <a:schemeClr val="accent2"/>
-                </a:solidFill>
-              </a:rPr>
-              <a:t>redio</a:t>
-            </a:r>
-            <a:r>
-              <a:rPr lang="en-US" sz="1400" dirty="0">
-                <a:solidFill>
-                  <a:schemeClr val="accent2"/>
-                </a:solidFill>
-              </a:rPr>
-              <a:t> button to choose by region **</a:t>
-            </a:r>
-          </a:p>
-          <a:p>
-            <a:pPr marL="285750" indent="-285750">
-              <a:buFont typeface="Arial" panose="020B0604020202020204" pitchFamily="34" charset="0"/>
-              <a:buChar char="•"/>
-            </a:pPr>
-            <a:r>
-              <a:rPr lang="en-US" sz="1400" dirty="0">
-                <a:solidFill>
-                  <a:schemeClr val="accent2"/>
-                </a:solidFill>
-              </a:rPr>
-              <a:t>Check the radius by 500 meters </a:t>
-            </a:r>
-            <a:endParaRPr lang="en-SG" sz="1400" dirty="0">
-              <a:solidFill>
-                <a:schemeClr val="accent2"/>
-              </a:solidFill>
-            </a:endParaRPr>
-          </a:p>
-        </p:txBody>
-      </p:sp>
+        </p:grpSpPr>
+        <p:sp>
+          <p:nvSpPr>
+            <p:cNvPr id="5" name="Rectangle: Rounded Corners 4">
+              <a:extLst>
+                <a:ext uri="{FF2B5EF4-FFF2-40B4-BE49-F238E27FC236}">
+                  <a16:creationId xmlns:a16="http://schemas.microsoft.com/office/drawing/2014/main" id="{096B9309-8632-4F95-940B-B8BBBDD22729}"/>
+                </a:ext>
+              </a:extLst>
+            </p:cNvPr>
+            <p:cNvSpPr/>
+            <p:nvPr/>
+          </p:nvSpPr>
+          <p:spPr>
+            <a:xfrm>
+              <a:off x="933061" y="830426"/>
+              <a:ext cx="1726163" cy="335902"/>
+            </a:xfrm>
+            <a:prstGeom prst="roundRect">
+              <a:avLst/>
+            </a:prstGeom>
+          </p:spPr>
+          <p:style>
+            <a:lnRef idx="2">
+              <a:schemeClr val="accent3">
+                <a:shade val="50000"/>
+              </a:schemeClr>
+            </a:lnRef>
+            <a:fillRef idx="1">
+              <a:schemeClr val="accent3"/>
+            </a:fillRef>
+            <a:effectRef idx="0">
+              <a:schemeClr val="accent3"/>
+            </a:effectRef>
+            <a:fontRef idx="minor">
+              <a:schemeClr val="lt1"/>
+            </a:fontRef>
+          </p:style>
+          <p:txBody>
+            <a:bodyPr rtlCol="0" anchor="ctr"/>
+            <a:lstStyle/>
+            <a:p>
+              <a:pPr algn="ctr"/>
+              <a:endParaRPr lang="en-SG"/>
+            </a:p>
+          </p:txBody>
+        </p:sp>
+        <p:sp>
+          <p:nvSpPr>
+            <p:cNvPr id="6" name="Rectangle: Rounded Corners 5">
+              <a:extLst>
+                <a:ext uri="{FF2B5EF4-FFF2-40B4-BE49-F238E27FC236}">
+                  <a16:creationId xmlns:a16="http://schemas.microsoft.com/office/drawing/2014/main" id="{E91A345C-642E-4D66-A7DD-C2A8CB19CF5A}"/>
+                </a:ext>
+              </a:extLst>
+            </p:cNvPr>
+            <p:cNvSpPr/>
+            <p:nvPr/>
+          </p:nvSpPr>
+          <p:spPr>
+            <a:xfrm>
+              <a:off x="2369975" y="830426"/>
+              <a:ext cx="289249" cy="335902"/>
+            </a:xfrm>
+            <a:prstGeom prst="roundRect">
+              <a:avLst/>
+            </a:prstGeom>
+            <a:solidFill>
+              <a:schemeClr val="bg1"/>
+            </a:solidFill>
+          </p:spPr>
+          <p:style>
+            <a:lnRef idx="2">
+              <a:schemeClr val="accent3">
+                <a:shade val="50000"/>
+              </a:schemeClr>
+            </a:lnRef>
+            <a:fillRef idx="1">
+              <a:schemeClr val="accent3"/>
+            </a:fillRef>
+            <a:effectRef idx="0">
+              <a:schemeClr val="accent3"/>
+            </a:effectRef>
+            <a:fontRef idx="minor">
+              <a:schemeClr val="lt1"/>
+            </a:fontRef>
+          </p:style>
+          <p:txBody>
+            <a:bodyPr rtlCol="0" anchor="ctr"/>
+            <a:lstStyle/>
+            <a:p>
+              <a:pPr algn="ctr"/>
+              <a:endParaRPr lang="en-SG" dirty="0"/>
+            </a:p>
+          </p:txBody>
+        </p:sp>
+        <p:sp>
+          <p:nvSpPr>
+            <p:cNvPr id="11" name="TextBox 10">
+              <a:extLst>
+                <a:ext uri="{FF2B5EF4-FFF2-40B4-BE49-F238E27FC236}">
+                  <a16:creationId xmlns:a16="http://schemas.microsoft.com/office/drawing/2014/main" id="{8538EA02-6C5F-4029-9D42-C2246A569DB4}"/>
+                </a:ext>
+              </a:extLst>
+            </p:cNvPr>
+            <p:cNvSpPr txBox="1"/>
+            <p:nvPr/>
+          </p:nvSpPr>
+          <p:spPr>
+            <a:xfrm>
+              <a:off x="933061" y="1436781"/>
+              <a:ext cx="1097903" cy="923330"/>
+            </a:xfrm>
+            <a:prstGeom prst="rect">
+              <a:avLst/>
+            </a:prstGeom>
+            <a:noFill/>
+          </p:spPr>
+          <p:txBody>
+            <a:bodyPr wrap="square" rtlCol="0">
+              <a:spAutoFit/>
+            </a:bodyPr>
+            <a:lstStyle/>
+            <a:p>
+              <a:r>
+                <a:rPr lang="en-US" dirty="0"/>
+                <a:t>Result 1</a:t>
+              </a:r>
+            </a:p>
+            <a:p>
+              <a:r>
+                <a:rPr lang="en-US" dirty="0"/>
+                <a:t>Result 2</a:t>
+              </a:r>
+            </a:p>
+            <a:p>
+              <a:r>
+                <a:rPr lang="en-US" dirty="0"/>
+                <a:t>Result 3</a:t>
+              </a:r>
+            </a:p>
+          </p:txBody>
+        </p:sp>
+        <p:sp>
+          <p:nvSpPr>
+            <p:cNvPr id="12" name="TextBox 11">
+              <a:extLst>
+                <a:ext uri="{FF2B5EF4-FFF2-40B4-BE49-F238E27FC236}">
+                  <a16:creationId xmlns:a16="http://schemas.microsoft.com/office/drawing/2014/main" id="{95DA45DA-2D1A-4BCA-A278-3124BCC6EEC1}"/>
+                </a:ext>
+              </a:extLst>
+            </p:cNvPr>
+            <p:cNvSpPr txBox="1"/>
+            <p:nvPr/>
+          </p:nvSpPr>
+          <p:spPr>
+            <a:xfrm>
+              <a:off x="727785" y="462069"/>
+              <a:ext cx="1489789" cy="307777"/>
+            </a:xfrm>
+            <a:prstGeom prst="rect">
+              <a:avLst/>
+            </a:prstGeom>
+            <a:noFill/>
+          </p:spPr>
+          <p:txBody>
+            <a:bodyPr wrap="square" rtlCol="0">
+              <a:spAutoFit/>
+            </a:bodyPr>
+            <a:lstStyle/>
+            <a:p>
+              <a:r>
+                <a:rPr lang="en-US" sz="1400" dirty="0">
+                  <a:solidFill>
+                    <a:srgbClr val="FFFFFF"/>
+                  </a:solidFill>
+                  <a:latin typeface="Roboto" panose="02000000000000000000" pitchFamily="2" charset="0"/>
+                </a:rPr>
+                <a:t>Search | </a:t>
+              </a:r>
+              <a:r>
+                <a:rPr lang="en-US" sz="1400" b="0" i="0" dirty="0">
+                  <a:solidFill>
+                    <a:srgbClr val="FFFFFF"/>
+                  </a:solidFill>
+                  <a:effectLst/>
+                  <a:latin typeface="Roboto" panose="02000000000000000000" pitchFamily="2" charset="0"/>
+                </a:rPr>
+                <a:t>Explore</a:t>
+              </a:r>
+              <a:endParaRPr lang="en-SG" sz="1400" dirty="0"/>
+            </a:p>
+          </p:txBody>
+        </p:sp>
+        <p:sp>
+          <p:nvSpPr>
+            <p:cNvPr id="33" name="TextBox 32">
+              <a:extLst>
+                <a:ext uri="{FF2B5EF4-FFF2-40B4-BE49-F238E27FC236}">
+                  <a16:creationId xmlns:a16="http://schemas.microsoft.com/office/drawing/2014/main" id="{2E67FA11-F145-4906-8F0F-8F0BFB9813E6}"/>
+                </a:ext>
+              </a:extLst>
+            </p:cNvPr>
+            <p:cNvSpPr txBox="1"/>
+            <p:nvPr/>
+          </p:nvSpPr>
+          <p:spPr>
+            <a:xfrm>
+              <a:off x="2418565" y="446681"/>
+              <a:ext cx="540399" cy="323165"/>
+            </a:xfrm>
+            <a:prstGeom prst="rect">
+              <a:avLst/>
+            </a:prstGeom>
+            <a:noFill/>
+          </p:spPr>
+          <p:txBody>
+            <a:bodyPr wrap="square" rtlCol="0">
+              <a:spAutoFit/>
+            </a:bodyPr>
+            <a:lstStyle/>
+            <a:p>
+              <a:r>
+                <a:rPr lang="en-US" sz="1500" dirty="0"/>
+                <a:t>hide</a:t>
+              </a:r>
+              <a:endParaRPr lang="en-SG" sz="1500" dirty="0"/>
+            </a:p>
+          </p:txBody>
+        </p:sp>
+      </p:grpSp>
       <p:sp>
         <p:nvSpPr>
           <p:cNvPr id="3" name="TextBox 2">
@@ -6858,6 +7280,985 @@
 </file>
 
 <file path=ppt/slides/slide4.xml><?xml version="1.0" encoding="utf-8"?>
+<p:sld xmlns:a="http://schemas.openxmlformats.org/drawingml/2006/main" xmlns:r="http://schemas.openxmlformats.org/officeDocument/2006/relationships" xmlns:p="http://schemas.openxmlformats.org/presentationml/2006/main">
+  <p:cSld>
+    <p:spTree>
+      <p:nvGrpSpPr>
+        <p:cNvPr id="1" name=""/>
+        <p:cNvGrpSpPr/>
+        <p:nvPr/>
+      </p:nvGrpSpPr>
+      <p:grpSpPr>
+        <a:xfrm>
+          <a:off x="0" y="0"/>
+          <a:ext cx="0" cy="0"/>
+          <a:chOff x="0" y="0"/>
+          <a:chExt cx="0" cy="0"/>
+        </a:xfrm>
+      </p:grpSpPr>
+      <p:sp>
+        <p:nvSpPr>
+          <p:cNvPr id="4" name="Rectangle 3">
+            <a:extLst>
+              <a:ext uri="{FF2B5EF4-FFF2-40B4-BE49-F238E27FC236}">
+                <a16:creationId xmlns:a16="http://schemas.microsoft.com/office/drawing/2014/main" id="{F612D7CA-803F-4E65-BDCD-A4EBA733EF3A}"/>
+              </a:ext>
+            </a:extLst>
+          </p:cNvPr>
+          <p:cNvSpPr/>
+          <p:nvPr/>
+        </p:nvSpPr>
+        <p:spPr>
+          <a:xfrm>
+            <a:off x="393438" y="249411"/>
+            <a:ext cx="11374015" cy="4637314"/>
+          </a:xfrm>
+          <a:prstGeom prst="rect">
+            <a:avLst/>
+          </a:prstGeom>
+        </p:spPr>
+        <p:style>
+          <a:lnRef idx="2">
+            <a:schemeClr val="accent1">
+              <a:shade val="50000"/>
+            </a:schemeClr>
+          </a:lnRef>
+          <a:fillRef idx="1">
+            <a:schemeClr val="accent1"/>
+          </a:fillRef>
+          <a:effectRef idx="0">
+            <a:schemeClr val="accent1"/>
+          </a:effectRef>
+          <a:fontRef idx="minor">
+            <a:schemeClr val="lt1"/>
+          </a:fontRef>
+        </p:style>
+        <p:txBody>
+          <a:bodyPr rtlCol="0" anchor="ctr"/>
+          <a:lstStyle/>
+          <a:p>
+            <a:pPr algn="ctr"/>
+            <a:endParaRPr lang="en-SG"/>
+          </a:p>
+        </p:txBody>
+      </p:sp>
+      <p:sp>
+        <p:nvSpPr>
+          <p:cNvPr id="23" name="Rectangle 22">
+            <a:extLst>
+              <a:ext uri="{FF2B5EF4-FFF2-40B4-BE49-F238E27FC236}">
+                <a16:creationId xmlns:a16="http://schemas.microsoft.com/office/drawing/2014/main" id="{FF173BAE-1655-42AC-9196-3914BED0354E}"/>
+              </a:ext>
+            </a:extLst>
+          </p:cNvPr>
+          <p:cNvSpPr/>
+          <p:nvPr/>
+        </p:nvSpPr>
+        <p:spPr>
+          <a:xfrm>
+            <a:off x="690601" y="381961"/>
+            <a:ext cx="2869345" cy="2896461"/>
+          </a:xfrm>
+          <a:prstGeom prst="rect">
+            <a:avLst/>
+          </a:prstGeom>
+          <a:solidFill>
+            <a:srgbClr val="EEFDA5">
+              <a:alpha val="34000"/>
+            </a:srgbClr>
+          </a:solidFill>
+        </p:spPr>
+        <p:style>
+          <a:lnRef idx="2">
+            <a:schemeClr val="accent1">
+              <a:shade val="50000"/>
+            </a:schemeClr>
+          </a:lnRef>
+          <a:fillRef idx="1">
+            <a:schemeClr val="accent1"/>
+          </a:fillRef>
+          <a:effectRef idx="0">
+            <a:schemeClr val="accent1"/>
+          </a:effectRef>
+          <a:fontRef idx="minor">
+            <a:schemeClr val="lt1"/>
+          </a:fontRef>
+        </p:style>
+        <p:txBody>
+          <a:bodyPr rtlCol="0" anchor="ctr"/>
+          <a:lstStyle/>
+          <a:p>
+            <a:pPr algn="ctr"/>
+            <a:endParaRPr lang="en-SG" dirty="0"/>
+          </a:p>
+        </p:txBody>
+      </p:sp>
+      <p:sp>
+        <p:nvSpPr>
+          <p:cNvPr id="24" name="Rectangle 23">
+            <a:extLst>
+              <a:ext uri="{FF2B5EF4-FFF2-40B4-BE49-F238E27FC236}">
+                <a16:creationId xmlns:a16="http://schemas.microsoft.com/office/drawing/2014/main" id="{ABACE66F-2A5E-4F98-ADBD-89EB73A3EA75}"/>
+              </a:ext>
+            </a:extLst>
+          </p:cNvPr>
+          <p:cNvSpPr/>
+          <p:nvPr/>
+        </p:nvSpPr>
+        <p:spPr>
+          <a:xfrm>
+            <a:off x="410546" y="5071391"/>
+            <a:ext cx="11374015" cy="1618658"/>
+          </a:xfrm>
+          <a:prstGeom prst="rect">
+            <a:avLst/>
+          </a:prstGeom>
+          <a:solidFill>
+            <a:schemeClr val="bg2"/>
+          </a:solidFill>
+        </p:spPr>
+        <p:style>
+          <a:lnRef idx="2">
+            <a:schemeClr val="accent1">
+              <a:shade val="50000"/>
+            </a:schemeClr>
+          </a:lnRef>
+          <a:fillRef idx="1">
+            <a:schemeClr val="accent1"/>
+          </a:fillRef>
+          <a:effectRef idx="0">
+            <a:schemeClr val="accent1"/>
+          </a:effectRef>
+          <a:fontRef idx="minor">
+            <a:schemeClr val="lt1"/>
+          </a:fontRef>
+        </p:style>
+        <p:txBody>
+          <a:bodyPr rtlCol="0" anchor="ctr"/>
+          <a:lstStyle/>
+          <a:p>
+            <a:pPr algn="ctr"/>
+            <a:endParaRPr lang="en-SG"/>
+          </a:p>
+        </p:txBody>
+      </p:sp>
+      <p:sp>
+        <p:nvSpPr>
+          <p:cNvPr id="26" name="TextBox 25">
+            <a:extLst>
+              <a:ext uri="{FF2B5EF4-FFF2-40B4-BE49-F238E27FC236}">
+                <a16:creationId xmlns:a16="http://schemas.microsoft.com/office/drawing/2014/main" id="{A5B280B2-D0B9-4C19-8609-85A1B57E5F09}"/>
+              </a:ext>
+            </a:extLst>
+          </p:cNvPr>
+          <p:cNvSpPr txBox="1"/>
+          <p:nvPr/>
+        </p:nvSpPr>
+        <p:spPr>
+          <a:xfrm>
+            <a:off x="5652795" y="2322789"/>
+            <a:ext cx="1699727" cy="369332"/>
+          </a:xfrm>
+          <a:prstGeom prst="rect">
+            <a:avLst/>
+          </a:prstGeom>
+          <a:noFill/>
+        </p:spPr>
+        <p:txBody>
+          <a:bodyPr wrap="square" rtlCol="0">
+            <a:spAutoFit/>
+          </a:bodyPr>
+          <a:lstStyle/>
+          <a:p>
+            <a:r>
+              <a:rPr lang="en-US" dirty="0"/>
+              <a:t>Interactive map </a:t>
+            </a:r>
+            <a:endParaRPr lang="en-SG" dirty="0"/>
+          </a:p>
+        </p:txBody>
+      </p:sp>
+      <p:sp>
+        <p:nvSpPr>
+          <p:cNvPr id="27" name="Rectangle 26">
+            <a:extLst>
+              <a:ext uri="{FF2B5EF4-FFF2-40B4-BE49-F238E27FC236}">
+                <a16:creationId xmlns:a16="http://schemas.microsoft.com/office/drawing/2014/main" id="{0D216D2B-38FE-406F-A1BC-DF3474A06479}"/>
+              </a:ext>
+            </a:extLst>
+          </p:cNvPr>
+          <p:cNvSpPr/>
+          <p:nvPr/>
+        </p:nvSpPr>
+        <p:spPr>
+          <a:xfrm>
+            <a:off x="547398" y="5253050"/>
+            <a:ext cx="1623525" cy="1255339"/>
+          </a:xfrm>
+          <a:prstGeom prst="rect">
+            <a:avLst/>
+          </a:prstGeom>
+          <a:solidFill>
+            <a:schemeClr val="accent2">
+              <a:lumMod val="20000"/>
+              <a:lumOff val="80000"/>
+            </a:schemeClr>
+          </a:solidFill>
+        </p:spPr>
+        <p:style>
+          <a:lnRef idx="2">
+            <a:schemeClr val="accent1">
+              <a:shade val="50000"/>
+            </a:schemeClr>
+          </a:lnRef>
+          <a:fillRef idx="1">
+            <a:schemeClr val="accent1"/>
+          </a:fillRef>
+          <a:effectRef idx="0">
+            <a:schemeClr val="accent1"/>
+          </a:effectRef>
+          <a:fontRef idx="minor">
+            <a:schemeClr val="lt1"/>
+          </a:fontRef>
+        </p:style>
+        <p:txBody>
+          <a:bodyPr rtlCol="0" anchor="ctr"/>
+          <a:lstStyle/>
+          <a:p>
+            <a:pPr algn="ctr"/>
+            <a:endParaRPr lang="en-SG"/>
+          </a:p>
+        </p:txBody>
+      </p:sp>
+      <p:sp>
+        <p:nvSpPr>
+          <p:cNvPr id="28" name="TextBox 27">
+            <a:extLst>
+              <a:ext uri="{FF2B5EF4-FFF2-40B4-BE49-F238E27FC236}">
+                <a16:creationId xmlns:a16="http://schemas.microsoft.com/office/drawing/2014/main" id="{AF5D59BA-4216-44AD-8B0C-930C94AB342E}"/>
+              </a:ext>
+            </a:extLst>
+          </p:cNvPr>
+          <p:cNvSpPr txBox="1"/>
+          <p:nvPr/>
+        </p:nvSpPr>
+        <p:spPr>
+          <a:xfrm>
+            <a:off x="603376" y="5341708"/>
+            <a:ext cx="1384039" cy="369332"/>
+          </a:xfrm>
+          <a:prstGeom prst="rect">
+            <a:avLst/>
+          </a:prstGeom>
+          <a:noFill/>
+        </p:spPr>
+        <p:txBody>
+          <a:bodyPr wrap="square" rtlCol="0">
+            <a:spAutoFit/>
+          </a:bodyPr>
+          <a:lstStyle/>
+          <a:p>
+            <a:r>
+              <a:rPr lang="en-US" dirty="0"/>
+              <a:t>2hrs forecast</a:t>
+            </a:r>
+            <a:endParaRPr lang="en-SG" dirty="0"/>
+          </a:p>
+        </p:txBody>
+      </p:sp>
+      <p:sp>
+        <p:nvSpPr>
+          <p:cNvPr id="29" name="Rectangle 28">
+            <a:extLst>
+              <a:ext uri="{FF2B5EF4-FFF2-40B4-BE49-F238E27FC236}">
+                <a16:creationId xmlns:a16="http://schemas.microsoft.com/office/drawing/2014/main" id="{4CA1FD3A-DAB8-40F6-B663-0F6EF1286CCD}"/>
+              </a:ext>
+            </a:extLst>
+          </p:cNvPr>
+          <p:cNvSpPr/>
+          <p:nvPr/>
+        </p:nvSpPr>
+        <p:spPr>
+          <a:xfrm>
+            <a:off x="3638941" y="5253050"/>
+            <a:ext cx="6466112" cy="1255339"/>
+          </a:xfrm>
+          <a:prstGeom prst="rect">
+            <a:avLst/>
+          </a:prstGeom>
+          <a:solidFill>
+            <a:schemeClr val="accent2">
+              <a:lumMod val="20000"/>
+              <a:lumOff val="80000"/>
+            </a:schemeClr>
+          </a:solidFill>
+        </p:spPr>
+        <p:style>
+          <a:lnRef idx="2">
+            <a:schemeClr val="accent1">
+              <a:shade val="50000"/>
+            </a:schemeClr>
+          </a:lnRef>
+          <a:fillRef idx="1">
+            <a:schemeClr val="accent1"/>
+          </a:fillRef>
+          <a:effectRef idx="0">
+            <a:schemeClr val="accent1"/>
+          </a:effectRef>
+          <a:fontRef idx="minor">
+            <a:schemeClr val="lt1"/>
+          </a:fontRef>
+        </p:style>
+        <p:txBody>
+          <a:bodyPr rtlCol="0" anchor="ctr"/>
+          <a:lstStyle/>
+          <a:p>
+            <a:pPr algn="ctr"/>
+            <a:endParaRPr lang="en-SG"/>
+          </a:p>
+        </p:txBody>
+      </p:sp>
+      <p:sp>
+        <p:nvSpPr>
+          <p:cNvPr id="30" name="TextBox 29">
+            <a:extLst>
+              <a:ext uri="{FF2B5EF4-FFF2-40B4-BE49-F238E27FC236}">
+                <a16:creationId xmlns:a16="http://schemas.microsoft.com/office/drawing/2014/main" id="{8CBCC2FC-FA56-4CEB-ACDF-98A4F676C70F}"/>
+              </a:ext>
+            </a:extLst>
+          </p:cNvPr>
+          <p:cNvSpPr txBox="1"/>
+          <p:nvPr/>
+        </p:nvSpPr>
+        <p:spPr>
+          <a:xfrm>
+            <a:off x="5652795" y="5713617"/>
+            <a:ext cx="2418185" cy="369332"/>
+          </a:xfrm>
+          <a:prstGeom prst="rect">
+            <a:avLst/>
+          </a:prstGeom>
+          <a:noFill/>
+        </p:spPr>
+        <p:txBody>
+          <a:bodyPr wrap="square" rtlCol="0">
+            <a:spAutoFit/>
+          </a:bodyPr>
+          <a:lstStyle/>
+          <a:p>
+            <a:r>
+              <a:rPr lang="en-US" dirty="0"/>
+              <a:t>2 hour weather display</a:t>
+            </a:r>
+            <a:endParaRPr lang="en-SG" dirty="0"/>
+          </a:p>
+        </p:txBody>
+      </p:sp>
+      <p:cxnSp>
+        <p:nvCxnSpPr>
+          <p:cNvPr id="9" name="Straight Arrow Connector 8">
+            <a:extLst>
+              <a:ext uri="{FF2B5EF4-FFF2-40B4-BE49-F238E27FC236}">
+                <a16:creationId xmlns:a16="http://schemas.microsoft.com/office/drawing/2014/main" id="{3E58FFA4-2A30-46A6-A962-2E808B785397}"/>
+              </a:ext>
+            </a:extLst>
+          </p:cNvPr>
+          <p:cNvCxnSpPr/>
+          <p:nvPr/>
+        </p:nvCxnSpPr>
+        <p:spPr>
+          <a:xfrm flipV="1">
+            <a:off x="6550090" y="3303037"/>
+            <a:ext cx="0" cy="2408003"/>
+          </a:xfrm>
+          <a:prstGeom prst="straightConnector1">
+            <a:avLst/>
+          </a:prstGeom>
+          <a:ln>
+            <a:tailEnd type="triangle"/>
+          </a:ln>
+        </p:spPr>
+        <p:style>
+          <a:lnRef idx="1">
+            <a:schemeClr val="accent4"/>
+          </a:lnRef>
+          <a:fillRef idx="0">
+            <a:schemeClr val="accent4"/>
+          </a:fillRef>
+          <a:effectRef idx="0">
+            <a:schemeClr val="accent4"/>
+          </a:effectRef>
+          <a:fontRef idx="minor">
+            <a:schemeClr val="tx1"/>
+          </a:fontRef>
+        </p:style>
+      </p:cxnSp>
+      <p:sp>
+        <p:nvSpPr>
+          <p:cNvPr id="31" name="TextBox 30">
+            <a:extLst>
+              <a:ext uri="{FF2B5EF4-FFF2-40B4-BE49-F238E27FC236}">
+                <a16:creationId xmlns:a16="http://schemas.microsoft.com/office/drawing/2014/main" id="{7635A29B-4E05-4CCD-815A-47A4745C00AA}"/>
+              </a:ext>
+            </a:extLst>
+          </p:cNvPr>
+          <p:cNvSpPr txBox="1"/>
+          <p:nvPr/>
+        </p:nvSpPr>
+        <p:spPr>
+          <a:xfrm>
+            <a:off x="594050" y="5740382"/>
+            <a:ext cx="1539549" cy="369332"/>
+          </a:xfrm>
+          <a:prstGeom prst="rect">
+            <a:avLst/>
+          </a:prstGeom>
+          <a:noFill/>
+        </p:spPr>
+        <p:txBody>
+          <a:bodyPr wrap="square" rtlCol="0">
+            <a:spAutoFit/>
+          </a:bodyPr>
+          <a:lstStyle/>
+          <a:p>
+            <a:r>
+              <a:rPr lang="en-US" dirty="0"/>
+              <a:t>24hrs forecast</a:t>
+            </a:r>
+            <a:endParaRPr lang="en-SG" dirty="0"/>
+          </a:p>
+        </p:txBody>
+      </p:sp>
+      <p:sp>
+        <p:nvSpPr>
+          <p:cNvPr id="32" name="TextBox 31">
+            <a:extLst>
+              <a:ext uri="{FF2B5EF4-FFF2-40B4-BE49-F238E27FC236}">
+                <a16:creationId xmlns:a16="http://schemas.microsoft.com/office/drawing/2014/main" id="{3602FB3D-AC27-481A-9631-761286BE926C}"/>
+              </a:ext>
+            </a:extLst>
+          </p:cNvPr>
+          <p:cNvSpPr txBox="1"/>
+          <p:nvPr/>
+        </p:nvSpPr>
+        <p:spPr>
+          <a:xfrm>
+            <a:off x="594050" y="6106707"/>
+            <a:ext cx="1623525" cy="369332"/>
+          </a:xfrm>
+          <a:prstGeom prst="rect">
+            <a:avLst/>
+          </a:prstGeom>
+          <a:noFill/>
+        </p:spPr>
+        <p:txBody>
+          <a:bodyPr wrap="square" rtlCol="0">
+            <a:spAutoFit/>
+          </a:bodyPr>
+          <a:lstStyle/>
+          <a:p>
+            <a:r>
+              <a:rPr lang="en-US" dirty="0"/>
+              <a:t>4 days forecast</a:t>
+            </a:r>
+            <a:endParaRPr lang="en-SG" dirty="0"/>
+          </a:p>
+        </p:txBody>
+      </p:sp>
+      <p:sp>
+        <p:nvSpPr>
+          <p:cNvPr id="5" name="Rectangle: Rounded Corners 4">
+            <a:extLst>
+              <a:ext uri="{FF2B5EF4-FFF2-40B4-BE49-F238E27FC236}">
+                <a16:creationId xmlns:a16="http://schemas.microsoft.com/office/drawing/2014/main" id="{096B9309-8632-4F95-940B-B8BBBDD22729}"/>
+              </a:ext>
+            </a:extLst>
+          </p:cNvPr>
+          <p:cNvSpPr/>
+          <p:nvPr/>
+        </p:nvSpPr>
+        <p:spPr>
+          <a:xfrm>
+            <a:off x="933061" y="830426"/>
+            <a:ext cx="1726163" cy="335902"/>
+          </a:xfrm>
+          <a:prstGeom prst="roundRect">
+            <a:avLst/>
+          </a:prstGeom>
+        </p:spPr>
+        <p:style>
+          <a:lnRef idx="2">
+            <a:schemeClr val="accent3">
+              <a:shade val="50000"/>
+            </a:schemeClr>
+          </a:lnRef>
+          <a:fillRef idx="1">
+            <a:schemeClr val="accent3"/>
+          </a:fillRef>
+          <a:effectRef idx="0">
+            <a:schemeClr val="accent3"/>
+          </a:effectRef>
+          <a:fontRef idx="minor">
+            <a:schemeClr val="lt1"/>
+          </a:fontRef>
+        </p:style>
+        <p:txBody>
+          <a:bodyPr rtlCol="0" anchor="ctr"/>
+          <a:lstStyle/>
+          <a:p>
+            <a:pPr algn="ctr"/>
+            <a:endParaRPr lang="en-SG"/>
+          </a:p>
+        </p:txBody>
+      </p:sp>
+      <p:sp>
+        <p:nvSpPr>
+          <p:cNvPr id="6" name="Rectangle: Rounded Corners 5">
+            <a:extLst>
+              <a:ext uri="{FF2B5EF4-FFF2-40B4-BE49-F238E27FC236}">
+                <a16:creationId xmlns:a16="http://schemas.microsoft.com/office/drawing/2014/main" id="{E91A345C-642E-4D66-A7DD-C2A8CB19CF5A}"/>
+              </a:ext>
+            </a:extLst>
+          </p:cNvPr>
+          <p:cNvSpPr/>
+          <p:nvPr/>
+        </p:nvSpPr>
+        <p:spPr>
+          <a:xfrm>
+            <a:off x="2369975" y="830426"/>
+            <a:ext cx="289249" cy="335902"/>
+          </a:xfrm>
+          <a:prstGeom prst="roundRect">
+            <a:avLst/>
+          </a:prstGeom>
+          <a:solidFill>
+            <a:schemeClr val="bg1"/>
+          </a:solidFill>
+        </p:spPr>
+        <p:style>
+          <a:lnRef idx="2">
+            <a:schemeClr val="accent3">
+              <a:shade val="50000"/>
+            </a:schemeClr>
+          </a:lnRef>
+          <a:fillRef idx="1">
+            <a:schemeClr val="accent3"/>
+          </a:fillRef>
+          <a:effectRef idx="0">
+            <a:schemeClr val="accent3"/>
+          </a:effectRef>
+          <a:fontRef idx="minor">
+            <a:schemeClr val="lt1"/>
+          </a:fontRef>
+        </p:style>
+        <p:txBody>
+          <a:bodyPr rtlCol="0" anchor="ctr"/>
+          <a:lstStyle/>
+          <a:p>
+            <a:pPr algn="ctr"/>
+            <a:endParaRPr lang="en-SG" dirty="0"/>
+          </a:p>
+        </p:txBody>
+      </p:sp>
+      <p:sp>
+        <p:nvSpPr>
+          <p:cNvPr id="11" name="TextBox 10">
+            <a:extLst>
+              <a:ext uri="{FF2B5EF4-FFF2-40B4-BE49-F238E27FC236}">
+                <a16:creationId xmlns:a16="http://schemas.microsoft.com/office/drawing/2014/main" id="{8538EA02-6C5F-4029-9D42-C2246A569DB4}"/>
+              </a:ext>
+            </a:extLst>
+          </p:cNvPr>
+          <p:cNvSpPr txBox="1"/>
+          <p:nvPr/>
+        </p:nvSpPr>
+        <p:spPr>
+          <a:xfrm>
+            <a:off x="3945538" y="441881"/>
+            <a:ext cx="2025903" cy="1200329"/>
+          </a:xfrm>
+          <a:prstGeom prst="rect">
+            <a:avLst/>
+          </a:prstGeom>
+          <a:noFill/>
+        </p:spPr>
+        <p:txBody>
+          <a:bodyPr wrap="square" rtlCol="0">
+            <a:spAutoFit/>
+          </a:bodyPr>
+          <a:lstStyle/>
+          <a:p>
+            <a:r>
+              <a:rPr lang="en-US" dirty="0"/>
+              <a:t>Drop down</a:t>
+            </a:r>
+          </a:p>
+          <a:p>
+            <a:pPr marL="285750" indent="-285750">
+              <a:buFont typeface="Courier New" panose="02070309020205020404" pitchFamily="49" charset="0"/>
+              <a:buChar char="o"/>
+            </a:pPr>
+            <a:r>
+              <a:rPr lang="en-US" dirty="0"/>
+              <a:t>Indoor </a:t>
+            </a:r>
+          </a:p>
+          <a:p>
+            <a:pPr marL="285750" indent="-285750">
+              <a:buFont typeface="Courier New" panose="02070309020205020404" pitchFamily="49" charset="0"/>
+              <a:buChar char="o"/>
+            </a:pPr>
+            <a:r>
+              <a:rPr lang="en-US" dirty="0"/>
+              <a:t>Outdoor nature </a:t>
+            </a:r>
+          </a:p>
+          <a:p>
+            <a:pPr marL="285750" indent="-285750">
+              <a:buFont typeface="Courier New" panose="02070309020205020404" pitchFamily="49" charset="0"/>
+              <a:buChar char="o"/>
+            </a:pPr>
+            <a:r>
+              <a:rPr lang="en-US" dirty="0"/>
+              <a:t>Both </a:t>
+            </a:r>
+          </a:p>
+        </p:txBody>
+      </p:sp>
+      <p:sp>
+        <p:nvSpPr>
+          <p:cNvPr id="12" name="TextBox 11">
+            <a:extLst>
+              <a:ext uri="{FF2B5EF4-FFF2-40B4-BE49-F238E27FC236}">
+                <a16:creationId xmlns:a16="http://schemas.microsoft.com/office/drawing/2014/main" id="{95DA45DA-2D1A-4BCA-A278-3124BCC6EEC1}"/>
+              </a:ext>
+            </a:extLst>
+          </p:cNvPr>
+          <p:cNvSpPr txBox="1"/>
+          <p:nvPr/>
+        </p:nvSpPr>
+        <p:spPr>
+          <a:xfrm>
+            <a:off x="727785" y="462069"/>
+            <a:ext cx="1489789" cy="307777"/>
+          </a:xfrm>
+          <a:prstGeom prst="rect">
+            <a:avLst/>
+          </a:prstGeom>
+          <a:noFill/>
+        </p:spPr>
+        <p:txBody>
+          <a:bodyPr wrap="square" rtlCol="0">
+            <a:spAutoFit/>
+          </a:bodyPr>
+          <a:lstStyle/>
+          <a:p>
+            <a:r>
+              <a:rPr lang="en-US" sz="1400" dirty="0">
+                <a:solidFill>
+                  <a:srgbClr val="FFFFFF"/>
+                </a:solidFill>
+                <a:latin typeface="Roboto" panose="02000000000000000000" pitchFamily="2" charset="0"/>
+              </a:rPr>
+              <a:t>Search | </a:t>
+            </a:r>
+            <a:r>
+              <a:rPr lang="en-US" sz="1400" b="0" i="0" dirty="0">
+                <a:solidFill>
+                  <a:srgbClr val="FFFFFF"/>
+                </a:solidFill>
+                <a:effectLst/>
+                <a:latin typeface="Roboto" panose="02000000000000000000" pitchFamily="2" charset="0"/>
+              </a:rPr>
+              <a:t>Explore</a:t>
+            </a:r>
+            <a:endParaRPr lang="en-SG" sz="1400" dirty="0"/>
+          </a:p>
+        </p:txBody>
+      </p:sp>
+      <p:sp>
+        <p:nvSpPr>
+          <p:cNvPr id="33" name="TextBox 32">
+            <a:extLst>
+              <a:ext uri="{FF2B5EF4-FFF2-40B4-BE49-F238E27FC236}">
+                <a16:creationId xmlns:a16="http://schemas.microsoft.com/office/drawing/2014/main" id="{2E67FA11-F145-4906-8F0F-8F0BFB9813E6}"/>
+              </a:ext>
+            </a:extLst>
+          </p:cNvPr>
+          <p:cNvSpPr txBox="1"/>
+          <p:nvPr/>
+        </p:nvSpPr>
+        <p:spPr>
+          <a:xfrm>
+            <a:off x="2418565" y="446681"/>
+            <a:ext cx="540399" cy="323165"/>
+          </a:xfrm>
+          <a:prstGeom prst="rect">
+            <a:avLst/>
+          </a:prstGeom>
+          <a:noFill/>
+        </p:spPr>
+        <p:txBody>
+          <a:bodyPr wrap="square" rtlCol="0">
+            <a:spAutoFit/>
+          </a:bodyPr>
+          <a:lstStyle/>
+          <a:p>
+            <a:r>
+              <a:rPr lang="en-US" sz="1500" dirty="0"/>
+              <a:t>hide</a:t>
+            </a:r>
+            <a:endParaRPr lang="en-SG" sz="1500" dirty="0"/>
+          </a:p>
+        </p:txBody>
+      </p:sp>
+      <p:sp>
+        <p:nvSpPr>
+          <p:cNvPr id="3" name="TextBox 2">
+            <a:extLst>
+              <a:ext uri="{FF2B5EF4-FFF2-40B4-BE49-F238E27FC236}">
+                <a16:creationId xmlns:a16="http://schemas.microsoft.com/office/drawing/2014/main" id="{8D57FB78-D92F-4FC7-BA32-F040DEA406D1}"/>
+              </a:ext>
+            </a:extLst>
+          </p:cNvPr>
+          <p:cNvSpPr txBox="1"/>
+          <p:nvPr/>
+        </p:nvSpPr>
+        <p:spPr>
+          <a:xfrm>
+            <a:off x="8153400" y="2124075"/>
+            <a:ext cx="3295650" cy="1200329"/>
+          </a:xfrm>
+          <a:prstGeom prst="rect">
+            <a:avLst/>
+          </a:prstGeom>
+          <a:noFill/>
+        </p:spPr>
+        <p:txBody>
+          <a:bodyPr wrap="square" rtlCol="0">
+            <a:spAutoFit/>
+          </a:bodyPr>
+          <a:lstStyle/>
+          <a:p>
+            <a:r>
+              <a:rPr lang="en-US" dirty="0">
+                <a:solidFill>
+                  <a:schemeClr val="accent2"/>
+                </a:solidFill>
+              </a:rPr>
+              <a:t>carpark, show </a:t>
+            </a:r>
+            <a:r>
+              <a:rPr lang="en-US" dirty="0" err="1">
+                <a:solidFill>
+                  <a:schemeClr val="accent2"/>
+                </a:solidFill>
+              </a:rPr>
+              <a:t>avai</a:t>
+            </a:r>
+            <a:r>
+              <a:rPr lang="en-US" dirty="0">
+                <a:solidFill>
+                  <a:schemeClr val="accent2"/>
+                </a:solidFill>
+              </a:rPr>
+              <a:t> and how many slot left </a:t>
+            </a:r>
+          </a:p>
+          <a:p>
+            <a:r>
+              <a:rPr lang="en-US" dirty="0">
+                <a:solidFill>
+                  <a:schemeClr val="accent2"/>
+                </a:solidFill>
+              </a:rPr>
+              <a:t>show parameter of nearby </a:t>
+            </a:r>
+            <a:r>
+              <a:rPr lang="en-US" dirty="0" err="1">
+                <a:solidFill>
+                  <a:schemeClr val="accent2"/>
+                </a:solidFill>
+              </a:rPr>
+              <a:t>wihin</a:t>
+            </a:r>
+            <a:r>
+              <a:rPr lang="en-US" dirty="0">
+                <a:solidFill>
+                  <a:schemeClr val="accent2"/>
+                </a:solidFill>
+              </a:rPr>
+              <a:t> 500 meters </a:t>
+            </a:r>
+          </a:p>
+        </p:txBody>
+      </p:sp>
+      <p:sp>
+        <p:nvSpPr>
+          <p:cNvPr id="21" name="TextBox 20">
+            <a:extLst>
+              <a:ext uri="{FF2B5EF4-FFF2-40B4-BE49-F238E27FC236}">
+                <a16:creationId xmlns:a16="http://schemas.microsoft.com/office/drawing/2014/main" id="{073C409D-52E7-4C03-8A75-73E2B0C9827C}"/>
+              </a:ext>
+            </a:extLst>
+          </p:cNvPr>
+          <p:cNvSpPr txBox="1"/>
+          <p:nvPr/>
+        </p:nvSpPr>
+        <p:spPr>
+          <a:xfrm>
+            <a:off x="722083" y="1309998"/>
+            <a:ext cx="2964235" cy="923330"/>
+          </a:xfrm>
+          <a:prstGeom prst="rect">
+            <a:avLst/>
+          </a:prstGeom>
+          <a:noFill/>
+        </p:spPr>
+        <p:txBody>
+          <a:bodyPr wrap="square" rtlCol="0">
+            <a:spAutoFit/>
+          </a:bodyPr>
+          <a:lstStyle/>
+          <a:p>
+            <a:r>
+              <a:rPr lang="en-US" dirty="0"/>
+              <a:t>Toggle view: </a:t>
+            </a:r>
+          </a:p>
+          <a:p>
+            <a:pPr marL="285750" indent="-285750">
+              <a:buFont typeface="Courier New" panose="02070309020205020404" pitchFamily="49" charset="0"/>
+              <a:buChar char="o"/>
+            </a:pPr>
+            <a:r>
+              <a:rPr lang="en-US" dirty="0"/>
+              <a:t>by region</a:t>
+            </a:r>
+          </a:p>
+          <a:p>
+            <a:pPr marL="285750" indent="-285750">
+              <a:buFont typeface="Courier New" panose="02070309020205020404" pitchFamily="49" charset="0"/>
+              <a:buChar char="o"/>
+            </a:pPr>
+            <a:r>
+              <a:rPr lang="en-US" dirty="0"/>
+              <a:t>Within 500 meters radius </a:t>
+            </a:r>
+          </a:p>
+        </p:txBody>
+      </p:sp>
+      <p:sp>
+        <p:nvSpPr>
+          <p:cNvPr id="22" name="TextBox 21">
+            <a:extLst>
+              <a:ext uri="{FF2B5EF4-FFF2-40B4-BE49-F238E27FC236}">
+                <a16:creationId xmlns:a16="http://schemas.microsoft.com/office/drawing/2014/main" id="{993965CA-5F7A-453C-ADE9-ED4375E7EC16}"/>
+              </a:ext>
+            </a:extLst>
+          </p:cNvPr>
+          <p:cNvSpPr txBox="1"/>
+          <p:nvPr/>
+        </p:nvSpPr>
+        <p:spPr>
+          <a:xfrm>
+            <a:off x="722083" y="2303170"/>
+            <a:ext cx="2964235" cy="923330"/>
+          </a:xfrm>
+          <a:prstGeom prst="rect">
+            <a:avLst/>
+          </a:prstGeom>
+          <a:noFill/>
+        </p:spPr>
+        <p:txBody>
+          <a:bodyPr wrap="square" rtlCol="0">
+            <a:spAutoFit/>
+          </a:bodyPr>
+          <a:lstStyle/>
+          <a:p>
+            <a:r>
+              <a:rPr lang="en-US" dirty="0"/>
+              <a:t>Recommend: </a:t>
+            </a:r>
+          </a:p>
+          <a:p>
+            <a:pPr marL="285750" indent="-285750">
+              <a:buFont typeface="Courier New" panose="02070309020205020404" pitchFamily="49" charset="0"/>
+              <a:buChar char="o"/>
+            </a:pPr>
+            <a:r>
+              <a:rPr lang="en-US" dirty="0"/>
+              <a:t>Outdoor famous spots</a:t>
+            </a:r>
+          </a:p>
+          <a:p>
+            <a:pPr marL="285750" indent="-285750">
+              <a:buFont typeface="Courier New" panose="02070309020205020404" pitchFamily="49" charset="0"/>
+              <a:buChar char="o"/>
+            </a:pPr>
+            <a:r>
+              <a:rPr lang="en-US" dirty="0"/>
+              <a:t>Indoor famous spots</a:t>
+            </a:r>
+          </a:p>
+        </p:txBody>
+      </p:sp>
+      <p:cxnSp>
+        <p:nvCxnSpPr>
+          <p:cNvPr id="25" name="Straight Arrow Connector 24">
+            <a:extLst>
+              <a:ext uri="{FF2B5EF4-FFF2-40B4-BE49-F238E27FC236}">
+                <a16:creationId xmlns:a16="http://schemas.microsoft.com/office/drawing/2014/main" id="{6D21F42A-158E-4C0C-A8D1-F785D20E2457}"/>
+              </a:ext>
+            </a:extLst>
+          </p:cNvPr>
+          <p:cNvCxnSpPr>
+            <a:cxnSpLocks/>
+            <a:endCxn id="12" idx="3"/>
+          </p:cNvCxnSpPr>
+          <p:nvPr/>
+        </p:nvCxnSpPr>
+        <p:spPr>
+          <a:xfrm flipH="1">
+            <a:off x="2217574" y="608263"/>
+            <a:ext cx="1727964" cy="7695"/>
+          </a:xfrm>
+          <a:prstGeom prst="straightConnector1">
+            <a:avLst/>
+          </a:prstGeom>
+          <a:ln>
+            <a:tailEnd type="triangle"/>
+          </a:ln>
+        </p:spPr>
+        <p:style>
+          <a:lnRef idx="1">
+            <a:schemeClr val="accent4"/>
+          </a:lnRef>
+          <a:fillRef idx="0">
+            <a:schemeClr val="accent4"/>
+          </a:fillRef>
+          <a:effectRef idx="0">
+            <a:schemeClr val="accent4"/>
+          </a:effectRef>
+          <a:fontRef idx="minor">
+            <a:schemeClr val="tx1"/>
+          </a:fontRef>
+        </p:style>
+      </p:cxnSp>
+    </p:spTree>
+    <p:extLst>
+      <p:ext uri="{BB962C8B-B14F-4D97-AF65-F5344CB8AC3E}">
+        <p14:creationId xmlns:p14="http://schemas.microsoft.com/office/powerpoint/2010/main" val="1136428255"/>
+      </p:ext>
+    </p:extLst>
+  </p:cSld>
+  <p:clrMapOvr>
+    <a:masterClrMapping/>
+  </p:clrMapOvr>
+</p:sld>
+</file>
+
+<file path=ppt/slides/slide5.xml><?xml version="1.0" encoding="utf-8"?>
 <p:sld xmlns:a="http://schemas.openxmlformats.org/drawingml/2006/main" xmlns:r="http://schemas.openxmlformats.org/officeDocument/2006/relationships" xmlns:p="http://schemas.openxmlformats.org/presentationml/2006/main">
   <p:cSld>
     <p:spTree>
@@ -7727,7 +9128,7 @@
 </p:sld>
 </file>
 
-<file path=ppt/slides/slide5.xml><?xml version="1.0" encoding="utf-8"?>
+<file path=ppt/slides/slide6.xml><?xml version="1.0" encoding="utf-8"?>
 <p:sld xmlns:a="http://schemas.openxmlformats.org/drawingml/2006/main" xmlns:r="http://schemas.openxmlformats.org/officeDocument/2006/relationships" xmlns:p="http://schemas.openxmlformats.org/presentationml/2006/main">
   <p:cSld>
     <p:spTree>
@@ -7914,7 +9315,7 @@
 </p:sld>
 </file>
 
-<file path=ppt/slides/slide6.xml><?xml version="1.0" encoding="utf-8"?>
+<file path=ppt/slides/slide7.xml><?xml version="1.0" encoding="utf-8"?>
 <p:sld xmlns:a="http://schemas.openxmlformats.org/drawingml/2006/main" xmlns:r="http://schemas.openxmlformats.org/officeDocument/2006/relationships" xmlns:p="http://schemas.openxmlformats.org/presentationml/2006/main">
   <p:cSld>
     <p:spTree>
@@ -7946,7 +9347,7 @@
           <p:nvPr>
             <p:extLst>
               <p:ext uri="{D42A27DB-BD31-4B8C-83A1-F6EECF244321}">
-                <p14:modId xmlns:p14="http://schemas.microsoft.com/office/powerpoint/2010/main" val="1807826774"/>
+                <p14:modId xmlns:p14="http://schemas.microsoft.com/office/powerpoint/2010/main" val="2905735666"/>
               </p:ext>
             </p:extLst>
           </p:nvPr>
@@ -8176,6 +9577,10 @@
                     <a:bodyPr/>
                     <a:lstStyle/>
                     <a:p>
+                      <a:r>
+                        <a:rPr lang="en-US" dirty="0"/>
+                        <a:t>Four Square</a:t>
+                      </a:r>
                       <a:endParaRPr lang="en-SG" dirty="0"/>
                     </a:p>
                   </a:txBody>
@@ -8186,7 +9591,10 @@
                     <a:bodyPr/>
                     <a:lstStyle/>
                     <a:p>
-                      <a:endParaRPr lang="en-SG"/>
+                      <a:r>
+                        <a:rPr lang="en-SG" dirty="0"/>
+                        <a:t>https://foursquare.com/products/places/</a:t>
+                      </a:r>
                     </a:p>
                   </a:txBody>
                   <a:tcPr/>
@@ -8268,7 +9676,7 @@
 </p:sld>
 </file>
 
-<file path=ppt/slides/slide7.xml><?xml version="1.0" encoding="utf-8"?>
+<file path=ppt/slides/slide8.xml><?xml version="1.0" encoding="utf-8"?>
 <p:sld xmlns:a="http://schemas.openxmlformats.org/drawingml/2006/main" xmlns:r="http://schemas.openxmlformats.org/officeDocument/2006/relationships" xmlns:p="http://schemas.openxmlformats.org/presentationml/2006/main">
   <p:cSld>
     <p:spTree>
@@ -8300,7 +9708,7 @@
           <p:nvPr>
             <p:extLst>
               <p:ext uri="{D42A27DB-BD31-4B8C-83A1-F6EECF244321}">
-                <p14:modId xmlns:p14="http://schemas.microsoft.com/office/powerpoint/2010/main" val="2959631894"/>
+                <p14:modId xmlns:p14="http://schemas.microsoft.com/office/powerpoint/2010/main" val="2786882"/>
               </p:ext>
             </p:extLst>
           </p:nvPr>
@@ -8571,10 +9979,6 @@
                     <a:bodyPr/>
                     <a:lstStyle/>
                     <a:p>
-                      <a:r>
-                        <a:rPr lang="en-US" sz="1600" dirty="0"/>
-                        <a:t>Next: </a:t>
-                      </a:r>
                       <a:endParaRPr lang="en-SG" sz="1600" dirty="0"/>
                     </a:p>
                   </a:txBody>
@@ -8667,13 +10071,6 @@
                         <a:t>Fly to the first result location </a:t>
                       </a:r>
                     </a:p>
-                    <a:p>
-                      <a:r>
-                        <a:rPr lang="en-US" sz="1600" dirty="0"/>
-                        <a:t>Search nap bar scroll down </a:t>
-                      </a:r>
-                      <a:endParaRPr lang="en-SG" sz="1600" dirty="0"/>
-                    </a:p>
                   </a:txBody>
                   <a:tcPr/>
                 </a:tc>
@@ -8692,279 +10089,7 @@
                           <a:ea typeface="+mn-ea"/>
                           <a:cs typeface="+mn-cs"/>
                         </a:rPr>
-                        <a:t>/*</a:t>
-                      </a:r>
-                    </a:p>
-                    <a:p>
-                      <a:r>
-                        <a:rPr lang="en-US" sz="1200" b="0" kern="1200" dirty="0">
-                          <a:solidFill>
-                            <a:schemeClr val="dk1"/>
-                          </a:solidFill>
-                          <a:effectLst/>
-                          <a:latin typeface="+mn-lt"/>
-                          <a:ea typeface="+mn-ea"/>
-                          <a:cs typeface="+mn-cs"/>
-                        </a:rPr>
-                        <a:t>        Leaflet Method (for </a:t>
-                      </a:r>
-                      <a:r>
-                        <a:rPr lang="en-US" sz="1200" b="0" kern="1200" dirty="0" err="1">
-                          <a:solidFill>
-                            <a:schemeClr val="dk1"/>
-                          </a:solidFill>
-                          <a:effectLst/>
-                          <a:latin typeface="+mn-lt"/>
-                          <a:ea typeface="+mn-ea"/>
-                          <a:cs typeface="+mn-cs"/>
-                        </a:rPr>
-                        <a:t>LatLngBounds</a:t>
-                      </a:r>
-                      <a:r>
-                        <a:rPr lang="en-US" sz="1200" b="0" kern="1200" dirty="0">
-                          <a:solidFill>
-                            <a:schemeClr val="dk1"/>
-                          </a:solidFill>
-                          <a:effectLst/>
-                          <a:latin typeface="+mn-lt"/>
-                          <a:ea typeface="+mn-ea"/>
-                          <a:cs typeface="+mn-cs"/>
-                        </a:rPr>
-                        <a:t> objects):</a:t>
-                      </a:r>
-                    </a:p>
-                    <a:p>
-                      <a:r>
-                        <a:rPr lang="en-US" sz="1200" b="0" kern="1200" dirty="0">
-                          <a:solidFill>
-                            <a:schemeClr val="dk1"/>
-                          </a:solidFill>
-                          <a:effectLst/>
-                          <a:latin typeface="+mn-lt"/>
-                          <a:ea typeface="+mn-ea"/>
-                          <a:cs typeface="+mn-cs"/>
-                        </a:rPr>
-                        <a:t>        </a:t>
-                      </a:r>
-                      <a:r>
-                        <a:rPr lang="en-US" sz="1200" b="0" kern="1200" dirty="0" err="1">
-                          <a:solidFill>
-                            <a:schemeClr val="dk1"/>
-                          </a:solidFill>
-                          <a:effectLst/>
-                          <a:latin typeface="+mn-lt"/>
-                          <a:ea typeface="+mn-ea"/>
-                          <a:cs typeface="+mn-cs"/>
-                        </a:rPr>
-                        <a:t>getBounds</a:t>
-                      </a:r>
-                      <a:r>
-                        <a:rPr lang="en-US" sz="1200" b="0" kern="1200" dirty="0">
-                          <a:solidFill>
-                            <a:schemeClr val="dk1"/>
-                          </a:solidFill>
-                          <a:effectLst/>
-                          <a:latin typeface="+mn-lt"/>
-                          <a:ea typeface="+mn-ea"/>
-                          <a:cs typeface="+mn-cs"/>
-                        </a:rPr>
-                        <a:t>() returns </a:t>
-                      </a:r>
-                      <a:r>
-                        <a:rPr lang="en-US" sz="1200" b="0" kern="1200" dirty="0" err="1">
-                          <a:solidFill>
-                            <a:schemeClr val="dk1"/>
-                          </a:solidFill>
-                          <a:effectLst/>
-                          <a:latin typeface="+mn-lt"/>
-                          <a:ea typeface="+mn-ea"/>
-                          <a:cs typeface="+mn-cs"/>
-                        </a:rPr>
-                        <a:t>LatLngBounds</a:t>
-                      </a:r>
-                      <a:r>
-                        <a:rPr lang="en-US" sz="1200" b="0" kern="1200" dirty="0">
-                          <a:solidFill>
-                            <a:schemeClr val="dk1"/>
-                          </a:solidFill>
-                          <a:effectLst/>
-                          <a:latin typeface="+mn-lt"/>
-                          <a:ea typeface="+mn-ea"/>
-                          <a:cs typeface="+mn-cs"/>
-                        </a:rPr>
-                        <a:t>  // </a:t>
-                      </a:r>
-                      <a:r>
-                        <a:rPr lang="en-US" sz="1200" b="0" kern="1200" dirty="0" err="1">
-                          <a:solidFill>
-                            <a:schemeClr val="dk1"/>
-                          </a:solidFill>
-                          <a:effectLst/>
-                          <a:latin typeface="+mn-lt"/>
-                          <a:ea typeface="+mn-ea"/>
-                          <a:cs typeface="+mn-cs"/>
-                        </a:rPr>
-                        <a:t>getCenter</a:t>
-                      </a:r>
-                      <a:r>
-                        <a:rPr lang="en-US" sz="1200" b="0" kern="1200" dirty="0">
-                          <a:solidFill>
-                            <a:schemeClr val="dk1"/>
-                          </a:solidFill>
-                          <a:effectLst/>
-                          <a:latin typeface="+mn-lt"/>
-                          <a:ea typeface="+mn-ea"/>
-                          <a:cs typeface="+mn-cs"/>
-                        </a:rPr>
-                        <a:t>() returns </a:t>
-                      </a:r>
-                      <a:r>
-                        <a:rPr lang="en-US" sz="1200" b="0" kern="1200" dirty="0" err="1">
-                          <a:solidFill>
-                            <a:schemeClr val="dk1"/>
-                          </a:solidFill>
-                          <a:effectLst/>
-                          <a:latin typeface="+mn-lt"/>
-                          <a:ea typeface="+mn-ea"/>
-                          <a:cs typeface="+mn-cs"/>
-                        </a:rPr>
-                        <a:t>LatLng</a:t>
-                      </a:r>
-                      <a:endParaRPr lang="en-US" sz="1200" b="0" kern="1200" dirty="0">
-                        <a:solidFill>
-                          <a:schemeClr val="dk1"/>
-                        </a:solidFill>
-                        <a:effectLst/>
-                        <a:latin typeface="+mn-lt"/>
-                        <a:ea typeface="+mn-ea"/>
-                        <a:cs typeface="+mn-cs"/>
-                      </a:endParaRPr>
-                    </a:p>
-                    <a:p>
-                      <a:r>
-                        <a:rPr lang="en-US" sz="1200" b="0" kern="1200" dirty="0">
-                          <a:solidFill>
-                            <a:schemeClr val="dk1"/>
-                          </a:solidFill>
-                          <a:effectLst/>
-                          <a:latin typeface="+mn-lt"/>
-                          <a:ea typeface="+mn-ea"/>
-                          <a:cs typeface="+mn-cs"/>
-                        </a:rPr>
-                        <a:t>        */</a:t>
-                      </a:r>
-                    </a:p>
-                    <a:p>
-                      <a:r>
-                        <a:rPr lang="en-US" sz="1200" b="0" kern="1200" dirty="0">
-                          <a:solidFill>
-                            <a:schemeClr val="dk1"/>
-                          </a:solidFill>
-                          <a:effectLst/>
-                          <a:latin typeface="+mn-lt"/>
-                          <a:ea typeface="+mn-ea"/>
-                          <a:cs typeface="+mn-cs"/>
-                        </a:rPr>
-                        <a:t>        // ****TO DO - when click on search result &gt; bring to marker </a:t>
-                      </a:r>
-                    </a:p>
-                    <a:p>
-                      <a:r>
-                        <a:rPr lang="en-US" sz="1200" b="0" kern="1200" dirty="0">
-                          <a:solidFill>
-                            <a:schemeClr val="dk1"/>
-                          </a:solidFill>
-                          <a:effectLst/>
-                          <a:latin typeface="+mn-lt"/>
-                          <a:ea typeface="+mn-ea"/>
-                          <a:cs typeface="+mn-cs"/>
-                        </a:rPr>
-                        <a:t>        let center = </a:t>
-                      </a:r>
-                      <a:r>
-                        <a:rPr lang="en-US" sz="1200" b="0" kern="1200" dirty="0" err="1">
-                          <a:solidFill>
-                            <a:schemeClr val="dk1"/>
-                          </a:solidFill>
-                          <a:effectLst/>
-                          <a:latin typeface="+mn-lt"/>
-                          <a:ea typeface="+mn-ea"/>
-                          <a:cs typeface="+mn-cs"/>
-                        </a:rPr>
-                        <a:t>map.getBounds</a:t>
-                      </a:r>
-                      <a:r>
-                        <a:rPr lang="en-US" sz="1200" b="0" kern="1200" dirty="0">
-                          <a:solidFill>
-                            <a:schemeClr val="dk1"/>
-                          </a:solidFill>
-                          <a:effectLst/>
-                          <a:latin typeface="+mn-lt"/>
-                          <a:ea typeface="+mn-ea"/>
-                          <a:cs typeface="+mn-cs"/>
-                        </a:rPr>
-                        <a:t>().</a:t>
-                      </a:r>
-                      <a:r>
-                        <a:rPr lang="en-US" sz="1200" b="0" kern="1200" dirty="0" err="1">
-                          <a:solidFill>
-                            <a:schemeClr val="dk1"/>
-                          </a:solidFill>
-                          <a:effectLst/>
-                          <a:latin typeface="+mn-lt"/>
-                          <a:ea typeface="+mn-ea"/>
-                          <a:cs typeface="+mn-cs"/>
-                        </a:rPr>
-                        <a:t>getCenter</a:t>
-                      </a:r>
-                      <a:r>
-                        <a:rPr lang="en-US" sz="1200" b="0" kern="1200" dirty="0">
-                          <a:solidFill>
-                            <a:schemeClr val="dk1"/>
-                          </a:solidFill>
-                          <a:effectLst/>
-                          <a:latin typeface="+mn-lt"/>
-                          <a:ea typeface="+mn-ea"/>
-                          <a:cs typeface="+mn-cs"/>
-                        </a:rPr>
-                        <a:t>();</a:t>
-                      </a:r>
-                    </a:p>
-                    <a:p>
-                      <a:endParaRPr lang="en-US" sz="1200" b="0" kern="1200" dirty="0">
-                        <a:solidFill>
-                          <a:schemeClr val="dk1"/>
-                        </a:solidFill>
-                        <a:effectLst/>
-                        <a:latin typeface="+mn-lt"/>
-                        <a:ea typeface="+mn-ea"/>
-                        <a:cs typeface="+mn-cs"/>
-                      </a:endParaRPr>
-                    </a:p>
-                    <a:p>
-                      <a:r>
-                        <a:rPr lang="en-US" sz="1200" b="0" kern="1200">
-                          <a:solidFill>
-                            <a:srgbClr val="FF0000"/>
-                          </a:solidFill>
-                          <a:effectLst/>
-                          <a:latin typeface="+mn-lt"/>
-                          <a:ea typeface="+mn-ea"/>
-                          <a:cs typeface="+mn-cs"/>
-                        </a:rPr>
-                        <a:t>put </a:t>
-                      </a:r>
-                      <a:r>
-                        <a:rPr lang="en-US" sz="1200" b="0" kern="1200" dirty="0">
-                          <a:solidFill>
-                            <a:srgbClr val="FF0000"/>
-                          </a:solidFill>
-                          <a:effectLst/>
-                          <a:latin typeface="+mn-lt"/>
-                          <a:ea typeface="+mn-ea"/>
-                          <a:cs typeface="+mn-cs"/>
-                        </a:rPr>
-                        <a:t>all variable into constances.js file </a:t>
+                        <a:t>       </a:t>
                       </a:r>
                     </a:p>
                   </a:txBody>
@@ -9048,6 +10173,30 @@
                   <a:txBody>
                     <a:bodyPr/>
                     <a:lstStyle/>
+                    <a:p>
+                      <a:pPr marL="0" marR="0" lvl="0" indent="0" algn="l" defTabSz="914400" rtl="0" eaLnBrk="1" fontAlgn="auto" latinLnBrk="0" hangingPunct="1">
+                        <a:lnSpc>
+                          <a:spcPct val="100000"/>
+                        </a:lnSpc>
+                        <a:spcBef>
+                          <a:spcPts val="0"/>
+                        </a:spcBef>
+                        <a:spcAft>
+                          <a:spcPts val="0"/>
+                        </a:spcAft>
+                        <a:buClrTx/>
+                        <a:buSzTx/>
+                        <a:buFontTx/>
+                        <a:buNone/>
+                        <a:tabLst/>
+                        <a:defRPr/>
+                      </a:pPr>
+                      <a:r>
+                        <a:rPr lang="en-US" sz="1600" strike="sngStrike" dirty="0"/>
+                        <a:t>Search nap bar scroll down </a:t>
+                      </a:r>
+                      <a:endParaRPr lang="en-SG" sz="1600" strike="sngStrike" dirty="0"/>
+                    </a:p>
                     <a:p>
                       <a:r>
                         <a:rPr lang="en-US" sz="1600" dirty="0"/>
@@ -9199,7 +10348,7 @@
 </p:sld>
 </file>
 
-<file path=ppt/slides/slide8.xml><?xml version="1.0" encoding="utf-8"?>
+<file path=ppt/slides/slide9.xml><?xml version="1.0" encoding="utf-8"?>
 <p:sld xmlns:a="http://schemas.openxmlformats.org/drawingml/2006/main" xmlns:r="http://schemas.openxmlformats.org/officeDocument/2006/relationships" xmlns:p="http://schemas.openxmlformats.org/presentationml/2006/main">
   <p:cSld>
     <p:spTree>
@@ -9679,495 +10828,6 @@
     <p:extLst>
       <p:ext uri="{BB962C8B-B14F-4D97-AF65-F5344CB8AC3E}">
         <p14:creationId xmlns:p14="http://schemas.microsoft.com/office/powerpoint/2010/main" val="440554776"/>
-      </p:ext>
-    </p:extLst>
-  </p:cSld>
-  <p:clrMapOvr>
-    <a:masterClrMapping/>
-  </p:clrMapOvr>
-</p:sld>
-</file>
-
-<file path=ppt/slides/slide9.xml><?xml version="1.0" encoding="utf-8"?>
-<p:sld xmlns:a="http://schemas.openxmlformats.org/drawingml/2006/main" xmlns:r="http://schemas.openxmlformats.org/officeDocument/2006/relationships" xmlns:p="http://schemas.openxmlformats.org/presentationml/2006/main">
-  <p:cSld>
-    <p:spTree>
-      <p:nvGrpSpPr>
-        <p:cNvPr id="1" name=""/>
-        <p:cNvGrpSpPr/>
-        <p:nvPr/>
-      </p:nvGrpSpPr>
-      <p:grpSpPr>
-        <a:xfrm>
-          <a:off x="0" y="0"/>
-          <a:ext cx="0" cy="0"/>
-          <a:chOff x="0" y="0"/>
-          <a:chExt cx="0" cy="0"/>
-        </a:xfrm>
-      </p:grpSpPr>
-      <p:graphicFrame>
-        <p:nvGraphicFramePr>
-          <p:cNvPr id="3" name="Table 3">
-            <a:extLst>
-              <a:ext uri="{FF2B5EF4-FFF2-40B4-BE49-F238E27FC236}">
-                <a16:creationId xmlns:a16="http://schemas.microsoft.com/office/drawing/2014/main" id="{34E5978E-10A6-43F2-BF10-97A84F4B18DD}"/>
-              </a:ext>
-            </a:extLst>
-          </p:cNvPr>
-          <p:cNvGraphicFramePr>
-            <a:graphicFrameLocks noGrp="1"/>
-          </p:cNvGraphicFramePr>
-          <p:nvPr>
-            <p:extLst>
-              <p:ext uri="{D42A27DB-BD31-4B8C-83A1-F6EECF244321}">
-                <p14:modId xmlns:p14="http://schemas.microsoft.com/office/powerpoint/2010/main" val="1362983282"/>
-              </p:ext>
-            </p:extLst>
-          </p:nvPr>
-        </p:nvGraphicFramePr>
-        <p:xfrm>
-          <a:off x="238539" y="149163"/>
-          <a:ext cx="11728175" cy="2590800"/>
-        </p:xfrm>
-        <a:graphic>
-          <a:graphicData uri="http://schemas.openxmlformats.org/drawingml/2006/table">
-            <a:tbl>
-              <a:tblPr firstRow="1" bandRow="1">
-                <a:tableStyleId>{5C22544A-7EE6-4342-B048-85BDC9FD1C3A}</a:tableStyleId>
-              </a:tblPr>
-              <a:tblGrid>
-                <a:gridCol w="1595626">
-                  <a:extLst>
-                    <a:ext uri="{9D8B030D-6E8A-4147-A177-3AD203B41FA5}">
-                      <a16:colId xmlns:a16="http://schemas.microsoft.com/office/drawing/2014/main" val="1417640537"/>
-                    </a:ext>
-                  </a:extLst>
-                </a:gridCol>
-                <a:gridCol w="2027187">
-                  <a:extLst>
-                    <a:ext uri="{9D8B030D-6E8A-4147-A177-3AD203B41FA5}">
-                      <a16:colId xmlns:a16="http://schemas.microsoft.com/office/drawing/2014/main" val="764260135"/>
-                    </a:ext>
-                  </a:extLst>
-                </a:gridCol>
-                <a:gridCol w="3071191">
-                  <a:extLst>
-                    <a:ext uri="{9D8B030D-6E8A-4147-A177-3AD203B41FA5}">
-                      <a16:colId xmlns:a16="http://schemas.microsoft.com/office/drawing/2014/main" val="3641419838"/>
-                    </a:ext>
-                  </a:extLst>
-                </a:gridCol>
-                <a:gridCol w="5034171">
-                  <a:extLst>
-                    <a:ext uri="{9D8B030D-6E8A-4147-A177-3AD203B41FA5}">
-                      <a16:colId xmlns:a16="http://schemas.microsoft.com/office/drawing/2014/main" val="4284585333"/>
-                    </a:ext>
-                  </a:extLst>
-                </a:gridCol>
-              </a:tblGrid>
-              <a:tr h="0">
-                <a:tc>
-                  <a:txBody>
-                    <a:bodyPr/>
-                    <a:lstStyle/>
-                    <a:p>
-                      <a:pPr algn="ctr"/>
-                      <a:r>
-                        <a:rPr lang="en-US" sz="1800" b="1" dirty="0"/>
-                        <a:t>Prioritization 3</a:t>
-                      </a:r>
-                      <a:endParaRPr lang="en-SG" dirty="0"/>
-                    </a:p>
-                  </a:txBody>
-                  <a:tcPr/>
-                </a:tc>
-                <a:tc>
-                  <a:txBody>
-                    <a:bodyPr/>
-                    <a:lstStyle/>
-                    <a:p>
-                      <a:pPr algn="ctr"/>
-                      <a:r>
-                        <a:rPr lang="en-US" dirty="0"/>
-                        <a:t>Features </a:t>
-                      </a:r>
-                      <a:endParaRPr lang="en-SG" dirty="0"/>
-                    </a:p>
-                  </a:txBody>
-                  <a:tcPr/>
-                </a:tc>
-                <a:tc>
-                  <a:txBody>
-                    <a:bodyPr/>
-                    <a:lstStyle/>
-                    <a:p>
-                      <a:pPr algn="ctr"/>
-                      <a:r>
-                        <a:rPr lang="en-US" dirty="0"/>
-                        <a:t>Tasks list</a:t>
-                      </a:r>
-                      <a:endParaRPr lang="en-SG" dirty="0"/>
-                    </a:p>
-                  </a:txBody>
-                  <a:tcPr/>
-                </a:tc>
-                <a:tc>
-                  <a:txBody>
-                    <a:bodyPr/>
-                    <a:lstStyle/>
-                    <a:p>
-                      <a:pPr algn="ctr"/>
-                      <a:r>
-                        <a:rPr lang="en-US" dirty="0"/>
-                        <a:t>Acceptance criteria</a:t>
-                      </a:r>
-                      <a:endParaRPr lang="en-SG" dirty="0"/>
-                    </a:p>
-                  </a:txBody>
-                  <a:tcPr/>
-                </a:tc>
-                <a:extLst>
-                  <a:ext uri="{0D108BD9-81ED-4DB2-BD59-A6C34878D82A}">
-                    <a16:rowId xmlns:a16="http://schemas.microsoft.com/office/drawing/2014/main" val="3206974568"/>
-                  </a:ext>
-                </a:extLst>
-              </a:tr>
-              <a:tr h="370840">
-                <a:tc>
-                  <a:txBody>
-                    <a:bodyPr/>
-                    <a:lstStyle/>
-                    <a:p>
-                      <a:r>
-                        <a:rPr lang="en-US" sz="1600" dirty="0"/>
-                        <a:t>Carpark </a:t>
-                      </a:r>
-                      <a:r>
-                        <a:rPr lang="en-US" sz="1600" dirty="0" err="1"/>
-                        <a:t>api</a:t>
-                      </a:r>
-                      <a:r>
-                        <a:rPr lang="en-US" sz="1600" dirty="0"/>
-                        <a:t> </a:t>
-                      </a:r>
-                      <a:endParaRPr lang="en-SG" sz="1600" dirty="0"/>
-                    </a:p>
-                  </a:txBody>
-                  <a:tcPr/>
-                </a:tc>
-                <a:tc>
-                  <a:txBody>
-                    <a:bodyPr/>
-                    <a:lstStyle/>
-                    <a:p>
-                      <a:endParaRPr lang="en-SG" sz="1600" dirty="0"/>
-                    </a:p>
-                  </a:txBody>
-                  <a:tcPr/>
-                </a:tc>
-                <a:tc>
-                  <a:txBody>
-                    <a:bodyPr/>
-                    <a:lstStyle/>
-                    <a:p>
-                      <a:pPr marL="0" marR="0" lvl="0" indent="0" algn="l" defTabSz="914400" rtl="0" eaLnBrk="1" fontAlgn="auto" latinLnBrk="0" hangingPunct="1">
-                        <a:lnSpc>
-                          <a:spcPct val="100000"/>
-                        </a:lnSpc>
-                        <a:spcBef>
-                          <a:spcPts val="0"/>
-                        </a:spcBef>
-                        <a:spcAft>
-                          <a:spcPts val="0"/>
-                        </a:spcAft>
-                        <a:buClrTx/>
-                        <a:buSzTx/>
-                        <a:buFontTx/>
-                        <a:buNone/>
-                        <a:tabLst/>
-                        <a:defRPr/>
-                      </a:pPr>
-                      <a:endParaRPr lang="en-SG" sz="1600" dirty="0"/>
-                    </a:p>
-                  </a:txBody>
-                  <a:tcPr/>
-                </a:tc>
-                <a:tc>
-                  <a:txBody>
-                    <a:bodyPr/>
-                    <a:lstStyle/>
-                    <a:p>
-                      <a:pPr marL="0" marR="0" lvl="0" indent="0" algn="l" defTabSz="914400" rtl="0" eaLnBrk="1" fontAlgn="auto" latinLnBrk="0" hangingPunct="1">
-                        <a:lnSpc>
-                          <a:spcPct val="100000"/>
-                        </a:lnSpc>
-                        <a:spcBef>
-                          <a:spcPts val="0"/>
-                        </a:spcBef>
-                        <a:spcAft>
-                          <a:spcPts val="0"/>
-                        </a:spcAft>
-                        <a:buClrTx/>
-                        <a:buSzTx/>
-                        <a:buFontTx/>
-                        <a:buNone/>
-                        <a:tabLst/>
-                        <a:defRPr/>
-                      </a:pPr>
-                      <a:endParaRPr lang="en-SG" sz="1600" dirty="0"/>
-                    </a:p>
-                  </a:txBody>
-                  <a:tcPr/>
-                </a:tc>
-                <a:extLst>
-                  <a:ext uri="{0D108BD9-81ED-4DB2-BD59-A6C34878D82A}">
-                    <a16:rowId xmlns:a16="http://schemas.microsoft.com/office/drawing/2014/main" val="2021552113"/>
-                  </a:ext>
-                </a:extLst>
-              </a:tr>
-              <a:tr h="370840">
-                <a:tc>
-                  <a:txBody>
-                    <a:bodyPr/>
-                    <a:lstStyle/>
-                    <a:p>
-                      <a:endParaRPr lang="en-SG" sz="1600"/>
-                    </a:p>
-                  </a:txBody>
-                  <a:tcPr/>
-                </a:tc>
-                <a:tc>
-                  <a:txBody>
-                    <a:bodyPr/>
-                    <a:lstStyle/>
-                    <a:p>
-                      <a:endParaRPr lang="en-SG" sz="1600" dirty="0"/>
-                    </a:p>
-                  </a:txBody>
-                  <a:tcPr/>
-                </a:tc>
-                <a:tc>
-                  <a:txBody>
-                    <a:bodyPr/>
-                    <a:lstStyle/>
-                    <a:p>
-                      <a:endParaRPr lang="en-SG" sz="1600" dirty="0"/>
-                    </a:p>
-                  </a:txBody>
-                  <a:tcPr/>
-                </a:tc>
-                <a:tc>
-                  <a:txBody>
-                    <a:bodyPr/>
-                    <a:lstStyle/>
-                    <a:p>
-                      <a:endParaRPr lang="en-SG" sz="1600" dirty="0"/>
-                    </a:p>
-                  </a:txBody>
-                  <a:tcPr/>
-                </a:tc>
-                <a:extLst>
-                  <a:ext uri="{0D108BD9-81ED-4DB2-BD59-A6C34878D82A}">
-                    <a16:rowId xmlns:a16="http://schemas.microsoft.com/office/drawing/2014/main" val="892559996"/>
-                  </a:ext>
-                </a:extLst>
-              </a:tr>
-              <a:tr h="370840">
-                <a:tc>
-                  <a:txBody>
-                    <a:bodyPr/>
-                    <a:lstStyle/>
-                    <a:p>
-                      <a:endParaRPr lang="en-SG" sz="1600"/>
-                    </a:p>
-                  </a:txBody>
-                  <a:tcPr/>
-                </a:tc>
-                <a:tc>
-                  <a:txBody>
-                    <a:bodyPr/>
-                    <a:lstStyle/>
-                    <a:p>
-                      <a:endParaRPr lang="en-SG" sz="1600" dirty="0"/>
-                    </a:p>
-                  </a:txBody>
-                  <a:tcPr/>
-                </a:tc>
-                <a:tc>
-                  <a:txBody>
-                    <a:bodyPr/>
-                    <a:lstStyle/>
-                    <a:p>
-                      <a:endParaRPr lang="en-SG" sz="1600" dirty="0"/>
-                    </a:p>
-                  </a:txBody>
-                  <a:tcPr/>
-                </a:tc>
-                <a:tc>
-                  <a:txBody>
-                    <a:bodyPr/>
-                    <a:lstStyle/>
-                    <a:p>
-                      <a:endParaRPr lang="en-SG" sz="1600" dirty="0"/>
-                    </a:p>
-                  </a:txBody>
-                  <a:tcPr/>
-                </a:tc>
-                <a:extLst>
-                  <a:ext uri="{0D108BD9-81ED-4DB2-BD59-A6C34878D82A}">
-                    <a16:rowId xmlns:a16="http://schemas.microsoft.com/office/drawing/2014/main" val="4053821403"/>
-                  </a:ext>
-                </a:extLst>
-              </a:tr>
-              <a:tr h="370840">
-                <a:tc>
-                  <a:txBody>
-                    <a:bodyPr/>
-                    <a:lstStyle/>
-                    <a:p>
-                      <a:endParaRPr lang="en-SG" sz="1600"/>
-                    </a:p>
-                  </a:txBody>
-                  <a:tcPr/>
-                </a:tc>
-                <a:tc>
-                  <a:txBody>
-                    <a:bodyPr/>
-                    <a:lstStyle/>
-                    <a:p>
-                      <a:endParaRPr lang="en-SG" sz="1600" dirty="0"/>
-                    </a:p>
-                  </a:txBody>
-                  <a:tcPr/>
-                </a:tc>
-                <a:tc>
-                  <a:txBody>
-                    <a:bodyPr/>
-                    <a:lstStyle/>
-                    <a:p>
-                      <a:endParaRPr lang="en-US" sz="1600" dirty="0"/>
-                    </a:p>
-                  </a:txBody>
-                  <a:tcPr/>
-                </a:tc>
-                <a:tc>
-                  <a:txBody>
-                    <a:bodyPr/>
-                    <a:lstStyle/>
-                    <a:p>
-                      <a:endParaRPr lang="en-SG" sz="1600" dirty="0"/>
-                    </a:p>
-                  </a:txBody>
-                  <a:tcPr/>
-                </a:tc>
-                <a:extLst>
-                  <a:ext uri="{0D108BD9-81ED-4DB2-BD59-A6C34878D82A}">
-                    <a16:rowId xmlns:a16="http://schemas.microsoft.com/office/drawing/2014/main" val="390328045"/>
-                  </a:ext>
-                </a:extLst>
-              </a:tr>
-              <a:tr h="370840">
-                <a:tc>
-                  <a:txBody>
-                    <a:bodyPr/>
-                    <a:lstStyle/>
-                    <a:p>
-                      <a:endParaRPr lang="en-SG" sz="1600"/>
-                    </a:p>
-                  </a:txBody>
-                  <a:tcPr/>
-                </a:tc>
-                <a:tc>
-                  <a:txBody>
-                    <a:bodyPr/>
-                    <a:lstStyle/>
-                    <a:p>
-                      <a:endParaRPr lang="en-SG" sz="1600"/>
-                    </a:p>
-                  </a:txBody>
-                  <a:tcPr/>
-                </a:tc>
-                <a:tc>
-                  <a:txBody>
-                    <a:bodyPr/>
-                    <a:lstStyle/>
-                    <a:p>
-                      <a:endParaRPr lang="en-SG" sz="1600" dirty="0"/>
-                    </a:p>
-                  </a:txBody>
-                  <a:tcPr/>
-                </a:tc>
-                <a:tc>
-                  <a:txBody>
-                    <a:bodyPr/>
-                    <a:lstStyle/>
-                    <a:p>
-                      <a:endParaRPr lang="en-SG" sz="1600" dirty="0"/>
-                    </a:p>
-                  </a:txBody>
-                  <a:tcPr/>
-                </a:tc>
-                <a:extLst>
-                  <a:ext uri="{0D108BD9-81ED-4DB2-BD59-A6C34878D82A}">
-                    <a16:rowId xmlns:a16="http://schemas.microsoft.com/office/drawing/2014/main" val="1708857485"/>
-                  </a:ext>
-                </a:extLst>
-              </a:tr>
-              <a:tr h="370840">
-                <a:tc>
-                  <a:txBody>
-                    <a:bodyPr/>
-                    <a:lstStyle/>
-                    <a:p>
-                      <a:endParaRPr lang="en-SG" sz="1600"/>
-                    </a:p>
-                  </a:txBody>
-                  <a:tcPr/>
-                </a:tc>
-                <a:tc>
-                  <a:txBody>
-                    <a:bodyPr/>
-                    <a:lstStyle/>
-                    <a:p>
-                      <a:endParaRPr lang="en-SG" sz="1600"/>
-                    </a:p>
-                  </a:txBody>
-                  <a:tcPr/>
-                </a:tc>
-                <a:tc>
-                  <a:txBody>
-                    <a:bodyPr/>
-                    <a:lstStyle/>
-                    <a:p>
-                      <a:endParaRPr lang="en-SG" sz="1600" dirty="0"/>
-                    </a:p>
-                  </a:txBody>
-                  <a:tcPr/>
-                </a:tc>
-                <a:tc>
-                  <a:txBody>
-                    <a:bodyPr/>
-                    <a:lstStyle/>
-                    <a:p>
-                      <a:endParaRPr lang="en-SG" sz="1600" dirty="0"/>
-                    </a:p>
-                  </a:txBody>
-                  <a:tcPr/>
-                </a:tc>
-                <a:extLst>
-                  <a:ext uri="{0D108BD9-81ED-4DB2-BD59-A6C34878D82A}">
-                    <a16:rowId xmlns:a16="http://schemas.microsoft.com/office/drawing/2014/main" val="1480457366"/>
-                  </a:ext>
-                </a:extLst>
-              </a:tr>
-            </a:tbl>
-          </a:graphicData>
-        </a:graphic>
-      </p:graphicFrame>
-    </p:spTree>
-    <p:extLst>
-      <p:ext uri="{BB962C8B-B14F-4D97-AF65-F5344CB8AC3E}">
-        <p14:creationId xmlns:p14="http://schemas.microsoft.com/office/powerpoint/2010/main" val="2691880006"/>
       </p:ext>
     </p:extLst>
   </p:cSld>

</xml_diff>

<commit_message>
set the drop down list with radio buttons, sorted FourSquare data and Fly to the first search result location
</commit_message>
<xml_diff>
--- a/wireframe.pptx
+++ b/wireframe.pptx
@@ -5,7 +5,7 @@
     <p:sldMasterId id="2147483648" r:id="rId1"/>
   </p:sldMasterIdLst>
   <p:notesMasterIdLst>
-    <p:notesMasterId r:id="rId15"/>
+    <p:notesMasterId r:id="rId16"/>
   </p:notesMasterIdLst>
   <p:sldIdLst>
     <p:sldId id="256" r:id="rId2"/>
@@ -16,11 +16,12 @@
     <p:sldId id="261" r:id="rId7"/>
     <p:sldId id="265" r:id="rId8"/>
     <p:sldId id="266" r:id="rId9"/>
-    <p:sldId id="267" r:id="rId10"/>
-    <p:sldId id="268" r:id="rId11"/>
-    <p:sldId id="269" r:id="rId12"/>
-    <p:sldId id="262" r:id="rId13"/>
-    <p:sldId id="263" r:id="rId14"/>
+    <p:sldId id="271" r:id="rId10"/>
+    <p:sldId id="267" r:id="rId11"/>
+    <p:sldId id="268" r:id="rId12"/>
+    <p:sldId id="269" r:id="rId13"/>
+    <p:sldId id="262" r:id="rId14"/>
+    <p:sldId id="263" r:id="rId15"/>
   </p:sldIdLst>
   <p:sldSz cx="12192000" cy="6858000"/>
   <p:notesSz cx="6858000" cy="9144000"/>
@@ -136,6 +137,7 @@
         <p14:section name="Untitled Section" id="{E083601B-BAD3-4FC3-94E0-3AAB599D93B4}">
           <p14:sldIdLst>
             <p14:sldId id="266"/>
+            <p14:sldId id="271"/>
             <p14:sldId id="267"/>
             <p14:sldId id="268"/>
             <p14:sldId id="269"/>
@@ -577,6 +579,90 @@
     <p:extLst>
       <p:ext uri="{BB962C8B-B14F-4D97-AF65-F5344CB8AC3E}">
         <p14:creationId xmlns:p14="http://schemas.microsoft.com/office/powerpoint/2010/main" val="1559201942"/>
+      </p:ext>
+    </p:extLst>
+  </p:cSld>
+  <p:clrMapOvr>
+    <a:masterClrMapping/>
+  </p:clrMapOvr>
+</p:notes>
+</file>
+
+<file path=ppt/notesSlides/notesSlide2.xml><?xml version="1.0" encoding="utf-8"?>
+<p:notes xmlns:a="http://schemas.openxmlformats.org/drawingml/2006/main" xmlns:r="http://schemas.openxmlformats.org/officeDocument/2006/relationships" xmlns:p="http://schemas.openxmlformats.org/presentationml/2006/main">
+  <p:cSld>
+    <p:spTree>
+      <p:nvGrpSpPr>
+        <p:cNvPr id="1" name=""/>
+        <p:cNvGrpSpPr/>
+        <p:nvPr/>
+      </p:nvGrpSpPr>
+      <p:grpSpPr>
+        <a:xfrm>
+          <a:off x="0" y="0"/>
+          <a:ext cx="0" cy="0"/>
+          <a:chOff x="0" y="0"/>
+          <a:chExt cx="0" cy="0"/>
+        </a:xfrm>
+      </p:grpSpPr>
+      <p:sp>
+        <p:nvSpPr>
+          <p:cNvPr id="2" name="Slide Image Placeholder 1"/>
+          <p:cNvSpPr>
+            <a:spLocks noGrp="1" noRot="1" noChangeAspect="1"/>
+          </p:cNvSpPr>
+          <p:nvPr>
+            <p:ph type="sldImg"/>
+          </p:nvPr>
+        </p:nvSpPr>
+        <p:spPr/>
+      </p:sp>
+      <p:sp>
+        <p:nvSpPr>
+          <p:cNvPr id="3" name="Notes Placeholder 2"/>
+          <p:cNvSpPr>
+            <a:spLocks noGrp="1"/>
+          </p:cNvSpPr>
+          <p:nvPr>
+            <p:ph type="body" idx="1"/>
+          </p:nvPr>
+        </p:nvSpPr>
+        <p:spPr/>
+        <p:txBody>
+          <a:bodyPr/>
+          <a:lstStyle/>
+          <a:p>
+            <a:endParaRPr lang="en-SG" dirty="0"/>
+          </a:p>
+        </p:txBody>
+      </p:sp>
+      <p:sp>
+        <p:nvSpPr>
+          <p:cNvPr id="4" name="Slide Number Placeholder 3"/>
+          <p:cNvSpPr>
+            <a:spLocks noGrp="1"/>
+          </p:cNvSpPr>
+          <p:nvPr>
+            <p:ph type="sldNum" sz="quarter" idx="5"/>
+          </p:nvPr>
+        </p:nvSpPr>
+        <p:spPr/>
+        <p:txBody>
+          <a:bodyPr/>
+          <a:lstStyle/>
+          <a:p>
+            <a:fld id="{EDB02C1C-226F-41E0-8C26-25B756F23392}" type="slidenum">
+              <a:rPr lang="en-SG" smtClean="0"/>
+              <a:t>9</a:t>
+            </a:fld>
+            <a:endParaRPr lang="en-SG"/>
+          </a:p>
+        </p:txBody>
+      </p:sp>
+    </p:spTree>
+    <p:extLst>
+      <p:ext uri="{BB962C8B-B14F-4D97-AF65-F5344CB8AC3E}">
+        <p14:creationId xmlns:p14="http://schemas.microsoft.com/office/powerpoint/2010/main" val="3594912703"/>
       </p:ext>
     </p:extLst>
   </p:cSld>
@@ -3950,6 +4036,495 @@
           <p:nvPr>
             <p:extLst>
               <p:ext uri="{D42A27DB-BD31-4B8C-83A1-F6EECF244321}">
+                <p14:modId xmlns:p14="http://schemas.microsoft.com/office/powerpoint/2010/main" val="3324065029"/>
+              </p:ext>
+            </p:extLst>
+          </p:nvPr>
+        </p:nvGraphicFramePr>
+        <p:xfrm>
+          <a:off x="238539" y="149163"/>
+          <a:ext cx="11728175" cy="2590800"/>
+        </p:xfrm>
+        <a:graphic>
+          <a:graphicData uri="http://schemas.openxmlformats.org/drawingml/2006/table">
+            <a:tbl>
+              <a:tblPr firstRow="1" bandRow="1">
+                <a:tableStyleId>{5C22544A-7EE6-4342-B048-85BDC9FD1C3A}</a:tableStyleId>
+              </a:tblPr>
+              <a:tblGrid>
+                <a:gridCol w="1595626">
+                  <a:extLst>
+                    <a:ext uri="{9D8B030D-6E8A-4147-A177-3AD203B41FA5}">
+                      <a16:colId xmlns:a16="http://schemas.microsoft.com/office/drawing/2014/main" val="1417640537"/>
+                    </a:ext>
+                  </a:extLst>
+                </a:gridCol>
+                <a:gridCol w="2027187">
+                  <a:extLst>
+                    <a:ext uri="{9D8B030D-6E8A-4147-A177-3AD203B41FA5}">
+                      <a16:colId xmlns:a16="http://schemas.microsoft.com/office/drawing/2014/main" val="764260135"/>
+                    </a:ext>
+                  </a:extLst>
+                </a:gridCol>
+                <a:gridCol w="3071191">
+                  <a:extLst>
+                    <a:ext uri="{9D8B030D-6E8A-4147-A177-3AD203B41FA5}">
+                      <a16:colId xmlns:a16="http://schemas.microsoft.com/office/drawing/2014/main" val="3641419838"/>
+                    </a:ext>
+                  </a:extLst>
+                </a:gridCol>
+                <a:gridCol w="5034171">
+                  <a:extLst>
+                    <a:ext uri="{9D8B030D-6E8A-4147-A177-3AD203B41FA5}">
+                      <a16:colId xmlns:a16="http://schemas.microsoft.com/office/drawing/2014/main" val="4284585333"/>
+                    </a:ext>
+                  </a:extLst>
+                </a:gridCol>
+              </a:tblGrid>
+              <a:tr h="0">
+                <a:tc>
+                  <a:txBody>
+                    <a:bodyPr/>
+                    <a:lstStyle/>
+                    <a:p>
+                      <a:pPr algn="ctr"/>
+                      <a:r>
+                        <a:rPr lang="en-US" sz="1800" b="1" dirty="0"/>
+                        <a:t>Prioritization 2</a:t>
+                      </a:r>
+                      <a:endParaRPr lang="en-SG" dirty="0"/>
+                    </a:p>
+                  </a:txBody>
+                  <a:tcPr/>
+                </a:tc>
+                <a:tc>
+                  <a:txBody>
+                    <a:bodyPr/>
+                    <a:lstStyle/>
+                    <a:p>
+                      <a:pPr algn="ctr"/>
+                      <a:r>
+                        <a:rPr lang="en-US" dirty="0"/>
+                        <a:t>Features </a:t>
+                      </a:r>
+                      <a:endParaRPr lang="en-SG" dirty="0"/>
+                    </a:p>
+                  </a:txBody>
+                  <a:tcPr/>
+                </a:tc>
+                <a:tc>
+                  <a:txBody>
+                    <a:bodyPr/>
+                    <a:lstStyle/>
+                    <a:p>
+                      <a:pPr algn="ctr"/>
+                      <a:r>
+                        <a:rPr lang="en-US" dirty="0"/>
+                        <a:t>Tasks list</a:t>
+                      </a:r>
+                      <a:endParaRPr lang="en-SG" dirty="0"/>
+                    </a:p>
+                  </a:txBody>
+                  <a:tcPr/>
+                </a:tc>
+                <a:tc>
+                  <a:txBody>
+                    <a:bodyPr/>
+                    <a:lstStyle/>
+                    <a:p>
+                      <a:pPr algn="ctr"/>
+                      <a:r>
+                        <a:rPr lang="en-US" dirty="0"/>
+                        <a:t>Acceptance criteria</a:t>
+                      </a:r>
+                      <a:endParaRPr lang="en-SG" dirty="0"/>
+                    </a:p>
+                  </a:txBody>
+                  <a:tcPr/>
+                </a:tc>
+                <a:extLst>
+                  <a:ext uri="{0D108BD9-81ED-4DB2-BD59-A6C34878D82A}">
+                    <a16:rowId xmlns:a16="http://schemas.microsoft.com/office/drawing/2014/main" val="3206974568"/>
+                  </a:ext>
+                </a:extLst>
+              </a:tr>
+              <a:tr h="370840">
+                <a:tc>
+                  <a:txBody>
+                    <a:bodyPr/>
+                    <a:lstStyle/>
+                    <a:p>
+                      <a:r>
+                        <a:rPr lang="en-US" sz="1600" dirty="0"/>
+                        <a:t>Weather </a:t>
+                      </a:r>
+                      <a:r>
+                        <a:rPr lang="en-US" sz="1600" dirty="0" err="1"/>
+                        <a:t>api</a:t>
+                      </a:r>
+                      <a:r>
+                        <a:rPr lang="en-US" sz="1600" dirty="0"/>
+                        <a:t> </a:t>
+                      </a:r>
+                      <a:endParaRPr lang="en-SG" sz="1600" dirty="0"/>
+                    </a:p>
+                  </a:txBody>
+                  <a:tcPr/>
+                </a:tc>
+                <a:tc>
+                  <a:txBody>
+                    <a:bodyPr/>
+                    <a:lstStyle/>
+                    <a:p>
+                      <a:endParaRPr lang="en-SG" sz="1600" dirty="0"/>
+                    </a:p>
+                  </a:txBody>
+                  <a:tcPr/>
+                </a:tc>
+                <a:tc>
+                  <a:txBody>
+                    <a:bodyPr/>
+                    <a:lstStyle/>
+                    <a:p>
+                      <a:pPr marL="0" marR="0" lvl="0" indent="0" algn="l" defTabSz="914400" rtl="0" eaLnBrk="1" fontAlgn="auto" latinLnBrk="0" hangingPunct="1">
+                        <a:lnSpc>
+                          <a:spcPct val="100000"/>
+                        </a:lnSpc>
+                        <a:spcBef>
+                          <a:spcPts val="0"/>
+                        </a:spcBef>
+                        <a:spcAft>
+                          <a:spcPts val="0"/>
+                        </a:spcAft>
+                        <a:buClrTx/>
+                        <a:buSzTx/>
+                        <a:buFontTx/>
+                        <a:buNone/>
+                        <a:tabLst/>
+                        <a:defRPr/>
+                      </a:pPr>
+                      <a:endParaRPr lang="en-SG" sz="1600" dirty="0"/>
+                    </a:p>
+                  </a:txBody>
+                  <a:tcPr/>
+                </a:tc>
+                <a:tc>
+                  <a:txBody>
+                    <a:bodyPr/>
+                    <a:lstStyle/>
+                    <a:p>
+                      <a:pPr marL="0" marR="0" lvl="0" indent="0" algn="l" defTabSz="914400" rtl="0" eaLnBrk="1" fontAlgn="auto" latinLnBrk="0" hangingPunct="1">
+                        <a:lnSpc>
+                          <a:spcPct val="100000"/>
+                        </a:lnSpc>
+                        <a:spcBef>
+                          <a:spcPts val="0"/>
+                        </a:spcBef>
+                        <a:spcAft>
+                          <a:spcPts val="0"/>
+                        </a:spcAft>
+                        <a:buClrTx/>
+                        <a:buSzTx/>
+                        <a:buFontTx/>
+                        <a:buNone/>
+                        <a:tabLst/>
+                        <a:defRPr/>
+                      </a:pPr>
+                      <a:endParaRPr lang="en-SG" sz="1600" dirty="0"/>
+                    </a:p>
+                  </a:txBody>
+                  <a:tcPr/>
+                </a:tc>
+                <a:extLst>
+                  <a:ext uri="{0D108BD9-81ED-4DB2-BD59-A6C34878D82A}">
+                    <a16:rowId xmlns:a16="http://schemas.microsoft.com/office/drawing/2014/main" val="2021552113"/>
+                  </a:ext>
+                </a:extLst>
+              </a:tr>
+              <a:tr h="370840">
+                <a:tc>
+                  <a:txBody>
+                    <a:bodyPr/>
+                    <a:lstStyle/>
+                    <a:p>
+                      <a:endParaRPr lang="en-SG" sz="1600"/>
+                    </a:p>
+                  </a:txBody>
+                  <a:tcPr/>
+                </a:tc>
+                <a:tc>
+                  <a:txBody>
+                    <a:bodyPr/>
+                    <a:lstStyle/>
+                    <a:p>
+                      <a:endParaRPr lang="en-SG" sz="1600" dirty="0"/>
+                    </a:p>
+                  </a:txBody>
+                  <a:tcPr/>
+                </a:tc>
+                <a:tc>
+                  <a:txBody>
+                    <a:bodyPr/>
+                    <a:lstStyle/>
+                    <a:p>
+                      <a:endParaRPr lang="en-SG" sz="1600" dirty="0"/>
+                    </a:p>
+                  </a:txBody>
+                  <a:tcPr/>
+                </a:tc>
+                <a:tc>
+                  <a:txBody>
+                    <a:bodyPr/>
+                    <a:lstStyle/>
+                    <a:p>
+                      <a:endParaRPr lang="en-SG" sz="1600" dirty="0"/>
+                    </a:p>
+                  </a:txBody>
+                  <a:tcPr/>
+                </a:tc>
+                <a:extLst>
+                  <a:ext uri="{0D108BD9-81ED-4DB2-BD59-A6C34878D82A}">
+                    <a16:rowId xmlns:a16="http://schemas.microsoft.com/office/drawing/2014/main" val="892559996"/>
+                  </a:ext>
+                </a:extLst>
+              </a:tr>
+              <a:tr h="370840">
+                <a:tc>
+                  <a:txBody>
+                    <a:bodyPr/>
+                    <a:lstStyle/>
+                    <a:p>
+                      <a:endParaRPr lang="en-SG" sz="1600"/>
+                    </a:p>
+                  </a:txBody>
+                  <a:tcPr/>
+                </a:tc>
+                <a:tc>
+                  <a:txBody>
+                    <a:bodyPr/>
+                    <a:lstStyle/>
+                    <a:p>
+                      <a:endParaRPr lang="en-SG" sz="1600" dirty="0"/>
+                    </a:p>
+                  </a:txBody>
+                  <a:tcPr/>
+                </a:tc>
+                <a:tc>
+                  <a:txBody>
+                    <a:bodyPr/>
+                    <a:lstStyle/>
+                    <a:p>
+                      <a:endParaRPr lang="en-SG" sz="1600" dirty="0"/>
+                    </a:p>
+                  </a:txBody>
+                  <a:tcPr/>
+                </a:tc>
+                <a:tc>
+                  <a:txBody>
+                    <a:bodyPr/>
+                    <a:lstStyle/>
+                    <a:p>
+                      <a:endParaRPr lang="en-SG" sz="1600" dirty="0"/>
+                    </a:p>
+                  </a:txBody>
+                  <a:tcPr/>
+                </a:tc>
+                <a:extLst>
+                  <a:ext uri="{0D108BD9-81ED-4DB2-BD59-A6C34878D82A}">
+                    <a16:rowId xmlns:a16="http://schemas.microsoft.com/office/drawing/2014/main" val="4053821403"/>
+                  </a:ext>
+                </a:extLst>
+              </a:tr>
+              <a:tr h="370840">
+                <a:tc>
+                  <a:txBody>
+                    <a:bodyPr/>
+                    <a:lstStyle/>
+                    <a:p>
+                      <a:endParaRPr lang="en-SG" sz="1600"/>
+                    </a:p>
+                  </a:txBody>
+                  <a:tcPr/>
+                </a:tc>
+                <a:tc>
+                  <a:txBody>
+                    <a:bodyPr/>
+                    <a:lstStyle/>
+                    <a:p>
+                      <a:endParaRPr lang="en-SG" sz="1600" dirty="0"/>
+                    </a:p>
+                  </a:txBody>
+                  <a:tcPr/>
+                </a:tc>
+                <a:tc>
+                  <a:txBody>
+                    <a:bodyPr/>
+                    <a:lstStyle/>
+                    <a:p>
+                      <a:endParaRPr lang="en-US" sz="1600" dirty="0"/>
+                    </a:p>
+                  </a:txBody>
+                  <a:tcPr/>
+                </a:tc>
+                <a:tc>
+                  <a:txBody>
+                    <a:bodyPr/>
+                    <a:lstStyle/>
+                    <a:p>
+                      <a:endParaRPr lang="en-SG" sz="1600" dirty="0"/>
+                    </a:p>
+                  </a:txBody>
+                  <a:tcPr/>
+                </a:tc>
+                <a:extLst>
+                  <a:ext uri="{0D108BD9-81ED-4DB2-BD59-A6C34878D82A}">
+                    <a16:rowId xmlns:a16="http://schemas.microsoft.com/office/drawing/2014/main" val="390328045"/>
+                  </a:ext>
+                </a:extLst>
+              </a:tr>
+              <a:tr h="370840">
+                <a:tc>
+                  <a:txBody>
+                    <a:bodyPr/>
+                    <a:lstStyle/>
+                    <a:p>
+                      <a:endParaRPr lang="en-SG" sz="1600"/>
+                    </a:p>
+                  </a:txBody>
+                  <a:tcPr/>
+                </a:tc>
+                <a:tc>
+                  <a:txBody>
+                    <a:bodyPr/>
+                    <a:lstStyle/>
+                    <a:p>
+                      <a:endParaRPr lang="en-SG" sz="1600"/>
+                    </a:p>
+                  </a:txBody>
+                  <a:tcPr/>
+                </a:tc>
+                <a:tc>
+                  <a:txBody>
+                    <a:bodyPr/>
+                    <a:lstStyle/>
+                    <a:p>
+                      <a:endParaRPr lang="en-SG" sz="1600" dirty="0"/>
+                    </a:p>
+                  </a:txBody>
+                  <a:tcPr/>
+                </a:tc>
+                <a:tc>
+                  <a:txBody>
+                    <a:bodyPr/>
+                    <a:lstStyle/>
+                    <a:p>
+                      <a:endParaRPr lang="en-SG" sz="1600" dirty="0"/>
+                    </a:p>
+                  </a:txBody>
+                  <a:tcPr/>
+                </a:tc>
+                <a:extLst>
+                  <a:ext uri="{0D108BD9-81ED-4DB2-BD59-A6C34878D82A}">
+                    <a16:rowId xmlns:a16="http://schemas.microsoft.com/office/drawing/2014/main" val="1708857485"/>
+                  </a:ext>
+                </a:extLst>
+              </a:tr>
+              <a:tr h="370840">
+                <a:tc>
+                  <a:txBody>
+                    <a:bodyPr/>
+                    <a:lstStyle/>
+                    <a:p>
+                      <a:endParaRPr lang="en-SG" sz="1600"/>
+                    </a:p>
+                  </a:txBody>
+                  <a:tcPr/>
+                </a:tc>
+                <a:tc>
+                  <a:txBody>
+                    <a:bodyPr/>
+                    <a:lstStyle/>
+                    <a:p>
+                      <a:endParaRPr lang="en-SG" sz="1600"/>
+                    </a:p>
+                  </a:txBody>
+                  <a:tcPr/>
+                </a:tc>
+                <a:tc>
+                  <a:txBody>
+                    <a:bodyPr/>
+                    <a:lstStyle/>
+                    <a:p>
+                      <a:endParaRPr lang="en-SG" sz="1600" dirty="0"/>
+                    </a:p>
+                  </a:txBody>
+                  <a:tcPr/>
+                </a:tc>
+                <a:tc>
+                  <a:txBody>
+                    <a:bodyPr/>
+                    <a:lstStyle/>
+                    <a:p>
+                      <a:endParaRPr lang="en-SG" sz="1600" dirty="0"/>
+                    </a:p>
+                  </a:txBody>
+                  <a:tcPr/>
+                </a:tc>
+                <a:extLst>
+                  <a:ext uri="{0D108BD9-81ED-4DB2-BD59-A6C34878D82A}">
+                    <a16:rowId xmlns:a16="http://schemas.microsoft.com/office/drawing/2014/main" val="1480457366"/>
+                  </a:ext>
+                </a:extLst>
+              </a:tr>
+            </a:tbl>
+          </a:graphicData>
+        </a:graphic>
+      </p:graphicFrame>
+    </p:spTree>
+    <p:extLst>
+      <p:ext uri="{BB962C8B-B14F-4D97-AF65-F5344CB8AC3E}">
+        <p14:creationId xmlns:p14="http://schemas.microsoft.com/office/powerpoint/2010/main" val="440554776"/>
+      </p:ext>
+    </p:extLst>
+  </p:cSld>
+  <p:clrMapOvr>
+    <a:masterClrMapping/>
+  </p:clrMapOvr>
+</p:sld>
+</file>
+
+<file path=ppt/slides/slide11.xml><?xml version="1.0" encoding="utf-8"?>
+<p:sld xmlns:a="http://schemas.openxmlformats.org/drawingml/2006/main" xmlns:r="http://schemas.openxmlformats.org/officeDocument/2006/relationships" xmlns:p="http://schemas.openxmlformats.org/presentationml/2006/main">
+  <p:cSld>
+    <p:spTree>
+      <p:nvGrpSpPr>
+        <p:cNvPr id="1" name=""/>
+        <p:cNvGrpSpPr/>
+        <p:nvPr/>
+      </p:nvGrpSpPr>
+      <p:grpSpPr>
+        <a:xfrm>
+          <a:off x="0" y="0"/>
+          <a:ext cx="0" cy="0"/>
+          <a:chOff x="0" y="0"/>
+          <a:chExt cx="0" cy="0"/>
+        </a:xfrm>
+      </p:grpSpPr>
+      <p:graphicFrame>
+        <p:nvGraphicFramePr>
+          <p:cNvPr id="3" name="Table 3">
+            <a:extLst>
+              <a:ext uri="{FF2B5EF4-FFF2-40B4-BE49-F238E27FC236}">
+                <a16:creationId xmlns:a16="http://schemas.microsoft.com/office/drawing/2014/main" id="{34E5978E-10A6-43F2-BF10-97A84F4B18DD}"/>
+              </a:ext>
+            </a:extLst>
+          </p:cNvPr>
+          <p:cNvGraphicFramePr>
+            <a:graphicFrameLocks noGrp="1"/>
+          </p:cNvGraphicFramePr>
+          <p:nvPr>
+            <p:extLst>
+              <p:ext uri="{D42A27DB-BD31-4B8C-83A1-F6EECF244321}">
                 <p14:modId xmlns:p14="http://schemas.microsoft.com/office/powerpoint/2010/main" val="1362983282"/>
               </p:ext>
             </p:extLst>
@@ -4407,7 +4982,7 @@
 </p:sld>
 </file>
 
-<file path=ppt/slides/slide11.xml><?xml version="1.0" encoding="utf-8"?>
+<file path=ppt/slides/slide12.xml><?xml version="1.0" encoding="utf-8"?>
 <p:sld xmlns:a="http://schemas.openxmlformats.org/drawingml/2006/main" xmlns:r="http://schemas.openxmlformats.org/officeDocument/2006/relationships" xmlns:p="http://schemas.openxmlformats.org/presentationml/2006/main">
   <p:cSld>
     <p:spTree>
@@ -4906,7 +5481,7 @@
 </p:sld>
 </file>
 
-<file path=ppt/slides/slide12.xml><?xml version="1.0" encoding="utf-8"?>
+<file path=ppt/slides/slide13.xml><?xml version="1.0" encoding="utf-8"?>
 <p:sld xmlns:a="http://schemas.openxmlformats.org/drawingml/2006/main" xmlns:r="http://schemas.openxmlformats.org/officeDocument/2006/relationships" xmlns:p="http://schemas.openxmlformats.org/presentationml/2006/main">
   <p:cSld>
     <p:spTree>
@@ -5560,7 +6135,7 @@
 </p:sld>
 </file>
 
-<file path=ppt/slides/slide13.xml><?xml version="1.0" encoding="utf-8"?>
+<file path=ppt/slides/slide14.xml><?xml version="1.0" encoding="utf-8"?>
 <p:sld xmlns:a="http://schemas.openxmlformats.org/drawingml/2006/main" xmlns:r="http://schemas.openxmlformats.org/officeDocument/2006/relationships" xmlns:p="http://schemas.openxmlformats.org/presentationml/2006/main">
   <p:cSld>
     <p:spTree>
@@ -9708,14 +10283,14 @@
           <p:nvPr>
             <p:extLst>
               <p:ext uri="{D42A27DB-BD31-4B8C-83A1-F6EECF244321}">
-                <p14:modId xmlns:p14="http://schemas.microsoft.com/office/powerpoint/2010/main" val="2786882"/>
+                <p14:modId xmlns:p14="http://schemas.microsoft.com/office/powerpoint/2010/main" val="2642465886"/>
               </p:ext>
             </p:extLst>
           </p:nvPr>
         </p:nvGraphicFramePr>
         <p:xfrm>
           <a:off x="238539" y="149163"/>
-          <a:ext cx="11728175" cy="6278880"/>
+          <a:ext cx="11728175" cy="4541520"/>
         </p:xfrm>
         <a:graphic>
           <a:graphicData uri="http://schemas.openxmlformats.org/drawingml/2006/table">
@@ -10107,15 +10682,101 @@
                     <a:bodyPr/>
                     <a:lstStyle/>
                     <a:p>
-                      <a:endParaRPr lang="en-SG" sz="1600"/>
-                    </a:p>
-                  </a:txBody>
-                  <a:tcPr/>
-                </a:tc>
-                <a:tc>
-                  <a:txBody>
-                    <a:bodyPr/>
-                    <a:lstStyle/>
+                      <a:r>
+                        <a:rPr lang="en-US" sz="1600" dirty="0" err="1"/>
+                        <a:t>FourSquare</a:t>
+                      </a:r>
+                      <a:endParaRPr lang="en-SG" sz="1600" dirty="0"/>
+                    </a:p>
+                  </a:txBody>
+                  <a:tcPr/>
+                </a:tc>
+                <a:tc>
+                  <a:txBody>
+                    <a:bodyPr/>
+                    <a:lstStyle/>
+                    <a:p>
+                      <a:r>
+                        <a:rPr lang="en-US" sz="1600" dirty="0"/>
+                        <a:t>City search (Map display )</a:t>
+                      </a:r>
+                      <a:endParaRPr lang="en-SG" sz="1600" dirty="0"/>
+                    </a:p>
+                    <a:p>
+                      <a:endParaRPr lang="en-SG" sz="1600" dirty="0"/>
+                    </a:p>
+                  </a:txBody>
+                  <a:tcPr/>
+                </a:tc>
+                <a:tc>
+                  <a:txBody>
+                    <a:bodyPr/>
+                    <a:lstStyle/>
+                    <a:p>
+                      <a:pPr marL="0" marR="0" lvl="0" indent="0" algn="l" defTabSz="914400" rtl="0" eaLnBrk="1" fontAlgn="auto" latinLnBrk="0" hangingPunct="1">
+                        <a:lnSpc>
+                          <a:spcPct val="100000"/>
+                        </a:lnSpc>
+                        <a:spcBef>
+                          <a:spcPts val="0"/>
+                        </a:spcBef>
+                        <a:spcAft>
+                          <a:spcPts val="0"/>
+                        </a:spcAft>
+                        <a:buClrTx/>
+                        <a:buSzTx/>
+                        <a:buFontTx/>
+                        <a:buNone/>
+                        <a:tabLst/>
+                        <a:defRPr/>
+                      </a:pPr>
+                      <a:r>
+                        <a:rPr lang="en-US" sz="1600" dirty="0" err="1"/>
+                        <a:t>FourSquare</a:t>
+                      </a:r>
+                      <a:r>
+                        <a:rPr lang="en-US" sz="1600" dirty="0"/>
+                        <a:t> data setup </a:t>
+                      </a:r>
+                    </a:p>
+                    <a:p>
+                      <a:pPr marL="0" marR="0" lvl="0" indent="0" algn="l" defTabSz="914400" rtl="0" eaLnBrk="1" fontAlgn="auto" latinLnBrk="0" hangingPunct="1">
+                        <a:lnSpc>
+                          <a:spcPct val="100000"/>
+                        </a:lnSpc>
+                        <a:spcBef>
+                          <a:spcPts val="0"/>
+                        </a:spcBef>
+                        <a:spcAft>
+                          <a:spcPts val="0"/>
+                        </a:spcAft>
+                        <a:buClrTx/>
+                        <a:buSzTx/>
+                        <a:buFontTx/>
+                        <a:buNone/>
+                        <a:tabLst/>
+                        <a:defRPr/>
+                      </a:pPr>
+                      <a:r>
+                        <a:rPr lang="en-SG" sz="1600" dirty="0"/>
+                        <a:t>City </a:t>
+                      </a:r>
+                      <a:r>
+                        <a:rPr lang="en-US" sz="1600" dirty="0"/>
+                        <a:t>name on the marker</a:t>
+                      </a:r>
+                    </a:p>
+                    <a:p>
+                      <a:r>
+                        <a:rPr lang="en-US" sz="1600" dirty="0"/>
+                        <a:t>Show filtered search result </a:t>
+                      </a:r>
+                      <a:endParaRPr lang="en-US" sz="1600" dirty="0">
+                        <a:solidFill>
+                          <a:srgbClr val="FF0000"/>
+                        </a:solidFill>
+                      </a:endParaRPr>
+                    </a:p>
                     <a:p>
                       <a:pPr marL="0" marR="0" lvl="0" indent="0" algn="l" defTabSz="914400" rtl="0" eaLnBrk="1" fontAlgn="auto" latinLnBrk="0" hangingPunct="1">
                         <a:lnSpc>
@@ -10136,7 +10797,15 @@
                       </a:pPr>
                       <a:r>
                         <a:rPr lang="en-US" sz="1600" dirty="0"/>
-                        <a:t>Next: </a:t>
+                        <a:t>Fly to </a:t>
+                      </a:r>
+                      <a:r>
+                        <a:rPr lang="en-US" sz="1600" dirty="0" err="1"/>
+                        <a:t>latlong</a:t>
+                      </a:r>
+                      <a:r>
+                        <a:rPr lang="en-US" sz="1600" dirty="0"/>
+                        <a:t> upon click</a:t>
                       </a:r>
                     </a:p>
                     <a:p>
@@ -10159,136 +10828,8 @@
                       </a:pPr>
                       <a:r>
                         <a:rPr lang="en-US" sz="1600" dirty="0"/>
-                        <a:t>under explore tap: </a:t>
+                        <a:t>Fly to the first result location </a:t>
                       </a:r>
-                      <a:endParaRPr lang="en-SG" sz="1600" dirty="0"/>
-                    </a:p>
-                    <a:p>
-                      <a:endParaRPr lang="en-SG" sz="1600" dirty="0"/>
-                    </a:p>
-                  </a:txBody>
-                  <a:tcPr/>
-                </a:tc>
-                <a:tc>
-                  <a:txBody>
-                    <a:bodyPr/>
-                    <a:lstStyle/>
-                    <a:p>
-                      <a:pPr marL="0" marR="0" lvl="0" indent="0" algn="l" defTabSz="914400" rtl="0" eaLnBrk="1" fontAlgn="auto" latinLnBrk="0" hangingPunct="1">
-                        <a:lnSpc>
-                          <a:spcPct val="100000"/>
-                        </a:lnSpc>
-                        <a:spcBef>
-                          <a:spcPts val="0"/>
-                        </a:spcBef>
-                        <a:spcAft>
-                          <a:spcPts val="0"/>
-                        </a:spcAft>
-                        <a:buClrTx/>
-                        <a:buSzTx/>
-                        <a:buFontTx/>
-                        <a:buNone/>
-                        <a:tabLst/>
-                        <a:defRPr/>
-                      </a:pPr>
-                      <a:r>
-                        <a:rPr lang="en-US" sz="1600" strike="sngStrike" dirty="0"/>
-                        <a:t>Search nap bar scroll down </a:t>
-                      </a:r>
-                      <a:endParaRPr lang="en-SG" sz="1600" strike="sngStrike" dirty="0"/>
-                    </a:p>
-                    <a:p>
-                      <a:r>
-                        <a:rPr lang="en-US" sz="1600" dirty="0"/>
-                        <a:t>Navbar: insert as drop down list … </a:t>
-                      </a:r>
-                    </a:p>
-                    <a:p>
-                      <a:pPr marL="0" marR="0" lvl="0" indent="0" algn="l" defTabSz="914400" rtl="0" eaLnBrk="1" fontAlgn="auto" latinLnBrk="0" hangingPunct="1">
-                        <a:lnSpc>
-                          <a:spcPct val="100000"/>
-                        </a:lnSpc>
-                        <a:spcBef>
-                          <a:spcPts val="0"/>
-                        </a:spcBef>
-                        <a:spcAft>
-                          <a:spcPts val="0"/>
-                        </a:spcAft>
-                        <a:buClrTx/>
-                        <a:buSzTx/>
-                        <a:buFontTx/>
-                        <a:buNone/>
-                        <a:tabLst/>
-                        <a:defRPr/>
-                      </a:pPr>
-                      <a:r>
-                        <a:rPr lang="en-US" sz="1600" dirty="0"/>
-                        <a:t>- </a:t>
-                      </a:r>
-                      <a:r>
-                        <a:rPr lang="en-US" sz="1600" dirty="0" err="1"/>
-                        <a:t>redio</a:t>
-                      </a:r>
-                      <a:r>
-                        <a:rPr lang="en-US" sz="1600" dirty="0"/>
-                        <a:t> button to </a:t>
-                      </a:r>
-                      <a:r>
-                        <a:rPr lang="en-SG" sz="1800" b="0" i="0" kern="1200" dirty="0">
-                          <a:solidFill>
-                            <a:schemeClr val="dk1"/>
-                          </a:solidFill>
-                          <a:effectLst/>
-                          <a:latin typeface="+mn-lt"/>
-                          <a:ea typeface="+mn-ea"/>
-                          <a:cs typeface="+mn-cs"/>
-                        </a:rPr>
-                        <a:t>Toggle Search Results:</a:t>
-                      </a:r>
-                      <a:endParaRPr lang="en-US" sz="1600" dirty="0"/>
-                    </a:p>
-                    <a:p>
-                      <a:r>
-                        <a:rPr lang="en-US" sz="1600" dirty="0"/>
-                        <a:t>choose by region  // </a:t>
-                      </a:r>
-                    </a:p>
-                    <a:p>
-                      <a:r>
-                        <a:rPr lang="en-US" sz="1600" dirty="0"/>
-                        <a:t>Check the radius by 500 meters (show parameter of nearby)</a:t>
-                      </a:r>
-                    </a:p>
-                    <a:p>
-                      <a:endParaRPr lang="en-US" sz="1600" dirty="0"/>
-                    </a:p>
-                    <a:p>
-                      <a:r>
-                        <a:rPr lang="en-US" sz="1600" dirty="0"/>
-                        <a:t>- Mapped the selected secret spots (insert photo) display on the map – put in separate file for this and future edition</a:t>
-                      </a:r>
-                    </a:p>
-                    <a:p>
-                      <a:endParaRPr lang="en-US" sz="1600" dirty="0"/>
-                    </a:p>
-                    <a:p>
-                      <a:r>
-                        <a:rPr lang="en-US" sz="1600" dirty="0"/>
-                        <a:t>Include on the checkbox for selection</a:t>
-                      </a:r>
-                    </a:p>
-                    <a:p>
-                      <a:r>
-                        <a:rPr lang="en-US" sz="1600" dirty="0"/>
-                        <a:t>(indoor famous spots</a:t>
-                      </a:r>
-                    </a:p>
-                    <a:p>
-                      <a:r>
-                        <a:rPr lang="en-US" sz="1600" dirty="0"/>
-                        <a:t>Outdoor famous spots)</a:t>
-                      </a:r>
-                      <a:endParaRPr lang="en-SG" sz="1600" dirty="0"/>
                     </a:p>
                   </a:txBody>
                   <a:tcPr/>
@@ -10316,11 +10857,32 @@
                       </a:r>
                     </a:p>
                     <a:p>
+                      <a:endParaRPr lang="en-US" sz="1600" dirty="0"/>
+                    </a:p>
+                    <a:p>
+                      <a:r>
+                        <a:rPr lang="en-US" sz="1600" dirty="0" err="1"/>
+                        <a:t>Todo</a:t>
+                      </a:r>
                       <a:r>
                         <a:rPr lang="en-US" sz="1600" dirty="0"/>
-                        <a:t>Both </a:t>
+                        <a:t>: </a:t>
                       </a:r>
-                      <a:endParaRPr lang="en-SG" sz="1600" dirty="0"/>
+                    </a:p>
+                    <a:p>
+                      <a:r>
+                        <a:rPr lang="en-US" sz="1600" dirty="0">
+                          <a:solidFill>
+                            <a:srgbClr val="FF0000"/>
+                          </a:solidFill>
+                        </a:rPr>
+                        <a:t>Both – to display them into the same div (combine data) and sorted </a:t>
+                      </a:r>
+                      <a:endParaRPr lang="en-SG" sz="1600" dirty="0">
+                        <a:solidFill>
+                          <a:srgbClr val="FF0000"/>
+                        </a:solidFill>
+                      </a:endParaRPr>
                     </a:p>
                   </a:txBody>
                   <a:tcPr/>
@@ -10380,14 +10942,14 @@
           <p:nvPr>
             <p:extLst>
               <p:ext uri="{D42A27DB-BD31-4B8C-83A1-F6EECF244321}">
-                <p14:modId xmlns:p14="http://schemas.microsoft.com/office/powerpoint/2010/main" val="3324065029"/>
+                <p14:modId xmlns:p14="http://schemas.microsoft.com/office/powerpoint/2010/main" val="2119929682"/>
               </p:ext>
             </p:extLst>
           </p:nvPr>
         </p:nvGraphicFramePr>
         <p:xfrm>
           <a:off x="238539" y="149163"/>
-          <a:ext cx="11728175" cy="2590800"/>
+          <a:ext cx="11728175" cy="3413760"/>
         </p:xfrm>
         <a:graphic>
           <a:graphicData uri="http://schemas.openxmlformats.org/drawingml/2006/table">
@@ -10403,14 +10965,14 @@
                     </a:ext>
                   </a:extLst>
                 </a:gridCol>
-                <a:gridCol w="2027187">
+                <a:gridCol w="1370674">
                   <a:extLst>
                     <a:ext uri="{9D8B030D-6E8A-4147-A177-3AD203B41FA5}">
                       <a16:colId xmlns:a16="http://schemas.microsoft.com/office/drawing/2014/main" val="764260135"/>
                     </a:ext>
                   </a:extLst>
                 </a:gridCol>
-                <a:gridCol w="3071191">
+                <a:gridCol w="3727704">
                   <a:extLst>
                     <a:ext uri="{9D8B030D-6E8A-4147-A177-3AD203B41FA5}">
                       <a16:colId xmlns:a16="http://schemas.microsoft.com/office/drawing/2014/main" val="3641419838"/>
@@ -10434,7 +10996,7 @@
                       <a:pPr algn="ctr"/>
                       <a:r>
                         <a:rPr lang="en-US" sz="1800" b="1" dirty="0"/>
-                        <a:t>Prioritization 2</a:t>
+                        <a:t>Prioritization 1</a:t>
                       </a:r>
                       <a:endParaRPr lang="en-SG" dirty="0"/>
                     </a:p>
@@ -10498,29 +11060,7 @@
                     <a:bodyPr/>
                     <a:lstStyle/>
                     <a:p>
-                      <a:r>
-                        <a:rPr lang="en-US" sz="1600" dirty="0"/>
-                        <a:t>Weather </a:t>
-                      </a:r>
-                      <a:r>
-                        <a:rPr lang="en-US" sz="1600" dirty="0" err="1"/>
-                        <a:t>api</a:t>
-                      </a:r>
-                      <a:r>
-                        <a:rPr lang="en-US" sz="1600" dirty="0"/>
-                        <a:t> </a:t>
-                      </a:r>
-                      <a:endParaRPr lang="en-SG" sz="1600" dirty="0"/>
-                    </a:p>
-                  </a:txBody>
-                  <a:tcPr/>
-                </a:tc>
-                <a:tc>
-                  <a:txBody>
-                    <a:bodyPr/>
-                    <a:lstStyle/>
-                    <a:p>
-                      <a:endParaRPr lang="en-SG" sz="1600" dirty="0"/>
+                      <a:endParaRPr lang="en-SG" sz="1600"/>
                     </a:p>
                   </a:txBody>
                   <a:tcPr/>
@@ -10547,15 +11087,11 @@
                         <a:tabLst/>
                         <a:defRPr/>
                       </a:pPr>
-                      <a:endParaRPr lang="en-SG" sz="1600" dirty="0"/>
-                    </a:p>
-                  </a:txBody>
-                  <a:tcPr/>
-                </a:tc>
-                <a:tc>
-                  <a:txBody>
-                    <a:bodyPr/>
-                    <a:lstStyle/>
+                      <a:r>
+                        <a:rPr lang="en-US" sz="1600" dirty="0"/>
+                        <a:t>Next: </a:t>
+                      </a:r>
+                    </a:p>
                     <a:p>
                       <a:pPr marL="0" marR="0" lvl="0" indent="0" algn="l" defTabSz="914400" rtl="0" eaLnBrk="1" fontAlgn="auto" latinLnBrk="0" hangingPunct="1">
                         <a:lnSpc>
@@ -10574,32 +11110,32 @@
                         <a:tabLst/>
                         <a:defRPr/>
                       </a:pPr>
+                      <a:endParaRPr lang="en-US" sz="1600" dirty="0"/>
+                    </a:p>
+                    <a:p>
+                      <a:pPr marL="0" marR="0" lvl="0" indent="0" algn="l" defTabSz="914400" rtl="0" eaLnBrk="1" fontAlgn="auto" latinLnBrk="0" hangingPunct="1">
+                        <a:lnSpc>
+                          <a:spcPct val="100000"/>
+                        </a:lnSpc>
+                        <a:spcBef>
+                          <a:spcPts val="0"/>
+                        </a:spcBef>
+                        <a:spcAft>
+                          <a:spcPts val="0"/>
+                        </a:spcAft>
+                        <a:buClrTx/>
+                        <a:buSzTx/>
+                        <a:buFontTx/>
+                        <a:buNone/>
+                        <a:tabLst/>
+                        <a:defRPr/>
+                      </a:pPr>
+                      <a:r>
+                        <a:rPr lang="en-US" sz="1600" dirty="0"/>
+                        <a:t>under explore tap: </a:t>
+                      </a:r>
                       <a:endParaRPr lang="en-SG" sz="1600" dirty="0"/>
                     </a:p>
-                  </a:txBody>
-                  <a:tcPr/>
-                </a:tc>
-                <a:extLst>
-                  <a:ext uri="{0D108BD9-81ED-4DB2-BD59-A6C34878D82A}">
-                    <a16:rowId xmlns:a16="http://schemas.microsoft.com/office/drawing/2014/main" val="2021552113"/>
-                  </a:ext>
-                </a:extLst>
-              </a:tr>
-              <a:tr h="370840">
-                <a:tc>
-                  <a:txBody>
-                    <a:bodyPr/>
-                    <a:lstStyle/>
-                    <a:p>
-                      <a:endParaRPr lang="en-SG" sz="1600"/>
-                    </a:p>
-                  </a:txBody>
-                  <a:tcPr/>
-                </a:tc>
-                <a:tc>
-                  <a:txBody>
-                    <a:bodyPr/>
-                    <a:lstStyle/>
                     <a:p>
                       <a:endParaRPr lang="en-SG" sz="1600" dirty="0"/>
                     </a:p>
@@ -10611,6 +11147,106 @@
                     <a:bodyPr/>
                     <a:lstStyle/>
                     <a:p>
+                      <a:pPr marL="0" marR="0" lvl="0" indent="0" algn="l" defTabSz="914400" rtl="0" eaLnBrk="1" fontAlgn="auto" latinLnBrk="0" hangingPunct="1">
+                        <a:lnSpc>
+                          <a:spcPct val="100000"/>
+                        </a:lnSpc>
+                        <a:spcBef>
+                          <a:spcPts val="0"/>
+                        </a:spcBef>
+                        <a:spcAft>
+                          <a:spcPts val="0"/>
+                        </a:spcAft>
+                        <a:buClrTx/>
+                        <a:buSzTx/>
+                        <a:buFontTx/>
+                        <a:buNone/>
+                        <a:tabLst/>
+                        <a:defRPr/>
+                      </a:pPr>
+                      <a:r>
+                        <a:rPr lang="en-US" sz="1600" strike="noStrike" dirty="0"/>
+                        <a:t>Search nap bar scroll down </a:t>
+                      </a:r>
+                      <a:endParaRPr lang="en-SG" sz="1600" strike="noStrike" dirty="0"/>
+                    </a:p>
+                    <a:p>
+                      <a:r>
+                        <a:rPr lang="en-US" sz="1600" dirty="0"/>
+                        <a:t>Navbar: insert as drop down list x </a:t>
+                      </a:r>
+                    </a:p>
+                    <a:p>
+                      <a:pPr marL="0" marR="0" lvl="0" indent="0" algn="l" defTabSz="914400" rtl="0" eaLnBrk="1" fontAlgn="auto" latinLnBrk="0" hangingPunct="1">
+                        <a:lnSpc>
+                          <a:spcPct val="100000"/>
+                        </a:lnSpc>
+                        <a:spcBef>
+                          <a:spcPts val="0"/>
+                        </a:spcBef>
+                        <a:spcAft>
+                          <a:spcPts val="0"/>
+                        </a:spcAft>
+                        <a:buClrTx/>
+                        <a:buSzTx/>
+                        <a:buFontTx/>
+                        <a:buNone/>
+                        <a:tabLst/>
+                        <a:defRPr/>
+                      </a:pPr>
+                      <a:r>
+                        <a:rPr lang="en-US" sz="1600" dirty="0"/>
+                        <a:t>- radio button to </a:t>
+                      </a:r>
+                      <a:r>
+                        <a:rPr lang="en-SG" sz="1800" b="0" i="0" kern="1200" dirty="0">
+                          <a:solidFill>
+                            <a:schemeClr val="dk1"/>
+                          </a:solidFill>
+                          <a:effectLst/>
+                          <a:latin typeface="+mn-lt"/>
+                          <a:ea typeface="+mn-ea"/>
+                          <a:cs typeface="+mn-cs"/>
+                        </a:rPr>
+                        <a:t>Toggle Search Results:</a:t>
+                      </a:r>
+                      <a:endParaRPr lang="en-US" sz="1600" dirty="0"/>
+                    </a:p>
+                    <a:p>
+                      <a:r>
+                        <a:rPr lang="en-US" sz="1600" dirty="0"/>
+                        <a:t>choose by region  // </a:t>
+                      </a:r>
+                    </a:p>
+                    <a:p>
+                      <a:r>
+                        <a:rPr lang="en-US" sz="1600" dirty="0"/>
+                        <a:t>Check the radius by 500 meters (show parameter of nearby)</a:t>
+                      </a:r>
+                    </a:p>
+                    <a:p>
+                      <a:r>
+                        <a:rPr lang="en-US" sz="1600" dirty="0"/>
+                        <a:t>- Mapped the selected secret spots (insert photo) display on the map – put in separate file for this and future edition</a:t>
+                      </a:r>
+                    </a:p>
+                    <a:p>
+                      <a:r>
+                        <a:rPr lang="en-US" sz="1600" dirty="0"/>
+                        <a:t>Include on the checkbox for selection</a:t>
+                      </a:r>
+                    </a:p>
+                    <a:p>
+                      <a:r>
+                        <a:rPr lang="en-US" sz="1600" dirty="0"/>
+                        <a:t>(indoor famous spots</a:t>
+                      </a:r>
+                    </a:p>
+                    <a:p>
+                      <a:r>
+                        <a:rPr lang="en-US" sz="1600" dirty="0"/>
+                        <a:t>Outdoor famous spots)</a:t>
+                      </a:r>
                       <a:endParaRPr lang="en-SG" sz="1600" dirty="0"/>
                     </a:p>
                   </a:txBody>
@@ -10621,100 +11257,28 @@
                     <a:bodyPr/>
                     <a:lstStyle/>
                     <a:p>
-                      <a:endParaRPr lang="en-SG" sz="1600" dirty="0"/>
-                    </a:p>
-                  </a:txBody>
-                  <a:tcPr/>
-                </a:tc>
-                <a:extLst>
-                  <a:ext uri="{0D108BD9-81ED-4DB2-BD59-A6C34878D82A}">
-                    <a16:rowId xmlns:a16="http://schemas.microsoft.com/office/drawing/2014/main" val="892559996"/>
-                  </a:ext>
-                </a:extLst>
-              </a:tr>
-              <a:tr h="370840">
-                <a:tc>
-                  <a:txBody>
-                    <a:bodyPr/>
-                    <a:lstStyle/>
-                    <a:p>
-                      <a:endParaRPr lang="en-SG" sz="1600"/>
-                    </a:p>
-                  </a:txBody>
-                  <a:tcPr/>
-                </a:tc>
-                <a:tc>
-                  <a:txBody>
-                    <a:bodyPr/>
-                    <a:lstStyle/>
-                    <a:p>
-                      <a:endParaRPr lang="en-SG" sz="1600" dirty="0"/>
-                    </a:p>
-                  </a:txBody>
-                  <a:tcPr/>
-                </a:tc>
-                <a:tc>
-                  <a:txBody>
-                    <a:bodyPr/>
-                    <a:lstStyle/>
-                    <a:p>
-                      <a:endParaRPr lang="en-SG" sz="1600" dirty="0"/>
-                    </a:p>
-                  </a:txBody>
-                  <a:tcPr/>
-                </a:tc>
-                <a:tc>
-                  <a:txBody>
-                    <a:bodyPr/>
-                    <a:lstStyle/>
-                    <a:p>
-                      <a:endParaRPr lang="en-SG" sz="1600" dirty="0"/>
-                    </a:p>
-                  </a:txBody>
-                  <a:tcPr/>
-                </a:tc>
-                <a:extLst>
-                  <a:ext uri="{0D108BD9-81ED-4DB2-BD59-A6C34878D82A}">
-                    <a16:rowId xmlns:a16="http://schemas.microsoft.com/office/drawing/2014/main" val="4053821403"/>
-                  </a:ext>
-                </a:extLst>
-              </a:tr>
-              <a:tr h="370840">
-                <a:tc>
-                  <a:txBody>
-                    <a:bodyPr/>
-                    <a:lstStyle/>
-                    <a:p>
-                      <a:endParaRPr lang="en-SG" sz="1600"/>
-                    </a:p>
-                  </a:txBody>
-                  <a:tcPr/>
-                </a:tc>
-                <a:tc>
-                  <a:txBody>
-                    <a:bodyPr/>
-                    <a:lstStyle/>
-                    <a:p>
-                      <a:endParaRPr lang="en-SG" sz="1600" dirty="0"/>
-                    </a:p>
-                  </a:txBody>
-                  <a:tcPr/>
-                </a:tc>
-                <a:tc>
-                  <a:txBody>
-                    <a:bodyPr/>
-                    <a:lstStyle/>
-                    <a:p>
-                      <a:endParaRPr lang="en-US" sz="1600" dirty="0"/>
-                    </a:p>
-                  </a:txBody>
-                  <a:tcPr/>
-                </a:tc>
-                <a:tc>
-                  <a:txBody>
-                    <a:bodyPr/>
-                    <a:lstStyle/>
-                    <a:p>
+                      <a:r>
+                        <a:rPr lang="en-US" sz="1600" dirty="0"/>
+                        <a:t>Select: </a:t>
+                      </a:r>
+                    </a:p>
+                    <a:p>
+                      <a:r>
+                        <a:rPr lang="en-US" sz="1600" dirty="0"/>
+                        <a:t>Indoor x </a:t>
+                      </a:r>
+                    </a:p>
+                    <a:p>
+                      <a:r>
+                        <a:rPr lang="en-US" sz="1600" dirty="0"/>
+                        <a:t>Outdoor nature x </a:t>
+                      </a:r>
+                    </a:p>
+                    <a:p>
+                      <a:r>
+                        <a:rPr lang="en-US" sz="1600" dirty="0"/>
+                        <a:t>Both **</a:t>
+                      </a:r>
                       <a:endParaRPr lang="en-SG" sz="1600" dirty="0"/>
                     </a:p>
                   </a:txBody>
@@ -10723,100 +11287,6 @@
                 <a:extLst>
                   <a:ext uri="{0D108BD9-81ED-4DB2-BD59-A6C34878D82A}">
                     <a16:rowId xmlns:a16="http://schemas.microsoft.com/office/drawing/2014/main" val="390328045"/>
-                  </a:ext>
-                </a:extLst>
-              </a:tr>
-              <a:tr h="370840">
-                <a:tc>
-                  <a:txBody>
-                    <a:bodyPr/>
-                    <a:lstStyle/>
-                    <a:p>
-                      <a:endParaRPr lang="en-SG" sz="1600"/>
-                    </a:p>
-                  </a:txBody>
-                  <a:tcPr/>
-                </a:tc>
-                <a:tc>
-                  <a:txBody>
-                    <a:bodyPr/>
-                    <a:lstStyle/>
-                    <a:p>
-                      <a:endParaRPr lang="en-SG" sz="1600"/>
-                    </a:p>
-                  </a:txBody>
-                  <a:tcPr/>
-                </a:tc>
-                <a:tc>
-                  <a:txBody>
-                    <a:bodyPr/>
-                    <a:lstStyle/>
-                    <a:p>
-                      <a:endParaRPr lang="en-SG" sz="1600" dirty="0"/>
-                    </a:p>
-                  </a:txBody>
-                  <a:tcPr/>
-                </a:tc>
-                <a:tc>
-                  <a:txBody>
-                    <a:bodyPr/>
-                    <a:lstStyle/>
-                    <a:p>
-                      <a:endParaRPr lang="en-SG" sz="1600" dirty="0"/>
-                    </a:p>
-                  </a:txBody>
-                  <a:tcPr/>
-                </a:tc>
-                <a:extLst>
-                  <a:ext uri="{0D108BD9-81ED-4DB2-BD59-A6C34878D82A}">
-                    <a16:rowId xmlns:a16="http://schemas.microsoft.com/office/drawing/2014/main" val="1708857485"/>
-                  </a:ext>
-                </a:extLst>
-              </a:tr>
-              <a:tr h="370840">
-                <a:tc>
-                  <a:txBody>
-                    <a:bodyPr/>
-                    <a:lstStyle/>
-                    <a:p>
-                      <a:endParaRPr lang="en-SG" sz="1600"/>
-                    </a:p>
-                  </a:txBody>
-                  <a:tcPr/>
-                </a:tc>
-                <a:tc>
-                  <a:txBody>
-                    <a:bodyPr/>
-                    <a:lstStyle/>
-                    <a:p>
-                      <a:endParaRPr lang="en-SG" sz="1600"/>
-                    </a:p>
-                  </a:txBody>
-                  <a:tcPr/>
-                </a:tc>
-                <a:tc>
-                  <a:txBody>
-                    <a:bodyPr/>
-                    <a:lstStyle/>
-                    <a:p>
-                      <a:endParaRPr lang="en-SG" sz="1600" dirty="0"/>
-                    </a:p>
-                  </a:txBody>
-                  <a:tcPr/>
-                </a:tc>
-                <a:tc>
-                  <a:txBody>
-                    <a:bodyPr/>
-                    <a:lstStyle/>
-                    <a:p>
-                      <a:endParaRPr lang="en-SG" sz="1600" dirty="0"/>
-                    </a:p>
-                  </a:txBody>
-                  <a:tcPr/>
-                </a:tc>
-                <a:extLst>
-                  <a:ext uri="{0D108BD9-81ED-4DB2-BD59-A6C34878D82A}">
-                    <a16:rowId xmlns:a16="http://schemas.microsoft.com/office/drawing/2014/main" val="1480457366"/>
                   </a:ext>
                 </a:extLst>
               </a:tr>
@@ -10827,7 +11297,7 @@
     </p:spTree>
     <p:extLst>
       <p:ext uri="{BB962C8B-B14F-4D97-AF65-F5344CB8AC3E}">
-        <p14:creationId xmlns:p14="http://schemas.microsoft.com/office/powerpoint/2010/main" val="440554776"/>
+        <p14:creationId xmlns:p14="http://schemas.microsoft.com/office/powerpoint/2010/main" val="917666995"/>
       </p:ext>
     </p:extLst>
   </p:cSld>

</xml_diff>

<commit_message>
set html for Toggle search & recommendation
</commit_message>
<xml_diff>
--- a/wireframe.pptx
+++ b/wireframe.pptx
@@ -236,7 +236,7 @@
           <a:p>
             <a:fld id="{32064421-C73C-417F-B8BA-758EB1A55C3F}" type="datetimeFigureOut">
               <a:rPr lang="en-SG" smtClean="0"/>
-              <a:t>15/9/2021</a:t>
+              <a:t>18/9/2021</a:t>
             </a:fld>
             <a:endParaRPr lang="en-SG"/>
           </a:p>
@@ -821,7 +821,7 @@
           <a:p>
             <a:fld id="{5B3D8EE2-B186-4E74-82A5-3FDCBC0BCA47}" type="datetimeFigureOut">
               <a:rPr lang="en-SG" smtClean="0"/>
-              <a:t>15/9/2021</a:t>
+              <a:t>18/9/2021</a:t>
             </a:fld>
             <a:endParaRPr lang="en-SG"/>
           </a:p>
@@ -1021,7 +1021,7 @@
           <a:p>
             <a:fld id="{5B3D8EE2-B186-4E74-82A5-3FDCBC0BCA47}" type="datetimeFigureOut">
               <a:rPr lang="en-SG" smtClean="0"/>
-              <a:t>15/9/2021</a:t>
+              <a:t>18/9/2021</a:t>
             </a:fld>
             <a:endParaRPr lang="en-SG"/>
           </a:p>
@@ -1231,7 +1231,7 @@
           <a:p>
             <a:fld id="{5B3D8EE2-B186-4E74-82A5-3FDCBC0BCA47}" type="datetimeFigureOut">
               <a:rPr lang="en-SG" smtClean="0"/>
-              <a:t>15/9/2021</a:t>
+              <a:t>18/9/2021</a:t>
             </a:fld>
             <a:endParaRPr lang="en-SG"/>
           </a:p>
@@ -1431,7 +1431,7 @@
           <a:p>
             <a:fld id="{5B3D8EE2-B186-4E74-82A5-3FDCBC0BCA47}" type="datetimeFigureOut">
               <a:rPr lang="en-SG" smtClean="0"/>
-              <a:t>15/9/2021</a:t>
+              <a:t>18/9/2021</a:t>
             </a:fld>
             <a:endParaRPr lang="en-SG"/>
           </a:p>
@@ -1707,7 +1707,7 @@
           <a:p>
             <a:fld id="{5B3D8EE2-B186-4E74-82A5-3FDCBC0BCA47}" type="datetimeFigureOut">
               <a:rPr lang="en-SG" smtClean="0"/>
-              <a:t>15/9/2021</a:t>
+              <a:t>18/9/2021</a:t>
             </a:fld>
             <a:endParaRPr lang="en-SG"/>
           </a:p>
@@ -1975,7 +1975,7 @@
           <a:p>
             <a:fld id="{5B3D8EE2-B186-4E74-82A5-3FDCBC0BCA47}" type="datetimeFigureOut">
               <a:rPr lang="en-SG" smtClean="0"/>
-              <a:t>15/9/2021</a:t>
+              <a:t>18/9/2021</a:t>
             </a:fld>
             <a:endParaRPr lang="en-SG"/>
           </a:p>
@@ -2390,7 +2390,7 @@
           <a:p>
             <a:fld id="{5B3D8EE2-B186-4E74-82A5-3FDCBC0BCA47}" type="datetimeFigureOut">
               <a:rPr lang="en-SG" smtClean="0"/>
-              <a:t>15/9/2021</a:t>
+              <a:t>18/9/2021</a:t>
             </a:fld>
             <a:endParaRPr lang="en-SG"/>
           </a:p>
@@ -2532,7 +2532,7 @@
           <a:p>
             <a:fld id="{5B3D8EE2-B186-4E74-82A5-3FDCBC0BCA47}" type="datetimeFigureOut">
               <a:rPr lang="en-SG" smtClean="0"/>
-              <a:t>15/9/2021</a:t>
+              <a:t>18/9/2021</a:t>
             </a:fld>
             <a:endParaRPr lang="en-SG"/>
           </a:p>
@@ -2645,7 +2645,7 @@
           <a:p>
             <a:fld id="{5B3D8EE2-B186-4E74-82A5-3FDCBC0BCA47}" type="datetimeFigureOut">
               <a:rPr lang="en-SG" smtClean="0"/>
-              <a:t>15/9/2021</a:t>
+              <a:t>18/9/2021</a:t>
             </a:fld>
             <a:endParaRPr lang="en-SG"/>
           </a:p>
@@ -2958,7 +2958,7 @@
           <a:p>
             <a:fld id="{5B3D8EE2-B186-4E74-82A5-3FDCBC0BCA47}" type="datetimeFigureOut">
               <a:rPr lang="en-SG" smtClean="0"/>
-              <a:t>15/9/2021</a:t>
+              <a:t>18/9/2021</a:t>
             </a:fld>
             <a:endParaRPr lang="en-SG"/>
           </a:p>
@@ -3247,7 +3247,7 @@
           <a:p>
             <a:fld id="{5B3D8EE2-B186-4E74-82A5-3FDCBC0BCA47}" type="datetimeFigureOut">
               <a:rPr lang="en-SG" smtClean="0"/>
-              <a:t>15/9/2021</a:t>
+              <a:t>18/9/2021</a:t>
             </a:fld>
             <a:endParaRPr lang="en-SG"/>
           </a:p>
@@ -3490,7 +3490,7 @@
           <a:p>
             <a:fld id="{5B3D8EE2-B186-4E74-82A5-3FDCBC0BCA47}" type="datetimeFigureOut">
               <a:rPr lang="en-SG" smtClean="0"/>
-              <a:t>15/9/2021</a:t>
+              <a:t>18/9/2021</a:t>
             </a:fld>
             <a:endParaRPr lang="en-SG"/>
           </a:p>
@@ -8698,7 +8698,7 @@
           <a:p>
             <a:r>
               <a:rPr lang="en-US" dirty="0"/>
-              <a:t>Toggle view: </a:t>
+              <a:t>Toggle view by: </a:t>
             </a:r>
           </a:p>
           <a:p>
@@ -8708,7 +8708,7 @@
             </a:pPr>
             <a:r>
               <a:rPr lang="en-US" dirty="0"/>
-              <a:t>by region</a:t>
+              <a:t>By region</a:t>
             </a:r>
           </a:p>
           <a:p>
@@ -10942,14 +10942,14 @@
           <p:nvPr>
             <p:extLst>
               <p:ext uri="{D42A27DB-BD31-4B8C-83A1-F6EECF244321}">
-                <p14:modId xmlns:p14="http://schemas.microsoft.com/office/powerpoint/2010/main" val="2119929682"/>
+                <p14:modId xmlns:p14="http://schemas.microsoft.com/office/powerpoint/2010/main" val="4248538452"/>
               </p:ext>
             </p:extLst>
           </p:nvPr>
         </p:nvGraphicFramePr>
         <p:xfrm>
           <a:off x="238539" y="149163"/>
-          <a:ext cx="11728175" cy="3413760"/>
+          <a:ext cx="11728175" cy="4206240"/>
         </p:xfrm>
         <a:graphic>
           <a:graphicData uri="http://schemas.openxmlformats.org/drawingml/2006/table">
@@ -10972,14 +10972,14 @@
                     </a:ext>
                   </a:extLst>
                 </a:gridCol>
-                <a:gridCol w="3727704">
+                <a:gridCol w="4586611">
                   <a:extLst>
                     <a:ext uri="{9D8B030D-6E8A-4147-A177-3AD203B41FA5}">
                       <a16:colId xmlns:a16="http://schemas.microsoft.com/office/drawing/2014/main" val="3641419838"/>
                     </a:ext>
                   </a:extLst>
                 </a:gridCol>
-                <a:gridCol w="5034171">
+                <a:gridCol w="4175264">
                   <a:extLst>
                     <a:ext uri="{9D8B030D-6E8A-4147-A177-3AD203B41FA5}">
                       <a16:colId xmlns:a16="http://schemas.microsoft.com/office/drawing/2014/main" val="4284585333"/>
@@ -11132,7 +11132,19 @@
                       </a:pPr>
                       <a:r>
                         <a:rPr lang="en-US" sz="1600" dirty="0"/>
-                        <a:t>under explore tap: </a:t>
+                        <a:t>under </a:t>
+                      </a:r>
+                      <a:r>
+                        <a:rPr lang="en-US" sz="1600" u="sng" dirty="0">
+                          <a:highlight>
+                            <a:srgbClr val="FFFF00"/>
+                          </a:highlight>
+                        </a:rPr>
+                        <a:t>explore</a:t>
+                      </a:r>
+                      <a:r>
+                        <a:rPr lang="en-US" sz="1600" dirty="0"/>
+                        <a:t> tap: </a:t>
                       </a:r>
                       <a:endParaRPr lang="en-SG" sz="1600" dirty="0"/>
                     </a:p>
@@ -11173,7 +11185,7 @@
                     <a:p>
                       <a:r>
                         <a:rPr lang="en-US" sz="1600" dirty="0"/>
-                        <a:t>Navbar: insert as drop down list x </a:t>
+                        <a:t>X Navbar: insert as drop down list </a:t>
                       </a:r>
                     </a:p>
                     <a:p>
@@ -11196,7 +11208,7 @@
                       </a:pPr>
                       <a:r>
                         <a:rPr lang="en-US" sz="1600" dirty="0"/>
-                        <a:t>- radio button to </a:t>
+                        <a:t>X - radio button to </a:t>
                       </a:r>
                       <a:r>
                         <a:rPr lang="en-SG" sz="1800" b="0" i="0" kern="1200" dirty="0">
@@ -11222,6 +11234,72 @@
                       <a:r>
                         <a:rPr lang="en-US" sz="1600" dirty="0"/>
                         <a:t>Check the radius by 500 meters (show parameter of nearby)</a:t>
+                      </a:r>
+                    </a:p>
+                    <a:p>
+                      <a:pPr marL="0" marR="0" lvl="0" indent="0" algn="l" defTabSz="914400" rtl="0" eaLnBrk="1" fontAlgn="auto" latinLnBrk="0" hangingPunct="1">
+                        <a:lnSpc>
+                          <a:spcPct val="100000"/>
+                        </a:lnSpc>
+                        <a:spcBef>
+                          <a:spcPts val="0"/>
+                        </a:spcBef>
+                        <a:spcAft>
+                          <a:spcPts val="0"/>
+                        </a:spcAft>
+                        <a:buClrTx/>
+                        <a:buSzTx/>
+                        <a:buFontTx/>
+                        <a:buNone/>
+                        <a:tabLst/>
+                        <a:defRPr/>
+                      </a:pPr>
+                      <a:r>
+                        <a:rPr lang="en-US" sz="1600" dirty="0"/>
+                        <a:t>- Add event listening to </a:t>
+                      </a:r>
+                      <a:r>
+                        <a:rPr lang="en-SG" sz="1800" b="0" kern="1200" dirty="0">
+                          <a:solidFill>
+                            <a:schemeClr val="dk1"/>
+                          </a:solidFill>
+                          <a:effectLst/>
+                          <a:latin typeface="+mn-lt"/>
+                          <a:ea typeface="+mn-ea"/>
+                          <a:cs typeface="+mn-cs"/>
+                        </a:rPr>
+                        <a:t>id="</a:t>
+                      </a:r>
+                      <a:r>
+                        <a:rPr lang="en-SG" sz="1800" b="0" kern="1200" dirty="0" err="1">
+                          <a:solidFill>
+                            <a:schemeClr val="dk1"/>
+                          </a:solidFill>
+                          <a:effectLst/>
+                          <a:latin typeface="+mn-lt"/>
+                          <a:ea typeface="+mn-ea"/>
+                          <a:cs typeface="+mn-cs"/>
+                        </a:rPr>
+                        <a:t>navbarDropdown</a:t>
+                      </a:r>
+                      <a:r>
+                        <a:rPr lang="en-SG" sz="1800" b="0" kern="1200" dirty="0">
+                          <a:solidFill>
+                            <a:schemeClr val="dk1"/>
+                          </a:solidFill>
+                          <a:effectLst/>
+                          <a:latin typeface="+mn-lt"/>
+                          <a:ea typeface="+mn-ea"/>
+                          <a:cs typeface="+mn-cs"/>
+                        </a:rPr>
+                        <a:t>” &gt;&gt; make the toggle search div appear</a:t>
+                      </a:r>
+                      <a:endParaRPr lang="en-US" sz="1600" dirty="0"/>
+                    </a:p>
+                    <a:p>
+                      <a:r>
+                        <a:rPr lang="en-US" sz="1600" dirty="0"/>
+                        <a:t>- setup region and radius</a:t>
                       </a:r>
                     </a:p>
                     <a:p>

</xml_diff>

<commit_message>
remove display none for explore tap, remain display when click
</commit_message>
<xml_diff>
--- a/wireframe.pptx
+++ b/wireframe.pptx
@@ -10942,7 +10942,7 @@
           <p:nvPr>
             <p:extLst>
               <p:ext uri="{D42A27DB-BD31-4B8C-83A1-F6EECF244321}">
-                <p14:modId xmlns:p14="http://schemas.microsoft.com/office/powerpoint/2010/main" val="4248538452"/>
+                <p14:modId xmlns:p14="http://schemas.microsoft.com/office/powerpoint/2010/main" val="4237190681"/>
               </p:ext>
             </p:extLst>
           </p:nvPr>
@@ -11256,7 +11256,7 @@
                       </a:pPr>
                       <a:r>
                         <a:rPr lang="en-US" sz="1600" dirty="0"/>
-                        <a:t>- Add event listening to </a:t>
+                        <a:t>X - Add event listening to </a:t>
                       </a:r>
                       <a:r>
                         <a:rPr lang="en-SG" sz="1800" b="0" kern="1200" dirty="0">

</xml_diff>

<commit_message>
add clear result button and styling
</commit_message>
<xml_diff>
--- a/wireframe.pptx
+++ b/wireframe.pptx
@@ -10942,14 +10942,14 @@
           <p:nvPr>
             <p:extLst>
               <p:ext uri="{D42A27DB-BD31-4B8C-83A1-F6EECF244321}">
-                <p14:modId xmlns:p14="http://schemas.microsoft.com/office/powerpoint/2010/main" val="4237190681"/>
+                <p14:modId xmlns:p14="http://schemas.microsoft.com/office/powerpoint/2010/main" val="3813016310"/>
               </p:ext>
             </p:extLst>
           </p:nvPr>
         </p:nvGraphicFramePr>
         <p:xfrm>
           <a:off x="238539" y="149163"/>
-          <a:ext cx="11728175" cy="4206240"/>
+          <a:ext cx="11728175" cy="4480560"/>
         </p:xfrm>
         <a:graphic>
           <a:graphicData uri="http://schemas.openxmlformats.org/drawingml/2006/table">
@@ -11293,6 +11293,37 @@
                           <a:cs typeface="+mn-cs"/>
                         </a:rPr>
                         <a:t>” &gt;&gt; make the toggle search div appear</a:t>
+                      </a:r>
+                    </a:p>
+                    <a:p>
+                      <a:pPr marL="0" marR="0" lvl="0" indent="0" algn="l" defTabSz="914400" rtl="0" eaLnBrk="1" fontAlgn="auto" latinLnBrk="0" hangingPunct="1">
+                        <a:lnSpc>
+                          <a:spcPct val="100000"/>
+                        </a:lnSpc>
+                        <a:spcBef>
+                          <a:spcPts val="0"/>
+                        </a:spcBef>
+                        <a:spcAft>
+                          <a:spcPts val="0"/>
+                        </a:spcAft>
+                        <a:buClrTx/>
+                        <a:buSzTx/>
+                        <a:buFontTx/>
+                        <a:buNone/>
+                        <a:tabLst/>
+                        <a:defRPr/>
+                      </a:pPr>
+                      <a:r>
+                        <a:rPr lang="en-SG" sz="1800" b="0" kern="1200" dirty="0">
+                          <a:solidFill>
+                            <a:schemeClr val="dk1"/>
+                          </a:solidFill>
+                          <a:effectLst/>
+                          <a:latin typeface="+mn-lt"/>
+                          <a:ea typeface="+mn-ea"/>
+                          <a:cs typeface="+mn-cs"/>
+                        </a:rPr>
+                        <a:t>X – add clear result button</a:t>
                       </a:r>
                       <a:endParaRPr lang="en-US" sz="1600" dirty="0"/>
                     </a:p>

</xml_diff>

<commit_message>
setup scroll down bar for search result display div
</commit_message>
<xml_diff>
--- a/wireframe.pptx
+++ b/wireframe.pptx
@@ -10942,14 +10942,14 @@
           <p:nvPr>
             <p:extLst>
               <p:ext uri="{D42A27DB-BD31-4B8C-83A1-F6EECF244321}">
-                <p14:modId xmlns:p14="http://schemas.microsoft.com/office/powerpoint/2010/main" val="3813016310"/>
+                <p14:modId xmlns:p14="http://schemas.microsoft.com/office/powerpoint/2010/main" val="2545915150"/>
               </p:ext>
             </p:extLst>
           </p:nvPr>
         </p:nvGraphicFramePr>
         <p:xfrm>
           <a:off x="238539" y="149163"/>
-          <a:ext cx="11728175" cy="4480560"/>
+          <a:ext cx="11728175" cy="4236720"/>
         </p:xfrm>
         <a:graphic>
           <a:graphicData uri="http://schemas.openxmlformats.org/drawingml/2006/table">
@@ -11178,7 +11178,7 @@
                       </a:pPr>
                       <a:r>
                         <a:rPr lang="en-US" sz="1600" strike="noStrike" dirty="0"/>
-                        <a:t>Search nap bar scroll down </a:t>
+                        <a:t>X Search nap bar scroll down </a:t>
                       </a:r>
                       <a:endParaRPr lang="en-SG" sz="1600" strike="noStrike" dirty="0"/>
                     </a:p>
@@ -11227,33 +11227,10 @@
                     <a:p>
                       <a:r>
                         <a:rPr lang="en-US" sz="1600" dirty="0"/>
-                        <a:t>choose by region  // </a:t>
+                        <a:t>choose by region  // 500 meters radius</a:t>
                       </a:r>
                     </a:p>
                     <a:p>
-                      <a:r>
-                        <a:rPr lang="en-US" sz="1600" dirty="0"/>
-                        <a:t>Check the radius by 500 meters (show parameter of nearby)</a:t>
-                      </a:r>
-                    </a:p>
-                    <a:p>
-                      <a:pPr marL="0" marR="0" lvl="0" indent="0" algn="l" defTabSz="914400" rtl="0" eaLnBrk="1" fontAlgn="auto" latinLnBrk="0" hangingPunct="1">
-                        <a:lnSpc>
-                          <a:spcPct val="100000"/>
-                        </a:lnSpc>
-                        <a:spcBef>
-                          <a:spcPts val="0"/>
-                        </a:spcBef>
-                        <a:spcAft>
-                          <a:spcPts val="0"/>
-                        </a:spcAft>
-                        <a:buClrTx/>
-                        <a:buSzTx/>
-                        <a:buFontTx/>
-                        <a:buNone/>
-                        <a:tabLst/>
-                        <a:defRPr/>
-                      </a:pPr>
                       <a:r>
                         <a:rPr lang="en-US" sz="1600" dirty="0"/>
                         <a:t>X - Add event listening to </a:t>
@@ -11328,9 +11305,23 @@
                       <a:endParaRPr lang="en-US" sz="1600" dirty="0"/>
                     </a:p>
                     <a:p>
+                      <a:pPr marL="285750" indent="-285750">
+                        <a:buFontTx/>
+                        <a:buChar char="-"/>
+                      </a:pPr>
                       <a:r>
                         <a:rPr lang="en-US" sz="1600" dirty="0"/>
-                        <a:t>- setup region and radius</a:t>
+                        <a:t>setup region search </a:t>
+                      </a:r>
+                    </a:p>
+                    <a:p>
+                      <a:pPr marL="285750" indent="-285750">
+                        <a:buFontTx/>
+                        <a:buChar char="-"/>
+                      </a:pPr>
+                      <a:r>
+                        <a:rPr lang="en-US" sz="1600" dirty="0"/>
+                        <a:t>setup radius search</a:t>
                       </a:r>
                     </a:p>
                     <a:p>

</xml_diff>

<commit_message>
setup radius search (take current selected location as reference)
</commit_message>
<xml_diff>
--- a/wireframe.pptx
+++ b/wireframe.pptx
@@ -10942,14 +10942,14 @@
           <p:nvPr>
             <p:extLst>
               <p:ext uri="{D42A27DB-BD31-4B8C-83A1-F6EECF244321}">
-                <p14:modId xmlns:p14="http://schemas.microsoft.com/office/powerpoint/2010/main" val="2545915150"/>
+                <p14:modId xmlns:p14="http://schemas.microsoft.com/office/powerpoint/2010/main" val="1559495904"/>
               </p:ext>
             </p:extLst>
           </p:nvPr>
         </p:nvGraphicFramePr>
         <p:xfrm>
           <a:off x="238539" y="149163"/>
-          <a:ext cx="11728175" cy="4236720"/>
+          <a:ext cx="11728175" cy="4480560"/>
         </p:xfrm>
         <a:graphic>
           <a:graphicData uri="http://schemas.openxmlformats.org/drawingml/2006/table">
@@ -11315,13 +11315,13 @@
                       </a:r>
                     </a:p>
                     <a:p>
-                      <a:pPr marL="285750" indent="-285750">
+                      <a:pPr marL="0" indent="0">
                         <a:buFontTx/>
-                        <a:buChar char="-"/>
+                        <a:buNone/>
                       </a:pPr>
                       <a:r>
                         <a:rPr lang="en-US" sz="1600" dirty="0"/>
-                        <a:t>setup radius search</a:t>
+                        <a:t>X - setup radius search (with take current selected location as reference)</a:t>
                       </a:r>
                     </a:p>
                     <a:p>

</xml_diff>

<commit_message>
create class for common attribute from multiple data sources with different data structure and code refactoring for display results
</commit_message>
<xml_diff>
--- a/wireframe.pptx
+++ b/wireframe.pptx
@@ -236,7 +236,7 @@
           <a:p>
             <a:fld id="{32064421-C73C-417F-B8BA-758EB1A55C3F}" type="datetimeFigureOut">
               <a:rPr lang="en-SG" smtClean="0"/>
-              <a:t>18/9/2021</a:t>
+              <a:t>19/9/2021</a:t>
             </a:fld>
             <a:endParaRPr lang="en-SG"/>
           </a:p>
@@ -821,7 +821,7 @@
           <a:p>
             <a:fld id="{5B3D8EE2-B186-4E74-82A5-3FDCBC0BCA47}" type="datetimeFigureOut">
               <a:rPr lang="en-SG" smtClean="0"/>
-              <a:t>18/9/2021</a:t>
+              <a:t>19/9/2021</a:t>
             </a:fld>
             <a:endParaRPr lang="en-SG"/>
           </a:p>
@@ -1021,7 +1021,7 @@
           <a:p>
             <a:fld id="{5B3D8EE2-B186-4E74-82A5-3FDCBC0BCA47}" type="datetimeFigureOut">
               <a:rPr lang="en-SG" smtClean="0"/>
-              <a:t>18/9/2021</a:t>
+              <a:t>19/9/2021</a:t>
             </a:fld>
             <a:endParaRPr lang="en-SG"/>
           </a:p>
@@ -1231,7 +1231,7 @@
           <a:p>
             <a:fld id="{5B3D8EE2-B186-4E74-82A5-3FDCBC0BCA47}" type="datetimeFigureOut">
               <a:rPr lang="en-SG" smtClean="0"/>
-              <a:t>18/9/2021</a:t>
+              <a:t>19/9/2021</a:t>
             </a:fld>
             <a:endParaRPr lang="en-SG"/>
           </a:p>
@@ -1431,7 +1431,7 @@
           <a:p>
             <a:fld id="{5B3D8EE2-B186-4E74-82A5-3FDCBC0BCA47}" type="datetimeFigureOut">
               <a:rPr lang="en-SG" smtClean="0"/>
-              <a:t>18/9/2021</a:t>
+              <a:t>19/9/2021</a:t>
             </a:fld>
             <a:endParaRPr lang="en-SG"/>
           </a:p>
@@ -1707,7 +1707,7 @@
           <a:p>
             <a:fld id="{5B3D8EE2-B186-4E74-82A5-3FDCBC0BCA47}" type="datetimeFigureOut">
               <a:rPr lang="en-SG" smtClean="0"/>
-              <a:t>18/9/2021</a:t>
+              <a:t>19/9/2021</a:t>
             </a:fld>
             <a:endParaRPr lang="en-SG"/>
           </a:p>
@@ -1975,7 +1975,7 @@
           <a:p>
             <a:fld id="{5B3D8EE2-B186-4E74-82A5-3FDCBC0BCA47}" type="datetimeFigureOut">
               <a:rPr lang="en-SG" smtClean="0"/>
-              <a:t>18/9/2021</a:t>
+              <a:t>19/9/2021</a:t>
             </a:fld>
             <a:endParaRPr lang="en-SG"/>
           </a:p>
@@ -2390,7 +2390,7 @@
           <a:p>
             <a:fld id="{5B3D8EE2-B186-4E74-82A5-3FDCBC0BCA47}" type="datetimeFigureOut">
               <a:rPr lang="en-SG" smtClean="0"/>
-              <a:t>18/9/2021</a:t>
+              <a:t>19/9/2021</a:t>
             </a:fld>
             <a:endParaRPr lang="en-SG"/>
           </a:p>
@@ -2532,7 +2532,7 @@
           <a:p>
             <a:fld id="{5B3D8EE2-B186-4E74-82A5-3FDCBC0BCA47}" type="datetimeFigureOut">
               <a:rPr lang="en-SG" smtClean="0"/>
-              <a:t>18/9/2021</a:t>
+              <a:t>19/9/2021</a:t>
             </a:fld>
             <a:endParaRPr lang="en-SG"/>
           </a:p>
@@ -2645,7 +2645,7 @@
           <a:p>
             <a:fld id="{5B3D8EE2-B186-4E74-82A5-3FDCBC0BCA47}" type="datetimeFigureOut">
               <a:rPr lang="en-SG" smtClean="0"/>
-              <a:t>18/9/2021</a:t>
+              <a:t>19/9/2021</a:t>
             </a:fld>
             <a:endParaRPr lang="en-SG"/>
           </a:p>
@@ -2958,7 +2958,7 @@
           <a:p>
             <a:fld id="{5B3D8EE2-B186-4E74-82A5-3FDCBC0BCA47}" type="datetimeFigureOut">
               <a:rPr lang="en-SG" smtClean="0"/>
-              <a:t>18/9/2021</a:t>
+              <a:t>19/9/2021</a:t>
             </a:fld>
             <a:endParaRPr lang="en-SG"/>
           </a:p>
@@ -3247,7 +3247,7 @@
           <a:p>
             <a:fld id="{5B3D8EE2-B186-4E74-82A5-3FDCBC0BCA47}" type="datetimeFigureOut">
               <a:rPr lang="en-SG" smtClean="0"/>
-              <a:t>18/9/2021</a:t>
+              <a:t>19/9/2021</a:t>
             </a:fld>
             <a:endParaRPr lang="en-SG"/>
           </a:p>
@@ -3490,7 +3490,7 @@
           <a:p>
             <a:fld id="{5B3D8EE2-B186-4E74-82A5-3FDCBC0BCA47}" type="datetimeFigureOut">
               <a:rPr lang="en-SG" smtClean="0"/>
-              <a:t>18/9/2021</a:t>
+              <a:t>19/9/2021</a:t>
             </a:fld>
             <a:endParaRPr lang="en-SG"/>
           </a:p>
@@ -4388,7 +4388,7 @@
                     <a:bodyPr/>
                     <a:lstStyle/>
                     <a:p>
-                      <a:endParaRPr lang="en-SG" sz="1600"/>
+                      <a:endParaRPr lang="en-SG" sz="1600" dirty="0"/>
                     </a:p>
                   </a:txBody>
                   <a:tcPr/>
@@ -10942,14 +10942,14 @@
           <p:nvPr>
             <p:extLst>
               <p:ext uri="{D42A27DB-BD31-4B8C-83A1-F6EECF244321}">
-                <p14:modId xmlns:p14="http://schemas.microsoft.com/office/powerpoint/2010/main" val="1559495904"/>
+                <p14:modId xmlns:p14="http://schemas.microsoft.com/office/powerpoint/2010/main" val="380626881"/>
               </p:ext>
             </p:extLst>
           </p:nvPr>
         </p:nvGraphicFramePr>
         <p:xfrm>
           <a:off x="238539" y="149163"/>
-          <a:ext cx="11728175" cy="4480560"/>
+          <a:ext cx="11728175" cy="5059680"/>
         </p:xfrm>
         <a:graphic>
           <a:graphicData uri="http://schemas.openxmlformats.org/drawingml/2006/table">
@@ -11060,7 +11060,10 @@
                     <a:bodyPr/>
                     <a:lstStyle/>
                     <a:p>
-                      <a:endParaRPr lang="en-SG" sz="1600"/>
+                      <a:endParaRPr lang="en-US" sz="1600" dirty="0"/>
+                    </a:p>
+                    <a:p>
+                      <a:endParaRPr lang="en-US" sz="1600" dirty="0"/>
                     </a:p>
                   </a:txBody>
                   <a:tcPr/>
@@ -11387,6 +11390,61 @@
                 <a:extLst>
                   <a:ext uri="{0D108BD9-81ED-4DB2-BD59-A6C34878D82A}">
                     <a16:rowId xmlns:a16="http://schemas.microsoft.com/office/drawing/2014/main" val="390328045"/>
+                  </a:ext>
+                </a:extLst>
+              </a:tr>
+              <a:tr h="370840">
+                <a:tc>
+                  <a:txBody>
+                    <a:bodyPr/>
+                    <a:lstStyle/>
+                    <a:p>
+                      <a:endParaRPr lang="en-US" sz="1600" dirty="0"/>
+                    </a:p>
+                  </a:txBody>
+                  <a:tcPr/>
+                </a:tc>
+                <a:tc>
+                  <a:txBody>
+                    <a:bodyPr/>
+                    <a:lstStyle/>
+                    <a:p>
+                      <a:r>
+                        <a:rPr lang="en-US" sz="1600" dirty="0"/>
+                        <a:t>Next:</a:t>
+                      </a:r>
+                      <a:endParaRPr lang="en-SG" sz="1600" dirty="0"/>
+                    </a:p>
+                  </a:txBody>
+                  <a:tcPr/>
+                </a:tc>
+                <a:tc>
+                  <a:txBody>
+                    <a:bodyPr/>
+                    <a:lstStyle/>
+                    <a:p>
+                      <a:r>
+                        <a:rPr lang="en-US" sz="1600" dirty="0"/>
+                        <a:t>Add icon to differentiate marker for park and city location</a:t>
+                      </a:r>
+                      <a:endParaRPr lang="en-SG" sz="1600" dirty="0"/>
+                    </a:p>
+                  </a:txBody>
+                  <a:tcPr/>
+                </a:tc>
+                <a:tc>
+                  <a:txBody>
+                    <a:bodyPr/>
+                    <a:lstStyle/>
+                    <a:p>
+                      <a:endParaRPr lang="en-SG" sz="1600" dirty="0"/>
+                    </a:p>
+                  </a:txBody>
+                  <a:tcPr/>
+                </a:tc>
+                <a:extLst>
+                  <a:ext uri="{0D108BD9-81ED-4DB2-BD59-A6C34878D82A}">
+                    <a16:rowId xmlns:a16="http://schemas.microsoft.com/office/drawing/2014/main" val="2168085772"/>
                   </a:ext>
                 </a:extLst>
               </a:tr>

</xml_diff>

<commit_message>
separate UI for search form tab and explore tab, update styling
</commit_message>
<xml_diff>
--- a/wireframe.pptx
+++ b/wireframe.pptx
@@ -10283,14 +10283,14 @@
           <p:nvPr>
             <p:extLst>
               <p:ext uri="{D42A27DB-BD31-4B8C-83A1-F6EECF244321}">
-                <p14:modId xmlns:p14="http://schemas.microsoft.com/office/powerpoint/2010/main" val="2642465886"/>
+                <p14:modId xmlns:p14="http://schemas.microsoft.com/office/powerpoint/2010/main" val="1680923741"/>
               </p:ext>
             </p:extLst>
           </p:nvPr>
         </p:nvGraphicFramePr>
         <p:xfrm>
           <a:off x="238539" y="149163"/>
-          <a:ext cx="11728175" cy="4541520"/>
+          <a:ext cx="11728175" cy="4053840"/>
         </p:xfrm>
         <a:graphic>
           <a:graphicData uri="http://schemas.openxmlformats.org/drawingml/2006/table">
@@ -10857,30 +10857,17 @@
                       </a:r>
                     </a:p>
                     <a:p>
-                      <a:endParaRPr lang="en-US" sz="1600" dirty="0"/>
-                    </a:p>
-                    <a:p>
-                      <a:r>
-                        <a:rPr lang="en-US" sz="1600" dirty="0" err="1"/>
-                        <a:t>Todo</a:t>
-                      </a:r>
-                      <a:r>
-                        <a:rPr lang="en-US" sz="1600" dirty="0"/>
-                        <a:t>: </a:t>
-                      </a:r>
-                    </a:p>
-                    <a:p>
                       <a:r>
                         <a:rPr lang="en-US" sz="1600" dirty="0">
                           <a:solidFill>
-                            <a:srgbClr val="FF0000"/>
+                            <a:schemeClr val="tx1"/>
                           </a:solidFill>
                         </a:rPr>
-                        <a:t>Both – to display them into the same div (combine data) and sorted </a:t>
+                        <a:t>Both – display park and data into the same div (combine data) and sorted </a:t>
                       </a:r>
                       <a:endParaRPr lang="en-SG" sz="1600" dirty="0">
                         <a:solidFill>
-                          <a:srgbClr val="FF0000"/>
+                          <a:schemeClr val="tx1"/>
                         </a:solidFill>
                       </a:endParaRPr>
                     </a:p>
@@ -10942,14 +10929,14 @@
           <p:nvPr>
             <p:extLst>
               <p:ext uri="{D42A27DB-BD31-4B8C-83A1-F6EECF244321}">
-                <p14:modId xmlns:p14="http://schemas.microsoft.com/office/powerpoint/2010/main" val="380626881"/>
+                <p14:modId xmlns:p14="http://schemas.microsoft.com/office/powerpoint/2010/main" val="3315921597"/>
               </p:ext>
             </p:extLst>
           </p:nvPr>
         </p:nvGraphicFramePr>
         <p:xfrm>
           <a:off x="238539" y="149163"/>
-          <a:ext cx="11728175" cy="5059680"/>
+          <a:ext cx="11728175" cy="4815840"/>
         </p:xfrm>
         <a:graphic>
           <a:graphicData uri="http://schemas.openxmlformats.org/drawingml/2006/table">
@@ -11313,7 +11300,13 @@
                         <a:buChar char="-"/>
                       </a:pPr>
                       <a:r>
-                        <a:rPr lang="en-US" sz="1600" dirty="0"/>
+                        <a:rPr lang="en-US" sz="1600" dirty="0">
+                          <a:solidFill>
+                            <a:schemeClr val="accent6">
+                              <a:lumMod val="75000"/>
+                            </a:schemeClr>
+                          </a:solidFill>
+                        </a:rPr>
                         <a:t>setup region search </a:t>
                       </a:r>
                     </a:p>
@@ -11329,60 +11322,56 @@
                     </a:p>
                     <a:p>
                       <a:r>
-                        <a:rPr lang="en-US" sz="1600" dirty="0"/>
+                        <a:rPr lang="en-US" sz="1600" dirty="0">
+                          <a:solidFill>
+                            <a:schemeClr val="accent6">
+                              <a:lumMod val="75000"/>
+                            </a:schemeClr>
+                          </a:solidFill>
+                        </a:rPr>
                         <a:t>- Mapped the selected secret spots (insert photo) display on the map – put in separate file for this and future edition</a:t>
                       </a:r>
                     </a:p>
                     <a:p>
                       <a:r>
                         <a:rPr lang="en-US" sz="1600" dirty="0"/>
-                        <a:t>Include on the checkbox for selection</a:t>
+                        <a:t>X -Include on the checkbox for selection (indoor famous spots  // Outdoor famous spots)</a:t>
                       </a:r>
-                    </a:p>
+                      <a:endParaRPr lang="en-SG" sz="1600" dirty="0"/>
+                    </a:p>
+                  </a:txBody>
+                  <a:tcPr/>
+                </a:tc>
+                <a:tc>
+                  <a:txBody>
+                    <a:bodyPr/>
+                    <a:lstStyle/>
                     <a:p>
                       <a:r>
                         <a:rPr lang="en-US" sz="1600" dirty="0"/>
-                        <a:t>(indoor famous spots</a:t>
+                        <a:t>To fix – </a:t>
                       </a:r>
-                    </a:p>
-                    <a:p>
                       <a:r>
-                        <a:rPr lang="en-US" sz="1600" dirty="0"/>
-                        <a:t>Outdoor famous spots)</a:t>
+                        <a:rPr lang="en-US" sz="1600" dirty="0" err="1">
+                          <a:solidFill>
+                            <a:srgbClr val="C00000"/>
+                          </a:solidFill>
+                        </a:rPr>
+                        <a:t>radious</a:t>
                       </a:r>
-                      <a:endParaRPr lang="en-SG" sz="1600" dirty="0"/>
-                    </a:p>
-                  </a:txBody>
-                  <a:tcPr/>
-                </a:tc>
-                <a:tc>
-                  <a:txBody>
-                    <a:bodyPr/>
-                    <a:lstStyle/>
-                    <a:p>
                       <a:r>
-                        <a:rPr lang="en-US" sz="1600" dirty="0"/>
-                        <a:t>Select: </a:t>
+                        <a:rPr lang="en-US" sz="1600" dirty="0">
+                          <a:solidFill>
+                            <a:srgbClr val="C00000"/>
+                          </a:solidFill>
+                        </a:rPr>
+                        <a:t> &gt; to clear the layer location for each (park, city, both)</a:t>
                       </a:r>
-                    </a:p>
-                    <a:p>
-                      <a:r>
-                        <a:rPr lang="en-US" sz="1600" dirty="0"/>
-                        <a:t>Indoor x </a:t>
-                      </a:r>
-                    </a:p>
-                    <a:p>
-                      <a:r>
-                        <a:rPr lang="en-US" sz="1600" dirty="0"/>
-                        <a:t>Outdoor nature x </a:t>
-                      </a:r>
-                    </a:p>
-                    <a:p>
-                      <a:r>
-                        <a:rPr lang="en-US" sz="1600" dirty="0"/>
-                        <a:t>Both **</a:t>
-                      </a:r>
-                      <a:endParaRPr lang="en-SG" sz="1600" dirty="0"/>
+                      <a:endParaRPr lang="en-SG" sz="1600" dirty="0">
+                        <a:solidFill>
+                          <a:srgbClr val="C00000"/>
+                        </a:solidFill>
+                      </a:endParaRPr>
                     </a:p>
                   </a:txBody>
                   <a:tcPr/>
@@ -11424,10 +11413,22 @@
                     <a:lstStyle/>
                     <a:p>
                       <a:r>
-                        <a:rPr lang="en-US" sz="1600" dirty="0"/>
+                        <a:rPr lang="en-US" sz="1600" dirty="0">
+                          <a:solidFill>
+                            <a:schemeClr val="accent6">
+                              <a:lumMod val="75000"/>
+                            </a:schemeClr>
+                          </a:solidFill>
+                        </a:rPr>
                         <a:t>Add icon to differentiate marker for park and city location</a:t>
                       </a:r>
-                      <a:endParaRPr lang="en-SG" sz="1600" dirty="0"/>
+                      <a:endParaRPr lang="en-SG" sz="1600" dirty="0">
+                        <a:solidFill>
+                          <a:schemeClr val="accent6">
+                            <a:lumMod val="75000"/>
+                          </a:schemeClr>
+                        </a:solidFill>
+                      </a:endParaRPr>
                     </a:p>
                   </a:txBody>
                   <a:tcPr/>

</xml_diff>

<commit_message>
add attractions to map
</commit_message>
<xml_diff>
--- a/wireframe.pptx
+++ b/wireframe.pptx
@@ -152,6 +152,18 @@
     </p:ext>
   </p:extLst>
 </p:presentation>
+</file>
+
+<file path=ppt/commentAuthors.xml><?xml version="1.0" encoding="utf-8"?>
+<p:cmAuthorLst xmlns:a="http://schemas.openxmlformats.org/drawingml/2006/main" xmlns:r="http://schemas.openxmlformats.org/officeDocument/2006/relationships" xmlns:p="http://schemas.openxmlformats.org/presentationml/2006/main">
+  <p:cmAuthor id="1" name="Drama Queen" initials="DQ" lastIdx="1" clrIdx="0">
+    <p:extLst>
+      <p:ext uri="{19B8F6BF-5375-455C-9EA6-DF929625EA0E}">
+        <p15:presenceInfo xmlns:p15="http://schemas.microsoft.com/office/powerpoint/2012/main" userId="c25e001cff9fcfd9" providerId="Windows Live"/>
+      </p:ext>
+    </p:extLst>
+  </p:cmAuthor>
+</p:cmAuthorLst>
 </file>
 
 <file path=ppt/notesMasters/notesMaster1.xml><?xml version="1.0" encoding="utf-8"?>
@@ -5528,13 +5540,13 @@
           <a:p>
             <a:r>
               <a:rPr lang="en-SG" sz="1800" dirty="0"/>
-              <a:t>Haji Lane</a:t>
+              <a:t>Haji Lane x </a:t>
             </a:r>
           </a:p>
           <a:p>
             <a:r>
               <a:rPr lang="en-SG" sz="1800" dirty="0"/>
-              <a:t>Arab Street &amp; Sultan Road</a:t>
+              <a:t>Arab Street &amp; Sultan Road x </a:t>
             </a:r>
           </a:p>
           <a:p>
@@ -5543,7 +5555,7 @@
           <a:p>
             <a:r>
               <a:rPr lang="en-SG" sz="1800" dirty="0"/>
-              <a:t>Cloud Forest (Gardens by the Bay) xx </a:t>
+              <a:t>Cloud Forest (Gardens by the Bay)  x </a:t>
             </a:r>
           </a:p>
           <a:p>
@@ -5552,54 +5564,35 @@
           <a:p>
             <a:r>
               <a:rPr lang="en-SG" sz="1800" dirty="0"/>
-              <a:t>Punggol Ranch</a:t>
+              <a:t>Punggol Waterway Park x </a:t>
             </a:r>
           </a:p>
           <a:p>
             <a:r>
               <a:rPr lang="en-SG" sz="1800" dirty="0"/>
-              <a:t>Punggol (Punggol Waterway Park, Punggol Jetty Park, Punggol Lalang Field)</a:t>
-            </a:r>
+              <a:t>Punggol Beach x </a:t>
+            </a:r>
+          </a:p>
+          <a:p>
+            <a:pPr marL="0" indent="0">
+              <a:buNone/>
+            </a:pPr>
+            <a:endParaRPr lang="en-SG" sz="1800" dirty="0"/>
           </a:p>
           <a:p>
             <a:r>
               <a:rPr lang="en-SG" sz="1800" dirty="0"/>
-              <a:t>Punggol Beach</a:t>
+              <a:t>Helix Bridge x </a:t>
             </a:r>
           </a:p>
           <a:p>
             <a:r>
               <a:rPr lang="en-SG" sz="1800" dirty="0"/>
-              <a:t>Punggol Marina</a:t>
-            </a:r>
-          </a:p>
-          <a:p>
-            <a:r>
-              <a:rPr lang="en-SG" sz="1800" dirty="0" err="1"/>
-              <a:t>Pulau</a:t>
-            </a:r>
-            <a:r>
-              <a:rPr lang="en-SG" sz="1800" dirty="0"/>
-              <a:t> Punggol Barat</a:t>
+              <a:t>Henderson Waves Bridge x</a:t>
             </a:r>
           </a:p>
           <a:p>
             <a:endParaRPr lang="en-SG" sz="1800" dirty="0"/>
-          </a:p>
-          <a:p>
-            <a:r>
-              <a:rPr lang="en-SG" sz="1800" dirty="0"/>
-              <a:t>Helix Bridge/ Henderson Waves Bridge</a:t>
-            </a:r>
-          </a:p>
-          <a:p>
-            <a:endParaRPr lang="en-SG" sz="1800" dirty="0"/>
-          </a:p>
-          <a:p>
-            <a:r>
-              <a:rPr lang="en-SG" sz="1800" dirty="0"/>
-              <a:t>Tuas/ Punggol Lalang Fields</a:t>
-            </a:r>
           </a:p>
           <a:p>
             <a:endParaRPr lang="en-SG" sz="1800" dirty="0"/>
@@ -5631,7 +5624,7 @@
         </p:spPr>
         <p:txBody>
           <a:bodyPr vert="horz" lIns="91440" tIns="45720" rIns="91440" bIns="45720" rtlCol="0">
-            <a:normAutofit fontScale="77500" lnSpcReduction="20000"/>
+            <a:normAutofit fontScale="70000" lnSpcReduction="20000"/>
           </a:bodyPr>
           <a:lstStyle>
             <a:lvl1pPr marL="228600" indent="-228600" algn="l" defTabSz="914400" rtl="0" eaLnBrk="1" latinLnBrk="0" hangingPunct="1">
@@ -5800,13 +5793,25 @@
           <a:p>
             <a:r>
               <a:rPr lang="en-SG" dirty="0"/>
-              <a:t>Lower Peirce Reservoir</a:t>
-            </a:r>
-          </a:p>
-          <a:p>
+              <a:t>Lower Peirce Reservoir (</a:t>
+            </a:r>
+            <a:r>
+              <a:rPr lang="en-SG" sz="2800" dirty="0" err="1"/>
+              <a:t>Pulau</a:t>
+            </a:r>
+            <a:r>
+              <a:rPr lang="en-SG" sz="2800" dirty="0"/>
+              <a:t> Punggol Barat)</a:t>
+            </a:r>
             <a:r>
               <a:rPr lang="en-SG" dirty="0"/>
-              <a:t>Jurong Lake Gardens Lalang Field</a:t>
+              <a:t> x</a:t>
+            </a:r>
+          </a:p>
+          <a:p>
+            <a:r>
+              <a:rPr lang="en-SG" dirty="0"/>
+              <a:t>Jurong Lake Gardens Lalang Field x </a:t>
             </a:r>
           </a:p>
           <a:p>
@@ -5815,13 +5820,16 @@
           <a:p>
             <a:r>
               <a:rPr lang="en-SG" dirty="0"/>
-              <a:t>Fort Canning</a:t>
-            </a:r>
+              <a:t>Fort Canning Park  x </a:t>
+            </a:r>
+          </a:p>
+          <a:p>
+            <a:endParaRPr lang="en-SG" dirty="0"/>
           </a:p>
           <a:p>
             <a:r>
               <a:rPr lang="en-SG" dirty="0"/>
-              <a:t>Fort Canning Park</a:t>
+              <a:t>Coney Island x </a:t>
             </a:r>
           </a:p>
           <a:p>
@@ -5830,25 +5838,33 @@
           <a:p>
             <a:r>
               <a:rPr lang="en-SG" dirty="0"/>
-              <a:t>Coney Island</a:t>
-            </a:r>
-          </a:p>
-          <a:p>
+              <a:t>Seletar North Link x</a:t>
+            </a:r>
+          </a:p>
+          <a:p>
+            <a:pPr marL="0" indent="0">
+              <a:buNone/>
+            </a:pPr>
+            <a:r>
+              <a:rPr lang="en-SG" dirty="0"/>
+              <a:t>(</a:t>
+            </a:r>
+            <a:r>
+              <a:rPr lang="en-SG" b="0" dirty="0">
+                <a:effectLst/>
+                <a:latin typeface="Consolas" panose="020B0609020204030204" pitchFamily="49" charset="0"/>
+              </a:rPr>
+              <a:t>Lower Seletar Reservoir Park)</a:t>
+            </a:r>
             <a:endParaRPr lang="en-SG" dirty="0"/>
           </a:p>
           <a:p>
+            <a:endParaRPr lang="en-SG" dirty="0"/>
+          </a:p>
+          <a:p>
             <a:r>
               <a:rPr lang="en-SG" dirty="0"/>
-              <a:t>Seletar North Link</a:t>
-            </a:r>
-          </a:p>
-          <a:p>
-            <a:endParaRPr lang="en-SG" dirty="0"/>
-          </a:p>
-          <a:p>
-            <a:r>
-              <a:rPr lang="en-SG" dirty="0"/>
-              <a:t>East Coast Park</a:t>
+              <a:t>East Coast Park x</a:t>
             </a:r>
           </a:p>
           <a:p>
@@ -5866,7 +5882,7 @@
           <a:p>
             <a:r>
               <a:rPr lang="en-SG" dirty="0"/>
-              <a:t>Singapore Botanic Gardens</a:t>
+              <a:t>Singapore Botanic Gardens x </a:t>
             </a:r>
           </a:p>
         </p:txBody>
@@ -5887,8 +5903,8 @@
         </p:nvSpPr>
         <p:spPr>
           <a:xfrm>
-            <a:off x="8428652" y="2640561"/>
-            <a:ext cx="3679371" cy="3662316"/>
+            <a:off x="8935551" y="2640561"/>
+            <a:ext cx="3095770" cy="3662316"/>
           </a:xfrm>
           <a:prstGeom prst="rect">
             <a:avLst/>
@@ -6073,7 +6089,7 @@
             </a:r>
             <a:r>
               <a:rPr lang="en-SG" sz="1800" dirty="0"/>
-              <a:t> Bridge</a:t>
+              <a:t> Bridge x </a:t>
             </a:r>
           </a:p>
           <a:p>
@@ -6082,7 +6098,7 @@
           <a:p>
             <a:r>
               <a:rPr lang="en-SG" sz="1800" dirty="0"/>
-              <a:t>Orchard Road</a:t>
+              <a:t>Orchard Road x</a:t>
             </a:r>
           </a:p>
           <a:p>
@@ -6091,7 +6107,7 @@
           <a:p>
             <a:r>
               <a:rPr lang="en-SG" sz="1800" dirty="0"/>
-              <a:t>Marina Barrage</a:t>
+              <a:t>Marina Barrage x</a:t>
             </a:r>
           </a:p>
           <a:p>
@@ -6100,7 +6116,7 @@
           <a:p>
             <a:r>
               <a:rPr lang="en-SG" sz="1800" dirty="0"/>
-              <a:t>Raffles Marina Lighthouse</a:t>
+              <a:t>Raffles Marina Lighthouse x</a:t>
             </a:r>
           </a:p>
           <a:p>
@@ -6117,7 +6133,7 @@
             </a:r>
             <a:r>
               <a:rPr lang="en-SG" sz="1800" dirty="0"/>
-              <a:t> Bridge</a:t>
+              <a:t> Bridge x</a:t>
             </a:r>
           </a:p>
         </p:txBody>

</xml_diff>

<commit_message>
increase font size for icons
</commit_message>
<xml_diff>
--- a/wireframe.pptx
+++ b/wireframe.pptx
@@ -248,7 +248,7 @@
           <a:p>
             <a:fld id="{32064421-C73C-417F-B8BA-758EB1A55C3F}" type="datetimeFigureOut">
               <a:rPr lang="en-SG" smtClean="0"/>
-              <a:t>19/9/2021</a:t>
+              <a:t>21/9/2021</a:t>
             </a:fld>
             <a:endParaRPr lang="en-SG"/>
           </a:p>
@@ -581,6 +581,90 @@
           <a:p>
             <a:fld id="{EDB02C1C-226F-41E0-8C26-25B756F23392}" type="slidenum">
               <a:rPr lang="en-SG" smtClean="0"/>
+              <a:t>6</a:t>
+            </a:fld>
+            <a:endParaRPr lang="en-SG"/>
+          </a:p>
+        </p:txBody>
+      </p:sp>
+    </p:spTree>
+    <p:extLst>
+      <p:ext uri="{BB962C8B-B14F-4D97-AF65-F5344CB8AC3E}">
+        <p14:creationId xmlns:p14="http://schemas.microsoft.com/office/powerpoint/2010/main" val="2844374891"/>
+      </p:ext>
+    </p:extLst>
+  </p:cSld>
+  <p:clrMapOvr>
+    <a:masterClrMapping/>
+  </p:clrMapOvr>
+</p:notes>
+</file>
+
+<file path=ppt/notesSlides/notesSlide2.xml><?xml version="1.0" encoding="utf-8"?>
+<p:notes xmlns:a="http://schemas.openxmlformats.org/drawingml/2006/main" xmlns:r="http://schemas.openxmlformats.org/officeDocument/2006/relationships" xmlns:p="http://schemas.openxmlformats.org/presentationml/2006/main">
+  <p:cSld>
+    <p:spTree>
+      <p:nvGrpSpPr>
+        <p:cNvPr id="1" name=""/>
+        <p:cNvGrpSpPr/>
+        <p:nvPr/>
+      </p:nvGrpSpPr>
+      <p:grpSpPr>
+        <a:xfrm>
+          <a:off x="0" y="0"/>
+          <a:ext cx="0" cy="0"/>
+          <a:chOff x="0" y="0"/>
+          <a:chExt cx="0" cy="0"/>
+        </a:xfrm>
+      </p:grpSpPr>
+      <p:sp>
+        <p:nvSpPr>
+          <p:cNvPr id="2" name="Slide Image Placeholder 1"/>
+          <p:cNvSpPr>
+            <a:spLocks noGrp="1" noRot="1" noChangeAspect="1"/>
+          </p:cNvSpPr>
+          <p:nvPr>
+            <p:ph type="sldImg"/>
+          </p:nvPr>
+        </p:nvSpPr>
+        <p:spPr/>
+      </p:sp>
+      <p:sp>
+        <p:nvSpPr>
+          <p:cNvPr id="3" name="Notes Placeholder 2"/>
+          <p:cNvSpPr>
+            <a:spLocks noGrp="1"/>
+          </p:cNvSpPr>
+          <p:nvPr>
+            <p:ph type="body" idx="1"/>
+          </p:nvPr>
+        </p:nvSpPr>
+        <p:spPr/>
+        <p:txBody>
+          <a:bodyPr/>
+          <a:lstStyle/>
+          <a:p>
+            <a:endParaRPr lang="en-SG" dirty="0"/>
+          </a:p>
+        </p:txBody>
+      </p:sp>
+      <p:sp>
+        <p:nvSpPr>
+          <p:cNvPr id="4" name="Slide Number Placeholder 3"/>
+          <p:cNvSpPr>
+            <a:spLocks noGrp="1"/>
+          </p:cNvSpPr>
+          <p:nvPr>
+            <p:ph type="sldNum" sz="quarter" idx="5"/>
+          </p:nvPr>
+        </p:nvSpPr>
+        <p:spPr/>
+        <p:txBody>
+          <a:bodyPr/>
+          <a:lstStyle/>
+          <a:p>
+            <a:fld id="{EDB02C1C-226F-41E0-8C26-25B756F23392}" type="slidenum">
+              <a:rPr lang="en-SG" smtClean="0"/>
               <a:t>8</a:t>
             </a:fld>
             <a:endParaRPr lang="en-SG"/>
@@ -600,7 +684,7 @@
 </p:notes>
 </file>
 
-<file path=ppt/notesSlides/notesSlide2.xml><?xml version="1.0" encoding="utf-8"?>
+<file path=ppt/notesSlides/notesSlide3.xml><?xml version="1.0" encoding="utf-8"?>
 <p:notes xmlns:a="http://schemas.openxmlformats.org/drawingml/2006/main" xmlns:r="http://schemas.openxmlformats.org/officeDocument/2006/relationships" xmlns:p="http://schemas.openxmlformats.org/presentationml/2006/main">
   <p:cSld>
     <p:spTree>
@@ -833,7 +917,7 @@
           <a:p>
             <a:fld id="{5B3D8EE2-B186-4E74-82A5-3FDCBC0BCA47}" type="datetimeFigureOut">
               <a:rPr lang="en-SG" smtClean="0"/>
-              <a:t>19/9/2021</a:t>
+              <a:t>21/9/2021</a:t>
             </a:fld>
             <a:endParaRPr lang="en-SG"/>
           </a:p>
@@ -1033,7 +1117,7 @@
           <a:p>
             <a:fld id="{5B3D8EE2-B186-4E74-82A5-3FDCBC0BCA47}" type="datetimeFigureOut">
               <a:rPr lang="en-SG" smtClean="0"/>
-              <a:t>19/9/2021</a:t>
+              <a:t>21/9/2021</a:t>
             </a:fld>
             <a:endParaRPr lang="en-SG"/>
           </a:p>
@@ -1243,7 +1327,7 @@
           <a:p>
             <a:fld id="{5B3D8EE2-B186-4E74-82A5-3FDCBC0BCA47}" type="datetimeFigureOut">
               <a:rPr lang="en-SG" smtClean="0"/>
-              <a:t>19/9/2021</a:t>
+              <a:t>21/9/2021</a:t>
             </a:fld>
             <a:endParaRPr lang="en-SG"/>
           </a:p>
@@ -1443,7 +1527,7 @@
           <a:p>
             <a:fld id="{5B3D8EE2-B186-4E74-82A5-3FDCBC0BCA47}" type="datetimeFigureOut">
               <a:rPr lang="en-SG" smtClean="0"/>
-              <a:t>19/9/2021</a:t>
+              <a:t>21/9/2021</a:t>
             </a:fld>
             <a:endParaRPr lang="en-SG"/>
           </a:p>
@@ -1719,7 +1803,7 @@
           <a:p>
             <a:fld id="{5B3D8EE2-B186-4E74-82A5-3FDCBC0BCA47}" type="datetimeFigureOut">
               <a:rPr lang="en-SG" smtClean="0"/>
-              <a:t>19/9/2021</a:t>
+              <a:t>21/9/2021</a:t>
             </a:fld>
             <a:endParaRPr lang="en-SG"/>
           </a:p>
@@ -1987,7 +2071,7 @@
           <a:p>
             <a:fld id="{5B3D8EE2-B186-4E74-82A5-3FDCBC0BCA47}" type="datetimeFigureOut">
               <a:rPr lang="en-SG" smtClean="0"/>
-              <a:t>19/9/2021</a:t>
+              <a:t>21/9/2021</a:t>
             </a:fld>
             <a:endParaRPr lang="en-SG"/>
           </a:p>
@@ -2402,7 +2486,7 @@
           <a:p>
             <a:fld id="{5B3D8EE2-B186-4E74-82A5-3FDCBC0BCA47}" type="datetimeFigureOut">
               <a:rPr lang="en-SG" smtClean="0"/>
-              <a:t>19/9/2021</a:t>
+              <a:t>21/9/2021</a:t>
             </a:fld>
             <a:endParaRPr lang="en-SG"/>
           </a:p>
@@ -2544,7 +2628,7 @@
           <a:p>
             <a:fld id="{5B3D8EE2-B186-4E74-82A5-3FDCBC0BCA47}" type="datetimeFigureOut">
               <a:rPr lang="en-SG" smtClean="0"/>
-              <a:t>19/9/2021</a:t>
+              <a:t>21/9/2021</a:t>
             </a:fld>
             <a:endParaRPr lang="en-SG"/>
           </a:p>
@@ -2657,7 +2741,7 @@
           <a:p>
             <a:fld id="{5B3D8EE2-B186-4E74-82A5-3FDCBC0BCA47}" type="datetimeFigureOut">
               <a:rPr lang="en-SG" smtClean="0"/>
-              <a:t>19/9/2021</a:t>
+              <a:t>21/9/2021</a:t>
             </a:fld>
             <a:endParaRPr lang="en-SG"/>
           </a:p>
@@ -2970,7 +3054,7 @@
           <a:p>
             <a:fld id="{5B3D8EE2-B186-4E74-82A5-3FDCBC0BCA47}" type="datetimeFigureOut">
               <a:rPr lang="en-SG" smtClean="0"/>
-              <a:t>19/9/2021</a:t>
+              <a:t>21/9/2021</a:t>
             </a:fld>
             <a:endParaRPr lang="en-SG"/>
           </a:p>
@@ -3259,7 +3343,7 @@
           <a:p>
             <a:fld id="{5B3D8EE2-B186-4E74-82A5-3FDCBC0BCA47}" type="datetimeFigureOut">
               <a:rPr lang="en-SG" smtClean="0"/>
-              <a:t>19/9/2021</a:t>
+              <a:t>21/9/2021</a:t>
             </a:fld>
             <a:endParaRPr lang="en-SG"/>
           </a:p>
@@ -3502,7 +3586,7 @@
           <a:p>
             <a:fld id="{5B3D8EE2-B186-4E74-82A5-3FDCBC0BCA47}" type="datetimeFigureOut">
               <a:rPr lang="en-SG" smtClean="0"/>
-              <a:t>19/9/2021</a:t>
+              <a:t>21/9/2021</a:t>
             </a:fld>
             <a:endParaRPr lang="en-SG"/>
           </a:p>
@@ -9796,7 +9880,7 @@
             </a:pPr>
             <a:r>
               <a:rPr lang="en-US" dirty="0">
-                <a:hlinkClick r:id="rId2"/>
+                <a:hlinkClick r:id="rId3"/>
               </a:rPr>
               <a:t>https://data.gov.sg/search?q=npark</a:t>
             </a:r>
@@ -9866,7 +9950,7 @@
           <a:p>
             <a:r>
               <a:rPr lang="en-US" dirty="0"/>
-              <a:t>Carpark Availability (do last one) </a:t>
+              <a:t>Carpark Availability (do last one) + HDB carpark info</a:t>
             </a:r>
           </a:p>
           <a:p>
@@ -10945,14 +11029,14 @@
           <p:nvPr>
             <p:extLst>
               <p:ext uri="{D42A27DB-BD31-4B8C-83A1-F6EECF244321}">
-                <p14:modId xmlns:p14="http://schemas.microsoft.com/office/powerpoint/2010/main" val="3315921597"/>
+                <p14:modId xmlns:p14="http://schemas.microsoft.com/office/powerpoint/2010/main" val="2881826199"/>
               </p:ext>
             </p:extLst>
           </p:nvPr>
         </p:nvGraphicFramePr>
         <p:xfrm>
           <a:off x="238539" y="149163"/>
-          <a:ext cx="11728175" cy="4815840"/>
+          <a:ext cx="11728175" cy="5303520"/>
         </p:xfrm>
         <a:graphic>
           <a:graphicData uri="http://schemas.openxmlformats.org/drawingml/2006/table">
@@ -11350,6 +11434,18 @@
                     </a:p>
                     <a:p>
                       <a:r>
+                        <a:rPr lang="en-US" sz="1600" dirty="0">
+                          <a:solidFill>
+                            <a:schemeClr val="accent6">
+                              <a:lumMod val="75000"/>
+                            </a:schemeClr>
+                          </a:solidFill>
+                        </a:rPr>
+                        <a:t>- Filter category for foursquare location</a:t>
+                      </a:r>
+                    </a:p>
+                    <a:p>
+                      <a:r>
                         <a:rPr lang="en-US" sz="1600" dirty="0"/>
                         <a:t>X -Include on the checkbox for selection (indoor famous spots  // Outdoor famous spots)</a:t>
                       </a:r>
@@ -11363,26 +11459,6 @@
                     <a:bodyPr/>
                     <a:lstStyle/>
                     <a:p>
-                      <a:r>
-                        <a:rPr lang="en-US" sz="1600" dirty="0"/>
-                        <a:t>To fix – </a:t>
-                      </a:r>
-                      <a:r>
-                        <a:rPr lang="en-US" sz="1600" dirty="0" err="1">
-                          <a:solidFill>
-                            <a:srgbClr val="C00000"/>
-                          </a:solidFill>
-                        </a:rPr>
-                        <a:t>radious</a:t>
-                      </a:r>
-                      <a:r>
-                        <a:rPr lang="en-US" sz="1600" dirty="0">
-                          <a:solidFill>
-                            <a:srgbClr val="C00000"/>
-                          </a:solidFill>
-                        </a:rPr>
-                        <a:t> &gt; to clear the layer location for each (park, city, both)</a:t>
-                      </a:r>
                       <a:endParaRPr lang="en-SG" sz="1600" dirty="0">
                         <a:solidFill>
                           <a:srgbClr val="C00000"/>
@@ -11431,18 +11507,24 @@
                       <a:r>
                         <a:rPr lang="en-US" sz="1600" dirty="0">
                           <a:solidFill>
-                            <a:schemeClr val="accent6">
-                              <a:lumMod val="75000"/>
-                            </a:schemeClr>
+                            <a:schemeClr val="tx1"/>
                           </a:solidFill>
                         </a:rPr>
-                        <a:t>Add icon to differentiate marker for park and city location</a:t>
+                        <a:t>X - Add icon to differentiate marker for park and city location</a:t>
+                      </a:r>
+                    </a:p>
+                    <a:p>
+                      <a:r>
+                        <a:rPr lang="en-US" sz="1600" dirty="0">
+                          <a:solidFill>
+                            <a:schemeClr val="tx1"/>
+                          </a:solidFill>
+                        </a:rPr>
+                        <a:t>X – add icon for radius pop up message</a:t>
                       </a:r>
                       <a:endParaRPr lang="en-SG" sz="1600" dirty="0">
                         <a:solidFill>
-                          <a:schemeClr val="accent6">
-                            <a:lumMod val="75000"/>
-                          </a:schemeClr>
+                          <a:schemeClr val="tx1"/>
                         </a:solidFill>
                       </a:endParaRPr>
                     </a:p>

</xml_diff>

<commit_message>
initial setup for 2hr weather api, moment.js library, weather control panel html and styling
</commit_message>
<xml_diff>
--- a/wireframe.pptx
+++ b/wireframe.pptx
@@ -4132,14 +4132,14 @@
           <p:nvPr>
             <p:extLst>
               <p:ext uri="{D42A27DB-BD31-4B8C-83A1-F6EECF244321}">
-                <p14:modId xmlns:p14="http://schemas.microsoft.com/office/powerpoint/2010/main" val="3324065029"/>
+                <p14:modId xmlns:p14="http://schemas.microsoft.com/office/powerpoint/2010/main" val="2123702685"/>
               </p:ext>
             </p:extLst>
           </p:nvPr>
         </p:nvGraphicFramePr>
         <p:xfrm>
           <a:off x="238539" y="149163"/>
-          <a:ext cx="11728175" cy="2590800"/>
+          <a:ext cx="11728175" cy="3251200"/>
         </p:xfrm>
         <a:graphic>
           <a:graphicData uri="http://schemas.openxmlformats.org/drawingml/2006/table">
@@ -4272,6 +4272,147 @@
                     <a:bodyPr/>
                     <a:lstStyle/>
                     <a:p>
+                      <a:pPr marL="0" marR="0" lvl="0" indent="0" algn="l" defTabSz="914400" rtl="0" eaLnBrk="1" fontAlgn="auto" latinLnBrk="0" hangingPunct="1">
+                        <a:lnSpc>
+                          <a:spcPct val="100000"/>
+                        </a:lnSpc>
+                        <a:spcBef>
+                          <a:spcPts val="0"/>
+                        </a:spcBef>
+                        <a:spcAft>
+                          <a:spcPts val="0"/>
+                        </a:spcAft>
+                        <a:buClrTx/>
+                        <a:buSzTx/>
+                        <a:buFontTx/>
+                        <a:buNone/>
+                        <a:tabLst/>
+                        <a:defRPr/>
+                      </a:pPr>
+                      <a:r>
+                        <a:rPr lang="en-US" sz="1600" dirty="0"/>
+                        <a:t>2 hours weather</a:t>
+                      </a:r>
+                    </a:p>
+                    <a:p>
+                      <a:pPr marL="0" marR="0" lvl="0" indent="0" algn="l" defTabSz="914400" rtl="0" eaLnBrk="1" fontAlgn="auto" latinLnBrk="0" hangingPunct="1">
+                        <a:lnSpc>
+                          <a:spcPct val="100000"/>
+                        </a:lnSpc>
+                        <a:spcBef>
+                          <a:spcPts val="0"/>
+                        </a:spcBef>
+                        <a:spcAft>
+                          <a:spcPts val="0"/>
+                        </a:spcAft>
+                        <a:buClrTx/>
+                        <a:buSzTx/>
+                        <a:buFontTx/>
+                        <a:buNone/>
+                        <a:tabLst/>
+                        <a:defRPr/>
+                      </a:pPr>
+                      <a:endParaRPr lang="en-US" sz="1600" dirty="0"/>
+                    </a:p>
+                    <a:p>
+                      <a:pPr marL="0" marR="0" lvl="0" indent="0" algn="l" defTabSz="914400" rtl="0" eaLnBrk="1" fontAlgn="auto" latinLnBrk="0" hangingPunct="1">
+                        <a:lnSpc>
+                          <a:spcPct val="100000"/>
+                        </a:lnSpc>
+                        <a:spcBef>
+                          <a:spcPts val="0"/>
+                        </a:spcBef>
+                        <a:spcAft>
+                          <a:spcPts val="0"/>
+                        </a:spcAft>
+                        <a:buClrTx/>
+                        <a:buSzTx/>
+                        <a:buFontTx/>
+                        <a:buNone/>
+                        <a:tabLst/>
+                        <a:defRPr/>
+                      </a:pPr>
+                      <a:r>
+                        <a:rPr lang="en-US" sz="1600" dirty="0"/>
+                        <a:t>To do: </a:t>
+                      </a:r>
+                      <a:endParaRPr lang="en-SG" sz="1600" dirty="0"/>
+                    </a:p>
+                  </a:txBody>
+                  <a:tcPr/>
+                </a:tc>
+                <a:tc>
+                  <a:txBody>
+                    <a:bodyPr/>
+                    <a:lstStyle/>
+                    <a:p>
+                      <a:pPr marL="0" marR="0" lvl="0" indent="0" algn="l" defTabSz="914400" rtl="0" eaLnBrk="1" fontAlgn="auto" latinLnBrk="0" hangingPunct="1">
+                        <a:lnSpc>
+                          <a:spcPct val="100000"/>
+                        </a:lnSpc>
+                        <a:spcBef>
+                          <a:spcPts val="0"/>
+                        </a:spcBef>
+                        <a:spcAft>
+                          <a:spcPts val="0"/>
+                        </a:spcAft>
+                        <a:buClrTx/>
+                        <a:buSzTx/>
+                        <a:buFontTx/>
+                        <a:buNone/>
+                        <a:tabLst/>
+                        <a:defRPr/>
+                      </a:pPr>
+                      <a:r>
+                        <a:rPr lang="en-US" sz="1600" dirty="0"/>
+                        <a:t>2 hours weather display </a:t>
+                      </a:r>
+                    </a:p>
+                    <a:p>
+                      <a:pPr marL="0" marR="0" lvl="0" indent="0" algn="l" defTabSz="914400" rtl="0" eaLnBrk="1" fontAlgn="auto" latinLnBrk="0" hangingPunct="1">
+                        <a:lnSpc>
+                          <a:spcPct val="100000"/>
+                        </a:lnSpc>
+                        <a:spcBef>
+                          <a:spcPts val="0"/>
+                        </a:spcBef>
+                        <a:spcAft>
+                          <a:spcPts val="0"/>
+                        </a:spcAft>
+                        <a:buClrTx/>
+                        <a:buSzTx/>
+                        <a:buFontTx/>
+                        <a:buNone/>
+                        <a:tabLst/>
+                        <a:defRPr/>
+                      </a:pPr>
+                      <a:r>
+                        <a:rPr lang="en-US" sz="1600" dirty="0"/>
+                        <a:t>Map to each location</a:t>
+                      </a:r>
+                    </a:p>
+                    <a:p>
+                      <a:pPr marL="0" marR="0" lvl="0" indent="0" algn="l" defTabSz="914400" rtl="0" eaLnBrk="1" fontAlgn="auto" latinLnBrk="0" hangingPunct="1">
+                        <a:lnSpc>
+                          <a:spcPct val="100000"/>
+                        </a:lnSpc>
+                        <a:spcBef>
+                          <a:spcPts val="0"/>
+                        </a:spcBef>
+                        <a:spcAft>
+                          <a:spcPts val="0"/>
+                        </a:spcAft>
+                        <a:buClrTx/>
+                        <a:buSzTx/>
+                        <a:buFontTx/>
+                        <a:buNone/>
+                        <a:tabLst/>
+                        <a:defRPr/>
+                      </a:pPr>
+                      <a:r>
+                        <a:rPr lang="en-US" sz="1600" dirty="0"/>
+                        <a:t>Show different icons</a:t>
+                      </a:r>
                       <a:endParaRPr lang="en-SG" sz="1600" dirty="0"/>
                     </a:p>
                   </a:txBody>
@@ -4304,33 +4445,6 @@
                   </a:txBody>
                   <a:tcPr/>
                 </a:tc>
-                <a:tc>
-                  <a:txBody>
-                    <a:bodyPr/>
-                    <a:lstStyle/>
-                    <a:p>
-                      <a:pPr marL="0" marR="0" lvl="0" indent="0" algn="l" defTabSz="914400" rtl="0" eaLnBrk="1" fontAlgn="auto" latinLnBrk="0" hangingPunct="1">
-                        <a:lnSpc>
-                          <a:spcPct val="100000"/>
-                        </a:lnSpc>
-                        <a:spcBef>
-                          <a:spcPts val="0"/>
-                        </a:spcBef>
-                        <a:spcAft>
-                          <a:spcPts val="0"/>
-                        </a:spcAft>
-                        <a:buClrTx/>
-                        <a:buSzTx/>
-                        <a:buFontTx/>
-                        <a:buNone/>
-                        <a:tabLst/>
-                        <a:defRPr/>
-                      </a:pPr>
-                      <a:endParaRPr lang="en-SG" sz="1600" dirty="0"/>
-                    </a:p>
-                  </a:txBody>
-                  <a:tcPr/>
-                </a:tc>
                 <a:extLst>
                   <a:ext uri="{0D108BD9-81ED-4DB2-BD59-A6C34878D82A}">
                     <a16:rowId xmlns:a16="http://schemas.microsoft.com/office/drawing/2014/main" val="2021552113"/>
@@ -4343,16 +4457,6 @@
                     <a:bodyPr/>
                     <a:lstStyle/>
                     <a:p>
-                      <a:endParaRPr lang="en-SG" sz="1600"/>
-                    </a:p>
-                  </a:txBody>
-                  <a:tcPr/>
-                </a:tc>
-                <a:tc>
-                  <a:txBody>
-                    <a:bodyPr/>
-                    <a:lstStyle/>
-                    <a:p>
                       <a:endParaRPr lang="en-SG" sz="1600" dirty="0"/>
                     </a:p>
                   </a:txBody>
@@ -4363,6 +4467,20 @@
                     <a:bodyPr/>
                     <a:lstStyle/>
                     <a:p>
+                      <a:endParaRPr lang="en-SG" sz="1600" dirty="0"/>
+                    </a:p>
+                  </a:txBody>
+                  <a:tcPr/>
+                </a:tc>
+                <a:tc>
+                  <a:txBody>
+                    <a:bodyPr/>
+                    <a:lstStyle/>
+                    <a:p>
+                      <a:r>
+                        <a:rPr lang="en-US" sz="1600" dirty="0"/>
+                        <a:t>Fly to coordinate when click on marker</a:t>
+                      </a:r>
                       <a:endParaRPr lang="en-SG" sz="1600" dirty="0"/>
                     </a:p>
                   </a:txBody>
@@ -10022,14 +10140,14 @@
           <p:nvPr>
             <p:extLst>
               <p:ext uri="{D42A27DB-BD31-4B8C-83A1-F6EECF244321}">
-                <p14:modId xmlns:p14="http://schemas.microsoft.com/office/powerpoint/2010/main" val="2905735666"/>
+                <p14:modId xmlns:p14="http://schemas.microsoft.com/office/powerpoint/2010/main" val="2969425680"/>
               </p:ext>
             </p:extLst>
           </p:nvPr>
         </p:nvGraphicFramePr>
         <p:xfrm>
           <a:off x="246821" y="356888"/>
-          <a:ext cx="11698358" cy="2494280"/>
+          <a:ext cx="11698358" cy="2763520"/>
         </p:xfrm>
         <a:graphic>
           <a:graphicData uri="http://schemas.openxmlformats.org/drawingml/2006/table">
@@ -10286,6 +10404,22 @@
                     <a:bodyPr/>
                     <a:lstStyle/>
                     <a:p>
+                      <a:r>
+                        <a:rPr lang="en-US" dirty="0"/>
+                        <a:t>2 </a:t>
+                      </a:r>
+                      <a:r>
+                        <a:rPr lang="en-US" dirty="0" err="1"/>
+                        <a:t>hr</a:t>
+                      </a:r>
+                      <a:r>
+                        <a:rPr lang="en-US" dirty="0"/>
+                        <a:t> </a:t>
+                      </a:r>
+                      <a:r>
+                        <a:rPr lang="en-US" dirty="0" err="1"/>
+                        <a:t>api</a:t>
+                      </a:r>
                       <a:endParaRPr lang="en-SG" dirty="0"/>
                     </a:p>
                   </a:txBody>
@@ -10296,7 +10430,35 @@
                     <a:bodyPr/>
                     <a:lstStyle/>
                     <a:p>
-                      <a:endParaRPr lang="en-SG"/>
+                      <a:pPr marL="0" marR="0" lvl="0" indent="0" algn="l" defTabSz="914400" rtl="0" eaLnBrk="1" fontAlgn="auto" latinLnBrk="0" hangingPunct="1">
+                        <a:lnSpc>
+                          <a:spcPct val="100000"/>
+                        </a:lnSpc>
+                        <a:spcBef>
+                          <a:spcPts val="0"/>
+                        </a:spcBef>
+                        <a:spcAft>
+                          <a:spcPts val="0"/>
+                        </a:spcAft>
+                        <a:buClrTx/>
+                        <a:buSzTx/>
+                        <a:buFontTx/>
+                        <a:buNone/>
+                        <a:tabLst/>
+                        <a:defRPr/>
+                      </a:pPr>
+                      <a:r>
+                        <a:rPr lang="en-SG" sz="1800" b="0" kern="1200" dirty="0">
+                          <a:solidFill>
+                            <a:schemeClr val="dk1"/>
+                          </a:solidFill>
+                          <a:effectLst/>
+                          <a:latin typeface="+mn-lt"/>
+                          <a:ea typeface="+mn-ea"/>
+                          <a:cs typeface="+mn-cs"/>
+                        </a:rPr>
+                        <a:t>https://api.data.gov.sg/v1/environment/2-hour-weather-forecast</a:t>
+                      </a:r>
                     </a:p>
                   </a:txBody>
                   <a:tcPr/>
@@ -11029,14 +11191,14 @@
           <p:nvPr>
             <p:extLst>
               <p:ext uri="{D42A27DB-BD31-4B8C-83A1-F6EECF244321}">
-                <p14:modId xmlns:p14="http://schemas.microsoft.com/office/powerpoint/2010/main" val="2881826199"/>
+                <p14:modId xmlns:p14="http://schemas.microsoft.com/office/powerpoint/2010/main" val="1577146319"/>
               </p:ext>
             </p:extLst>
           </p:nvPr>
         </p:nvGraphicFramePr>
         <p:xfrm>
           <a:off x="238539" y="149163"/>
-          <a:ext cx="11728175" cy="5303520"/>
+          <a:ext cx="11728175" cy="5547360"/>
         </p:xfrm>
         <a:graphic>
           <a:graphicData uri="http://schemas.openxmlformats.org/drawingml/2006/table">
@@ -11159,29 +11321,6 @@
                   <a:txBody>
                     <a:bodyPr/>
                     <a:lstStyle/>
-                    <a:p>
-                      <a:pPr marL="0" marR="0" lvl="0" indent="0" algn="l" defTabSz="914400" rtl="0" eaLnBrk="1" fontAlgn="auto" latinLnBrk="0" hangingPunct="1">
-                        <a:lnSpc>
-                          <a:spcPct val="100000"/>
-                        </a:lnSpc>
-                        <a:spcBef>
-                          <a:spcPts val="0"/>
-                        </a:spcBef>
-                        <a:spcAft>
-                          <a:spcPts val="0"/>
-                        </a:spcAft>
-                        <a:buClrTx/>
-                        <a:buSzTx/>
-                        <a:buFontTx/>
-                        <a:buNone/>
-                        <a:tabLst/>
-                        <a:defRPr/>
-                      </a:pPr>
-                      <a:r>
-                        <a:rPr lang="en-US" sz="1600" dirty="0"/>
-                        <a:t>Next: </a:t>
-                      </a:r>
-                    </a:p>
                     <a:p>
                       <a:pPr marL="0" marR="0" lvl="0" indent="0" algn="l" defTabSz="914400" rtl="0" eaLnBrk="1" fontAlgn="auto" latinLnBrk="0" hangingPunct="1">
                         <a:lnSpc>
@@ -11436,12 +11575,10 @@
                       <a:r>
                         <a:rPr lang="en-US" sz="1600" dirty="0">
                           <a:solidFill>
-                            <a:schemeClr val="accent6">
-                              <a:lumMod val="75000"/>
-                            </a:schemeClr>
+                            <a:schemeClr val="tx1"/>
                           </a:solidFill>
                         </a:rPr>
-                        <a:t>- Filter category for foursquare location</a:t>
+                        <a:t>X - Filter category for foursquare location</a:t>
                       </a:r>
                     </a:p>
                     <a:p>
@@ -11522,11 +11659,35 @@
                         </a:rPr>
                         <a:t>X – add icon for radius pop up message</a:t>
                       </a:r>
-                      <a:endParaRPr lang="en-SG" sz="1600" dirty="0">
-                        <a:solidFill>
-                          <a:schemeClr val="tx1"/>
-                        </a:solidFill>
-                      </a:endParaRPr>
+                    </a:p>
+                    <a:p>
+                      <a:pPr marL="0" marR="0" lvl="0" indent="0" algn="l" defTabSz="914400" rtl="0" eaLnBrk="1" fontAlgn="auto" latinLnBrk="0" hangingPunct="1">
+                        <a:lnSpc>
+                          <a:spcPct val="100000"/>
+                        </a:lnSpc>
+                        <a:spcBef>
+                          <a:spcPts val="0"/>
+                        </a:spcBef>
+                        <a:spcAft>
+                          <a:spcPts val="0"/>
+                        </a:spcAft>
+                        <a:buClrTx/>
+                        <a:buSzTx/>
+                        <a:buFontTx/>
+                        <a:buNone/>
+                        <a:tabLst/>
+                        <a:defRPr/>
+                      </a:pPr>
+                      <a:r>
+                        <a:rPr lang="en-US" sz="1600" dirty="0">
+                          <a:solidFill>
+                            <a:schemeClr val="accent6">
+                              <a:lumMod val="75000"/>
+                            </a:schemeClr>
+                          </a:solidFill>
+                        </a:rPr>
+                        <a:t>- Set the font (google font)</a:t>
+                      </a:r>
                     </a:p>
                   </a:txBody>
                   <a:tcPr/>

</xml_diff>

<commit_message>
initial setup for 24 hours weather api
</commit_message>
<xml_diff>
--- a/wireframe.pptx
+++ b/wireframe.pptx
@@ -248,7 +248,7 @@
           <a:p>
             <a:fld id="{32064421-C73C-417F-B8BA-758EB1A55C3F}" type="datetimeFigureOut">
               <a:rPr lang="en-SG" smtClean="0"/>
-              <a:t>21/9/2021</a:t>
+              <a:t>22/9/2021</a:t>
             </a:fld>
             <a:endParaRPr lang="en-SG"/>
           </a:p>
@@ -917,7 +917,7 @@
           <a:p>
             <a:fld id="{5B3D8EE2-B186-4E74-82A5-3FDCBC0BCA47}" type="datetimeFigureOut">
               <a:rPr lang="en-SG" smtClean="0"/>
-              <a:t>21/9/2021</a:t>
+              <a:t>22/9/2021</a:t>
             </a:fld>
             <a:endParaRPr lang="en-SG"/>
           </a:p>
@@ -1117,7 +1117,7 @@
           <a:p>
             <a:fld id="{5B3D8EE2-B186-4E74-82A5-3FDCBC0BCA47}" type="datetimeFigureOut">
               <a:rPr lang="en-SG" smtClean="0"/>
-              <a:t>21/9/2021</a:t>
+              <a:t>22/9/2021</a:t>
             </a:fld>
             <a:endParaRPr lang="en-SG"/>
           </a:p>
@@ -1327,7 +1327,7 @@
           <a:p>
             <a:fld id="{5B3D8EE2-B186-4E74-82A5-3FDCBC0BCA47}" type="datetimeFigureOut">
               <a:rPr lang="en-SG" smtClean="0"/>
-              <a:t>21/9/2021</a:t>
+              <a:t>22/9/2021</a:t>
             </a:fld>
             <a:endParaRPr lang="en-SG"/>
           </a:p>
@@ -1527,7 +1527,7 @@
           <a:p>
             <a:fld id="{5B3D8EE2-B186-4E74-82A5-3FDCBC0BCA47}" type="datetimeFigureOut">
               <a:rPr lang="en-SG" smtClean="0"/>
-              <a:t>21/9/2021</a:t>
+              <a:t>22/9/2021</a:t>
             </a:fld>
             <a:endParaRPr lang="en-SG"/>
           </a:p>
@@ -1803,7 +1803,7 @@
           <a:p>
             <a:fld id="{5B3D8EE2-B186-4E74-82A5-3FDCBC0BCA47}" type="datetimeFigureOut">
               <a:rPr lang="en-SG" smtClean="0"/>
-              <a:t>21/9/2021</a:t>
+              <a:t>22/9/2021</a:t>
             </a:fld>
             <a:endParaRPr lang="en-SG"/>
           </a:p>
@@ -2071,7 +2071,7 @@
           <a:p>
             <a:fld id="{5B3D8EE2-B186-4E74-82A5-3FDCBC0BCA47}" type="datetimeFigureOut">
               <a:rPr lang="en-SG" smtClean="0"/>
-              <a:t>21/9/2021</a:t>
+              <a:t>22/9/2021</a:t>
             </a:fld>
             <a:endParaRPr lang="en-SG"/>
           </a:p>
@@ -2486,7 +2486,7 @@
           <a:p>
             <a:fld id="{5B3D8EE2-B186-4E74-82A5-3FDCBC0BCA47}" type="datetimeFigureOut">
               <a:rPr lang="en-SG" smtClean="0"/>
-              <a:t>21/9/2021</a:t>
+              <a:t>22/9/2021</a:t>
             </a:fld>
             <a:endParaRPr lang="en-SG"/>
           </a:p>
@@ -2628,7 +2628,7 @@
           <a:p>
             <a:fld id="{5B3D8EE2-B186-4E74-82A5-3FDCBC0BCA47}" type="datetimeFigureOut">
               <a:rPr lang="en-SG" smtClean="0"/>
-              <a:t>21/9/2021</a:t>
+              <a:t>22/9/2021</a:t>
             </a:fld>
             <a:endParaRPr lang="en-SG"/>
           </a:p>
@@ -2741,7 +2741,7 @@
           <a:p>
             <a:fld id="{5B3D8EE2-B186-4E74-82A5-3FDCBC0BCA47}" type="datetimeFigureOut">
               <a:rPr lang="en-SG" smtClean="0"/>
-              <a:t>21/9/2021</a:t>
+              <a:t>22/9/2021</a:t>
             </a:fld>
             <a:endParaRPr lang="en-SG"/>
           </a:p>
@@ -3054,7 +3054,7 @@
           <a:p>
             <a:fld id="{5B3D8EE2-B186-4E74-82A5-3FDCBC0BCA47}" type="datetimeFigureOut">
               <a:rPr lang="en-SG" smtClean="0"/>
-              <a:t>21/9/2021</a:t>
+              <a:t>22/9/2021</a:t>
             </a:fld>
             <a:endParaRPr lang="en-SG"/>
           </a:p>
@@ -3343,7 +3343,7 @@
           <a:p>
             <a:fld id="{5B3D8EE2-B186-4E74-82A5-3FDCBC0BCA47}" type="datetimeFigureOut">
               <a:rPr lang="en-SG" smtClean="0"/>
-              <a:t>21/9/2021</a:t>
+              <a:t>22/9/2021</a:t>
             </a:fld>
             <a:endParaRPr lang="en-SG"/>
           </a:p>
@@ -3586,7 +3586,7 @@
           <a:p>
             <a:fld id="{5B3D8EE2-B186-4E74-82A5-3FDCBC0BCA47}" type="datetimeFigureOut">
               <a:rPr lang="en-SG" smtClean="0"/>
-              <a:t>21/9/2021</a:t>
+              <a:t>22/9/2021</a:t>
             </a:fld>
             <a:endParaRPr lang="en-SG"/>
           </a:p>
@@ -4132,14 +4132,14 @@
           <p:nvPr>
             <p:extLst>
               <p:ext uri="{D42A27DB-BD31-4B8C-83A1-F6EECF244321}">
-                <p14:modId xmlns:p14="http://schemas.microsoft.com/office/powerpoint/2010/main" val="2123702685"/>
+                <p14:modId xmlns:p14="http://schemas.microsoft.com/office/powerpoint/2010/main" val="3851091015"/>
               </p:ext>
             </p:extLst>
           </p:nvPr>
         </p:nvGraphicFramePr>
         <p:xfrm>
           <a:off x="238539" y="149163"/>
-          <a:ext cx="11728175" cy="3251200"/>
+          <a:ext cx="11728175" cy="4958080"/>
         </p:xfrm>
         <a:graphic>
           <a:graphicData uri="http://schemas.openxmlformats.org/drawingml/2006/table">
@@ -4314,6 +4314,13 @@
                       </a:pPr>
                       <a:endParaRPr lang="en-US" sz="1600" dirty="0"/>
                     </a:p>
+                  </a:txBody>
+                  <a:tcPr/>
+                </a:tc>
+                <a:tc>
+                  <a:txBody>
+                    <a:bodyPr/>
+                    <a:lstStyle/>
                     <a:p>
                       <a:pPr marL="0" marR="0" lvl="0" indent="0" algn="l" defTabSz="914400" rtl="0" eaLnBrk="1" fontAlgn="auto" latinLnBrk="0" hangingPunct="1">
                         <a:lnSpc>
@@ -4334,17 +4341,9 @@
                       </a:pPr>
                       <a:r>
                         <a:rPr lang="en-US" sz="1600" dirty="0"/>
-                        <a:t>To do: </a:t>
+                        <a:t>- 2 hours weather display </a:t>
                       </a:r>
-                      <a:endParaRPr lang="en-SG" sz="1600" dirty="0"/>
-                    </a:p>
-                  </a:txBody>
-                  <a:tcPr/>
-                </a:tc>
-                <a:tc>
-                  <a:txBody>
-                    <a:bodyPr/>
-                    <a:lstStyle/>
+                    </a:p>
                     <a:p>
                       <a:pPr marL="0" marR="0" lvl="0" indent="0" algn="l" defTabSz="914400" rtl="0" eaLnBrk="1" fontAlgn="auto" latinLnBrk="0" hangingPunct="1">
                         <a:lnSpc>
@@ -4365,7 +4364,7 @@
                       </a:pPr>
                       <a:r>
                         <a:rPr lang="en-US" sz="1600" dirty="0"/>
-                        <a:t>2 hours weather display </a:t>
+                        <a:t>- Map to each location</a:t>
                       </a:r>
                     </a:p>
                     <a:p>
@@ -4388,7 +4387,7 @@
                       </a:pPr>
                       <a:r>
                         <a:rPr lang="en-US" sz="1600" dirty="0"/>
-                        <a:t>Map to each location</a:t>
+                        <a:t>- Show different icons</a:t>
                       </a:r>
                     </a:p>
                     <a:p>
@@ -4411,7 +4410,7 @@
                       </a:pPr>
                       <a:r>
                         <a:rPr lang="en-US" sz="1600" dirty="0"/>
-                        <a:t>Show different icons</a:t>
+                        <a:t>- Fly to coordinate when click on marker</a:t>
                       </a:r>
                       <a:endParaRPr lang="en-SG" sz="1600" dirty="0"/>
                     </a:p>
@@ -4467,21 +4466,37 @@
                     <a:bodyPr/>
                     <a:lstStyle/>
                     <a:p>
-                      <a:endParaRPr lang="en-SG" sz="1600" dirty="0"/>
-                    </a:p>
-                  </a:txBody>
-                  <a:tcPr/>
-                </a:tc>
-                <a:tc>
-                  <a:txBody>
-                    <a:bodyPr/>
-                    <a:lstStyle/>
-                    <a:p>
                       <a:r>
                         <a:rPr lang="en-US" sz="1600" dirty="0"/>
-                        <a:t>Fly to coordinate when click on marker</a:t>
+                        <a:t>Next: </a:t>
                       </a:r>
                       <a:endParaRPr lang="en-SG" sz="1600" dirty="0"/>
+                    </a:p>
+                  </a:txBody>
+                  <a:tcPr/>
+                </a:tc>
+                <a:tc>
+                  <a:txBody>
+                    <a:bodyPr/>
+                    <a:lstStyle/>
+                    <a:p>
+                      <a:r>
+                        <a:rPr lang="en-US" sz="1600" dirty="0">
+                          <a:solidFill>
+                            <a:schemeClr val="accent6">
+                              <a:lumMod val="75000"/>
+                            </a:schemeClr>
+                          </a:solidFill>
+                        </a:rPr>
+                        <a:t>- Clear layer</a:t>
+                      </a:r>
+                      <a:endParaRPr lang="en-SG" sz="1600" dirty="0">
+                        <a:solidFill>
+                          <a:schemeClr val="accent6">
+                            <a:lumMod val="75000"/>
+                          </a:schemeClr>
+                        </a:solidFill>
+                      </a:endParaRPr>
                     </a:p>
                   </a:txBody>
                   <a:tcPr/>
@@ -4518,17 +4533,157 @@
                     <a:bodyPr/>
                     <a:lstStyle/>
                     <a:p>
-                      <a:endParaRPr lang="en-SG" sz="1600" dirty="0"/>
-                    </a:p>
-                  </a:txBody>
-                  <a:tcPr/>
-                </a:tc>
-                <a:tc>
-                  <a:txBody>
-                    <a:bodyPr/>
-                    <a:lstStyle/>
-                    <a:p>
-                      <a:endParaRPr lang="en-SG" sz="1600" dirty="0"/>
+                      <a:pPr marL="0" marR="0" lvl="0" indent="0" algn="l" defTabSz="914400" rtl="0" eaLnBrk="1" fontAlgn="auto" latinLnBrk="0" hangingPunct="1">
+                        <a:lnSpc>
+                          <a:spcPct val="100000"/>
+                        </a:lnSpc>
+                        <a:spcBef>
+                          <a:spcPts val="0"/>
+                        </a:spcBef>
+                        <a:spcAft>
+                          <a:spcPts val="0"/>
+                        </a:spcAft>
+                        <a:buClrTx/>
+                        <a:buSzTx/>
+                        <a:buFontTx/>
+                        <a:buNone/>
+                        <a:tabLst/>
+                        <a:defRPr/>
+                      </a:pPr>
+                      <a:r>
+                        <a:rPr lang="en-US" sz="1600" dirty="0"/>
+                        <a:t>24 hours weather</a:t>
+                      </a:r>
+                    </a:p>
+                  </a:txBody>
+                  <a:tcPr/>
+                </a:tc>
+                <a:tc>
+                  <a:txBody>
+                    <a:bodyPr/>
+                    <a:lstStyle/>
+                    <a:p>
+                      <a:pPr marL="0" marR="0" lvl="0" indent="0" algn="l" defTabSz="914400" rtl="0" eaLnBrk="1" fontAlgn="auto" latinLnBrk="0" hangingPunct="1">
+                        <a:lnSpc>
+                          <a:spcPct val="100000"/>
+                        </a:lnSpc>
+                        <a:spcBef>
+                          <a:spcPts val="0"/>
+                        </a:spcBef>
+                        <a:spcAft>
+                          <a:spcPts val="0"/>
+                        </a:spcAft>
+                        <a:buClrTx/>
+                        <a:buSzTx/>
+                        <a:buFontTx/>
+                        <a:buNone/>
+                        <a:tabLst/>
+                        <a:defRPr/>
+                      </a:pPr>
+                      <a:r>
+                        <a:rPr lang="en-US" sz="1600" dirty="0">
+                          <a:solidFill>
+                            <a:schemeClr val="accent6">
+                              <a:lumMod val="75000"/>
+                            </a:schemeClr>
+                          </a:solidFill>
+                        </a:rPr>
+                        <a:t>- 24 hours weather display (morning, noon, night)</a:t>
+                      </a:r>
+                    </a:p>
+                    <a:p>
+                      <a:pPr marL="0" marR="0" lvl="0" indent="0" algn="l" defTabSz="914400" rtl="0" eaLnBrk="1" fontAlgn="auto" latinLnBrk="0" hangingPunct="1">
+                        <a:lnSpc>
+                          <a:spcPct val="100000"/>
+                        </a:lnSpc>
+                        <a:spcBef>
+                          <a:spcPts val="0"/>
+                        </a:spcBef>
+                        <a:spcAft>
+                          <a:spcPts val="0"/>
+                        </a:spcAft>
+                        <a:buClrTx/>
+                        <a:buSzTx/>
+                        <a:buFontTx/>
+                        <a:buNone/>
+                        <a:tabLst/>
+                        <a:defRPr/>
+                      </a:pPr>
+                      <a:r>
+                        <a:rPr lang="en-US" sz="1600" dirty="0">
+                          <a:solidFill>
+                            <a:schemeClr val="accent6">
+                              <a:lumMod val="75000"/>
+                            </a:schemeClr>
+                          </a:solidFill>
+                        </a:rPr>
+                        <a:t>- Map to each region</a:t>
+                      </a:r>
+                    </a:p>
+                    <a:p>
+                      <a:pPr marL="0" marR="0" lvl="0" indent="0" algn="l" defTabSz="914400" rtl="0" eaLnBrk="1" fontAlgn="auto" latinLnBrk="0" hangingPunct="1">
+                        <a:lnSpc>
+                          <a:spcPct val="100000"/>
+                        </a:lnSpc>
+                        <a:spcBef>
+                          <a:spcPts val="0"/>
+                        </a:spcBef>
+                        <a:spcAft>
+                          <a:spcPts val="0"/>
+                        </a:spcAft>
+                        <a:buClrTx/>
+                        <a:buSzTx/>
+                        <a:buFontTx/>
+                        <a:buNone/>
+                        <a:tabLst/>
+                        <a:defRPr/>
+                      </a:pPr>
+                      <a:r>
+                        <a:rPr lang="en-US" sz="1600" dirty="0">
+                          <a:solidFill>
+                            <a:schemeClr val="accent6">
+                              <a:lumMod val="75000"/>
+                            </a:schemeClr>
+                          </a:solidFill>
+                        </a:rPr>
+                        <a:t>- Show different icons</a:t>
+                      </a:r>
+                    </a:p>
+                    <a:p>
+                      <a:pPr marL="0" marR="0" lvl="0" indent="0" algn="l" defTabSz="914400" rtl="0" eaLnBrk="1" fontAlgn="auto" latinLnBrk="0" hangingPunct="1">
+                        <a:lnSpc>
+                          <a:spcPct val="100000"/>
+                        </a:lnSpc>
+                        <a:spcBef>
+                          <a:spcPts val="0"/>
+                        </a:spcBef>
+                        <a:spcAft>
+                          <a:spcPts val="0"/>
+                        </a:spcAft>
+                        <a:buClrTx/>
+                        <a:buSzTx/>
+                        <a:buFontTx/>
+                        <a:buNone/>
+                        <a:tabLst/>
+                        <a:defRPr/>
+                      </a:pPr>
+                      <a:r>
+                        <a:rPr lang="en-US" sz="1600" dirty="0">
+                          <a:solidFill>
+                            <a:schemeClr val="accent6">
+                              <a:lumMod val="75000"/>
+                            </a:schemeClr>
+                          </a:solidFill>
+                        </a:rPr>
+                        <a:t>- Display humidity and temperature &gt; on the div display box</a:t>
+                      </a:r>
+                      <a:endParaRPr lang="en-SG" sz="1600" dirty="0">
+                        <a:solidFill>
+                          <a:schemeClr val="accent6">
+                            <a:lumMod val="75000"/>
+                          </a:schemeClr>
+                        </a:solidFill>
+                      </a:endParaRPr>
                     </a:p>
                   </a:txBody>
                   <a:tcPr/>
@@ -11191,14 +11346,14 @@
           <p:nvPr>
             <p:extLst>
               <p:ext uri="{D42A27DB-BD31-4B8C-83A1-F6EECF244321}">
-                <p14:modId xmlns:p14="http://schemas.microsoft.com/office/powerpoint/2010/main" val="1577146319"/>
+                <p14:modId xmlns:p14="http://schemas.microsoft.com/office/powerpoint/2010/main" val="1609965394"/>
               </p:ext>
             </p:extLst>
           </p:nvPr>
         </p:nvGraphicFramePr>
         <p:xfrm>
           <a:off x="238539" y="149163"/>
-          <a:ext cx="11728175" cy="5547360"/>
+          <a:ext cx="11728175" cy="5791200"/>
         </p:xfrm>
         <a:graphic>
           <a:graphicData uri="http://schemas.openxmlformats.org/drawingml/2006/table">
@@ -11689,15 +11844,149 @@
                         <a:t>- Set the font (google font)</a:t>
                       </a:r>
                     </a:p>
-                  </a:txBody>
-                  <a:tcPr/>
-                </a:tc>
-                <a:tc>
-                  <a:txBody>
-                    <a:bodyPr/>
-                    <a:lstStyle/>
-                    <a:p>
-                      <a:endParaRPr lang="en-SG" sz="1600" dirty="0"/>
+                    <a:p>
+                      <a:pPr marL="0" marR="0" lvl="0" indent="0" algn="l" defTabSz="914400" rtl="0" eaLnBrk="1" fontAlgn="auto" latinLnBrk="0" hangingPunct="1">
+                        <a:lnSpc>
+                          <a:spcPct val="100000"/>
+                        </a:lnSpc>
+                        <a:spcBef>
+                          <a:spcPts val="0"/>
+                        </a:spcBef>
+                        <a:spcAft>
+                          <a:spcPts val="0"/>
+                        </a:spcAft>
+                        <a:buClrTx/>
+                        <a:buSzTx/>
+                        <a:buFontTx/>
+                        <a:buNone/>
+                        <a:tabLst/>
+                        <a:defRPr/>
+                      </a:pPr>
+                      <a:r>
+                        <a:rPr lang="en-US" sz="1600" dirty="0">
+                          <a:solidFill>
+                            <a:schemeClr val="accent6">
+                              <a:lumMod val="75000"/>
+                            </a:schemeClr>
+                          </a:solidFill>
+                        </a:rPr>
+                        <a:t>- Set fly to marker when click</a:t>
+                      </a:r>
+                    </a:p>
+                  </a:txBody>
+                  <a:tcPr/>
+                </a:tc>
+                <a:tc>
+                  <a:txBody>
+                    <a:bodyPr/>
+                    <a:lstStyle/>
+                    <a:p>
+                      <a:r>
+                        <a:rPr lang="en-US" sz="1600" dirty="0"/>
+                        <a:t>Ref: </a:t>
+                      </a:r>
+                    </a:p>
+                    <a:p>
+                      <a:r>
+                        <a:rPr lang="en-SG" sz="1800" b="0" kern="1200" dirty="0" err="1">
+                          <a:solidFill>
+                            <a:schemeClr val="dk1"/>
+                          </a:solidFill>
+                          <a:effectLst/>
+                          <a:latin typeface="+mn-lt"/>
+                          <a:ea typeface="+mn-ea"/>
+                          <a:cs typeface="+mn-cs"/>
+                        </a:rPr>
+                        <a:t>weatherMarker.on</a:t>
+                      </a:r>
+                      <a:r>
+                        <a:rPr lang="en-SG" sz="1800" b="0" kern="1200" dirty="0">
+                          <a:solidFill>
+                            <a:schemeClr val="dk1"/>
+                          </a:solidFill>
+                          <a:effectLst/>
+                          <a:latin typeface="+mn-lt"/>
+                          <a:ea typeface="+mn-ea"/>
+                          <a:cs typeface="+mn-cs"/>
+                        </a:rPr>
+                        <a:t>("click", function(e){</a:t>
+                      </a:r>
+                    </a:p>
+                    <a:p>
+                      <a:r>
+                        <a:rPr lang="en-SG" sz="1800" b="0" kern="1200" dirty="0">
+                          <a:solidFill>
+                            <a:schemeClr val="dk1"/>
+                          </a:solidFill>
+                          <a:effectLst/>
+                          <a:latin typeface="+mn-lt"/>
+                          <a:ea typeface="+mn-ea"/>
+                          <a:cs typeface="+mn-cs"/>
+                        </a:rPr>
+                        <a:t>                </a:t>
+                      </a:r>
+                      <a:r>
+                        <a:rPr lang="en-SG" sz="1800" b="0" kern="1200" dirty="0" err="1">
+                          <a:solidFill>
+                            <a:schemeClr val="dk1"/>
+                          </a:solidFill>
+                          <a:effectLst/>
+                          <a:latin typeface="+mn-lt"/>
+                          <a:ea typeface="+mn-ea"/>
+                          <a:cs typeface="+mn-cs"/>
+                        </a:rPr>
+                        <a:t>map.flyTo</a:t>
+                      </a:r>
+                      <a:r>
+                        <a:rPr lang="en-SG" sz="1800" b="0" kern="1200" dirty="0">
+                          <a:solidFill>
+                            <a:schemeClr val="dk1"/>
+                          </a:solidFill>
+                          <a:effectLst/>
+                          <a:latin typeface="+mn-lt"/>
+                          <a:ea typeface="+mn-ea"/>
+                          <a:cs typeface="+mn-cs"/>
+                        </a:rPr>
+                        <a:t>(</a:t>
+                      </a:r>
+                      <a:r>
+                        <a:rPr lang="en-SG" sz="1800" b="0" kern="1200" dirty="0" err="1">
+                          <a:solidFill>
+                            <a:schemeClr val="dk1"/>
+                          </a:solidFill>
+                          <a:effectLst/>
+                          <a:latin typeface="+mn-lt"/>
+                          <a:ea typeface="+mn-ea"/>
+                          <a:cs typeface="+mn-cs"/>
+                        </a:rPr>
+                        <a:t>this.getLatLng</a:t>
+                      </a:r>
+                      <a:r>
+                        <a:rPr lang="en-SG" sz="1800" b="0" kern="1200" dirty="0">
+                          <a:solidFill>
+                            <a:schemeClr val="dk1"/>
+                          </a:solidFill>
+                          <a:effectLst/>
+                          <a:latin typeface="+mn-lt"/>
+                          <a:ea typeface="+mn-ea"/>
+                          <a:cs typeface="+mn-cs"/>
+                        </a:rPr>
+                        <a:t>(),16)</a:t>
+                      </a:r>
+                    </a:p>
+                    <a:p>
+                      <a:r>
+                        <a:rPr lang="en-SG" sz="1800" b="0" kern="1200" dirty="0">
+                          <a:solidFill>
+                            <a:schemeClr val="dk1"/>
+                          </a:solidFill>
+                          <a:effectLst/>
+                          <a:latin typeface="+mn-lt"/>
+                          <a:ea typeface="+mn-ea"/>
+                          <a:cs typeface="+mn-cs"/>
+                        </a:rPr>
+                        <a:t>            }) </a:t>
+                      </a:r>
                     </a:p>
                   </a:txBody>
                   <a:tcPr/>

</xml_diff>

<commit_message>
setup region on the map using geoJson multipolygon, add tooltips and styling
</commit_message>
<xml_diff>
--- a/wireframe.pptx
+++ b/wireframe.pptx
@@ -4132,14 +4132,14 @@
           <p:nvPr>
             <p:extLst>
               <p:ext uri="{D42A27DB-BD31-4B8C-83A1-F6EECF244321}">
-                <p14:modId xmlns:p14="http://schemas.microsoft.com/office/powerpoint/2010/main" val="3851091015"/>
+                <p14:modId xmlns:p14="http://schemas.microsoft.com/office/powerpoint/2010/main" val="3041845259"/>
               </p:ext>
             </p:extLst>
           </p:nvPr>
         </p:nvGraphicFramePr>
         <p:xfrm>
           <a:off x="238539" y="149163"/>
-          <a:ext cx="11728175" cy="4958080"/>
+          <a:ext cx="11728175" cy="5201920"/>
         </p:xfrm>
         <a:graphic>
           <a:graphicData uri="http://schemas.openxmlformats.org/drawingml/2006/table">
@@ -4676,6 +4676,35 @@
                           </a:solidFill>
                         </a:rPr>
                         <a:t>- Display humidity and temperature &gt; on the div display box</a:t>
+                      </a:r>
+                    </a:p>
+                    <a:p>
+                      <a:pPr marL="0" marR="0" lvl="0" indent="0" algn="l" defTabSz="914400" rtl="0" eaLnBrk="1" fontAlgn="auto" latinLnBrk="0" hangingPunct="1">
+                        <a:lnSpc>
+                          <a:spcPct val="100000"/>
+                        </a:lnSpc>
+                        <a:spcBef>
+                          <a:spcPts val="0"/>
+                        </a:spcBef>
+                        <a:spcAft>
+                          <a:spcPts val="0"/>
+                        </a:spcAft>
+                        <a:buClrTx/>
+                        <a:buSzTx/>
+                        <a:buFontTx/>
+                        <a:buNone/>
+                        <a:tabLst/>
+                        <a:defRPr/>
+                      </a:pPr>
+                      <a:r>
+                        <a:rPr lang="en-US" sz="1600" dirty="0">
+                          <a:solidFill>
+                            <a:schemeClr val="accent6">
+                              <a:lumMod val="75000"/>
+                            </a:schemeClr>
+                          </a:solidFill>
+                        </a:rPr>
+                        <a:t>- Clear layer</a:t>
                       </a:r>
                       <a:endParaRPr lang="en-SG" sz="1600" dirty="0">
                         <a:solidFill>
@@ -10295,14 +10324,14 @@
           <p:nvPr>
             <p:extLst>
               <p:ext uri="{D42A27DB-BD31-4B8C-83A1-F6EECF244321}">
-                <p14:modId xmlns:p14="http://schemas.microsoft.com/office/powerpoint/2010/main" val="2969425680"/>
+                <p14:modId xmlns:p14="http://schemas.microsoft.com/office/powerpoint/2010/main" val="1513334531"/>
               </p:ext>
             </p:extLst>
           </p:nvPr>
         </p:nvGraphicFramePr>
         <p:xfrm>
           <a:off x="246821" y="356888"/>
-          <a:ext cx="11698358" cy="2763520"/>
+          <a:ext cx="11698358" cy="3403600"/>
         </p:xfrm>
         <a:graphic>
           <a:graphicData uri="http://schemas.openxmlformats.org/drawingml/2006/table">
@@ -10539,52 +10568,6 @@
                     <a:bodyPr/>
                     <a:lstStyle/>
                     <a:p>
-                      <a:r>
-                        <a:rPr lang="en-SG" dirty="0"/>
-                        <a:t>https://foursquare.com/products/places/</a:t>
-                      </a:r>
-                    </a:p>
-                  </a:txBody>
-                  <a:tcPr/>
-                </a:tc>
-                <a:extLst>
-                  <a:ext uri="{0D108BD9-81ED-4DB2-BD59-A6C34878D82A}">
-                    <a16:rowId xmlns:a16="http://schemas.microsoft.com/office/drawing/2014/main" val="3190661558"/>
-                  </a:ext>
-                </a:extLst>
-              </a:tr>
-              <a:tr h="370840">
-                <a:tc>
-                  <a:txBody>
-                    <a:bodyPr/>
-                    <a:lstStyle/>
-                    <a:p>
-                      <a:r>
-                        <a:rPr lang="en-US" dirty="0"/>
-                        <a:t>2 </a:t>
-                      </a:r>
-                      <a:r>
-                        <a:rPr lang="en-US" dirty="0" err="1"/>
-                        <a:t>hr</a:t>
-                      </a:r>
-                      <a:r>
-                        <a:rPr lang="en-US" dirty="0"/>
-                        <a:t> </a:t>
-                      </a:r>
-                      <a:r>
-                        <a:rPr lang="en-US" dirty="0" err="1"/>
-                        <a:t>api</a:t>
-                      </a:r>
-                      <a:endParaRPr lang="en-SG" dirty="0"/>
-                    </a:p>
-                  </a:txBody>
-                  <a:tcPr/>
-                </a:tc>
-                <a:tc>
-                  <a:txBody>
-                    <a:bodyPr/>
-                    <a:lstStyle/>
-                    <a:p>
                       <a:pPr marL="0" marR="0" lvl="0" indent="0" algn="l" defTabSz="914400" rtl="0" eaLnBrk="1" fontAlgn="auto" latinLnBrk="0" hangingPunct="1">
                         <a:lnSpc>
                           <a:spcPct val="100000"/>
@@ -10612,6 +10595,77 @@
                           <a:ea typeface="+mn-ea"/>
                           <a:cs typeface="+mn-cs"/>
                         </a:rPr>
+                        <a:t>https://api.foursquare.com/v2/venues/search</a:t>
+                      </a:r>
+                    </a:p>
+                  </a:txBody>
+                  <a:tcPr/>
+                </a:tc>
+                <a:extLst>
+                  <a:ext uri="{0D108BD9-81ED-4DB2-BD59-A6C34878D82A}">
+                    <a16:rowId xmlns:a16="http://schemas.microsoft.com/office/drawing/2014/main" val="3190661558"/>
+                  </a:ext>
+                </a:extLst>
+              </a:tr>
+              <a:tr h="370840">
+                <a:tc>
+                  <a:txBody>
+                    <a:bodyPr/>
+                    <a:lstStyle/>
+                    <a:p>
+                      <a:r>
+                        <a:rPr lang="en-US" dirty="0"/>
+                        <a:t>2 </a:t>
+                      </a:r>
+                      <a:r>
+                        <a:rPr lang="en-US" dirty="0" err="1"/>
+                        <a:t>hr</a:t>
+                      </a:r>
+                      <a:r>
+                        <a:rPr lang="en-US" dirty="0"/>
+                        <a:t> </a:t>
+                      </a:r>
+                      <a:r>
+                        <a:rPr lang="en-US" dirty="0" err="1"/>
+                        <a:t>api</a:t>
+                      </a:r>
+                      <a:endParaRPr lang="en-SG" dirty="0"/>
+                    </a:p>
+                  </a:txBody>
+                  <a:tcPr/>
+                </a:tc>
+                <a:tc>
+                  <a:txBody>
+                    <a:bodyPr/>
+                    <a:lstStyle/>
+                    <a:p>
+                      <a:pPr marL="0" marR="0" lvl="0" indent="0" algn="l" defTabSz="914400" rtl="0" eaLnBrk="1" fontAlgn="auto" latinLnBrk="0" hangingPunct="1">
+                        <a:lnSpc>
+                          <a:spcPct val="100000"/>
+                        </a:lnSpc>
+                        <a:spcBef>
+                          <a:spcPts val="0"/>
+                        </a:spcBef>
+                        <a:spcAft>
+                          <a:spcPts val="0"/>
+                        </a:spcAft>
+                        <a:buClrTx/>
+                        <a:buSzTx/>
+                        <a:buFontTx/>
+                        <a:buNone/>
+                        <a:tabLst/>
+                        <a:defRPr/>
+                      </a:pPr>
+                      <a:r>
+                        <a:rPr lang="en-SG" sz="1800" b="0" kern="1200" dirty="0">
+                          <a:solidFill>
+                            <a:schemeClr val="dk1"/>
+                          </a:solidFill>
+                          <a:effectLst/>
+                          <a:latin typeface="+mn-lt"/>
+                          <a:ea typeface="+mn-ea"/>
+                          <a:cs typeface="+mn-cs"/>
+                        </a:rPr>
                         <a:t>https://api.data.gov.sg/v1/environment/2-hour-weather-forecast</a:t>
                       </a:r>
                     </a:p>
@@ -10621,6 +10675,119 @@
                 <a:extLst>
                   <a:ext uri="{0D108BD9-81ED-4DB2-BD59-A6C34878D82A}">
                     <a16:rowId xmlns:a16="http://schemas.microsoft.com/office/drawing/2014/main" val="860356388"/>
+                  </a:ext>
+                </a:extLst>
+              </a:tr>
+              <a:tr h="370840">
+                <a:tc>
+                  <a:txBody>
+                    <a:bodyPr/>
+                    <a:lstStyle/>
+                    <a:p>
+                      <a:r>
+                        <a:rPr lang="en-US" dirty="0"/>
+                        <a:t>Singapore regions boundary</a:t>
+                      </a:r>
+                    </a:p>
+                    <a:p>
+                      <a:pPr marL="0" marR="0" lvl="0" indent="0" algn="l" defTabSz="914400" rtl="0" eaLnBrk="1" fontAlgn="auto" latinLnBrk="0" hangingPunct="1">
+                        <a:lnSpc>
+                          <a:spcPct val="100000"/>
+                        </a:lnSpc>
+                        <a:spcBef>
+                          <a:spcPts val="0"/>
+                        </a:spcBef>
+                        <a:spcAft>
+                          <a:spcPts val="0"/>
+                        </a:spcAft>
+                        <a:buClrTx/>
+                        <a:buSzTx/>
+                        <a:buFontTx/>
+                        <a:buNone/>
+                        <a:tabLst/>
+                        <a:defRPr/>
+                      </a:pPr>
+                      <a:r>
+                        <a:rPr lang="en-US" dirty="0"/>
+                        <a:t>(</a:t>
+                      </a:r>
+                      <a:r>
+                        <a:rPr lang="en-US" dirty="0" err="1"/>
+                        <a:t>geojson</a:t>
+                      </a:r>
+                      <a:r>
+                        <a:rPr lang="en-US" dirty="0"/>
+                        <a:t> </a:t>
+                      </a:r>
+                      <a:r>
+                        <a:rPr lang="en-SG" sz="1800" b="0" kern="1200" dirty="0" err="1">
+                          <a:solidFill>
+                            <a:schemeClr val="dk1"/>
+                          </a:solidFill>
+                          <a:effectLst/>
+                          <a:latin typeface="+mn-lt"/>
+                          <a:ea typeface="+mn-ea"/>
+                          <a:cs typeface="+mn-cs"/>
+                        </a:rPr>
+                        <a:t>MultiPolygon</a:t>
+                      </a:r>
+                      <a:r>
+                        <a:rPr lang="en-SG" sz="1800" b="0" kern="1200" dirty="0">
+                          <a:solidFill>
+                            <a:schemeClr val="dk1"/>
+                          </a:solidFill>
+                          <a:effectLst/>
+                          <a:latin typeface="+mn-lt"/>
+                          <a:ea typeface="+mn-ea"/>
+                          <a:cs typeface="+mn-cs"/>
+                        </a:rPr>
+                        <a:t>)</a:t>
+                      </a:r>
+                    </a:p>
+                  </a:txBody>
+                  <a:tcPr/>
+                </a:tc>
+                <a:tc>
+                  <a:txBody>
+                    <a:bodyPr/>
+                    <a:lstStyle/>
+                    <a:p>
+                      <a:pPr marL="0" marR="0" lvl="0" indent="0" algn="l" defTabSz="914400" rtl="0" eaLnBrk="1" fontAlgn="auto" latinLnBrk="0" hangingPunct="1">
+                        <a:lnSpc>
+                          <a:spcPct val="100000"/>
+                        </a:lnSpc>
+                        <a:spcBef>
+                          <a:spcPts val="0"/>
+                        </a:spcBef>
+                        <a:spcAft>
+                          <a:spcPts val="0"/>
+                        </a:spcAft>
+                        <a:buClrTx/>
+                        <a:buSzTx/>
+                        <a:buFontTx/>
+                        <a:buNone/>
+                        <a:tabLst/>
+                        <a:defRPr/>
+                      </a:pPr>
+                      <a:r>
+                        <a:rPr lang="en-SG" sz="1800" b="0" kern="1200" dirty="0">
+                          <a:solidFill>
+                            <a:schemeClr val="dk1"/>
+                          </a:solidFill>
+                          <a:effectLst/>
+                          <a:latin typeface="+mn-lt"/>
+                          <a:ea typeface="+mn-ea"/>
+                          <a:cs typeface="+mn-cs"/>
+                        </a:rPr>
+                        <a:t>https://data.gov.sg/dataset/master-plan-2019-region-boundary-no-sea</a:t>
+                      </a:r>
+                    </a:p>
+                  </a:txBody>
+                  <a:tcPr/>
+                </a:tc>
+                <a:extLst>
+                  <a:ext uri="{0D108BD9-81ED-4DB2-BD59-A6C34878D82A}">
+                    <a16:rowId xmlns:a16="http://schemas.microsoft.com/office/drawing/2014/main" val="1550290926"/>
                   </a:ext>
                 </a:extLst>
               </a:tr>
@@ -11346,14 +11513,14 @@
           <p:nvPr>
             <p:extLst>
               <p:ext uri="{D42A27DB-BD31-4B8C-83A1-F6EECF244321}">
-                <p14:modId xmlns:p14="http://schemas.microsoft.com/office/powerpoint/2010/main" val="1609965394"/>
+                <p14:modId xmlns:p14="http://schemas.microsoft.com/office/powerpoint/2010/main" val="4115446072"/>
               </p:ext>
             </p:extLst>
           </p:nvPr>
         </p:nvGraphicFramePr>
         <p:xfrm>
           <a:off x="238539" y="149163"/>
-          <a:ext cx="11728175" cy="5791200"/>
+          <a:ext cx="11728175" cy="6522720"/>
         </p:xfrm>
         <a:graphic>
           <a:graphicData uri="http://schemas.openxmlformats.org/drawingml/2006/table">
@@ -11871,6 +12038,90 @@
                           </a:solidFill>
                         </a:rPr>
                         <a:t>- Set fly to marker when click</a:t>
+                      </a:r>
+                    </a:p>
+                    <a:p>
+                      <a:pPr marL="0" marR="0" lvl="0" indent="0" algn="l" defTabSz="914400" rtl="0" eaLnBrk="1" fontAlgn="auto" latinLnBrk="0" hangingPunct="1">
+                        <a:lnSpc>
+                          <a:spcPct val="100000"/>
+                        </a:lnSpc>
+                        <a:spcBef>
+                          <a:spcPts val="0"/>
+                        </a:spcBef>
+                        <a:spcAft>
+                          <a:spcPts val="0"/>
+                        </a:spcAft>
+                        <a:buClrTx/>
+                        <a:buSzTx/>
+                        <a:buFontTx/>
+                        <a:buNone/>
+                        <a:tabLst/>
+                        <a:defRPr/>
+                      </a:pPr>
+                      <a:endParaRPr lang="en-US" sz="1600" dirty="0">
+                        <a:solidFill>
+                          <a:schemeClr val="accent6">
+                            <a:lumMod val="75000"/>
+                          </a:schemeClr>
+                        </a:solidFill>
+                      </a:endParaRPr>
+                    </a:p>
+                    <a:p>
+                      <a:pPr marL="0" marR="0" lvl="0" indent="0" algn="l" defTabSz="914400" rtl="0" eaLnBrk="1" fontAlgn="auto" latinLnBrk="0" hangingPunct="1">
+                        <a:lnSpc>
+                          <a:spcPct val="100000"/>
+                        </a:lnSpc>
+                        <a:spcBef>
+                          <a:spcPts val="0"/>
+                        </a:spcBef>
+                        <a:spcAft>
+                          <a:spcPts val="0"/>
+                        </a:spcAft>
+                        <a:buClrTx/>
+                        <a:buSzTx/>
+                        <a:buFontTx/>
+                        <a:buNone/>
+                        <a:tabLst/>
+                        <a:defRPr/>
+                      </a:pPr>
+                      <a:r>
+                        <a:rPr lang="en-US" sz="1600" dirty="0">
+                          <a:solidFill>
+                            <a:schemeClr val="accent6">
+                              <a:lumMod val="75000"/>
+                            </a:schemeClr>
+                          </a:solidFill>
+                        </a:rPr>
+                        <a:t>- Make into single page html </a:t>
+                      </a:r>
+                    </a:p>
+                    <a:p>
+                      <a:pPr marL="0" marR="0" lvl="0" indent="0" algn="l" defTabSz="914400" rtl="0" eaLnBrk="1" fontAlgn="auto" latinLnBrk="0" hangingPunct="1">
+                        <a:lnSpc>
+                          <a:spcPct val="100000"/>
+                        </a:lnSpc>
+                        <a:spcBef>
+                          <a:spcPts val="0"/>
+                        </a:spcBef>
+                        <a:spcAft>
+                          <a:spcPts val="0"/>
+                        </a:spcAft>
+                        <a:buClrTx/>
+                        <a:buSzTx/>
+                        <a:buFontTx/>
+                        <a:buNone/>
+                        <a:tabLst/>
+                        <a:defRPr/>
+                      </a:pPr>
+                      <a:r>
+                        <a:rPr lang="en-US" sz="1600" dirty="0">
+                          <a:solidFill>
+                            <a:schemeClr val="accent6">
+                              <a:lumMod val="75000"/>
+                            </a:schemeClr>
+                          </a:solidFill>
+                        </a:rPr>
+                        <a:t>- Search box display result for the first page </a:t>
                       </a:r>
                     </a:p>
                   </a:txBody>

</xml_diff>

<commit_message>
set the Nav and search container to float on the map
</commit_message>
<xml_diff>
--- a/wireframe.pptx
+++ b/wireframe.pptx
@@ -248,7 +248,7 @@
           <a:p>
             <a:fld id="{32064421-C73C-417F-B8BA-758EB1A55C3F}" type="datetimeFigureOut">
               <a:rPr lang="en-SG" smtClean="0"/>
-              <a:t>22/9/2021</a:t>
+              <a:t>23/9/2021</a:t>
             </a:fld>
             <a:endParaRPr lang="en-SG"/>
           </a:p>
@@ -917,7 +917,7 @@
           <a:p>
             <a:fld id="{5B3D8EE2-B186-4E74-82A5-3FDCBC0BCA47}" type="datetimeFigureOut">
               <a:rPr lang="en-SG" smtClean="0"/>
-              <a:t>22/9/2021</a:t>
+              <a:t>23/9/2021</a:t>
             </a:fld>
             <a:endParaRPr lang="en-SG"/>
           </a:p>
@@ -1117,7 +1117,7 @@
           <a:p>
             <a:fld id="{5B3D8EE2-B186-4E74-82A5-3FDCBC0BCA47}" type="datetimeFigureOut">
               <a:rPr lang="en-SG" smtClean="0"/>
-              <a:t>22/9/2021</a:t>
+              <a:t>23/9/2021</a:t>
             </a:fld>
             <a:endParaRPr lang="en-SG"/>
           </a:p>
@@ -1327,7 +1327,7 @@
           <a:p>
             <a:fld id="{5B3D8EE2-B186-4E74-82A5-3FDCBC0BCA47}" type="datetimeFigureOut">
               <a:rPr lang="en-SG" smtClean="0"/>
-              <a:t>22/9/2021</a:t>
+              <a:t>23/9/2021</a:t>
             </a:fld>
             <a:endParaRPr lang="en-SG"/>
           </a:p>
@@ -1527,7 +1527,7 @@
           <a:p>
             <a:fld id="{5B3D8EE2-B186-4E74-82A5-3FDCBC0BCA47}" type="datetimeFigureOut">
               <a:rPr lang="en-SG" smtClean="0"/>
-              <a:t>22/9/2021</a:t>
+              <a:t>23/9/2021</a:t>
             </a:fld>
             <a:endParaRPr lang="en-SG"/>
           </a:p>
@@ -1803,7 +1803,7 @@
           <a:p>
             <a:fld id="{5B3D8EE2-B186-4E74-82A5-3FDCBC0BCA47}" type="datetimeFigureOut">
               <a:rPr lang="en-SG" smtClean="0"/>
-              <a:t>22/9/2021</a:t>
+              <a:t>23/9/2021</a:t>
             </a:fld>
             <a:endParaRPr lang="en-SG"/>
           </a:p>
@@ -2071,7 +2071,7 @@
           <a:p>
             <a:fld id="{5B3D8EE2-B186-4E74-82A5-3FDCBC0BCA47}" type="datetimeFigureOut">
               <a:rPr lang="en-SG" smtClean="0"/>
-              <a:t>22/9/2021</a:t>
+              <a:t>23/9/2021</a:t>
             </a:fld>
             <a:endParaRPr lang="en-SG"/>
           </a:p>
@@ -2486,7 +2486,7 @@
           <a:p>
             <a:fld id="{5B3D8EE2-B186-4E74-82A5-3FDCBC0BCA47}" type="datetimeFigureOut">
               <a:rPr lang="en-SG" smtClean="0"/>
-              <a:t>22/9/2021</a:t>
+              <a:t>23/9/2021</a:t>
             </a:fld>
             <a:endParaRPr lang="en-SG"/>
           </a:p>
@@ -2628,7 +2628,7 @@
           <a:p>
             <a:fld id="{5B3D8EE2-B186-4E74-82A5-3FDCBC0BCA47}" type="datetimeFigureOut">
               <a:rPr lang="en-SG" smtClean="0"/>
-              <a:t>22/9/2021</a:t>
+              <a:t>23/9/2021</a:t>
             </a:fld>
             <a:endParaRPr lang="en-SG"/>
           </a:p>
@@ -2741,7 +2741,7 @@
           <a:p>
             <a:fld id="{5B3D8EE2-B186-4E74-82A5-3FDCBC0BCA47}" type="datetimeFigureOut">
               <a:rPr lang="en-SG" smtClean="0"/>
-              <a:t>22/9/2021</a:t>
+              <a:t>23/9/2021</a:t>
             </a:fld>
             <a:endParaRPr lang="en-SG"/>
           </a:p>
@@ -3054,7 +3054,7 @@
           <a:p>
             <a:fld id="{5B3D8EE2-B186-4E74-82A5-3FDCBC0BCA47}" type="datetimeFigureOut">
               <a:rPr lang="en-SG" smtClean="0"/>
-              <a:t>22/9/2021</a:t>
+              <a:t>23/9/2021</a:t>
             </a:fld>
             <a:endParaRPr lang="en-SG"/>
           </a:p>
@@ -3343,7 +3343,7 @@
           <a:p>
             <a:fld id="{5B3D8EE2-B186-4E74-82A5-3FDCBC0BCA47}" type="datetimeFigureOut">
               <a:rPr lang="en-SG" smtClean="0"/>
-              <a:t>22/9/2021</a:t>
+              <a:t>23/9/2021</a:t>
             </a:fld>
             <a:endParaRPr lang="en-SG"/>
           </a:p>
@@ -3586,7 +3586,7 @@
           <a:p>
             <a:fld id="{5B3D8EE2-B186-4E74-82A5-3FDCBC0BCA47}" type="datetimeFigureOut">
               <a:rPr lang="en-SG" smtClean="0"/>
-              <a:t>22/9/2021</a:t>
+              <a:t>23/9/2021</a:t>
             </a:fld>
             <a:endParaRPr lang="en-SG"/>
           </a:p>
@@ -10926,7 +10926,7 @@
           <p:nvPr>
             <p:extLst>
               <p:ext uri="{D42A27DB-BD31-4B8C-83A1-F6EECF244321}">
-                <p14:modId xmlns:p14="http://schemas.microsoft.com/office/powerpoint/2010/main" val="3437766132"/>
+                <p14:modId xmlns:p14="http://schemas.microsoft.com/office/powerpoint/2010/main" val="733870814"/>
               </p:ext>
             </p:extLst>
           </p:nvPr>
@@ -11520,7 +11520,7 @@
                             </a:schemeClr>
                           </a:solidFill>
                         </a:rPr>
-                        <a:t>- Limit the search to SG only</a:t>
+                        <a:t>- Limit the search to SG only **</a:t>
                       </a:r>
                     </a:p>
                   </a:txBody>

</xml_diff>

<commit_message>
Navbar for mobile responsiveness
</commit_message>
<xml_diff>
--- a/wireframe.pptx
+++ b/wireframe.pptx
@@ -11621,7 +11621,7 @@
           <p:nvPr>
             <p:extLst>
               <p:ext uri="{D42A27DB-BD31-4B8C-83A1-F6EECF244321}">
-                <p14:modId xmlns:p14="http://schemas.microsoft.com/office/powerpoint/2010/main" val="2487343689"/>
+                <p14:modId xmlns:p14="http://schemas.microsoft.com/office/powerpoint/2010/main" val="3861603036"/>
               </p:ext>
             </p:extLst>
           </p:nvPr>
@@ -12023,6 +12023,42 @@
                   <a:txBody>
                     <a:bodyPr/>
                     <a:lstStyle/>
+                    <a:p>
+                      <a:endParaRPr lang="en-US" sz="1600" dirty="0">
+                        <a:solidFill>
+                          <a:srgbClr val="C00000"/>
+                        </a:solidFill>
+                      </a:endParaRPr>
+                    </a:p>
+                    <a:p>
+                      <a:pPr marL="0" marR="0" lvl="0" indent="0" algn="l" defTabSz="914400" rtl="0" eaLnBrk="1" fontAlgn="auto" latinLnBrk="0" hangingPunct="1">
+                        <a:lnSpc>
+                          <a:spcPct val="100000"/>
+                        </a:lnSpc>
+                        <a:spcBef>
+                          <a:spcPts val="0"/>
+                        </a:spcBef>
+                        <a:spcAft>
+                          <a:spcPts val="0"/>
+                        </a:spcAft>
+                        <a:buClrTx/>
+                        <a:buSzTx/>
+                        <a:buFontTx/>
+                        <a:buNone/>
+                        <a:tabLst/>
+                        <a:defRPr/>
+                      </a:pPr>
+                      <a:r>
+                        <a:rPr lang="en-US" sz="1600" dirty="0">
+                          <a:solidFill>
+                            <a:schemeClr val="accent6">
+                              <a:lumMod val="75000"/>
+                            </a:schemeClr>
+                          </a:solidFill>
+                        </a:rPr>
+                        <a:t>- Show region &gt;&gt; zoom out to see full region view**</a:t>
+                      </a:r>
+                    </a:p>
                     <a:p>
                       <a:endParaRPr lang="en-SG" sz="1600" dirty="0">
                         <a:solidFill>

</xml_diff>

<commit_message>
set container fluid to hold Nav container and map
</commit_message>
<xml_diff>
--- a/wireframe.pptx
+++ b/wireframe.pptx
@@ -248,7 +248,7 @@
           <a:p>
             <a:fld id="{32064421-C73C-417F-B8BA-758EB1A55C3F}" type="datetimeFigureOut">
               <a:rPr lang="en-SG" smtClean="0"/>
-              <a:t>23/9/2021</a:t>
+              <a:t>24/9/2021</a:t>
             </a:fld>
             <a:endParaRPr lang="en-SG"/>
           </a:p>
@@ -917,7 +917,7 @@
           <a:p>
             <a:fld id="{5B3D8EE2-B186-4E74-82A5-3FDCBC0BCA47}" type="datetimeFigureOut">
               <a:rPr lang="en-SG" smtClean="0"/>
-              <a:t>23/9/2021</a:t>
+              <a:t>24/9/2021</a:t>
             </a:fld>
             <a:endParaRPr lang="en-SG"/>
           </a:p>
@@ -1117,7 +1117,7 @@
           <a:p>
             <a:fld id="{5B3D8EE2-B186-4E74-82A5-3FDCBC0BCA47}" type="datetimeFigureOut">
               <a:rPr lang="en-SG" smtClean="0"/>
-              <a:t>23/9/2021</a:t>
+              <a:t>24/9/2021</a:t>
             </a:fld>
             <a:endParaRPr lang="en-SG"/>
           </a:p>
@@ -1327,7 +1327,7 @@
           <a:p>
             <a:fld id="{5B3D8EE2-B186-4E74-82A5-3FDCBC0BCA47}" type="datetimeFigureOut">
               <a:rPr lang="en-SG" smtClean="0"/>
-              <a:t>23/9/2021</a:t>
+              <a:t>24/9/2021</a:t>
             </a:fld>
             <a:endParaRPr lang="en-SG"/>
           </a:p>
@@ -1527,7 +1527,7 @@
           <a:p>
             <a:fld id="{5B3D8EE2-B186-4E74-82A5-3FDCBC0BCA47}" type="datetimeFigureOut">
               <a:rPr lang="en-SG" smtClean="0"/>
-              <a:t>23/9/2021</a:t>
+              <a:t>24/9/2021</a:t>
             </a:fld>
             <a:endParaRPr lang="en-SG"/>
           </a:p>
@@ -1803,7 +1803,7 @@
           <a:p>
             <a:fld id="{5B3D8EE2-B186-4E74-82A5-3FDCBC0BCA47}" type="datetimeFigureOut">
               <a:rPr lang="en-SG" smtClean="0"/>
-              <a:t>23/9/2021</a:t>
+              <a:t>24/9/2021</a:t>
             </a:fld>
             <a:endParaRPr lang="en-SG"/>
           </a:p>
@@ -2071,7 +2071,7 @@
           <a:p>
             <a:fld id="{5B3D8EE2-B186-4E74-82A5-3FDCBC0BCA47}" type="datetimeFigureOut">
               <a:rPr lang="en-SG" smtClean="0"/>
-              <a:t>23/9/2021</a:t>
+              <a:t>24/9/2021</a:t>
             </a:fld>
             <a:endParaRPr lang="en-SG"/>
           </a:p>
@@ -2486,7 +2486,7 @@
           <a:p>
             <a:fld id="{5B3D8EE2-B186-4E74-82A5-3FDCBC0BCA47}" type="datetimeFigureOut">
               <a:rPr lang="en-SG" smtClean="0"/>
-              <a:t>23/9/2021</a:t>
+              <a:t>24/9/2021</a:t>
             </a:fld>
             <a:endParaRPr lang="en-SG"/>
           </a:p>
@@ -2628,7 +2628,7 @@
           <a:p>
             <a:fld id="{5B3D8EE2-B186-4E74-82A5-3FDCBC0BCA47}" type="datetimeFigureOut">
               <a:rPr lang="en-SG" smtClean="0"/>
-              <a:t>23/9/2021</a:t>
+              <a:t>24/9/2021</a:t>
             </a:fld>
             <a:endParaRPr lang="en-SG"/>
           </a:p>
@@ -2741,7 +2741,7 @@
           <a:p>
             <a:fld id="{5B3D8EE2-B186-4E74-82A5-3FDCBC0BCA47}" type="datetimeFigureOut">
               <a:rPr lang="en-SG" smtClean="0"/>
-              <a:t>23/9/2021</a:t>
+              <a:t>24/9/2021</a:t>
             </a:fld>
             <a:endParaRPr lang="en-SG"/>
           </a:p>
@@ -3054,7 +3054,7 @@
           <a:p>
             <a:fld id="{5B3D8EE2-B186-4E74-82A5-3FDCBC0BCA47}" type="datetimeFigureOut">
               <a:rPr lang="en-SG" smtClean="0"/>
-              <a:t>23/9/2021</a:t>
+              <a:t>24/9/2021</a:t>
             </a:fld>
             <a:endParaRPr lang="en-SG"/>
           </a:p>
@@ -3343,7 +3343,7 @@
           <a:p>
             <a:fld id="{5B3D8EE2-B186-4E74-82A5-3FDCBC0BCA47}" type="datetimeFigureOut">
               <a:rPr lang="en-SG" smtClean="0"/>
-              <a:t>23/9/2021</a:t>
+              <a:t>24/9/2021</a:t>
             </a:fld>
             <a:endParaRPr lang="en-SG"/>
           </a:p>
@@ -3586,7 +3586,7 @@
           <a:p>
             <a:fld id="{5B3D8EE2-B186-4E74-82A5-3FDCBC0BCA47}" type="datetimeFigureOut">
               <a:rPr lang="en-SG" smtClean="0"/>
-              <a:t>23/9/2021</a:t>
+              <a:t>24/9/2021</a:t>
             </a:fld>
             <a:endParaRPr lang="en-SG"/>
           </a:p>
@@ -10926,14 +10926,14 @@
           <p:nvPr>
             <p:extLst>
               <p:ext uri="{D42A27DB-BD31-4B8C-83A1-F6EECF244321}">
-                <p14:modId xmlns:p14="http://schemas.microsoft.com/office/powerpoint/2010/main" val="733870814"/>
+                <p14:modId xmlns:p14="http://schemas.microsoft.com/office/powerpoint/2010/main" val="64136418"/>
               </p:ext>
             </p:extLst>
           </p:nvPr>
         </p:nvGraphicFramePr>
         <p:xfrm>
           <a:off x="238539" y="149163"/>
-          <a:ext cx="11728175" cy="4541520"/>
+          <a:ext cx="11728175" cy="5029200"/>
         </p:xfrm>
         <a:graphic>
           <a:graphicData uri="http://schemas.openxmlformats.org/drawingml/2006/table">
@@ -11521,6 +11521,35 @@
                           </a:solidFill>
                         </a:rPr>
                         <a:t>- Limit the search to SG only **</a:t>
+                      </a:r>
+                    </a:p>
+                    <a:p>
+                      <a:pPr marL="0" marR="0" lvl="0" indent="0" algn="l" defTabSz="914400" rtl="0" eaLnBrk="1" fontAlgn="auto" latinLnBrk="0" hangingPunct="1">
+                        <a:lnSpc>
+                          <a:spcPct val="100000"/>
+                        </a:lnSpc>
+                        <a:spcBef>
+                          <a:spcPts val="0"/>
+                        </a:spcBef>
+                        <a:spcAft>
+                          <a:spcPts val="0"/>
+                        </a:spcAft>
+                        <a:buClrTx/>
+                        <a:buSzTx/>
+                        <a:buFontTx/>
+                        <a:buNone/>
+                        <a:tabLst/>
+                        <a:defRPr/>
+                      </a:pPr>
+                      <a:r>
+                        <a:rPr lang="en-US" sz="1600" dirty="0">
+                          <a:solidFill>
+                            <a:schemeClr val="accent6">
+                              <a:lumMod val="75000"/>
+                            </a:schemeClr>
+                          </a:solidFill>
+                        </a:rPr>
+                        <a:t>- Adjust the fly too zoom value (both on the display result &amp; the marker)</a:t>
                       </a:r>
                     </a:p>
                   </a:txBody>
@@ -11621,7 +11650,7 @@
           <p:nvPr>
             <p:extLst>
               <p:ext uri="{D42A27DB-BD31-4B8C-83A1-F6EECF244321}">
-                <p14:modId xmlns:p14="http://schemas.microsoft.com/office/powerpoint/2010/main" val="3861603036"/>
+                <p14:modId xmlns:p14="http://schemas.microsoft.com/office/powerpoint/2010/main" val="2187936975"/>
               </p:ext>
             </p:extLst>
           </p:nvPr>
@@ -12056,7 +12085,7 @@
                             </a:schemeClr>
                           </a:solidFill>
                         </a:rPr>
-                        <a:t>- Show region &gt;&gt; zoom out to see full region view**</a:t>
+                        <a:t>- Show region &gt;&gt; zoom out to see full region view***</a:t>
                       </a:r>
                     </a:p>
                     <a:p>

</xml_diff>

<commit_message>
fixed leftlet map not rendering when calling second page after set single page application
</commit_message>
<xml_diff>
--- a/wireframe.pptx
+++ b/wireframe.pptx
@@ -248,7 +248,7 @@
           <a:p>
             <a:fld id="{32064421-C73C-417F-B8BA-758EB1A55C3F}" type="datetimeFigureOut">
               <a:rPr lang="en-SG" smtClean="0"/>
-              <a:t>24/9/2021</a:t>
+              <a:t>26/9/2021</a:t>
             </a:fld>
             <a:endParaRPr lang="en-SG"/>
           </a:p>
@@ -917,7 +917,7 @@
           <a:p>
             <a:fld id="{5B3D8EE2-B186-4E74-82A5-3FDCBC0BCA47}" type="datetimeFigureOut">
               <a:rPr lang="en-SG" smtClean="0"/>
-              <a:t>24/9/2021</a:t>
+              <a:t>26/9/2021</a:t>
             </a:fld>
             <a:endParaRPr lang="en-SG"/>
           </a:p>
@@ -1117,7 +1117,7 @@
           <a:p>
             <a:fld id="{5B3D8EE2-B186-4E74-82A5-3FDCBC0BCA47}" type="datetimeFigureOut">
               <a:rPr lang="en-SG" smtClean="0"/>
-              <a:t>24/9/2021</a:t>
+              <a:t>26/9/2021</a:t>
             </a:fld>
             <a:endParaRPr lang="en-SG"/>
           </a:p>
@@ -1327,7 +1327,7 @@
           <a:p>
             <a:fld id="{5B3D8EE2-B186-4E74-82A5-3FDCBC0BCA47}" type="datetimeFigureOut">
               <a:rPr lang="en-SG" smtClean="0"/>
-              <a:t>24/9/2021</a:t>
+              <a:t>26/9/2021</a:t>
             </a:fld>
             <a:endParaRPr lang="en-SG"/>
           </a:p>
@@ -1527,7 +1527,7 @@
           <a:p>
             <a:fld id="{5B3D8EE2-B186-4E74-82A5-3FDCBC0BCA47}" type="datetimeFigureOut">
               <a:rPr lang="en-SG" smtClean="0"/>
-              <a:t>24/9/2021</a:t>
+              <a:t>26/9/2021</a:t>
             </a:fld>
             <a:endParaRPr lang="en-SG"/>
           </a:p>
@@ -1803,7 +1803,7 @@
           <a:p>
             <a:fld id="{5B3D8EE2-B186-4E74-82A5-3FDCBC0BCA47}" type="datetimeFigureOut">
               <a:rPr lang="en-SG" smtClean="0"/>
-              <a:t>24/9/2021</a:t>
+              <a:t>26/9/2021</a:t>
             </a:fld>
             <a:endParaRPr lang="en-SG"/>
           </a:p>
@@ -2071,7 +2071,7 @@
           <a:p>
             <a:fld id="{5B3D8EE2-B186-4E74-82A5-3FDCBC0BCA47}" type="datetimeFigureOut">
               <a:rPr lang="en-SG" smtClean="0"/>
-              <a:t>24/9/2021</a:t>
+              <a:t>26/9/2021</a:t>
             </a:fld>
             <a:endParaRPr lang="en-SG"/>
           </a:p>
@@ -2486,7 +2486,7 @@
           <a:p>
             <a:fld id="{5B3D8EE2-B186-4E74-82A5-3FDCBC0BCA47}" type="datetimeFigureOut">
               <a:rPr lang="en-SG" smtClean="0"/>
-              <a:t>24/9/2021</a:t>
+              <a:t>26/9/2021</a:t>
             </a:fld>
             <a:endParaRPr lang="en-SG"/>
           </a:p>
@@ -2628,7 +2628,7 @@
           <a:p>
             <a:fld id="{5B3D8EE2-B186-4E74-82A5-3FDCBC0BCA47}" type="datetimeFigureOut">
               <a:rPr lang="en-SG" smtClean="0"/>
-              <a:t>24/9/2021</a:t>
+              <a:t>26/9/2021</a:t>
             </a:fld>
             <a:endParaRPr lang="en-SG"/>
           </a:p>
@@ -2741,7 +2741,7 @@
           <a:p>
             <a:fld id="{5B3D8EE2-B186-4E74-82A5-3FDCBC0BCA47}" type="datetimeFigureOut">
               <a:rPr lang="en-SG" smtClean="0"/>
-              <a:t>24/9/2021</a:t>
+              <a:t>26/9/2021</a:t>
             </a:fld>
             <a:endParaRPr lang="en-SG"/>
           </a:p>
@@ -3054,7 +3054,7 @@
           <a:p>
             <a:fld id="{5B3D8EE2-B186-4E74-82A5-3FDCBC0BCA47}" type="datetimeFigureOut">
               <a:rPr lang="en-SG" smtClean="0"/>
-              <a:t>24/9/2021</a:t>
+              <a:t>26/9/2021</a:t>
             </a:fld>
             <a:endParaRPr lang="en-SG"/>
           </a:p>
@@ -3343,7 +3343,7 @@
           <a:p>
             <a:fld id="{5B3D8EE2-B186-4E74-82A5-3FDCBC0BCA47}" type="datetimeFigureOut">
               <a:rPr lang="en-SG" smtClean="0"/>
-              <a:t>24/9/2021</a:t>
+              <a:t>26/9/2021</a:t>
             </a:fld>
             <a:endParaRPr lang="en-SG"/>
           </a:p>
@@ -3586,7 +3586,7 @@
           <a:p>
             <a:fld id="{5B3D8EE2-B186-4E74-82A5-3FDCBC0BCA47}" type="datetimeFigureOut">
               <a:rPr lang="en-SG" smtClean="0"/>
-              <a:t>24/9/2021</a:t>
+              <a:t>26/9/2021</a:t>
             </a:fld>
             <a:endParaRPr lang="en-SG"/>
           </a:p>
@@ -4067,7 +4067,7 @@
           <a:p>
             <a:r>
               <a:rPr lang="en-US" dirty="0"/>
-              <a:t>Interactive map Outdoor Pre-Wedding Shoot Locations</a:t>
+              <a:t>Interactive map for Pre-Wedding Shoot Locations</a:t>
             </a:r>
           </a:p>
           <a:p>
@@ -7122,7 +7122,7 @@
           <a:p>
             <a:r>
               <a:rPr lang="en-US" dirty="0"/>
-              <a:t>images </a:t>
+              <a:t>image </a:t>
             </a:r>
             <a:endParaRPr lang="en-SG" dirty="0"/>
           </a:p>
@@ -7430,7 +7430,7 @@
           <a:p>
             <a:r>
               <a:rPr lang="en-US" dirty="0"/>
-              <a:t>images </a:t>
+              <a:t>image </a:t>
             </a:r>
             <a:endParaRPr lang="en-SG" dirty="0"/>
           </a:p>
@@ -7466,7 +7466,7 @@
           <a:p>
             <a:r>
               <a:rPr lang="en-US" dirty="0"/>
-              <a:t>images </a:t>
+              <a:t>image</a:t>
             </a:r>
             <a:endParaRPr lang="en-SG" dirty="0"/>
           </a:p>
@@ -8221,87 +8221,6 @@
           </p:txBody>
         </p:sp>
       </p:grpSp>
-      <p:sp>
-        <p:nvSpPr>
-          <p:cNvPr id="3" name="TextBox 2">
-            <a:extLst>
-              <a:ext uri="{FF2B5EF4-FFF2-40B4-BE49-F238E27FC236}">
-                <a16:creationId xmlns:a16="http://schemas.microsoft.com/office/drawing/2014/main" id="{8D57FB78-D92F-4FC7-BA32-F040DEA406D1}"/>
-              </a:ext>
-            </a:extLst>
-          </p:cNvPr>
-          <p:cNvSpPr txBox="1"/>
-          <p:nvPr/>
-        </p:nvSpPr>
-        <p:spPr>
-          <a:xfrm>
-            <a:off x="8153400" y="2124075"/>
-            <a:ext cx="3295650" cy="1200329"/>
-          </a:xfrm>
-          <a:prstGeom prst="rect">
-            <a:avLst/>
-          </a:prstGeom>
-          <a:noFill/>
-        </p:spPr>
-        <p:txBody>
-          <a:bodyPr wrap="square" rtlCol="0">
-            <a:spAutoFit/>
-          </a:bodyPr>
-          <a:lstStyle/>
-          <a:p>
-            <a:r>
-              <a:rPr lang="en-US" dirty="0">
-                <a:solidFill>
-                  <a:schemeClr val="accent2"/>
-                </a:solidFill>
-              </a:rPr>
-              <a:t>carpark, show </a:t>
-            </a:r>
-            <a:r>
-              <a:rPr lang="en-US" dirty="0" err="1">
-                <a:solidFill>
-                  <a:schemeClr val="accent2"/>
-                </a:solidFill>
-              </a:rPr>
-              <a:t>avai</a:t>
-            </a:r>
-            <a:r>
-              <a:rPr lang="en-US" dirty="0">
-                <a:solidFill>
-                  <a:schemeClr val="accent2"/>
-                </a:solidFill>
-              </a:rPr>
-              <a:t> and how many slot left </a:t>
-            </a:r>
-          </a:p>
-          <a:p>
-            <a:r>
-              <a:rPr lang="en-US" dirty="0">
-                <a:solidFill>
-                  <a:schemeClr val="accent2"/>
-                </a:solidFill>
-              </a:rPr>
-              <a:t>show parameter of nearby </a:t>
-            </a:r>
-            <a:r>
-              <a:rPr lang="en-US" dirty="0" err="1">
-                <a:solidFill>
-                  <a:schemeClr val="accent2"/>
-                </a:solidFill>
-              </a:rPr>
-              <a:t>wihin</a:t>
-            </a:r>
-            <a:r>
-              <a:rPr lang="en-US" dirty="0">
-                <a:solidFill>
-                  <a:schemeClr val="accent2"/>
-                </a:solidFill>
-              </a:rPr>
-              <a:t> 500 meters </a:t>
-            </a:r>
-          </a:p>
-        </p:txBody>
-      </p:sp>
     </p:spTree>
     <p:extLst>
       <p:ext uri="{BB962C8B-B14F-4D97-AF65-F5344CB8AC3E}">
@@ -10368,519 +10287,145 @@
           <a:chExt cx="0" cy="0"/>
         </a:xfrm>
       </p:grpSpPr>
-      <p:graphicFrame>
-        <p:nvGraphicFramePr>
-          <p:cNvPr id="2" name="Table 3">
-            <a:extLst>
-              <a:ext uri="{FF2B5EF4-FFF2-40B4-BE49-F238E27FC236}">
-                <a16:creationId xmlns:a16="http://schemas.microsoft.com/office/drawing/2014/main" id="{B81D1094-1E12-4E9F-9397-57470ED44070}"/>
-              </a:ext>
-            </a:extLst>
-          </p:cNvPr>
-          <p:cNvGraphicFramePr>
-            <a:graphicFrameLocks noGrp="1"/>
-          </p:cNvGraphicFramePr>
-          <p:nvPr>
-            <p:extLst>
-              <p:ext uri="{D42A27DB-BD31-4B8C-83A1-F6EECF244321}">
-                <p14:modId xmlns:p14="http://schemas.microsoft.com/office/powerpoint/2010/main" val="1513334531"/>
-              </p:ext>
-            </p:extLst>
-          </p:nvPr>
-        </p:nvGraphicFramePr>
-        <p:xfrm>
-          <a:off x="246821" y="356888"/>
-          <a:ext cx="11698358" cy="3403600"/>
-        </p:xfrm>
-        <a:graphic>
-          <a:graphicData uri="http://schemas.openxmlformats.org/drawingml/2006/table">
-            <a:tbl>
-              <a:tblPr firstRow="1" bandRow="1">
-                <a:tableStyleId>{5C22544A-7EE6-4342-B048-85BDC9FD1C3A}</a:tableStyleId>
-              </a:tblPr>
-              <a:tblGrid>
-                <a:gridCol w="5849179">
-                  <a:extLst>
-                    <a:ext uri="{9D8B030D-6E8A-4147-A177-3AD203B41FA5}">
-                      <a16:colId xmlns:a16="http://schemas.microsoft.com/office/drawing/2014/main" val="2073254338"/>
-                    </a:ext>
-                  </a:extLst>
-                </a:gridCol>
-                <a:gridCol w="5849179">
-                  <a:extLst>
-                    <a:ext uri="{9D8B030D-6E8A-4147-A177-3AD203B41FA5}">
-                      <a16:colId xmlns:a16="http://schemas.microsoft.com/office/drawing/2014/main" val="3487445649"/>
-                    </a:ext>
-                  </a:extLst>
-                </a:gridCol>
-              </a:tblGrid>
-              <a:tr h="370840">
-                <a:tc>
-                  <a:txBody>
-                    <a:bodyPr/>
-                    <a:lstStyle/>
-                    <a:p>
-                      <a:pPr marL="0" marR="0" lvl="0" indent="0" algn="l" defTabSz="914400" rtl="0" eaLnBrk="1" fontAlgn="auto" latinLnBrk="0" hangingPunct="1">
-                        <a:lnSpc>
-                          <a:spcPct val="100000"/>
-                        </a:lnSpc>
-                        <a:spcBef>
-                          <a:spcPts val="0"/>
-                        </a:spcBef>
-                        <a:spcAft>
-                          <a:spcPts val="0"/>
-                        </a:spcAft>
-                        <a:buClrTx/>
-                        <a:buSzTx/>
-                        <a:buFontTx/>
-                        <a:buNone/>
-                        <a:tabLst/>
-                        <a:defRPr/>
-                      </a:pPr>
-                      <a:r>
-                        <a:rPr lang="en-US" sz="1800" b="1" dirty="0"/>
-                        <a:t>Updated data use: </a:t>
-                      </a:r>
-                    </a:p>
-                  </a:txBody>
-                  <a:tcPr/>
-                </a:tc>
-                <a:tc>
-                  <a:txBody>
-                    <a:bodyPr/>
-                    <a:lstStyle/>
-                    <a:p>
-                      <a:r>
-                        <a:rPr lang="en-US" dirty="0"/>
-                        <a:t>Ref: </a:t>
-                      </a:r>
-                      <a:endParaRPr lang="en-SG" dirty="0"/>
-                    </a:p>
-                  </a:txBody>
-                  <a:tcPr/>
-                </a:tc>
-                <a:extLst>
-                  <a:ext uri="{0D108BD9-81ED-4DB2-BD59-A6C34878D82A}">
-                    <a16:rowId xmlns:a16="http://schemas.microsoft.com/office/drawing/2014/main" val="1548987095"/>
-                  </a:ext>
-                </a:extLst>
-              </a:tr>
-              <a:tr h="370840">
-                <a:tc>
-                  <a:txBody>
-                    <a:bodyPr/>
-                    <a:lstStyle/>
-                    <a:p>
-                      <a:pPr marL="0" marR="0" lvl="0" indent="0" algn="l" defTabSz="914400" rtl="0" eaLnBrk="1" fontAlgn="auto" latinLnBrk="0" hangingPunct="1">
-                        <a:lnSpc>
-                          <a:spcPct val="100000"/>
-                        </a:lnSpc>
-                        <a:spcBef>
-                          <a:spcPts val="0"/>
-                        </a:spcBef>
-                        <a:spcAft>
-                          <a:spcPts val="0"/>
-                        </a:spcAft>
-                        <a:buClrTx/>
-                        <a:buSzTx/>
-                        <a:buFontTx/>
-                        <a:buNone/>
-                        <a:tabLst/>
-                        <a:defRPr/>
-                      </a:pPr>
-                      <a:r>
-                        <a:rPr lang="en-US" sz="1800" dirty="0"/>
-                        <a:t>Main map  &gt;&gt; </a:t>
-                      </a:r>
-                      <a:r>
-                        <a:rPr lang="en-US" sz="1800" dirty="0" err="1"/>
-                        <a:t>Leftlet</a:t>
-                      </a:r>
-                      <a:r>
-                        <a:rPr lang="en-US" sz="1800" dirty="0"/>
-                        <a:t> </a:t>
-                      </a:r>
-                    </a:p>
-                  </a:txBody>
-                  <a:tcPr/>
-                </a:tc>
-                <a:tc>
-                  <a:txBody>
-                    <a:bodyPr/>
-                    <a:lstStyle/>
-                    <a:p>
-                      <a:pPr marL="0" marR="0" lvl="0" indent="0" algn="l" defTabSz="914400" rtl="0" eaLnBrk="1" fontAlgn="auto" latinLnBrk="0" hangingPunct="1">
-                        <a:lnSpc>
-                          <a:spcPct val="100000"/>
-                        </a:lnSpc>
-                        <a:spcBef>
-                          <a:spcPts val="0"/>
-                        </a:spcBef>
-                        <a:spcAft>
-                          <a:spcPts val="0"/>
-                        </a:spcAft>
-                        <a:buClrTx/>
-                        <a:buSzTx/>
-                        <a:buFontTx/>
-                        <a:buNone/>
-                        <a:tabLst/>
-                        <a:defRPr/>
-                      </a:pPr>
-                      <a:r>
-                        <a:rPr lang="en-SG" sz="1800" dirty="0"/>
-                        <a:t>https://leafletjs.com/reference-1.7.1.html</a:t>
-                      </a:r>
-                    </a:p>
-                  </a:txBody>
-                  <a:tcPr/>
-                </a:tc>
-                <a:extLst>
-                  <a:ext uri="{0D108BD9-81ED-4DB2-BD59-A6C34878D82A}">
-                    <a16:rowId xmlns:a16="http://schemas.microsoft.com/office/drawing/2014/main" val="930923466"/>
-                  </a:ext>
-                </a:extLst>
-              </a:tr>
-              <a:tr h="370840">
-                <a:tc>
-                  <a:txBody>
-                    <a:bodyPr/>
-                    <a:lstStyle/>
-                    <a:p>
-                      <a:pPr marL="0" marR="0" lvl="0" indent="0" algn="l" defTabSz="914400" rtl="0" eaLnBrk="1" fontAlgn="auto" latinLnBrk="0" hangingPunct="1">
-                        <a:lnSpc>
-                          <a:spcPct val="100000"/>
-                        </a:lnSpc>
-                        <a:spcBef>
-                          <a:spcPts val="0"/>
-                        </a:spcBef>
-                        <a:spcAft>
-                          <a:spcPts val="0"/>
-                        </a:spcAft>
-                        <a:buClrTx/>
-                        <a:buSzTx/>
-                        <a:buFontTx/>
-                        <a:buNone/>
-                        <a:tabLst/>
-                        <a:defRPr/>
-                      </a:pPr>
-                      <a:r>
-                        <a:rPr lang="en-SG" sz="1800" dirty="0"/>
-                        <a:t>Parks</a:t>
-                      </a:r>
-                    </a:p>
-                  </a:txBody>
-                  <a:tcPr/>
-                </a:tc>
-                <a:tc>
-                  <a:txBody>
-                    <a:bodyPr/>
-                    <a:lstStyle/>
-                    <a:p>
-                      <a:pPr marL="0" marR="0" lvl="0" indent="0" algn="l" defTabSz="914400" rtl="0" eaLnBrk="1" fontAlgn="auto" latinLnBrk="0" hangingPunct="1">
-                        <a:lnSpc>
-                          <a:spcPct val="100000"/>
-                        </a:lnSpc>
-                        <a:spcBef>
-                          <a:spcPts val="0"/>
-                        </a:spcBef>
-                        <a:spcAft>
-                          <a:spcPts val="0"/>
-                        </a:spcAft>
-                        <a:buClrTx/>
-                        <a:buSzTx/>
-                        <a:buFontTx/>
-                        <a:buNone/>
-                        <a:tabLst/>
-                        <a:defRPr/>
-                      </a:pPr>
-                      <a:r>
-                        <a:rPr lang="en-SG" sz="1800" dirty="0"/>
-                        <a:t>https://data.gov.sg/dataset/parks?resource_id=579a406c-f1bb-44da-afb7-45d8c1e4465f</a:t>
-                      </a:r>
-                    </a:p>
-                  </a:txBody>
-                  <a:tcPr/>
-                </a:tc>
-                <a:extLst>
-                  <a:ext uri="{0D108BD9-81ED-4DB2-BD59-A6C34878D82A}">
-                    <a16:rowId xmlns:a16="http://schemas.microsoft.com/office/drawing/2014/main" val="3313079467"/>
-                  </a:ext>
-                </a:extLst>
-              </a:tr>
-              <a:tr h="370840">
-                <a:tc>
-                  <a:txBody>
-                    <a:bodyPr/>
-                    <a:lstStyle/>
-                    <a:p>
-                      <a:r>
-                        <a:rPr lang="en-US" dirty="0"/>
-                        <a:t>Four Square</a:t>
-                      </a:r>
-                      <a:endParaRPr lang="en-SG" dirty="0"/>
-                    </a:p>
-                  </a:txBody>
-                  <a:tcPr/>
-                </a:tc>
-                <a:tc>
-                  <a:txBody>
-                    <a:bodyPr/>
-                    <a:lstStyle/>
-                    <a:p>
-                      <a:pPr marL="0" marR="0" lvl="0" indent="0" algn="l" defTabSz="914400" rtl="0" eaLnBrk="1" fontAlgn="auto" latinLnBrk="0" hangingPunct="1">
-                        <a:lnSpc>
-                          <a:spcPct val="100000"/>
-                        </a:lnSpc>
-                        <a:spcBef>
-                          <a:spcPts val="0"/>
-                        </a:spcBef>
-                        <a:spcAft>
-                          <a:spcPts val="0"/>
-                        </a:spcAft>
-                        <a:buClrTx/>
-                        <a:buSzTx/>
-                        <a:buFontTx/>
-                        <a:buNone/>
-                        <a:tabLst/>
-                        <a:defRPr/>
-                      </a:pPr>
-                      <a:r>
-                        <a:rPr lang="en-SG" sz="1800" b="0" kern="1200" dirty="0">
-                          <a:solidFill>
-                            <a:schemeClr val="dk1"/>
-                          </a:solidFill>
-                          <a:effectLst/>
-                          <a:latin typeface="+mn-lt"/>
-                          <a:ea typeface="+mn-ea"/>
-                          <a:cs typeface="+mn-cs"/>
-                        </a:rPr>
-                        <a:t>https://api.foursquare.com/v2/venues/search</a:t>
-                      </a:r>
-                    </a:p>
-                  </a:txBody>
-                  <a:tcPr/>
-                </a:tc>
-                <a:extLst>
-                  <a:ext uri="{0D108BD9-81ED-4DB2-BD59-A6C34878D82A}">
-                    <a16:rowId xmlns:a16="http://schemas.microsoft.com/office/drawing/2014/main" val="3190661558"/>
-                  </a:ext>
-                </a:extLst>
-              </a:tr>
-              <a:tr h="370840">
-                <a:tc>
-                  <a:txBody>
-                    <a:bodyPr/>
-                    <a:lstStyle/>
-                    <a:p>
-                      <a:r>
-                        <a:rPr lang="en-US" dirty="0"/>
-                        <a:t>2 </a:t>
-                      </a:r>
-                      <a:r>
-                        <a:rPr lang="en-US" dirty="0" err="1"/>
-                        <a:t>hr</a:t>
-                      </a:r>
-                      <a:r>
-                        <a:rPr lang="en-US" dirty="0"/>
-                        <a:t> </a:t>
-                      </a:r>
-                      <a:r>
-                        <a:rPr lang="en-US" dirty="0" err="1"/>
-                        <a:t>api</a:t>
-                      </a:r>
-                      <a:endParaRPr lang="en-SG" dirty="0"/>
-                    </a:p>
-                  </a:txBody>
-                  <a:tcPr/>
-                </a:tc>
-                <a:tc>
-                  <a:txBody>
-                    <a:bodyPr/>
-                    <a:lstStyle/>
-                    <a:p>
-                      <a:pPr marL="0" marR="0" lvl="0" indent="0" algn="l" defTabSz="914400" rtl="0" eaLnBrk="1" fontAlgn="auto" latinLnBrk="0" hangingPunct="1">
-                        <a:lnSpc>
-                          <a:spcPct val="100000"/>
-                        </a:lnSpc>
-                        <a:spcBef>
-                          <a:spcPts val="0"/>
-                        </a:spcBef>
-                        <a:spcAft>
-                          <a:spcPts val="0"/>
-                        </a:spcAft>
-                        <a:buClrTx/>
-                        <a:buSzTx/>
-                        <a:buFontTx/>
-                        <a:buNone/>
-                        <a:tabLst/>
-                        <a:defRPr/>
-                      </a:pPr>
-                      <a:r>
-                        <a:rPr lang="en-SG" sz="1800" b="0" kern="1200" dirty="0">
-                          <a:solidFill>
-                            <a:schemeClr val="dk1"/>
-                          </a:solidFill>
-                          <a:effectLst/>
-                          <a:latin typeface="+mn-lt"/>
-                          <a:ea typeface="+mn-ea"/>
-                          <a:cs typeface="+mn-cs"/>
-                        </a:rPr>
-                        <a:t>https://api.data.gov.sg/v1/environment/2-hour-weather-forecast</a:t>
-                      </a:r>
-                    </a:p>
-                  </a:txBody>
-                  <a:tcPr/>
-                </a:tc>
-                <a:extLst>
-                  <a:ext uri="{0D108BD9-81ED-4DB2-BD59-A6C34878D82A}">
-                    <a16:rowId xmlns:a16="http://schemas.microsoft.com/office/drawing/2014/main" val="860356388"/>
-                  </a:ext>
-                </a:extLst>
-              </a:tr>
-              <a:tr h="370840">
-                <a:tc>
-                  <a:txBody>
-                    <a:bodyPr/>
-                    <a:lstStyle/>
-                    <a:p>
-                      <a:r>
-                        <a:rPr lang="en-US" dirty="0"/>
-                        <a:t>Singapore regions boundary</a:t>
-                      </a:r>
-                    </a:p>
-                    <a:p>
-                      <a:pPr marL="0" marR="0" lvl="0" indent="0" algn="l" defTabSz="914400" rtl="0" eaLnBrk="1" fontAlgn="auto" latinLnBrk="0" hangingPunct="1">
-                        <a:lnSpc>
-                          <a:spcPct val="100000"/>
-                        </a:lnSpc>
-                        <a:spcBef>
-                          <a:spcPts val="0"/>
-                        </a:spcBef>
-                        <a:spcAft>
-                          <a:spcPts val="0"/>
-                        </a:spcAft>
-                        <a:buClrTx/>
-                        <a:buSzTx/>
-                        <a:buFontTx/>
-                        <a:buNone/>
-                        <a:tabLst/>
-                        <a:defRPr/>
-                      </a:pPr>
-                      <a:r>
-                        <a:rPr lang="en-US" dirty="0"/>
-                        <a:t>(</a:t>
-                      </a:r>
-                      <a:r>
-                        <a:rPr lang="en-US" dirty="0" err="1"/>
-                        <a:t>geojson</a:t>
-                      </a:r>
-                      <a:r>
-                        <a:rPr lang="en-US" dirty="0"/>
-                        <a:t> </a:t>
-                      </a:r>
-                      <a:r>
-                        <a:rPr lang="en-SG" sz="1800" b="0" kern="1200" dirty="0" err="1">
-                          <a:solidFill>
-                            <a:schemeClr val="dk1"/>
-                          </a:solidFill>
-                          <a:effectLst/>
-                          <a:latin typeface="+mn-lt"/>
-                          <a:ea typeface="+mn-ea"/>
-                          <a:cs typeface="+mn-cs"/>
-                        </a:rPr>
-                        <a:t>MultiPolygon</a:t>
-                      </a:r>
-                      <a:r>
-                        <a:rPr lang="en-SG" sz="1800" b="0" kern="1200" dirty="0">
-                          <a:solidFill>
-                            <a:schemeClr val="dk1"/>
-                          </a:solidFill>
-                          <a:effectLst/>
-                          <a:latin typeface="+mn-lt"/>
-                          <a:ea typeface="+mn-ea"/>
-                          <a:cs typeface="+mn-cs"/>
-                        </a:rPr>
-                        <a:t>)</a:t>
-                      </a:r>
-                    </a:p>
-                  </a:txBody>
-                  <a:tcPr/>
-                </a:tc>
-                <a:tc>
-                  <a:txBody>
-                    <a:bodyPr/>
-                    <a:lstStyle/>
-                    <a:p>
-                      <a:pPr marL="0" marR="0" lvl="0" indent="0" algn="l" defTabSz="914400" rtl="0" eaLnBrk="1" fontAlgn="auto" latinLnBrk="0" hangingPunct="1">
-                        <a:lnSpc>
-                          <a:spcPct val="100000"/>
-                        </a:lnSpc>
-                        <a:spcBef>
-                          <a:spcPts val="0"/>
-                        </a:spcBef>
-                        <a:spcAft>
-                          <a:spcPts val="0"/>
-                        </a:spcAft>
-                        <a:buClrTx/>
-                        <a:buSzTx/>
-                        <a:buFontTx/>
-                        <a:buNone/>
-                        <a:tabLst/>
-                        <a:defRPr/>
-                      </a:pPr>
-                      <a:r>
-                        <a:rPr lang="en-SG" sz="1800" b="0" kern="1200" dirty="0">
-                          <a:solidFill>
-                            <a:schemeClr val="dk1"/>
-                          </a:solidFill>
-                          <a:effectLst/>
-                          <a:latin typeface="+mn-lt"/>
-                          <a:ea typeface="+mn-ea"/>
-                          <a:cs typeface="+mn-cs"/>
-                        </a:rPr>
-                        <a:t>https://data.gov.sg/dataset/master-plan-2019-region-boundary-no-sea</a:t>
-                      </a:r>
-                    </a:p>
-                  </a:txBody>
-                  <a:tcPr/>
-                </a:tc>
-                <a:extLst>
-                  <a:ext uri="{0D108BD9-81ED-4DB2-BD59-A6C34878D82A}">
-                    <a16:rowId xmlns:a16="http://schemas.microsoft.com/office/drawing/2014/main" val="1550290926"/>
-                  </a:ext>
-                </a:extLst>
-              </a:tr>
-              <a:tr h="370840">
-                <a:tc>
-                  <a:txBody>
-                    <a:bodyPr/>
-                    <a:lstStyle/>
-                    <a:p>
-                      <a:endParaRPr lang="en-SG" dirty="0"/>
-                    </a:p>
-                  </a:txBody>
-                  <a:tcPr/>
-                </a:tc>
-                <a:tc>
-                  <a:txBody>
-                    <a:bodyPr/>
-                    <a:lstStyle/>
-                    <a:p>
-                      <a:endParaRPr lang="en-SG" dirty="0"/>
-                    </a:p>
-                  </a:txBody>
-                  <a:tcPr/>
-                </a:tc>
-                <a:extLst>
-                  <a:ext uri="{0D108BD9-81ED-4DB2-BD59-A6C34878D82A}">
-                    <a16:rowId xmlns:a16="http://schemas.microsoft.com/office/drawing/2014/main" val="999446564"/>
-                  </a:ext>
-                </a:extLst>
-              </a:tr>
-            </a:tbl>
-          </a:graphicData>
-        </a:graphic>
-      </p:graphicFrame>
+      <p:sp>
+        <p:nvSpPr>
+          <p:cNvPr id="3" name="TextBox 2">
+            <a:extLst>
+              <a:ext uri="{FF2B5EF4-FFF2-40B4-BE49-F238E27FC236}">
+                <a16:creationId xmlns:a16="http://schemas.microsoft.com/office/drawing/2014/main" id="{9884C430-F3E4-4198-B55D-2F617E95BA5A}"/>
+              </a:ext>
+            </a:extLst>
+          </p:cNvPr>
+          <p:cNvSpPr txBox="1"/>
+          <p:nvPr/>
+        </p:nvSpPr>
+        <p:spPr>
+          <a:xfrm>
+            <a:off x="4462670" y="2782669"/>
+            <a:ext cx="1823830" cy="646331"/>
+          </a:xfrm>
+          <a:prstGeom prst="rect">
+            <a:avLst/>
+          </a:prstGeom>
+          <a:noFill/>
+        </p:spPr>
+        <p:txBody>
+          <a:bodyPr wrap="square" rtlCol="0">
+            <a:spAutoFit/>
+          </a:bodyPr>
+          <a:lstStyle/>
+          <a:p>
+            <a:r>
+              <a:rPr lang="en-SG" dirty="0">
+                <a:solidFill>
+                  <a:schemeClr val="accent6">
+                    <a:lumMod val="50000"/>
+                  </a:schemeClr>
+                </a:solidFill>
+              </a:rPr>
+              <a:t>Foursquare photos </a:t>
+            </a:r>
+            <a:r>
+              <a:rPr lang="en-SG" dirty="0" err="1">
+                <a:solidFill>
+                  <a:schemeClr val="accent6">
+                    <a:lumMod val="50000"/>
+                  </a:schemeClr>
+                </a:solidFill>
+              </a:rPr>
+              <a:t>api</a:t>
+            </a:r>
+            <a:endParaRPr lang="en-SG" dirty="0">
+              <a:solidFill>
+                <a:schemeClr val="accent6">
+                  <a:lumMod val="50000"/>
+                </a:schemeClr>
+              </a:solidFill>
+            </a:endParaRPr>
+          </a:p>
+        </p:txBody>
+      </p:sp>
+      <p:sp>
+        <p:nvSpPr>
+          <p:cNvPr id="4" name="TextBox 3">
+            <a:extLst>
+              <a:ext uri="{FF2B5EF4-FFF2-40B4-BE49-F238E27FC236}">
+                <a16:creationId xmlns:a16="http://schemas.microsoft.com/office/drawing/2014/main" id="{3271B57A-94CE-4FA4-B1F2-D2D21E0A8199}"/>
+              </a:ext>
+            </a:extLst>
+          </p:cNvPr>
+          <p:cNvSpPr txBox="1"/>
+          <p:nvPr/>
+        </p:nvSpPr>
+        <p:spPr>
+          <a:xfrm>
+            <a:off x="8153400" y="2124075"/>
+            <a:ext cx="3295650" cy="1200329"/>
+          </a:xfrm>
+          <a:prstGeom prst="rect">
+            <a:avLst/>
+          </a:prstGeom>
+          <a:noFill/>
+        </p:spPr>
+        <p:txBody>
+          <a:bodyPr wrap="square" rtlCol="0">
+            <a:spAutoFit/>
+          </a:bodyPr>
+          <a:lstStyle/>
+          <a:p>
+            <a:r>
+              <a:rPr lang="en-US" dirty="0">
+                <a:solidFill>
+                  <a:schemeClr val="accent2"/>
+                </a:solidFill>
+              </a:rPr>
+              <a:t>carpark, show </a:t>
+            </a:r>
+            <a:r>
+              <a:rPr lang="en-US" dirty="0" err="1">
+                <a:solidFill>
+                  <a:schemeClr val="accent2"/>
+                </a:solidFill>
+              </a:rPr>
+              <a:t>avai</a:t>
+            </a:r>
+            <a:r>
+              <a:rPr lang="en-US" dirty="0">
+                <a:solidFill>
+                  <a:schemeClr val="accent2"/>
+                </a:solidFill>
+              </a:rPr>
+              <a:t> and how many slot left </a:t>
+            </a:r>
+          </a:p>
+          <a:p>
+            <a:r>
+              <a:rPr lang="en-US" dirty="0">
+                <a:solidFill>
+                  <a:schemeClr val="accent2"/>
+                </a:solidFill>
+              </a:rPr>
+              <a:t>show parameter of nearby </a:t>
+            </a:r>
+            <a:r>
+              <a:rPr lang="en-US" dirty="0" err="1">
+                <a:solidFill>
+                  <a:schemeClr val="accent2"/>
+                </a:solidFill>
+              </a:rPr>
+              <a:t>wihin</a:t>
+            </a:r>
+            <a:r>
+              <a:rPr lang="en-US" dirty="0">
+                <a:solidFill>
+                  <a:schemeClr val="accent2"/>
+                </a:solidFill>
+              </a:rPr>
+              <a:t> 500 meters </a:t>
+            </a:r>
+          </a:p>
+        </p:txBody>
+      </p:sp>
     </p:spTree>
     <p:extLst>
       <p:ext uri="{BB962C8B-B14F-4D97-AF65-F5344CB8AC3E}">

</xml_diff>